<commit_message>
Level 2 - Fixes The death animation issue ! Also Boss model added and some animations
</commit_message>
<xml_diff>
--- a/Documentation/Report/Documentationofstuff.pptx
+++ b/Documentation/Report/Documentationofstuff.pptx
@@ -111,6 +111,11 @@
       </a:defRPr>
     </a:lvl9pPr>
   </p:defaultTextStyle>
+  <p:extLst>
+    <p:ext uri="{EFAFB233-063F-42B5-8137-9DF3F51BA10A}">
+      <p15:sldGuideLst xmlns:p15="http://schemas.microsoft.com/office/powerpoint/2012/main"/>
+    </p:ext>
+  </p:extLst>
 </p:presentation>
 </file>
 
@@ -3758,7 +3763,10 @@
           <a:bodyPr/>
           <a:lstStyle/>
           <a:p>
-            <a:endParaRPr lang="en-GB"/>
+            <a:r>
+              <a:rPr lang="en-GB" dirty="0"/>
+              <a:t>I THINK RN</a:t>
+            </a:r>
           </a:p>
         </p:txBody>
       </p:sp>
@@ -3783,7 +3791,25 @@
           <a:bodyPr/>
           <a:lstStyle/>
           <a:p>
-            <a:endParaRPr lang="en-GB"/>
+            <a:r>
+              <a:rPr lang="en-GB" dirty="0"/>
+              <a:t>Going to get all levels working , enemies , boss , part , next level</a:t>
+            </a:r>
+          </a:p>
+          <a:p>
+            <a:r>
+              <a:rPr lang="en-GB" dirty="0"/>
+              <a:t> </a:t>
+            </a:r>
+          </a:p>
+          <a:p>
+            <a:r>
+              <a:rPr lang="en-GB" dirty="0"/>
+              <a:t>Then , Audio, Power Ups, Animations </a:t>
+            </a:r>
+          </a:p>
+          <a:p>
+            <a:endParaRPr lang="en-GB" dirty="0"/>
           </a:p>
         </p:txBody>
       </p:sp>
@@ -4058,6 +4084,36 @@
           </a:prstGeom>
         </p:spPr>
       </p:pic>
+      <p:pic>
+        <p:nvPicPr>
+          <p:cNvPr id="6" name="Picture 5">
+            <a:extLst>
+              <a:ext uri="{FF2B5EF4-FFF2-40B4-BE49-F238E27FC236}">
+                <a16:creationId xmlns:a16="http://schemas.microsoft.com/office/drawing/2014/main" id="{21F23233-5B01-3858-B054-A03ECAD2C262}"/>
+              </a:ext>
+            </a:extLst>
+          </p:cNvPr>
+          <p:cNvPicPr>
+            <a:picLocks noChangeAspect="1"/>
+          </p:cNvPicPr>
+          <p:nvPr/>
+        </p:nvPicPr>
+        <p:blipFill>
+          <a:blip r:embed="rId3"/>
+          <a:stretch>
+            <a:fillRect/>
+          </a:stretch>
+        </p:blipFill>
+        <p:spPr>
+          <a:xfrm>
+            <a:off x="8292247" y="2926080"/>
+            <a:ext cx="2618635" cy="3027665"/>
+          </a:xfrm>
+          <a:prstGeom prst="rect">
+            <a:avLst/>
+          </a:prstGeom>
+        </p:spPr>
+      </p:pic>
     </p:spTree>
     <p:extLst>
       <p:ext uri="{BB962C8B-B14F-4D97-AF65-F5344CB8AC3E}">
@@ -4115,7 +4171,10 @@
           <a:bodyPr/>
           <a:lstStyle/>
           <a:p>
-            <a:endParaRPr lang="en-GB"/>
+            <a:r>
+              <a:rPr lang="en-GB" dirty="0"/>
+              <a:t>FIX</a:t>
+            </a:r>
           </a:p>
         </p:txBody>
       </p:sp>
@@ -4140,10 +4199,43 @@
           <a:bodyPr/>
           <a:lstStyle/>
           <a:p>
-            <a:endParaRPr lang="en-GB"/>
-          </a:p>
-        </p:txBody>
-      </p:sp>
+            <a:r>
+              <a:rPr lang="en-GB" dirty="0"/>
+              <a:t>The fix was going onto the animation file and baking into pose the root transformation of position Y</a:t>
+            </a:r>
+          </a:p>
+        </p:txBody>
+      </p:sp>
+      <p:pic>
+        <p:nvPicPr>
+          <p:cNvPr id="5" name="Picture 4">
+            <a:extLst>
+              <a:ext uri="{FF2B5EF4-FFF2-40B4-BE49-F238E27FC236}">
+                <a16:creationId xmlns:a16="http://schemas.microsoft.com/office/drawing/2014/main" id="{64AA64D6-A69B-F59D-4D96-652438522D7E}"/>
+              </a:ext>
+            </a:extLst>
+          </p:cNvPr>
+          <p:cNvPicPr>
+            <a:picLocks noChangeAspect="1"/>
+          </p:cNvPicPr>
+          <p:nvPr/>
+        </p:nvPicPr>
+        <p:blipFill>
+          <a:blip r:embed="rId2"/>
+          <a:stretch>
+            <a:fillRect/>
+          </a:stretch>
+        </p:blipFill>
+        <p:spPr>
+          <a:xfrm>
+            <a:off x="7058860" y="2734251"/>
+            <a:ext cx="2564326" cy="3577649"/>
+          </a:xfrm>
+          <a:prstGeom prst="rect">
+            <a:avLst/>
+          </a:prstGeom>
+        </p:spPr>
+      </p:pic>
     </p:spTree>
     <p:extLst>
       <p:ext uri="{BB962C8B-B14F-4D97-AF65-F5344CB8AC3E}">

</xml_diff>

<commit_message>
Level 2 - Animation drop fix , Boss AI
</commit_message>
<xml_diff>
--- a/Documentation/Report/Documentationofstuff.pptx
+++ b/Documentation/Report/Documentationofstuff.pptx
@@ -268,7 +268,7 @@
           <a:p>
             <a:fld id="{C272013D-9C3F-40F8-8AC4-43A405D33223}" type="datetimeFigureOut">
               <a:rPr lang="en-GB" smtClean="0"/>
-              <a:t>28/03/2025</a:t>
+              <a:t>29/03/2025</a:t>
             </a:fld>
             <a:endParaRPr lang="en-GB"/>
           </a:p>
@@ -468,7 +468,7 @@
           <a:p>
             <a:fld id="{C272013D-9C3F-40F8-8AC4-43A405D33223}" type="datetimeFigureOut">
               <a:rPr lang="en-GB" smtClean="0"/>
-              <a:t>28/03/2025</a:t>
+              <a:t>29/03/2025</a:t>
             </a:fld>
             <a:endParaRPr lang="en-GB"/>
           </a:p>
@@ -678,7 +678,7 @@
           <a:p>
             <a:fld id="{C272013D-9C3F-40F8-8AC4-43A405D33223}" type="datetimeFigureOut">
               <a:rPr lang="en-GB" smtClean="0"/>
-              <a:t>28/03/2025</a:t>
+              <a:t>29/03/2025</a:t>
             </a:fld>
             <a:endParaRPr lang="en-GB"/>
           </a:p>
@@ -878,7 +878,7 @@
           <a:p>
             <a:fld id="{C272013D-9C3F-40F8-8AC4-43A405D33223}" type="datetimeFigureOut">
               <a:rPr lang="en-GB" smtClean="0"/>
-              <a:t>28/03/2025</a:t>
+              <a:t>29/03/2025</a:t>
             </a:fld>
             <a:endParaRPr lang="en-GB"/>
           </a:p>
@@ -1154,7 +1154,7 @@
           <a:p>
             <a:fld id="{C272013D-9C3F-40F8-8AC4-43A405D33223}" type="datetimeFigureOut">
               <a:rPr lang="en-GB" smtClean="0"/>
-              <a:t>28/03/2025</a:t>
+              <a:t>29/03/2025</a:t>
             </a:fld>
             <a:endParaRPr lang="en-GB"/>
           </a:p>
@@ -1422,7 +1422,7 @@
           <a:p>
             <a:fld id="{C272013D-9C3F-40F8-8AC4-43A405D33223}" type="datetimeFigureOut">
               <a:rPr lang="en-GB" smtClean="0"/>
-              <a:t>28/03/2025</a:t>
+              <a:t>29/03/2025</a:t>
             </a:fld>
             <a:endParaRPr lang="en-GB"/>
           </a:p>
@@ -1837,7 +1837,7 @@
           <a:p>
             <a:fld id="{C272013D-9C3F-40F8-8AC4-43A405D33223}" type="datetimeFigureOut">
               <a:rPr lang="en-GB" smtClean="0"/>
-              <a:t>28/03/2025</a:t>
+              <a:t>29/03/2025</a:t>
             </a:fld>
             <a:endParaRPr lang="en-GB"/>
           </a:p>
@@ -1979,7 +1979,7 @@
           <a:p>
             <a:fld id="{C272013D-9C3F-40F8-8AC4-43A405D33223}" type="datetimeFigureOut">
               <a:rPr lang="en-GB" smtClean="0"/>
-              <a:t>28/03/2025</a:t>
+              <a:t>29/03/2025</a:t>
             </a:fld>
             <a:endParaRPr lang="en-GB"/>
           </a:p>
@@ -2092,7 +2092,7 @@
           <a:p>
             <a:fld id="{C272013D-9C3F-40F8-8AC4-43A405D33223}" type="datetimeFigureOut">
               <a:rPr lang="en-GB" smtClean="0"/>
-              <a:t>28/03/2025</a:t>
+              <a:t>29/03/2025</a:t>
             </a:fld>
             <a:endParaRPr lang="en-GB"/>
           </a:p>
@@ -2405,7 +2405,7 @@
           <a:p>
             <a:fld id="{C272013D-9C3F-40F8-8AC4-43A405D33223}" type="datetimeFigureOut">
               <a:rPr lang="en-GB" smtClean="0"/>
-              <a:t>28/03/2025</a:t>
+              <a:t>29/03/2025</a:t>
             </a:fld>
             <a:endParaRPr lang="en-GB"/>
           </a:p>
@@ -2694,7 +2694,7 @@
           <a:p>
             <a:fld id="{C272013D-9C3F-40F8-8AC4-43A405D33223}" type="datetimeFigureOut">
               <a:rPr lang="en-GB" smtClean="0"/>
-              <a:t>28/03/2025</a:t>
+              <a:t>29/03/2025</a:t>
             </a:fld>
             <a:endParaRPr lang="en-GB"/>
           </a:p>
@@ -2937,7 +2937,7 @@
           <a:p>
             <a:fld id="{C272013D-9C3F-40F8-8AC4-43A405D33223}" type="datetimeFigureOut">
               <a:rPr lang="en-GB" smtClean="0"/>
-              <a:t>28/03/2025</a:t>
+              <a:t>29/03/2025</a:t>
             </a:fld>
             <a:endParaRPr lang="en-GB"/>
           </a:p>

</xml_diff>

<commit_message>
Level 2 Model - Polishing
</commit_message>
<xml_diff>
--- a/Documentation/Report/Documentationofstuff.pptx
+++ b/Documentation/Report/Documentationofstuff.pptx
@@ -10,9 +10,10 @@
     <p:sldId id="258" r:id="rId4"/>
     <p:sldId id="259" r:id="rId5"/>
     <p:sldId id="261" r:id="rId6"/>
-    <p:sldId id="260" r:id="rId7"/>
-    <p:sldId id="262" r:id="rId8"/>
-    <p:sldId id="263" r:id="rId9"/>
+    <p:sldId id="264" r:id="rId7"/>
+    <p:sldId id="260" r:id="rId8"/>
+    <p:sldId id="262" r:id="rId9"/>
+    <p:sldId id="263" r:id="rId10"/>
   </p:sldIdLst>
   <p:sldSz cx="12192000" cy="6858000"/>
   <p:notesSz cx="6858000" cy="9144000"/>
@@ -3848,6 +3849,517 @@
           <p:cNvPr id="2" name="Title 1">
             <a:extLst>
               <a:ext uri="{FF2B5EF4-FFF2-40B4-BE49-F238E27FC236}">
+                <a16:creationId xmlns:a16="http://schemas.microsoft.com/office/drawing/2014/main" id="{76F7E7E4-9827-C9EA-41A9-B8C6EF75B3BA}"/>
+              </a:ext>
+            </a:extLst>
+          </p:cNvPr>
+          <p:cNvSpPr>
+            <a:spLocks noGrp="1"/>
+          </p:cNvSpPr>
+          <p:nvPr>
+            <p:ph type="title"/>
+          </p:nvPr>
+        </p:nvSpPr>
+        <p:spPr/>
+        <p:txBody>
+          <a:bodyPr/>
+          <a:lstStyle/>
+          <a:p>
+            <a:endParaRPr lang="en-GB" dirty="0"/>
+          </a:p>
+        </p:txBody>
+      </p:sp>
+      <p:sp>
+        <p:nvSpPr>
+          <p:cNvPr id="3" name="Content Placeholder 2">
+            <a:extLst>
+              <a:ext uri="{FF2B5EF4-FFF2-40B4-BE49-F238E27FC236}">
+                <a16:creationId xmlns:a16="http://schemas.microsoft.com/office/drawing/2014/main" id="{69D816C0-DEFD-6470-D46E-50B949AAE97C}"/>
+              </a:ext>
+            </a:extLst>
+          </p:cNvPr>
+          <p:cNvSpPr>
+            <a:spLocks noGrp="1"/>
+          </p:cNvSpPr>
+          <p:nvPr>
+            <p:ph idx="1"/>
+          </p:nvPr>
+        </p:nvSpPr>
+        <p:spPr/>
+        <p:txBody>
+          <a:bodyPr/>
+          <a:lstStyle/>
+          <a:p>
+            <a:r>
+              <a:rPr lang="en-GB" dirty="0"/>
+              <a:t>If I need to revert the z\</a:t>
+            </a:r>
+            <a:r>
+              <a:rPr lang="en-GB" dirty="0" err="1"/>
+              <a:t>ombie</a:t>
+            </a:r>
+            <a:r>
+              <a:rPr lang="en-GB" dirty="0"/>
+              <a:t> </a:t>
+            </a:r>
+            <a:r>
+              <a:rPr lang="en-GB" dirty="0" err="1"/>
+              <a:t>animiaton</a:t>
+            </a:r>
+            <a:r>
+              <a:rPr lang="en-GB" dirty="0"/>
+              <a:t> then delete links to attack and </a:t>
+            </a:r>
+          </a:p>
+        </p:txBody>
+      </p:sp>
+      <p:sp>
+        <p:nvSpPr>
+          <p:cNvPr id="4" name="TextBox 3">
+            <a:extLst>
+              <a:ext uri="{FF2B5EF4-FFF2-40B4-BE49-F238E27FC236}">
+                <a16:creationId xmlns:a16="http://schemas.microsoft.com/office/drawing/2014/main" id="{5BDA14E1-2B65-96B1-BBB5-FEEEF22049E4}"/>
+              </a:ext>
+            </a:extLst>
+          </p:cNvPr>
+          <p:cNvSpPr txBox="1"/>
+          <p:nvPr/>
+        </p:nvSpPr>
+        <p:spPr>
+          <a:xfrm>
+            <a:off x="4681728" y="2525967"/>
+            <a:ext cx="6153912" cy="4278094"/>
+          </a:xfrm>
+          <a:prstGeom prst="rect">
+            <a:avLst/>
+          </a:prstGeom>
+          <a:noFill/>
+        </p:spPr>
+        <p:txBody>
+          <a:bodyPr wrap="square" rtlCol="0">
+            <a:spAutoFit/>
+          </a:bodyPr>
+          <a:lstStyle/>
+          <a:p>
+            <a:r>
+              <a:rPr lang="en-GB" sz="800" dirty="0"/>
+              <a:t>using </a:t>
+            </a:r>
+            <a:r>
+              <a:rPr lang="en-GB" sz="800" dirty="0" err="1"/>
+              <a:t>UnityEngine</a:t>
+            </a:r>
+            <a:r>
+              <a:rPr lang="en-GB" sz="800" dirty="0"/>
+              <a:t>;</a:t>
+            </a:r>
+          </a:p>
+          <a:p>
+            <a:endParaRPr lang="en-GB" sz="800" dirty="0"/>
+          </a:p>
+          <a:p>
+            <a:r>
+              <a:rPr lang="en-GB" sz="800" dirty="0"/>
+              <a:t>public class </a:t>
+            </a:r>
+            <a:r>
+              <a:rPr lang="en-GB" sz="800" dirty="0" err="1"/>
+              <a:t>ZombieAttack</a:t>
+            </a:r>
+            <a:r>
+              <a:rPr lang="en-GB" sz="800" dirty="0"/>
+              <a:t> : </a:t>
+            </a:r>
+            <a:r>
+              <a:rPr lang="en-GB" sz="800" dirty="0" err="1"/>
+              <a:t>MonoBehaviour</a:t>
+            </a:r>
+            <a:endParaRPr lang="en-GB" sz="800" dirty="0"/>
+          </a:p>
+          <a:p>
+            <a:r>
+              <a:rPr lang="en-GB" sz="800" dirty="0"/>
+              <a:t>{</a:t>
+            </a:r>
+          </a:p>
+          <a:p>
+            <a:r>
+              <a:rPr lang="en-GB" sz="800" dirty="0"/>
+              <a:t>    public int damage = 10; // Damage per hit</a:t>
+            </a:r>
+          </a:p>
+          <a:p>
+            <a:r>
+              <a:rPr lang="en-GB" sz="800" dirty="0"/>
+              <a:t>    public float </a:t>
+            </a:r>
+            <a:r>
+              <a:rPr lang="en-GB" sz="800" dirty="0" err="1"/>
+              <a:t>attackRate</a:t>
+            </a:r>
+            <a:r>
+              <a:rPr lang="en-GB" sz="800" dirty="0"/>
+              <a:t> = 1.5f; // Attack every X seconds</a:t>
+            </a:r>
+          </a:p>
+          <a:p>
+            <a:endParaRPr lang="en-GB" sz="800" dirty="0"/>
+          </a:p>
+          <a:p>
+            <a:r>
+              <a:rPr lang="en-GB" sz="800" dirty="0"/>
+              <a:t>    private float </a:t>
+            </a:r>
+            <a:r>
+              <a:rPr lang="en-GB" sz="800" dirty="0" err="1"/>
+              <a:t>nextAttackTime</a:t>
+            </a:r>
+            <a:r>
+              <a:rPr lang="en-GB" sz="800" dirty="0"/>
+              <a:t> = 0f;</a:t>
+            </a:r>
+          </a:p>
+          <a:p>
+            <a:endParaRPr lang="en-GB" sz="800" dirty="0"/>
+          </a:p>
+          <a:p>
+            <a:r>
+              <a:rPr lang="en-GB" sz="800" dirty="0"/>
+              <a:t>    private void </a:t>
+            </a:r>
+            <a:r>
+              <a:rPr lang="en-GB" sz="800" dirty="0" err="1"/>
+              <a:t>OnCollisionStay</a:t>
+            </a:r>
+            <a:r>
+              <a:rPr lang="en-GB" sz="800" dirty="0"/>
+              <a:t>(Collision collision)</a:t>
+            </a:r>
+          </a:p>
+          <a:p>
+            <a:r>
+              <a:rPr lang="en-GB" sz="800" dirty="0"/>
+              <a:t>    {</a:t>
+            </a:r>
+          </a:p>
+          <a:p>
+            <a:r>
+              <a:rPr lang="en-GB" sz="800" dirty="0"/>
+              <a:t>        if (</a:t>
+            </a:r>
+            <a:r>
+              <a:rPr lang="en-GB" sz="800" dirty="0" err="1"/>
+              <a:t>collision.gameObject.CompareTag</a:t>
+            </a:r>
+            <a:r>
+              <a:rPr lang="en-GB" sz="800" dirty="0"/>
+              <a:t>("Player"))</a:t>
+            </a:r>
+          </a:p>
+          <a:p>
+            <a:r>
+              <a:rPr lang="en-GB" sz="800" dirty="0"/>
+              <a:t>        {</a:t>
+            </a:r>
+          </a:p>
+          <a:p>
+            <a:r>
+              <a:rPr lang="en-GB" sz="800" dirty="0"/>
+              <a:t>            if (</a:t>
+            </a:r>
+            <a:r>
+              <a:rPr lang="en-GB" sz="800" dirty="0" err="1"/>
+              <a:t>Time.time</a:t>
+            </a:r>
+            <a:r>
+              <a:rPr lang="en-GB" sz="800" dirty="0"/>
+              <a:t> &gt;= </a:t>
+            </a:r>
+            <a:r>
+              <a:rPr lang="en-GB" sz="800" dirty="0" err="1"/>
+              <a:t>nextAttackTime</a:t>
+            </a:r>
+            <a:r>
+              <a:rPr lang="en-GB" sz="800" dirty="0"/>
+              <a:t>)</a:t>
+            </a:r>
+          </a:p>
+          <a:p>
+            <a:r>
+              <a:rPr lang="en-GB" sz="800" dirty="0"/>
+              <a:t>            {</a:t>
+            </a:r>
+          </a:p>
+          <a:p>
+            <a:r>
+              <a:rPr lang="en-GB" sz="800" dirty="0"/>
+              <a:t>                </a:t>
+            </a:r>
+            <a:r>
+              <a:rPr lang="en-GB" sz="800" dirty="0" err="1"/>
+              <a:t>HealthManager</a:t>
+            </a:r>
+            <a:r>
+              <a:rPr lang="en-GB" sz="800" dirty="0"/>
+              <a:t> </a:t>
+            </a:r>
+            <a:r>
+              <a:rPr lang="en-GB" sz="800" dirty="0" err="1"/>
+              <a:t>playerHealth</a:t>
+            </a:r>
+            <a:r>
+              <a:rPr lang="en-GB" sz="800" dirty="0"/>
+              <a:t> = </a:t>
+            </a:r>
+            <a:r>
+              <a:rPr lang="en-GB" sz="800" dirty="0" err="1"/>
+              <a:t>collision.gameObject.GetComponent</a:t>
+            </a:r>
+            <a:r>
+              <a:rPr lang="en-GB" sz="800" dirty="0"/>
+              <a:t>&lt;</a:t>
+            </a:r>
+            <a:r>
+              <a:rPr lang="en-GB" sz="800" dirty="0" err="1"/>
+              <a:t>HealthManager</a:t>
+            </a:r>
+            <a:r>
+              <a:rPr lang="en-GB" sz="800" dirty="0"/>
+              <a:t>&gt;();</a:t>
+            </a:r>
+          </a:p>
+          <a:p>
+            <a:r>
+              <a:rPr lang="en-GB" sz="800" dirty="0"/>
+              <a:t>                </a:t>
+            </a:r>
+            <a:r>
+              <a:rPr lang="en-GB" sz="800" dirty="0" err="1"/>
+              <a:t>DamageOverlay</a:t>
+            </a:r>
+            <a:r>
+              <a:rPr lang="en-GB" sz="800" dirty="0"/>
+              <a:t> </a:t>
+            </a:r>
+            <a:r>
+              <a:rPr lang="en-GB" sz="800" dirty="0" err="1"/>
+              <a:t>screenEffect</a:t>
+            </a:r>
+            <a:r>
+              <a:rPr lang="en-GB" sz="800" dirty="0"/>
+              <a:t> = </a:t>
+            </a:r>
+            <a:r>
+              <a:rPr lang="en-GB" sz="800" dirty="0" err="1"/>
+              <a:t>collision.gameObject.GetComponent</a:t>
+            </a:r>
+            <a:r>
+              <a:rPr lang="en-GB" sz="800" dirty="0"/>
+              <a:t>&lt;</a:t>
+            </a:r>
+            <a:r>
+              <a:rPr lang="en-GB" sz="800" dirty="0" err="1"/>
+              <a:t>DamageOverlay</a:t>
+            </a:r>
+            <a:r>
+              <a:rPr lang="en-GB" sz="800" dirty="0"/>
+              <a:t>&gt;(); // Get the red pulse effect</a:t>
+            </a:r>
+          </a:p>
+          <a:p>
+            <a:endParaRPr lang="en-GB" sz="800" dirty="0"/>
+          </a:p>
+          <a:p>
+            <a:r>
+              <a:rPr lang="en-GB" sz="800" dirty="0"/>
+              <a:t>                if (</a:t>
+            </a:r>
+            <a:r>
+              <a:rPr lang="en-GB" sz="800" dirty="0" err="1"/>
+              <a:t>playerHealth</a:t>
+            </a:r>
+            <a:r>
+              <a:rPr lang="en-GB" sz="800" dirty="0"/>
+              <a:t> != null)</a:t>
+            </a:r>
+          </a:p>
+          <a:p>
+            <a:r>
+              <a:rPr lang="en-GB" sz="800" dirty="0"/>
+              <a:t>                {</a:t>
+            </a:r>
+          </a:p>
+          <a:p>
+            <a:r>
+              <a:rPr lang="en-GB" sz="800" dirty="0"/>
+              <a:t>                    </a:t>
+            </a:r>
+            <a:r>
+              <a:rPr lang="en-GB" sz="800" dirty="0" err="1"/>
+              <a:t>playerHealth.TakeDamage</a:t>
+            </a:r>
+            <a:r>
+              <a:rPr lang="en-GB" sz="800" dirty="0"/>
+              <a:t>(damage);</a:t>
+            </a:r>
+          </a:p>
+          <a:p>
+            <a:r>
+              <a:rPr lang="en-GB" sz="800" dirty="0"/>
+              <a:t>                    </a:t>
+            </a:r>
+            <a:r>
+              <a:rPr lang="en-GB" sz="800" dirty="0" err="1"/>
+              <a:t>Debug.Log</a:t>
+            </a:r>
+            <a:r>
+              <a:rPr lang="en-GB" sz="800" dirty="0"/>
+              <a:t>("Zombie dealt " + damage + " damage to player.");</a:t>
+            </a:r>
+          </a:p>
+          <a:p>
+            <a:r>
+              <a:rPr lang="en-GB" sz="800" dirty="0"/>
+              <a:t>                }</a:t>
+            </a:r>
+          </a:p>
+          <a:p>
+            <a:endParaRPr lang="en-GB" sz="800" dirty="0"/>
+          </a:p>
+          <a:p>
+            <a:r>
+              <a:rPr lang="en-GB" sz="800" dirty="0"/>
+              <a:t>                if (</a:t>
+            </a:r>
+            <a:r>
+              <a:rPr lang="en-GB" sz="800" dirty="0" err="1"/>
+              <a:t>screenEffect</a:t>
+            </a:r>
+            <a:r>
+              <a:rPr lang="en-GB" sz="800" dirty="0"/>
+              <a:t> != null)</a:t>
+            </a:r>
+          </a:p>
+          <a:p>
+            <a:r>
+              <a:rPr lang="en-GB" sz="800" dirty="0"/>
+              <a:t>                {</a:t>
+            </a:r>
+          </a:p>
+          <a:p>
+            <a:r>
+              <a:rPr lang="en-GB" sz="800" dirty="0"/>
+              <a:t>                    </a:t>
+            </a:r>
+            <a:r>
+              <a:rPr lang="en-GB" sz="800" dirty="0" err="1"/>
+              <a:t>screenEffect.ShowDamageEffect</a:t>
+            </a:r>
+            <a:r>
+              <a:rPr lang="en-GB" sz="800" dirty="0"/>
+              <a:t>(); // Trigger red screen pulse</a:t>
+            </a:r>
+          </a:p>
+          <a:p>
+            <a:r>
+              <a:rPr lang="en-GB" sz="800" dirty="0"/>
+              <a:t>                }</a:t>
+            </a:r>
+          </a:p>
+          <a:p>
+            <a:endParaRPr lang="en-GB" sz="800" dirty="0"/>
+          </a:p>
+          <a:p>
+            <a:r>
+              <a:rPr lang="en-GB" sz="800" dirty="0"/>
+              <a:t>                </a:t>
+            </a:r>
+            <a:r>
+              <a:rPr lang="en-GB" sz="800" dirty="0" err="1"/>
+              <a:t>nextAttackTime</a:t>
+            </a:r>
+            <a:r>
+              <a:rPr lang="en-GB" sz="800" dirty="0"/>
+              <a:t> = </a:t>
+            </a:r>
+            <a:r>
+              <a:rPr lang="en-GB" sz="800" dirty="0" err="1"/>
+              <a:t>Time.time</a:t>
+            </a:r>
+            <a:r>
+              <a:rPr lang="en-GB" sz="800" dirty="0"/>
+              <a:t> + </a:t>
+            </a:r>
+            <a:r>
+              <a:rPr lang="en-GB" sz="800" dirty="0" err="1"/>
+              <a:t>attackRate</a:t>
+            </a:r>
+            <a:r>
+              <a:rPr lang="en-GB" sz="800" dirty="0"/>
+              <a:t>;</a:t>
+            </a:r>
+          </a:p>
+          <a:p>
+            <a:r>
+              <a:rPr lang="en-GB" sz="800" dirty="0"/>
+              <a:t>            }</a:t>
+            </a:r>
+          </a:p>
+          <a:p>
+            <a:r>
+              <a:rPr lang="en-GB" sz="800" dirty="0"/>
+              <a:t>        }</a:t>
+            </a:r>
+          </a:p>
+          <a:p>
+            <a:r>
+              <a:rPr lang="en-GB" sz="800" dirty="0"/>
+              <a:t>    }</a:t>
+            </a:r>
+          </a:p>
+          <a:p>
+            <a:r>
+              <a:rPr lang="en-GB" sz="800" dirty="0"/>
+              <a:t>}</a:t>
+            </a:r>
+          </a:p>
+        </p:txBody>
+      </p:sp>
+    </p:spTree>
+    <p:extLst>
+      <p:ext uri="{BB962C8B-B14F-4D97-AF65-F5344CB8AC3E}">
+        <p14:creationId xmlns:p14="http://schemas.microsoft.com/office/powerpoint/2010/main" val="1016281087"/>
+      </p:ext>
+    </p:extLst>
+  </p:cSld>
+  <p:clrMapOvr>
+    <a:masterClrMapping/>
+  </p:clrMapOvr>
+</p:sld>
+</file>
+
+<file path=ppt/slides/slide7.xml><?xml version="1.0" encoding="utf-8"?>
+<p:sld xmlns:a="http://schemas.openxmlformats.org/drawingml/2006/main" xmlns:r="http://schemas.openxmlformats.org/officeDocument/2006/relationships" xmlns:p="http://schemas.openxmlformats.org/presentationml/2006/main">
+  <p:cSld>
+    <p:spTree>
+      <p:nvGrpSpPr>
+        <p:cNvPr id="1" name=""/>
+        <p:cNvGrpSpPr/>
+        <p:nvPr/>
+      </p:nvGrpSpPr>
+      <p:grpSpPr>
+        <a:xfrm>
+          <a:off x="0" y="0"/>
+          <a:ext cx="0" cy="0"/>
+          <a:chOff x="0" y="0"/>
+          <a:chExt cx="0" cy="0"/>
+        </a:xfrm>
+      </p:grpSpPr>
+      <p:sp>
+        <p:nvSpPr>
+          <p:cNvPr id="2" name="Title 1">
+            <a:extLst>
+              <a:ext uri="{FF2B5EF4-FFF2-40B4-BE49-F238E27FC236}">
                 <a16:creationId xmlns:a16="http://schemas.microsoft.com/office/drawing/2014/main" id="{FDF41021-4C15-7026-2A5B-B95AFC73A9DE}"/>
               </a:ext>
             </a:extLst>
@@ -3968,7 +4480,7 @@
 </p:sld>
 </file>
 
-<file path=ppt/slides/slide7.xml><?xml version="1.0" encoding="utf-8"?>
+<file path=ppt/slides/slide8.xml><?xml version="1.0" encoding="utf-8"?>
 <p:sld xmlns:a="http://schemas.openxmlformats.org/drawingml/2006/main" xmlns:r="http://schemas.openxmlformats.org/officeDocument/2006/relationships" xmlns:p="http://schemas.openxmlformats.org/presentationml/2006/main">
   <p:cSld>
     <p:spTree>
@@ -4127,7 +4639,7 @@
 </p:sld>
 </file>
 
-<file path=ppt/slides/slide8.xml><?xml version="1.0" encoding="utf-8"?>
+<file path=ppt/slides/slide9.xml><?xml version="1.0" encoding="utf-8"?>
 <p:sld xmlns:a="http://schemas.openxmlformats.org/drawingml/2006/main" xmlns:r="http://schemas.openxmlformats.org/officeDocument/2006/relationships" xmlns:p="http://schemas.openxmlformats.org/presentationml/2006/main">
   <p:cSld>
     <p:spTree>

</xml_diff>

<commit_message>
Game changes + Report progress
Game states , lvl3 created, scenes removed
</commit_message>
<xml_diff>
--- a/Documentation/Report/Documentationofstuff.pptx
+++ b/Documentation/Report/Documentationofstuff.pptx
@@ -9,11 +9,13 @@
     <p:sldId id="257" r:id="rId3"/>
     <p:sldId id="258" r:id="rId4"/>
     <p:sldId id="259" r:id="rId5"/>
-    <p:sldId id="261" r:id="rId6"/>
-    <p:sldId id="264" r:id="rId7"/>
-    <p:sldId id="260" r:id="rId8"/>
-    <p:sldId id="262" r:id="rId9"/>
-    <p:sldId id="263" r:id="rId10"/>
+    <p:sldId id="265" r:id="rId6"/>
+    <p:sldId id="261" r:id="rId7"/>
+    <p:sldId id="264" r:id="rId8"/>
+    <p:sldId id="260" r:id="rId9"/>
+    <p:sldId id="262" r:id="rId10"/>
+    <p:sldId id="263" r:id="rId11"/>
+    <p:sldId id="266" r:id="rId12"/>
   </p:sldIdLst>
   <p:sldSz cx="12192000" cy="6858000"/>
   <p:notesSz cx="6858000" cy="9144000"/>
@@ -269,7 +271,7 @@
           <a:p>
             <a:fld id="{C272013D-9C3F-40F8-8AC4-43A405D33223}" type="datetimeFigureOut">
               <a:rPr lang="en-GB" smtClean="0"/>
-              <a:t>31/03/2025</a:t>
+              <a:t>01/04/2025</a:t>
             </a:fld>
             <a:endParaRPr lang="en-GB"/>
           </a:p>
@@ -469,7 +471,7 @@
           <a:p>
             <a:fld id="{C272013D-9C3F-40F8-8AC4-43A405D33223}" type="datetimeFigureOut">
               <a:rPr lang="en-GB" smtClean="0"/>
-              <a:t>31/03/2025</a:t>
+              <a:t>01/04/2025</a:t>
             </a:fld>
             <a:endParaRPr lang="en-GB"/>
           </a:p>
@@ -679,7 +681,7 @@
           <a:p>
             <a:fld id="{C272013D-9C3F-40F8-8AC4-43A405D33223}" type="datetimeFigureOut">
               <a:rPr lang="en-GB" smtClean="0"/>
-              <a:t>31/03/2025</a:t>
+              <a:t>01/04/2025</a:t>
             </a:fld>
             <a:endParaRPr lang="en-GB"/>
           </a:p>
@@ -879,7 +881,7 @@
           <a:p>
             <a:fld id="{C272013D-9C3F-40F8-8AC4-43A405D33223}" type="datetimeFigureOut">
               <a:rPr lang="en-GB" smtClean="0"/>
-              <a:t>31/03/2025</a:t>
+              <a:t>01/04/2025</a:t>
             </a:fld>
             <a:endParaRPr lang="en-GB"/>
           </a:p>
@@ -1155,7 +1157,7 @@
           <a:p>
             <a:fld id="{C272013D-9C3F-40F8-8AC4-43A405D33223}" type="datetimeFigureOut">
               <a:rPr lang="en-GB" smtClean="0"/>
-              <a:t>31/03/2025</a:t>
+              <a:t>01/04/2025</a:t>
             </a:fld>
             <a:endParaRPr lang="en-GB"/>
           </a:p>
@@ -1423,7 +1425,7 @@
           <a:p>
             <a:fld id="{C272013D-9C3F-40F8-8AC4-43A405D33223}" type="datetimeFigureOut">
               <a:rPr lang="en-GB" smtClean="0"/>
-              <a:t>31/03/2025</a:t>
+              <a:t>01/04/2025</a:t>
             </a:fld>
             <a:endParaRPr lang="en-GB"/>
           </a:p>
@@ -1838,7 +1840,7 @@
           <a:p>
             <a:fld id="{C272013D-9C3F-40F8-8AC4-43A405D33223}" type="datetimeFigureOut">
               <a:rPr lang="en-GB" smtClean="0"/>
-              <a:t>31/03/2025</a:t>
+              <a:t>01/04/2025</a:t>
             </a:fld>
             <a:endParaRPr lang="en-GB"/>
           </a:p>
@@ -1980,7 +1982,7 @@
           <a:p>
             <a:fld id="{C272013D-9C3F-40F8-8AC4-43A405D33223}" type="datetimeFigureOut">
               <a:rPr lang="en-GB" smtClean="0"/>
-              <a:t>31/03/2025</a:t>
+              <a:t>01/04/2025</a:t>
             </a:fld>
             <a:endParaRPr lang="en-GB"/>
           </a:p>
@@ -2093,7 +2095,7 @@
           <a:p>
             <a:fld id="{C272013D-9C3F-40F8-8AC4-43A405D33223}" type="datetimeFigureOut">
               <a:rPr lang="en-GB" smtClean="0"/>
-              <a:t>31/03/2025</a:t>
+              <a:t>01/04/2025</a:t>
             </a:fld>
             <a:endParaRPr lang="en-GB"/>
           </a:p>
@@ -2406,7 +2408,7 @@
           <a:p>
             <a:fld id="{C272013D-9C3F-40F8-8AC4-43A405D33223}" type="datetimeFigureOut">
               <a:rPr lang="en-GB" smtClean="0"/>
-              <a:t>31/03/2025</a:t>
+              <a:t>01/04/2025</a:t>
             </a:fld>
             <a:endParaRPr lang="en-GB"/>
           </a:p>
@@ -2695,7 +2697,7 @@
           <a:p>
             <a:fld id="{C272013D-9C3F-40F8-8AC4-43A405D33223}" type="datetimeFigureOut">
               <a:rPr lang="en-GB" smtClean="0"/>
-              <a:t>31/03/2025</a:t>
+              <a:t>01/04/2025</a:t>
             </a:fld>
             <a:endParaRPr lang="en-GB"/>
           </a:p>
@@ -2938,7 +2940,7 @@
           <a:p>
             <a:fld id="{C272013D-9C3F-40F8-8AC4-43A405D33223}" type="datetimeFigureOut">
               <a:rPr lang="en-GB" smtClean="0"/>
-              <a:t>31/03/2025</a:t>
+              <a:t>01/04/2025</a:t>
             </a:fld>
             <a:endParaRPr lang="en-GB"/>
           </a:p>
@@ -3689,6 +3691,237 @@
 </p:sld>
 </file>
 
+<file path=ppt/slides/slide10.xml><?xml version="1.0" encoding="utf-8"?>
+<p:sld xmlns:a="http://schemas.openxmlformats.org/drawingml/2006/main" xmlns:r="http://schemas.openxmlformats.org/officeDocument/2006/relationships" xmlns:p="http://schemas.openxmlformats.org/presentationml/2006/main">
+  <p:cSld>
+    <p:spTree>
+      <p:nvGrpSpPr>
+        <p:cNvPr id="1" name="">
+          <a:extLst>
+            <a:ext uri="{FF2B5EF4-FFF2-40B4-BE49-F238E27FC236}">
+              <a16:creationId xmlns:a16="http://schemas.microsoft.com/office/drawing/2014/main" id="{2C9BF43F-916F-0213-9A0D-4D75D7E4CEDC}"/>
+            </a:ext>
+          </a:extLst>
+        </p:cNvPr>
+        <p:cNvGrpSpPr/>
+        <p:nvPr/>
+      </p:nvGrpSpPr>
+      <p:grpSpPr>
+        <a:xfrm>
+          <a:off x="0" y="0"/>
+          <a:ext cx="0" cy="0"/>
+          <a:chOff x="0" y="0"/>
+          <a:chExt cx="0" cy="0"/>
+        </a:xfrm>
+      </p:grpSpPr>
+      <p:sp>
+        <p:nvSpPr>
+          <p:cNvPr id="2" name="Title 1">
+            <a:extLst>
+              <a:ext uri="{FF2B5EF4-FFF2-40B4-BE49-F238E27FC236}">
+                <a16:creationId xmlns:a16="http://schemas.microsoft.com/office/drawing/2014/main" id="{F62EAD6F-89B9-52EB-2D97-64605D539423}"/>
+              </a:ext>
+            </a:extLst>
+          </p:cNvPr>
+          <p:cNvSpPr>
+            <a:spLocks noGrp="1"/>
+          </p:cNvSpPr>
+          <p:nvPr>
+            <p:ph type="title"/>
+          </p:nvPr>
+        </p:nvSpPr>
+        <p:spPr/>
+        <p:txBody>
+          <a:bodyPr/>
+          <a:lstStyle/>
+          <a:p>
+            <a:r>
+              <a:rPr lang="en-GB" dirty="0"/>
+              <a:t>FIX</a:t>
+            </a:r>
+          </a:p>
+        </p:txBody>
+      </p:sp>
+      <p:sp>
+        <p:nvSpPr>
+          <p:cNvPr id="3" name="Content Placeholder 2">
+            <a:extLst>
+              <a:ext uri="{FF2B5EF4-FFF2-40B4-BE49-F238E27FC236}">
+                <a16:creationId xmlns:a16="http://schemas.microsoft.com/office/drawing/2014/main" id="{6397EE5A-E641-75FC-8F2D-4DDFA650D1F0}"/>
+              </a:ext>
+            </a:extLst>
+          </p:cNvPr>
+          <p:cNvSpPr>
+            <a:spLocks noGrp="1"/>
+          </p:cNvSpPr>
+          <p:nvPr>
+            <p:ph idx="1"/>
+          </p:nvPr>
+        </p:nvSpPr>
+        <p:spPr/>
+        <p:txBody>
+          <a:bodyPr/>
+          <a:lstStyle/>
+          <a:p>
+            <a:r>
+              <a:rPr lang="en-GB" dirty="0"/>
+              <a:t>The fix was going onto the animation file and baking into pose the root transformation of position Y</a:t>
+            </a:r>
+          </a:p>
+        </p:txBody>
+      </p:sp>
+      <p:pic>
+        <p:nvPicPr>
+          <p:cNvPr id="5" name="Picture 4">
+            <a:extLst>
+              <a:ext uri="{FF2B5EF4-FFF2-40B4-BE49-F238E27FC236}">
+                <a16:creationId xmlns:a16="http://schemas.microsoft.com/office/drawing/2014/main" id="{64AA64D6-A69B-F59D-4D96-652438522D7E}"/>
+              </a:ext>
+            </a:extLst>
+          </p:cNvPr>
+          <p:cNvPicPr>
+            <a:picLocks noChangeAspect="1"/>
+          </p:cNvPicPr>
+          <p:nvPr/>
+        </p:nvPicPr>
+        <p:blipFill>
+          <a:blip r:embed="rId2"/>
+          <a:stretch>
+            <a:fillRect/>
+          </a:stretch>
+        </p:blipFill>
+        <p:spPr>
+          <a:xfrm>
+            <a:off x="7058860" y="2734251"/>
+            <a:ext cx="2564326" cy="3577649"/>
+          </a:xfrm>
+          <a:prstGeom prst="rect">
+            <a:avLst/>
+          </a:prstGeom>
+        </p:spPr>
+      </p:pic>
+    </p:spTree>
+    <p:extLst>
+      <p:ext uri="{BB962C8B-B14F-4D97-AF65-F5344CB8AC3E}">
+        <p14:creationId xmlns:p14="http://schemas.microsoft.com/office/powerpoint/2010/main" val="2675561405"/>
+      </p:ext>
+    </p:extLst>
+  </p:cSld>
+  <p:clrMapOvr>
+    <a:masterClrMapping/>
+  </p:clrMapOvr>
+</p:sld>
+</file>
+
+<file path=ppt/slides/slide11.xml><?xml version="1.0" encoding="utf-8"?>
+<p:sld xmlns:a="http://schemas.openxmlformats.org/drawingml/2006/main" xmlns:r="http://schemas.openxmlformats.org/officeDocument/2006/relationships" xmlns:p="http://schemas.openxmlformats.org/presentationml/2006/main">
+  <p:cSld>
+    <p:spTree>
+      <p:nvGrpSpPr>
+        <p:cNvPr id="1" name=""/>
+        <p:cNvGrpSpPr/>
+        <p:nvPr/>
+      </p:nvGrpSpPr>
+      <p:grpSpPr>
+        <a:xfrm>
+          <a:off x="0" y="0"/>
+          <a:ext cx="0" cy="0"/>
+          <a:chOff x="0" y="0"/>
+          <a:chExt cx="0" cy="0"/>
+        </a:xfrm>
+      </p:grpSpPr>
+      <p:sp>
+        <p:nvSpPr>
+          <p:cNvPr id="2" name="Title 1">
+            <a:extLst>
+              <a:ext uri="{FF2B5EF4-FFF2-40B4-BE49-F238E27FC236}">
+                <a16:creationId xmlns:a16="http://schemas.microsoft.com/office/drawing/2014/main" id="{7EE5037D-386C-C289-A64E-0C46E065915C}"/>
+              </a:ext>
+            </a:extLst>
+          </p:cNvPr>
+          <p:cNvSpPr>
+            <a:spLocks noGrp="1"/>
+          </p:cNvSpPr>
+          <p:nvPr>
+            <p:ph type="title"/>
+          </p:nvPr>
+        </p:nvSpPr>
+        <p:spPr/>
+        <p:txBody>
+          <a:bodyPr/>
+          <a:lstStyle/>
+          <a:p>
+            <a:r>
+              <a:rPr lang="en-GB" dirty="0"/>
+              <a:t>References </a:t>
+            </a:r>
+          </a:p>
+        </p:txBody>
+      </p:sp>
+      <p:sp>
+        <p:nvSpPr>
+          <p:cNvPr id="3" name="Content Placeholder 2">
+            <a:extLst>
+              <a:ext uri="{FF2B5EF4-FFF2-40B4-BE49-F238E27FC236}">
+                <a16:creationId xmlns:a16="http://schemas.microsoft.com/office/drawing/2014/main" id="{0DB0B8FF-490E-CB11-A00D-3F58CCC3BB83}"/>
+              </a:ext>
+            </a:extLst>
+          </p:cNvPr>
+          <p:cNvSpPr>
+            <a:spLocks noGrp="1"/>
+          </p:cNvSpPr>
+          <p:nvPr>
+            <p:ph idx="1"/>
+          </p:nvPr>
+        </p:nvSpPr>
+        <p:spPr/>
+        <p:txBody>
+          <a:bodyPr/>
+          <a:lstStyle/>
+          <a:p>
+            <a:r>
+              <a:rPr lang="en-GB" dirty="0"/>
+              <a:t>1. </a:t>
+            </a:r>
+            <a:r>
+              <a:rPr lang="en-GB" dirty="0">
+                <a:hlinkClick r:id="rId2"/>
+              </a:rPr>
+              <a:t>https://parents.actionforchildren.org.uk/home-family-life/technology/video-game-age-restrictions/</a:t>
+            </a:r>
+            <a:endParaRPr lang="en-GB" dirty="0"/>
+          </a:p>
+          <a:p>
+            <a:r>
+              <a:rPr lang="en-GB" dirty="0"/>
+              <a:t>2. </a:t>
+            </a:r>
+            <a:r>
+              <a:rPr lang="en-GB" dirty="0">
+                <a:hlinkClick r:id="rId3"/>
+              </a:rPr>
+              <a:t>https://openr.co/unveiling-the-demographics-of-call-of-dutys-target-audience/</a:t>
+            </a:r>
+            <a:endParaRPr lang="en-GB" dirty="0"/>
+          </a:p>
+          <a:p>
+            <a:endParaRPr lang="en-GB" dirty="0"/>
+          </a:p>
+        </p:txBody>
+      </p:sp>
+    </p:spTree>
+    <p:extLst>
+      <p:ext uri="{BB962C8B-B14F-4D97-AF65-F5344CB8AC3E}">
+        <p14:creationId xmlns:p14="http://schemas.microsoft.com/office/powerpoint/2010/main" val="4223885075"/>
+      </p:ext>
+    </p:extLst>
+  </p:cSld>
+  <p:clrMapOvr>
+    <a:masterClrMapping/>
+  </p:clrMapOvr>
+</p:sld>
+</file>
+
 <file path=ppt/slides/slide2.xml><?xml version="1.0" encoding="utf-8"?>
 <p:sld xmlns:a="http://schemas.openxmlformats.org/drawingml/2006/main" xmlns:r="http://schemas.openxmlformats.org/officeDocument/2006/relationships" xmlns:p="http://schemas.openxmlformats.org/presentationml/2006/main">
   <p:cSld>
@@ -4019,7 +4252,7 @@
           <p:cNvPr id="2" name="Title 1">
             <a:extLst>
               <a:ext uri="{FF2B5EF4-FFF2-40B4-BE49-F238E27FC236}">
-                <a16:creationId xmlns:a16="http://schemas.microsoft.com/office/drawing/2014/main" id="{5B68C855-5DB6-9A1A-D0CF-E16FEB6FFD48}"/>
+                <a16:creationId xmlns:a16="http://schemas.microsoft.com/office/drawing/2014/main" id="{A74688DE-9C4C-94A4-28D9-89EA6EB9A93F}"/>
               </a:ext>
             </a:extLst>
           </p:cNvPr>
@@ -4036,9 +4269,13 @@
           <a:lstStyle/>
           <a:p>
             <a:r>
-              <a:rPr lang="en-GB" dirty="0"/>
-              <a:t>I THINK RN</a:t>
-            </a:r>
+              <a:rPr lang="en-GB" b="1" dirty="0"/>
+              <a:t>Scene Flow</a:t>
+            </a:r>
+            <a:br>
+              <a:rPr lang="en-GB" b="1" dirty="0"/>
+            </a:br>
+            <a:endParaRPr lang="en-GB" dirty="0"/>
           </a:p>
         </p:txBody>
       </p:sp>
@@ -4047,7 +4284,7 @@
           <p:cNvPr id="3" name="Content Placeholder 2">
             <a:extLst>
               <a:ext uri="{FF2B5EF4-FFF2-40B4-BE49-F238E27FC236}">
-                <a16:creationId xmlns:a16="http://schemas.microsoft.com/office/drawing/2014/main" id="{513ED3D6-07D7-A298-9458-397260D7FA2C}"/>
+                <a16:creationId xmlns:a16="http://schemas.microsoft.com/office/drawing/2014/main" id="{F0A16279-9A53-323B-3B2C-1B5C11E7D0EF}"/>
               </a:ext>
             </a:extLst>
           </p:cNvPr>
@@ -4063,22 +4300,31 @@
           <a:bodyPr/>
           <a:lstStyle/>
           <a:p>
-            <a:r>
-              <a:rPr lang="en-GB" dirty="0"/>
-              <a:t>Going to get all levels working , enemies , boss , part , next level</a:t>
-            </a:r>
-          </a:p>
-          <a:p>
-            <a:r>
-              <a:rPr lang="en-GB" dirty="0"/>
-              <a:t> </a:t>
-            </a:r>
-          </a:p>
-          <a:p>
-            <a:r>
-              <a:rPr lang="en-GB" dirty="0"/>
-              <a:t>Then , Audio, Power Ups, Animations </a:t>
-            </a:r>
+            <a:pPr>
+              <a:buFont typeface="Arial" panose="020B0604020202020204" pitchFamily="34" charset="0"/>
+              <a:buChar char="•"/>
+            </a:pPr>
+            <a:r>
+              <a:rPr lang="en-GB" b="1" dirty="0" err="1"/>
+              <a:t>MainMenu</a:t>
+            </a:r>
+            <a:r>
+              <a:rPr lang="en-GB" b="1" dirty="0"/>
+              <a:t> → Level1 → Loading → Level2 → Loading → Level3 → </a:t>
+            </a:r>
+            <a:r>
+              <a:rPr lang="en-GB" b="1" dirty="0" err="1"/>
+              <a:t>EndScreen</a:t>
+            </a:r>
+            <a:r>
+              <a:rPr lang="en-GB" b="1" dirty="0"/>
+              <a:t> → </a:t>
+            </a:r>
+            <a:r>
+              <a:rPr lang="en-GB" b="1" dirty="0" err="1"/>
+              <a:t>MainMenu</a:t>
+            </a:r>
+            <a:endParaRPr lang="en-GB" dirty="0"/>
           </a:p>
           <a:p>
             <a:endParaRPr lang="en-GB" dirty="0"/>
@@ -4088,7 +4334,7 @@
     </p:spTree>
     <p:extLst>
       <p:ext uri="{BB962C8B-B14F-4D97-AF65-F5344CB8AC3E}">
-        <p14:creationId xmlns:p14="http://schemas.microsoft.com/office/powerpoint/2010/main" val="3884251571"/>
+        <p14:creationId xmlns:p14="http://schemas.microsoft.com/office/powerpoint/2010/main" val="2796165813"/>
       </p:ext>
     </p:extLst>
   </p:cSld>
@@ -4120,6 +4366,107 @@
           <p:cNvPr id="2" name="Title 1">
             <a:extLst>
               <a:ext uri="{FF2B5EF4-FFF2-40B4-BE49-F238E27FC236}">
+                <a16:creationId xmlns:a16="http://schemas.microsoft.com/office/drawing/2014/main" id="{5B68C855-5DB6-9A1A-D0CF-E16FEB6FFD48}"/>
+              </a:ext>
+            </a:extLst>
+          </p:cNvPr>
+          <p:cNvSpPr>
+            <a:spLocks noGrp="1"/>
+          </p:cNvSpPr>
+          <p:nvPr>
+            <p:ph type="title"/>
+          </p:nvPr>
+        </p:nvSpPr>
+        <p:spPr/>
+        <p:txBody>
+          <a:bodyPr/>
+          <a:lstStyle/>
+          <a:p>
+            <a:r>
+              <a:rPr lang="en-GB" dirty="0"/>
+              <a:t>I THINK RN</a:t>
+            </a:r>
+          </a:p>
+        </p:txBody>
+      </p:sp>
+      <p:sp>
+        <p:nvSpPr>
+          <p:cNvPr id="3" name="Content Placeholder 2">
+            <a:extLst>
+              <a:ext uri="{FF2B5EF4-FFF2-40B4-BE49-F238E27FC236}">
+                <a16:creationId xmlns:a16="http://schemas.microsoft.com/office/drawing/2014/main" id="{513ED3D6-07D7-A298-9458-397260D7FA2C}"/>
+              </a:ext>
+            </a:extLst>
+          </p:cNvPr>
+          <p:cNvSpPr>
+            <a:spLocks noGrp="1"/>
+          </p:cNvSpPr>
+          <p:nvPr>
+            <p:ph idx="1"/>
+          </p:nvPr>
+        </p:nvSpPr>
+        <p:spPr/>
+        <p:txBody>
+          <a:bodyPr/>
+          <a:lstStyle/>
+          <a:p>
+            <a:r>
+              <a:rPr lang="en-GB" dirty="0"/>
+              <a:t>Going to get all levels working , enemies , boss , part , next level</a:t>
+            </a:r>
+          </a:p>
+          <a:p>
+            <a:r>
+              <a:rPr lang="en-GB" dirty="0"/>
+              <a:t> </a:t>
+            </a:r>
+          </a:p>
+          <a:p>
+            <a:r>
+              <a:rPr lang="en-GB" dirty="0"/>
+              <a:t>Then , Audio, Power Ups, Animations </a:t>
+            </a:r>
+          </a:p>
+          <a:p>
+            <a:endParaRPr lang="en-GB" dirty="0"/>
+          </a:p>
+        </p:txBody>
+      </p:sp>
+    </p:spTree>
+    <p:extLst>
+      <p:ext uri="{BB962C8B-B14F-4D97-AF65-F5344CB8AC3E}">
+        <p14:creationId xmlns:p14="http://schemas.microsoft.com/office/powerpoint/2010/main" val="3884251571"/>
+      </p:ext>
+    </p:extLst>
+  </p:cSld>
+  <p:clrMapOvr>
+    <a:masterClrMapping/>
+  </p:clrMapOvr>
+</p:sld>
+</file>
+
+<file path=ppt/slides/slide7.xml><?xml version="1.0" encoding="utf-8"?>
+<p:sld xmlns:a="http://schemas.openxmlformats.org/drawingml/2006/main" xmlns:r="http://schemas.openxmlformats.org/officeDocument/2006/relationships" xmlns:p="http://schemas.openxmlformats.org/presentationml/2006/main">
+  <p:cSld>
+    <p:spTree>
+      <p:nvGrpSpPr>
+        <p:cNvPr id="1" name=""/>
+        <p:cNvGrpSpPr/>
+        <p:nvPr/>
+      </p:nvGrpSpPr>
+      <p:grpSpPr>
+        <a:xfrm>
+          <a:off x="0" y="0"/>
+          <a:ext cx="0" cy="0"/>
+          <a:chOff x="0" y="0"/>
+          <a:chExt cx="0" cy="0"/>
+        </a:xfrm>
+      </p:grpSpPr>
+      <p:sp>
+        <p:nvSpPr>
+          <p:cNvPr id="2" name="Title 1">
+            <a:extLst>
+              <a:ext uri="{FF2B5EF4-FFF2-40B4-BE49-F238E27FC236}">
                 <a16:creationId xmlns:a16="http://schemas.microsoft.com/office/drawing/2014/main" id="{76F7E7E4-9827-C9EA-41A9-B8C6EF75B3BA}"/>
               </a:ext>
             </a:extLst>
@@ -4609,7 +4956,7 @@
 </p:sld>
 </file>
 
-<file path=ppt/slides/slide7.xml><?xml version="1.0" encoding="utf-8"?>
+<file path=ppt/slides/slide8.xml><?xml version="1.0" encoding="utf-8"?>
 <p:sld xmlns:a="http://schemas.openxmlformats.org/drawingml/2006/main" xmlns:r="http://schemas.openxmlformats.org/officeDocument/2006/relationships" xmlns:p="http://schemas.openxmlformats.org/presentationml/2006/main">
   <p:cSld>
     <p:spTree>
@@ -4751,7 +5098,7 @@
 </p:sld>
 </file>
 
-<file path=ppt/slides/slide8.xml><?xml version="1.0" encoding="utf-8"?>
+<file path=ppt/slides/slide9.xml><?xml version="1.0" encoding="utf-8"?>
 <p:sld xmlns:a="http://schemas.openxmlformats.org/drawingml/2006/main" xmlns:r="http://schemas.openxmlformats.org/officeDocument/2006/relationships" xmlns:p="http://schemas.openxmlformats.org/presentationml/2006/main">
   <p:cSld>
     <p:spTree>
@@ -4901,128 +5248,6 @@
     <p:extLst>
       <p:ext uri="{BB962C8B-B14F-4D97-AF65-F5344CB8AC3E}">
         <p14:creationId xmlns:p14="http://schemas.microsoft.com/office/powerpoint/2010/main" val="4025589089"/>
-      </p:ext>
-    </p:extLst>
-  </p:cSld>
-  <p:clrMapOvr>
-    <a:masterClrMapping/>
-  </p:clrMapOvr>
-</p:sld>
-</file>
-
-<file path=ppt/slides/slide9.xml><?xml version="1.0" encoding="utf-8"?>
-<p:sld xmlns:a="http://schemas.openxmlformats.org/drawingml/2006/main" xmlns:r="http://schemas.openxmlformats.org/officeDocument/2006/relationships" xmlns:p="http://schemas.openxmlformats.org/presentationml/2006/main">
-  <p:cSld>
-    <p:spTree>
-      <p:nvGrpSpPr>
-        <p:cNvPr id="1" name="">
-          <a:extLst>
-            <a:ext uri="{FF2B5EF4-FFF2-40B4-BE49-F238E27FC236}">
-              <a16:creationId xmlns:a16="http://schemas.microsoft.com/office/drawing/2014/main" id="{2C9BF43F-916F-0213-9A0D-4D75D7E4CEDC}"/>
-            </a:ext>
-          </a:extLst>
-        </p:cNvPr>
-        <p:cNvGrpSpPr/>
-        <p:nvPr/>
-      </p:nvGrpSpPr>
-      <p:grpSpPr>
-        <a:xfrm>
-          <a:off x="0" y="0"/>
-          <a:ext cx="0" cy="0"/>
-          <a:chOff x="0" y="0"/>
-          <a:chExt cx="0" cy="0"/>
-        </a:xfrm>
-      </p:grpSpPr>
-      <p:sp>
-        <p:nvSpPr>
-          <p:cNvPr id="2" name="Title 1">
-            <a:extLst>
-              <a:ext uri="{FF2B5EF4-FFF2-40B4-BE49-F238E27FC236}">
-                <a16:creationId xmlns:a16="http://schemas.microsoft.com/office/drawing/2014/main" id="{F62EAD6F-89B9-52EB-2D97-64605D539423}"/>
-              </a:ext>
-            </a:extLst>
-          </p:cNvPr>
-          <p:cNvSpPr>
-            <a:spLocks noGrp="1"/>
-          </p:cNvSpPr>
-          <p:nvPr>
-            <p:ph type="title"/>
-          </p:nvPr>
-        </p:nvSpPr>
-        <p:spPr/>
-        <p:txBody>
-          <a:bodyPr/>
-          <a:lstStyle/>
-          <a:p>
-            <a:r>
-              <a:rPr lang="en-GB" dirty="0"/>
-              <a:t>FIX</a:t>
-            </a:r>
-          </a:p>
-        </p:txBody>
-      </p:sp>
-      <p:sp>
-        <p:nvSpPr>
-          <p:cNvPr id="3" name="Content Placeholder 2">
-            <a:extLst>
-              <a:ext uri="{FF2B5EF4-FFF2-40B4-BE49-F238E27FC236}">
-                <a16:creationId xmlns:a16="http://schemas.microsoft.com/office/drawing/2014/main" id="{6397EE5A-E641-75FC-8F2D-4DDFA650D1F0}"/>
-              </a:ext>
-            </a:extLst>
-          </p:cNvPr>
-          <p:cNvSpPr>
-            <a:spLocks noGrp="1"/>
-          </p:cNvSpPr>
-          <p:nvPr>
-            <p:ph idx="1"/>
-          </p:nvPr>
-        </p:nvSpPr>
-        <p:spPr/>
-        <p:txBody>
-          <a:bodyPr/>
-          <a:lstStyle/>
-          <a:p>
-            <a:r>
-              <a:rPr lang="en-GB" dirty="0"/>
-              <a:t>The fix was going onto the animation file and baking into pose the root transformation of position Y</a:t>
-            </a:r>
-          </a:p>
-        </p:txBody>
-      </p:sp>
-      <p:pic>
-        <p:nvPicPr>
-          <p:cNvPr id="5" name="Picture 4">
-            <a:extLst>
-              <a:ext uri="{FF2B5EF4-FFF2-40B4-BE49-F238E27FC236}">
-                <a16:creationId xmlns:a16="http://schemas.microsoft.com/office/drawing/2014/main" id="{64AA64D6-A69B-F59D-4D96-652438522D7E}"/>
-              </a:ext>
-            </a:extLst>
-          </p:cNvPr>
-          <p:cNvPicPr>
-            <a:picLocks noChangeAspect="1"/>
-          </p:cNvPicPr>
-          <p:nvPr/>
-        </p:nvPicPr>
-        <p:blipFill>
-          <a:blip r:embed="rId2"/>
-          <a:stretch>
-            <a:fillRect/>
-          </a:stretch>
-        </p:blipFill>
-        <p:spPr>
-          <a:xfrm>
-            <a:off x="7058860" y="2734251"/>
-            <a:ext cx="2564326" cy="3577649"/>
-          </a:xfrm>
-          <a:prstGeom prst="rect">
-            <a:avLst/>
-          </a:prstGeom>
-        </p:spPr>
-      </p:pic>
-    </p:spTree>
-    <p:extLst>
-      <p:ext uri="{BB962C8B-B14F-4D97-AF65-F5344CB8AC3E}">
-        <p14:creationId xmlns:p14="http://schemas.microsoft.com/office/powerpoint/2010/main" val="2675561405"/>
       </p:ext>
     </p:extLst>
   </p:cSld>

</xml_diff>

<commit_message>
Organised folders + New player movement start
</commit_message>
<xml_diff>
--- a/Documentation/Report/Documentationofstuff.pptx
+++ b/Documentation/Report/Documentationofstuff.pptx
@@ -4428,6 +4428,10 @@
             </a:r>
           </a:p>
           <a:p>
+            <a:r>
+              <a:rPr lang="en-GB"/>
+              <a:t>NEW MOVEMENT IS GOOD BUT JUMP NOT WORK (GROUNDCHECK) AND ENEMIES ARENT ATTACKINGBUT DO FOLLOW WHAT THE FUCK</a:t>
+            </a:r>
             <a:endParaRPr lang="en-GB" dirty="0"/>
           </a:p>
         </p:txBody>

</xml_diff>

<commit_message>
Poster Final Draft 1
</commit_message>
<xml_diff>
--- a/Documentation/Report/Documentationofstuff.pptx
+++ b/Documentation/Report/Documentationofstuff.pptx
@@ -11,12 +11,13 @@
     <p:sldId id="259" r:id="rId5"/>
     <p:sldId id="265" r:id="rId6"/>
     <p:sldId id="261" r:id="rId7"/>
-    <p:sldId id="267" r:id="rId8"/>
-    <p:sldId id="264" r:id="rId9"/>
-    <p:sldId id="260" r:id="rId10"/>
-    <p:sldId id="262" r:id="rId11"/>
-    <p:sldId id="263" r:id="rId12"/>
-    <p:sldId id="266" r:id="rId13"/>
+    <p:sldId id="268" r:id="rId8"/>
+    <p:sldId id="267" r:id="rId9"/>
+    <p:sldId id="264" r:id="rId10"/>
+    <p:sldId id="260" r:id="rId11"/>
+    <p:sldId id="262" r:id="rId12"/>
+    <p:sldId id="263" r:id="rId13"/>
+    <p:sldId id="266" r:id="rId14"/>
   </p:sldIdLst>
   <p:sldSz cx="12192000" cy="6858000"/>
   <p:notesSz cx="6858000" cy="9144000"/>
@@ -272,7 +273,7 @@
           <a:p>
             <a:fld id="{C272013D-9C3F-40F8-8AC4-43A405D33223}" type="datetimeFigureOut">
               <a:rPr lang="en-GB" smtClean="0"/>
-              <a:t>02/04/2025</a:t>
+              <a:t>03/04/2025</a:t>
             </a:fld>
             <a:endParaRPr lang="en-GB"/>
           </a:p>
@@ -472,7 +473,7 @@
           <a:p>
             <a:fld id="{C272013D-9C3F-40F8-8AC4-43A405D33223}" type="datetimeFigureOut">
               <a:rPr lang="en-GB" smtClean="0"/>
-              <a:t>02/04/2025</a:t>
+              <a:t>03/04/2025</a:t>
             </a:fld>
             <a:endParaRPr lang="en-GB"/>
           </a:p>
@@ -682,7 +683,7 @@
           <a:p>
             <a:fld id="{C272013D-9C3F-40F8-8AC4-43A405D33223}" type="datetimeFigureOut">
               <a:rPr lang="en-GB" smtClean="0"/>
-              <a:t>02/04/2025</a:t>
+              <a:t>03/04/2025</a:t>
             </a:fld>
             <a:endParaRPr lang="en-GB"/>
           </a:p>
@@ -882,7 +883,7 @@
           <a:p>
             <a:fld id="{C272013D-9C3F-40F8-8AC4-43A405D33223}" type="datetimeFigureOut">
               <a:rPr lang="en-GB" smtClean="0"/>
-              <a:t>02/04/2025</a:t>
+              <a:t>03/04/2025</a:t>
             </a:fld>
             <a:endParaRPr lang="en-GB"/>
           </a:p>
@@ -1158,7 +1159,7 @@
           <a:p>
             <a:fld id="{C272013D-9C3F-40F8-8AC4-43A405D33223}" type="datetimeFigureOut">
               <a:rPr lang="en-GB" smtClean="0"/>
-              <a:t>02/04/2025</a:t>
+              <a:t>03/04/2025</a:t>
             </a:fld>
             <a:endParaRPr lang="en-GB"/>
           </a:p>
@@ -1426,7 +1427,7 @@
           <a:p>
             <a:fld id="{C272013D-9C3F-40F8-8AC4-43A405D33223}" type="datetimeFigureOut">
               <a:rPr lang="en-GB" smtClean="0"/>
-              <a:t>02/04/2025</a:t>
+              <a:t>03/04/2025</a:t>
             </a:fld>
             <a:endParaRPr lang="en-GB"/>
           </a:p>
@@ -1841,7 +1842,7 @@
           <a:p>
             <a:fld id="{C272013D-9C3F-40F8-8AC4-43A405D33223}" type="datetimeFigureOut">
               <a:rPr lang="en-GB" smtClean="0"/>
-              <a:t>02/04/2025</a:t>
+              <a:t>03/04/2025</a:t>
             </a:fld>
             <a:endParaRPr lang="en-GB"/>
           </a:p>
@@ -1983,7 +1984,7 @@
           <a:p>
             <a:fld id="{C272013D-9C3F-40F8-8AC4-43A405D33223}" type="datetimeFigureOut">
               <a:rPr lang="en-GB" smtClean="0"/>
-              <a:t>02/04/2025</a:t>
+              <a:t>03/04/2025</a:t>
             </a:fld>
             <a:endParaRPr lang="en-GB"/>
           </a:p>
@@ -2096,7 +2097,7 @@
           <a:p>
             <a:fld id="{C272013D-9C3F-40F8-8AC4-43A405D33223}" type="datetimeFigureOut">
               <a:rPr lang="en-GB" smtClean="0"/>
-              <a:t>02/04/2025</a:t>
+              <a:t>03/04/2025</a:t>
             </a:fld>
             <a:endParaRPr lang="en-GB"/>
           </a:p>
@@ -2409,7 +2410,7 @@
           <a:p>
             <a:fld id="{C272013D-9C3F-40F8-8AC4-43A405D33223}" type="datetimeFigureOut">
               <a:rPr lang="en-GB" smtClean="0"/>
-              <a:t>02/04/2025</a:t>
+              <a:t>03/04/2025</a:t>
             </a:fld>
             <a:endParaRPr lang="en-GB"/>
           </a:p>
@@ -2698,7 +2699,7 @@
           <a:p>
             <a:fld id="{C272013D-9C3F-40F8-8AC4-43A405D33223}" type="datetimeFigureOut">
               <a:rPr lang="en-GB" smtClean="0"/>
-              <a:t>02/04/2025</a:t>
+              <a:t>03/04/2025</a:t>
             </a:fld>
             <a:endParaRPr lang="en-GB"/>
           </a:p>
@@ -2941,7 +2942,7 @@
           <a:p>
             <a:fld id="{C272013D-9C3F-40F8-8AC4-43A405D33223}" type="datetimeFigureOut">
               <a:rPr lang="en-GB" smtClean="0"/>
-              <a:t>02/04/2025</a:t>
+              <a:t>03/04/2025</a:t>
             </a:fld>
             <a:endParaRPr lang="en-GB"/>
           </a:p>
@@ -3697,6 +3698,148 @@
   <p:cSld>
     <p:spTree>
       <p:nvGrpSpPr>
+        <p:cNvPr id="1" name=""/>
+        <p:cNvGrpSpPr/>
+        <p:nvPr/>
+      </p:nvGrpSpPr>
+      <p:grpSpPr>
+        <a:xfrm>
+          <a:off x="0" y="0"/>
+          <a:ext cx="0" cy="0"/>
+          <a:chOff x="0" y="0"/>
+          <a:chExt cx="0" cy="0"/>
+        </a:xfrm>
+      </p:grpSpPr>
+      <p:sp>
+        <p:nvSpPr>
+          <p:cNvPr id="2" name="Title 1">
+            <a:extLst>
+              <a:ext uri="{FF2B5EF4-FFF2-40B4-BE49-F238E27FC236}">
+                <a16:creationId xmlns:a16="http://schemas.microsoft.com/office/drawing/2014/main" id="{FDF41021-4C15-7026-2A5B-B95AFC73A9DE}"/>
+              </a:ext>
+            </a:extLst>
+          </p:cNvPr>
+          <p:cNvSpPr>
+            <a:spLocks noGrp="1"/>
+          </p:cNvSpPr>
+          <p:nvPr>
+            <p:ph type="title"/>
+          </p:nvPr>
+        </p:nvSpPr>
+        <p:spPr/>
+        <p:txBody>
+          <a:bodyPr/>
+          <a:lstStyle/>
+          <a:p>
+            <a:r>
+              <a:rPr lang="en-GB" dirty="0"/>
+              <a:t>ISSUES </a:t>
+            </a:r>
+            <a:br>
+              <a:rPr lang="en-GB" dirty="0"/>
+            </a:br>
+            <a:endParaRPr lang="en-GB" dirty="0"/>
+          </a:p>
+        </p:txBody>
+      </p:sp>
+      <p:sp>
+        <p:nvSpPr>
+          <p:cNvPr id="3" name="Content Placeholder 2">
+            <a:extLst>
+              <a:ext uri="{FF2B5EF4-FFF2-40B4-BE49-F238E27FC236}">
+                <a16:creationId xmlns:a16="http://schemas.microsoft.com/office/drawing/2014/main" id="{FAA49033-DC5F-4BEA-86B6-ADA421639E6E}"/>
+              </a:ext>
+            </a:extLst>
+          </p:cNvPr>
+          <p:cNvSpPr>
+            <a:spLocks noGrp="1"/>
+          </p:cNvSpPr>
+          <p:nvPr>
+            <p:ph idx="1"/>
+          </p:nvPr>
+        </p:nvSpPr>
+        <p:spPr>
+          <a:xfrm>
+            <a:off x="609600" y="1377569"/>
+            <a:ext cx="10515600" cy="4351338"/>
+          </a:xfrm>
+        </p:spPr>
+        <p:txBody>
+          <a:bodyPr/>
+          <a:lstStyle/>
+          <a:p>
+            <a:r>
+              <a:rPr lang="en-GB" dirty="0"/>
+              <a:t>Small issue but the bullets weren’t damaging the player and then I realised the collider was too low  so I made hight bigger and collider bigger</a:t>
+            </a:r>
+          </a:p>
+        </p:txBody>
+      </p:sp>
+      <p:pic>
+        <p:nvPicPr>
+          <p:cNvPr id="1026" name="Picture 2" descr="Uploaded image">
+            <a:extLst>
+              <a:ext uri="{FF2B5EF4-FFF2-40B4-BE49-F238E27FC236}">
+                <a16:creationId xmlns:a16="http://schemas.microsoft.com/office/drawing/2014/main" id="{DBF7FCB0-B845-6636-872A-3C8899E8C1EC}"/>
+              </a:ext>
+            </a:extLst>
+          </p:cNvPr>
+          <p:cNvPicPr>
+            <a:picLocks noChangeAspect="1" noChangeArrowheads="1"/>
+          </p:cNvPicPr>
+          <p:nvPr/>
+        </p:nvPicPr>
+        <p:blipFill>
+          <a:blip r:embed="rId2">
+            <a:extLst>
+              <a:ext uri="{28A0092B-C50C-407E-A947-70E740481C1C}">
+                <a14:useLocalDpi xmlns:a14="http://schemas.microsoft.com/office/drawing/2010/main" val="0"/>
+              </a:ext>
+            </a:extLst>
+          </a:blip>
+          <a:srcRect/>
+          <a:stretch>
+            <a:fillRect/>
+          </a:stretch>
+        </p:blipFill>
+        <p:spPr bwMode="auto">
+          <a:xfrm>
+            <a:off x="7054736" y="2396691"/>
+            <a:ext cx="3200244" cy="3903679"/>
+          </a:xfrm>
+          <a:prstGeom prst="rect">
+            <a:avLst/>
+          </a:prstGeom>
+          <a:noFill/>
+          <a:extLst>
+            <a:ext uri="{909E8E84-426E-40DD-AFC4-6F175D3DCCD1}">
+              <a14:hiddenFill xmlns:a14="http://schemas.microsoft.com/office/drawing/2010/main">
+                <a:solidFill>
+                  <a:srgbClr val="FFFFFF"/>
+                </a:solidFill>
+              </a14:hiddenFill>
+            </a:ext>
+          </a:extLst>
+        </p:spPr>
+      </p:pic>
+    </p:spTree>
+    <p:extLst>
+      <p:ext uri="{BB962C8B-B14F-4D97-AF65-F5344CB8AC3E}">
+        <p14:creationId xmlns:p14="http://schemas.microsoft.com/office/powerpoint/2010/main" val="3336898204"/>
+      </p:ext>
+    </p:extLst>
+  </p:cSld>
+  <p:clrMapOvr>
+    <a:masterClrMapping/>
+  </p:clrMapOvr>
+</p:sld>
+</file>
+
+<file path=ppt/slides/slide11.xml><?xml version="1.0" encoding="utf-8"?>
+<p:sld xmlns:a="http://schemas.openxmlformats.org/drawingml/2006/main" xmlns:r="http://schemas.openxmlformats.org/officeDocument/2006/relationships" xmlns:p="http://schemas.openxmlformats.org/presentationml/2006/main">
+  <p:cSld>
+    <p:spTree>
+      <p:nvGrpSpPr>
         <p:cNvPr id="1" name="">
           <a:extLst>
             <a:ext uri="{FF2B5EF4-FFF2-40B4-BE49-F238E27FC236}">
@@ -3851,7 +3994,7 @@
 </p:sld>
 </file>
 
-<file path=ppt/slides/slide11.xml><?xml version="1.0" encoding="utf-8"?>
+<file path=ppt/slides/slide12.xml><?xml version="1.0" encoding="utf-8"?>
 <p:sld xmlns:a="http://schemas.openxmlformats.org/drawingml/2006/main" xmlns:r="http://schemas.openxmlformats.org/officeDocument/2006/relationships" xmlns:p="http://schemas.openxmlformats.org/presentationml/2006/main">
   <p:cSld>
     <p:spTree>
@@ -3973,7 +4116,7 @@
 </p:sld>
 </file>
 
-<file path=ppt/slides/slide12.xml><?xml version="1.0" encoding="utf-8"?>
+<file path=ppt/slides/slide13.xml><?xml version="1.0" encoding="utf-8"?>
 <p:sld xmlns:a="http://schemas.openxmlformats.org/drawingml/2006/main" xmlns:r="http://schemas.openxmlformats.org/officeDocument/2006/relationships" xmlns:p="http://schemas.openxmlformats.org/presentationml/2006/main">
   <p:cSld>
     <p:spTree>
@@ -4631,7 +4774,7 @@
           <p:cNvPr id="2" name="Title 1">
             <a:extLst>
               <a:ext uri="{FF2B5EF4-FFF2-40B4-BE49-F238E27FC236}">
-                <a16:creationId xmlns:a16="http://schemas.microsoft.com/office/drawing/2014/main" id="{19B657D5-0D05-CDB3-E622-CC74399D9293}"/>
+                <a16:creationId xmlns:a16="http://schemas.microsoft.com/office/drawing/2014/main" id="{F58F3967-18E6-8991-E8AE-620BDC2DE720}"/>
               </a:ext>
             </a:extLst>
           </p:cNvPr>
@@ -4649,7 +4792,7 @@
           <a:p>
             <a:r>
               <a:rPr lang="en-GB" dirty="0"/>
-              <a:t>MOVEMENT 2</a:t>
+              <a:t>JJ MEETINGS </a:t>
             </a:r>
           </a:p>
         </p:txBody>
@@ -4659,7 +4802,7 @@
           <p:cNvPr id="3" name="Content Placeholder 2">
             <a:extLst>
               <a:ext uri="{FF2B5EF4-FFF2-40B4-BE49-F238E27FC236}">
-                <a16:creationId xmlns:a16="http://schemas.microsoft.com/office/drawing/2014/main" id="{6ADAF85F-3274-500B-24F1-77722205A975}"/>
+                <a16:creationId xmlns:a16="http://schemas.microsoft.com/office/drawing/2014/main" id="{696F8D03-4BA6-E44A-EB92-62C49E851A3A}"/>
               </a:ext>
             </a:extLst>
           </p:cNvPr>
@@ -4676,54 +4819,51 @@
           <a:lstStyle/>
           <a:p>
             <a:r>
+              <a:rPr lang="en-GB" dirty="0" err="1"/>
+              <a:t>Implementaiton</a:t>
+            </a:r>
+            <a:r>
               <a:rPr lang="en-GB" dirty="0"/>
-              <a:t>JUMP ONLY WORKS WHEN HELD</a:t>
+              <a:t> – GDD, DESIGN LIKE THE MAP THINGS</a:t>
             </a:r>
           </a:p>
           <a:p>
             <a:r>
               <a:rPr lang="en-GB" dirty="0"/>
-              <a:t>KINDA BUGGY WHEN PLAYER IS BEING PUSHED </a:t>
-            </a:r>
-          </a:p>
-          <a:p>
-            <a:r>
-              <a:rPr lang="en-GB" dirty="0">
-                <a:hlinkClick r:id="rId2"/>
-              </a:rPr>
-              <a:t>https://www.youtube.com/watch?v=_QajrabyTJc&amp;t=848s</a:t>
+              <a:t>Methodology is how I created it like the design </a:t>
+            </a:r>
+            <a:r>
+              <a:rPr lang="en-GB" dirty="0" err="1"/>
+              <a:t>implemnation</a:t>
+            </a:r>
+            <a:r>
+              <a:rPr lang="en-GB" dirty="0"/>
+              <a:t> </a:t>
+            </a:r>
+          </a:p>
+          <a:p>
+            <a:r>
+              <a:rPr lang="en-GB" dirty="0"/>
+              <a:t>How I used user testing for feedback to make iterations and </a:t>
+            </a:r>
+            <a:r>
+              <a:rPr lang="en-GB" dirty="0" err="1"/>
+              <a:t>yh</a:t>
             </a:r>
             <a:endParaRPr lang="en-GB" dirty="0"/>
           </a:p>
           <a:p>
-            <a:endParaRPr lang="en-GB" dirty="0"/>
-          </a:p>
-          <a:p>
-            <a:r>
-              <a:rPr lang="en-GB" dirty="0"/>
-              <a:t>Can always revert back to old as  I saved them as  prefabs and old movement in separate folder </a:t>
-            </a:r>
-          </a:p>
-          <a:p>
-            <a:r>
-              <a:rPr lang="en-GB" dirty="0"/>
-              <a:t>Make sure to change movement in lvl1 </a:t>
-            </a:r>
-            <a:r>
-              <a:rPr lang="en-GB" dirty="0" err="1"/>
-              <a:t>aswel</a:t>
-            </a:r>
-            <a:endParaRPr lang="en-GB"/>
-          </a:p>
-          <a:p>
-            <a:endParaRPr lang="en-GB"/>
+            <a:r>
+              <a:rPr lang="en-GB"/>
+              <a:t>Analysis </a:t>
+            </a:r>
           </a:p>
         </p:txBody>
       </p:sp>
     </p:spTree>
     <p:extLst>
       <p:ext uri="{BB962C8B-B14F-4D97-AF65-F5344CB8AC3E}">
-        <p14:creationId xmlns:p14="http://schemas.microsoft.com/office/powerpoint/2010/main" val="3653716512"/>
+        <p14:creationId xmlns:p14="http://schemas.microsoft.com/office/powerpoint/2010/main" val="2649845202"/>
       </p:ext>
     </p:extLst>
   </p:cSld>
@@ -4755,7 +4895,7 @@
           <p:cNvPr id="2" name="Title 1">
             <a:extLst>
               <a:ext uri="{FF2B5EF4-FFF2-40B4-BE49-F238E27FC236}">
-                <a16:creationId xmlns:a16="http://schemas.microsoft.com/office/drawing/2014/main" id="{76F7E7E4-9827-C9EA-41A9-B8C6EF75B3BA}"/>
+                <a16:creationId xmlns:a16="http://schemas.microsoft.com/office/drawing/2014/main" id="{19B657D5-0D05-CDB3-E622-CC74399D9293}"/>
               </a:ext>
             </a:extLst>
           </p:cNvPr>
@@ -4771,470 +4911,83 @@
           <a:bodyPr/>
           <a:lstStyle/>
           <a:p>
+            <a:r>
+              <a:rPr lang="en-GB" dirty="0"/>
+              <a:t>MOVEMENT 2</a:t>
+            </a:r>
+          </a:p>
+        </p:txBody>
+      </p:sp>
+      <p:sp>
+        <p:nvSpPr>
+          <p:cNvPr id="3" name="Content Placeholder 2">
+            <a:extLst>
+              <a:ext uri="{FF2B5EF4-FFF2-40B4-BE49-F238E27FC236}">
+                <a16:creationId xmlns:a16="http://schemas.microsoft.com/office/drawing/2014/main" id="{6ADAF85F-3274-500B-24F1-77722205A975}"/>
+              </a:ext>
+            </a:extLst>
+          </p:cNvPr>
+          <p:cNvSpPr>
+            <a:spLocks noGrp="1"/>
+          </p:cNvSpPr>
+          <p:nvPr>
+            <p:ph idx="1"/>
+          </p:nvPr>
+        </p:nvSpPr>
+        <p:spPr/>
+        <p:txBody>
+          <a:bodyPr/>
+          <a:lstStyle/>
+          <a:p>
+            <a:r>
+              <a:rPr lang="en-GB" dirty="0"/>
+              <a:t>JUMP ONLY WORKS WHEN HELD</a:t>
+            </a:r>
+          </a:p>
+          <a:p>
+            <a:r>
+              <a:rPr lang="en-GB" dirty="0"/>
+              <a:t>KINDA BUGGY WHEN PLAYER IS BEING PUSHED </a:t>
+            </a:r>
+          </a:p>
+          <a:p>
+            <a:r>
+              <a:rPr lang="en-GB" dirty="0">
+                <a:hlinkClick r:id="rId2"/>
+              </a:rPr>
+              <a:t>https://www.youtube.com/watch?v=_QajrabyTJc&amp;t=848s</a:t>
+            </a:r>
             <a:endParaRPr lang="en-GB" dirty="0"/>
           </a:p>
-        </p:txBody>
-      </p:sp>
-      <p:sp>
-        <p:nvSpPr>
-          <p:cNvPr id="3" name="Content Placeholder 2">
-            <a:extLst>
-              <a:ext uri="{FF2B5EF4-FFF2-40B4-BE49-F238E27FC236}">
-                <a16:creationId xmlns:a16="http://schemas.microsoft.com/office/drawing/2014/main" id="{69D816C0-DEFD-6470-D46E-50B949AAE97C}"/>
-              </a:ext>
-            </a:extLst>
-          </p:cNvPr>
-          <p:cNvSpPr>
-            <a:spLocks noGrp="1"/>
-          </p:cNvSpPr>
-          <p:nvPr>
-            <p:ph idx="1"/>
-          </p:nvPr>
-        </p:nvSpPr>
-        <p:spPr/>
-        <p:txBody>
-          <a:bodyPr/>
-          <a:lstStyle/>
+          <a:p>
+            <a:endParaRPr lang="en-GB" dirty="0"/>
+          </a:p>
           <a:p>
             <a:r>
               <a:rPr lang="en-GB" dirty="0"/>
-              <a:t>If I need to revert the z\</a:t>
+              <a:t>Can always revert back to old as  I saved them as  prefabs and old movement in separate folder </a:t>
+            </a:r>
+          </a:p>
+          <a:p>
+            <a:r>
+              <a:rPr lang="en-GB" dirty="0"/>
+              <a:t>Make sure to change movement in lvl1 </a:t>
             </a:r>
             <a:r>
               <a:rPr lang="en-GB" dirty="0" err="1"/>
-              <a:t>ombie</a:t>
-            </a:r>
-            <a:r>
-              <a:rPr lang="en-GB" dirty="0"/>
-              <a:t> </a:t>
-            </a:r>
-            <a:r>
-              <a:rPr lang="en-GB" dirty="0" err="1"/>
-              <a:t>animiaton</a:t>
-            </a:r>
-            <a:r>
-              <a:rPr lang="en-GB" dirty="0"/>
-              <a:t> then delete links to attack and </a:t>
-            </a:r>
-          </a:p>
-        </p:txBody>
-      </p:sp>
-      <p:sp>
-        <p:nvSpPr>
-          <p:cNvPr id="4" name="TextBox 3">
-            <a:extLst>
-              <a:ext uri="{FF2B5EF4-FFF2-40B4-BE49-F238E27FC236}">
-                <a16:creationId xmlns:a16="http://schemas.microsoft.com/office/drawing/2014/main" id="{5BDA14E1-2B65-96B1-BBB5-FEEEF22049E4}"/>
-              </a:ext>
-            </a:extLst>
-          </p:cNvPr>
-          <p:cNvSpPr txBox="1"/>
-          <p:nvPr/>
-        </p:nvSpPr>
-        <p:spPr>
-          <a:xfrm>
-            <a:off x="4681728" y="2525967"/>
-            <a:ext cx="6153912" cy="4278094"/>
-          </a:xfrm>
-          <a:prstGeom prst="rect">
-            <a:avLst/>
-          </a:prstGeom>
-          <a:noFill/>
-        </p:spPr>
-        <p:txBody>
-          <a:bodyPr wrap="square" rtlCol="0">
-            <a:spAutoFit/>
-          </a:bodyPr>
-          <a:lstStyle/>
-          <a:p>
-            <a:r>
-              <a:rPr lang="en-GB" sz="800" dirty="0"/>
-              <a:t>using </a:t>
-            </a:r>
-            <a:r>
-              <a:rPr lang="en-GB" sz="800" dirty="0" err="1"/>
-              <a:t>UnityEngine</a:t>
-            </a:r>
-            <a:r>
-              <a:rPr lang="en-GB" sz="800" dirty="0"/>
-              <a:t>;</a:t>
-            </a:r>
-          </a:p>
-          <a:p>
-            <a:endParaRPr lang="en-GB" sz="800" dirty="0"/>
-          </a:p>
-          <a:p>
-            <a:r>
-              <a:rPr lang="en-GB" sz="800" dirty="0"/>
-              <a:t>public class </a:t>
-            </a:r>
-            <a:r>
-              <a:rPr lang="en-GB" sz="800" dirty="0" err="1"/>
-              <a:t>ZombieAttack</a:t>
-            </a:r>
-            <a:r>
-              <a:rPr lang="en-GB" sz="800" dirty="0"/>
-              <a:t> : </a:t>
-            </a:r>
-            <a:r>
-              <a:rPr lang="en-GB" sz="800" dirty="0" err="1"/>
-              <a:t>MonoBehaviour</a:t>
-            </a:r>
-            <a:endParaRPr lang="en-GB" sz="800" dirty="0"/>
-          </a:p>
-          <a:p>
-            <a:r>
-              <a:rPr lang="en-GB" sz="800" dirty="0"/>
-              <a:t>{</a:t>
-            </a:r>
-          </a:p>
-          <a:p>
-            <a:r>
-              <a:rPr lang="en-GB" sz="800" dirty="0"/>
-              <a:t>    public int damage = 10; // Damage per hit</a:t>
-            </a:r>
-          </a:p>
-          <a:p>
-            <a:r>
-              <a:rPr lang="en-GB" sz="800" dirty="0"/>
-              <a:t>    public float </a:t>
-            </a:r>
-            <a:r>
-              <a:rPr lang="en-GB" sz="800" dirty="0" err="1"/>
-              <a:t>attackRate</a:t>
-            </a:r>
-            <a:r>
-              <a:rPr lang="en-GB" sz="800" dirty="0"/>
-              <a:t> = 1.5f; // Attack every X seconds</a:t>
-            </a:r>
-          </a:p>
-          <a:p>
-            <a:endParaRPr lang="en-GB" sz="800" dirty="0"/>
-          </a:p>
-          <a:p>
-            <a:r>
-              <a:rPr lang="en-GB" sz="800" dirty="0"/>
-              <a:t>    private float </a:t>
-            </a:r>
-            <a:r>
-              <a:rPr lang="en-GB" sz="800" dirty="0" err="1"/>
-              <a:t>nextAttackTime</a:t>
-            </a:r>
-            <a:r>
-              <a:rPr lang="en-GB" sz="800" dirty="0"/>
-              <a:t> = 0f;</a:t>
-            </a:r>
-          </a:p>
-          <a:p>
-            <a:endParaRPr lang="en-GB" sz="800" dirty="0"/>
-          </a:p>
-          <a:p>
-            <a:r>
-              <a:rPr lang="en-GB" sz="800" dirty="0"/>
-              <a:t>    private void </a:t>
-            </a:r>
-            <a:r>
-              <a:rPr lang="en-GB" sz="800" dirty="0" err="1"/>
-              <a:t>OnCollisionStay</a:t>
-            </a:r>
-            <a:r>
-              <a:rPr lang="en-GB" sz="800" dirty="0"/>
-              <a:t>(Collision collision)</a:t>
-            </a:r>
-          </a:p>
-          <a:p>
-            <a:r>
-              <a:rPr lang="en-GB" sz="800" dirty="0"/>
-              <a:t>    {</a:t>
-            </a:r>
-          </a:p>
-          <a:p>
-            <a:r>
-              <a:rPr lang="en-GB" sz="800" dirty="0"/>
-              <a:t>        if (</a:t>
-            </a:r>
-            <a:r>
-              <a:rPr lang="en-GB" sz="800" dirty="0" err="1"/>
-              <a:t>collision.gameObject.CompareTag</a:t>
-            </a:r>
-            <a:r>
-              <a:rPr lang="en-GB" sz="800" dirty="0"/>
-              <a:t>("Player"))</a:t>
-            </a:r>
-          </a:p>
-          <a:p>
-            <a:r>
-              <a:rPr lang="en-GB" sz="800" dirty="0"/>
-              <a:t>        {</a:t>
-            </a:r>
-          </a:p>
-          <a:p>
-            <a:r>
-              <a:rPr lang="en-GB" sz="800" dirty="0"/>
-              <a:t>            if (</a:t>
-            </a:r>
-            <a:r>
-              <a:rPr lang="en-GB" sz="800" dirty="0" err="1"/>
-              <a:t>Time.time</a:t>
-            </a:r>
-            <a:r>
-              <a:rPr lang="en-GB" sz="800" dirty="0"/>
-              <a:t> &gt;= </a:t>
-            </a:r>
-            <a:r>
-              <a:rPr lang="en-GB" sz="800" dirty="0" err="1"/>
-              <a:t>nextAttackTime</a:t>
-            </a:r>
-            <a:r>
-              <a:rPr lang="en-GB" sz="800" dirty="0"/>
-              <a:t>)</a:t>
-            </a:r>
-          </a:p>
-          <a:p>
-            <a:r>
-              <a:rPr lang="en-GB" sz="800" dirty="0"/>
-              <a:t>            {</a:t>
-            </a:r>
-          </a:p>
-          <a:p>
-            <a:r>
-              <a:rPr lang="en-GB" sz="800" dirty="0"/>
-              <a:t>                </a:t>
-            </a:r>
-            <a:r>
-              <a:rPr lang="en-GB" sz="800" dirty="0" err="1"/>
-              <a:t>HealthManager</a:t>
-            </a:r>
-            <a:r>
-              <a:rPr lang="en-GB" sz="800" dirty="0"/>
-              <a:t> </a:t>
-            </a:r>
-            <a:r>
-              <a:rPr lang="en-GB" sz="800" dirty="0" err="1"/>
-              <a:t>playerHealth</a:t>
-            </a:r>
-            <a:r>
-              <a:rPr lang="en-GB" sz="800" dirty="0"/>
-              <a:t> = </a:t>
-            </a:r>
-            <a:r>
-              <a:rPr lang="en-GB" sz="800" dirty="0" err="1"/>
-              <a:t>collision.gameObject.GetComponent</a:t>
-            </a:r>
-            <a:r>
-              <a:rPr lang="en-GB" sz="800" dirty="0"/>
-              <a:t>&lt;</a:t>
-            </a:r>
-            <a:r>
-              <a:rPr lang="en-GB" sz="800" dirty="0" err="1"/>
-              <a:t>HealthManager</a:t>
-            </a:r>
-            <a:r>
-              <a:rPr lang="en-GB" sz="800" dirty="0"/>
-              <a:t>&gt;();</a:t>
-            </a:r>
-          </a:p>
-          <a:p>
-            <a:r>
-              <a:rPr lang="en-GB" sz="800" dirty="0"/>
-              <a:t>                </a:t>
-            </a:r>
-            <a:r>
-              <a:rPr lang="en-GB" sz="800" dirty="0" err="1"/>
-              <a:t>DamageOverlay</a:t>
-            </a:r>
-            <a:r>
-              <a:rPr lang="en-GB" sz="800" dirty="0"/>
-              <a:t> </a:t>
-            </a:r>
-            <a:r>
-              <a:rPr lang="en-GB" sz="800" dirty="0" err="1"/>
-              <a:t>screenEffect</a:t>
-            </a:r>
-            <a:r>
-              <a:rPr lang="en-GB" sz="800" dirty="0"/>
-              <a:t> = </a:t>
-            </a:r>
-            <a:r>
-              <a:rPr lang="en-GB" sz="800" dirty="0" err="1"/>
-              <a:t>collision.gameObject.GetComponent</a:t>
-            </a:r>
-            <a:r>
-              <a:rPr lang="en-GB" sz="800" dirty="0"/>
-              <a:t>&lt;</a:t>
-            </a:r>
-            <a:r>
-              <a:rPr lang="en-GB" sz="800" dirty="0" err="1"/>
-              <a:t>DamageOverlay</a:t>
-            </a:r>
-            <a:r>
-              <a:rPr lang="en-GB" sz="800" dirty="0"/>
-              <a:t>&gt;(); // Get the red pulse effect</a:t>
-            </a:r>
-          </a:p>
-          <a:p>
-            <a:endParaRPr lang="en-GB" sz="800" dirty="0"/>
-          </a:p>
-          <a:p>
-            <a:r>
-              <a:rPr lang="en-GB" sz="800" dirty="0"/>
-              <a:t>                if (</a:t>
-            </a:r>
-            <a:r>
-              <a:rPr lang="en-GB" sz="800" dirty="0" err="1"/>
-              <a:t>playerHealth</a:t>
-            </a:r>
-            <a:r>
-              <a:rPr lang="en-GB" sz="800" dirty="0"/>
-              <a:t> != null)</a:t>
-            </a:r>
-          </a:p>
-          <a:p>
-            <a:r>
-              <a:rPr lang="en-GB" sz="800" dirty="0"/>
-              <a:t>                {</a:t>
-            </a:r>
-          </a:p>
-          <a:p>
-            <a:r>
-              <a:rPr lang="en-GB" sz="800" dirty="0"/>
-              <a:t>                    </a:t>
-            </a:r>
-            <a:r>
-              <a:rPr lang="en-GB" sz="800" dirty="0" err="1"/>
-              <a:t>playerHealth.TakeDamage</a:t>
-            </a:r>
-            <a:r>
-              <a:rPr lang="en-GB" sz="800" dirty="0"/>
-              <a:t>(damage);</a:t>
-            </a:r>
-          </a:p>
-          <a:p>
-            <a:r>
-              <a:rPr lang="en-GB" sz="800" dirty="0"/>
-              <a:t>                    </a:t>
-            </a:r>
-            <a:r>
-              <a:rPr lang="en-GB" sz="800" dirty="0" err="1"/>
-              <a:t>Debug.Log</a:t>
-            </a:r>
-            <a:r>
-              <a:rPr lang="en-GB" sz="800" dirty="0"/>
-              <a:t>("Zombie dealt " + damage + " damage to player.");</a:t>
-            </a:r>
-          </a:p>
-          <a:p>
-            <a:r>
-              <a:rPr lang="en-GB" sz="800" dirty="0"/>
-              <a:t>                }</a:t>
-            </a:r>
-          </a:p>
-          <a:p>
-            <a:endParaRPr lang="en-GB" sz="800" dirty="0"/>
-          </a:p>
-          <a:p>
-            <a:r>
-              <a:rPr lang="en-GB" sz="800" dirty="0"/>
-              <a:t>                if (</a:t>
-            </a:r>
-            <a:r>
-              <a:rPr lang="en-GB" sz="800" dirty="0" err="1"/>
-              <a:t>screenEffect</a:t>
-            </a:r>
-            <a:r>
-              <a:rPr lang="en-GB" sz="800" dirty="0"/>
-              <a:t> != null)</a:t>
-            </a:r>
-          </a:p>
-          <a:p>
-            <a:r>
-              <a:rPr lang="en-GB" sz="800" dirty="0"/>
-              <a:t>                {</a:t>
-            </a:r>
-          </a:p>
-          <a:p>
-            <a:r>
-              <a:rPr lang="en-GB" sz="800" dirty="0"/>
-              <a:t>                    </a:t>
-            </a:r>
-            <a:r>
-              <a:rPr lang="en-GB" sz="800" dirty="0" err="1"/>
-              <a:t>screenEffect.ShowDamageEffect</a:t>
-            </a:r>
-            <a:r>
-              <a:rPr lang="en-GB" sz="800" dirty="0"/>
-              <a:t>(); // Trigger red screen pulse</a:t>
-            </a:r>
-          </a:p>
-          <a:p>
-            <a:r>
-              <a:rPr lang="en-GB" sz="800" dirty="0"/>
-              <a:t>                }</a:t>
-            </a:r>
-          </a:p>
-          <a:p>
-            <a:endParaRPr lang="en-GB" sz="800" dirty="0"/>
-          </a:p>
-          <a:p>
-            <a:r>
-              <a:rPr lang="en-GB" sz="800" dirty="0"/>
-              <a:t>                </a:t>
-            </a:r>
-            <a:r>
-              <a:rPr lang="en-GB" sz="800" dirty="0" err="1"/>
-              <a:t>nextAttackTime</a:t>
-            </a:r>
-            <a:r>
-              <a:rPr lang="en-GB" sz="800" dirty="0"/>
-              <a:t> = </a:t>
-            </a:r>
-            <a:r>
-              <a:rPr lang="en-GB" sz="800" dirty="0" err="1"/>
-              <a:t>Time.time</a:t>
-            </a:r>
-            <a:r>
-              <a:rPr lang="en-GB" sz="800" dirty="0"/>
-              <a:t> + </a:t>
-            </a:r>
-            <a:r>
-              <a:rPr lang="en-GB" sz="800" dirty="0" err="1"/>
-              <a:t>attackRate</a:t>
-            </a:r>
-            <a:r>
-              <a:rPr lang="en-GB" sz="800" dirty="0"/>
-              <a:t>;</a:t>
-            </a:r>
-          </a:p>
-          <a:p>
-            <a:r>
-              <a:rPr lang="en-GB" sz="800" dirty="0"/>
-              <a:t>            }</a:t>
-            </a:r>
-          </a:p>
-          <a:p>
-            <a:r>
-              <a:rPr lang="en-GB" sz="800" dirty="0"/>
-              <a:t>        }</a:t>
-            </a:r>
-          </a:p>
-          <a:p>
-            <a:r>
-              <a:rPr lang="en-GB" sz="800" dirty="0"/>
-              <a:t>    }</a:t>
-            </a:r>
-          </a:p>
-          <a:p>
-            <a:r>
-              <a:rPr lang="en-GB" sz="800" dirty="0"/>
-              <a:t>}</a:t>
-            </a:r>
+              <a:t>aswel</a:t>
+            </a:r>
+            <a:endParaRPr lang="en-GB"/>
+          </a:p>
+          <a:p>
+            <a:endParaRPr lang="en-GB"/>
           </a:p>
         </p:txBody>
       </p:sp>
     </p:spTree>
     <p:extLst>
       <p:ext uri="{BB962C8B-B14F-4D97-AF65-F5344CB8AC3E}">
-        <p14:creationId xmlns:p14="http://schemas.microsoft.com/office/powerpoint/2010/main" val="1016281087"/>
+        <p14:creationId xmlns:p14="http://schemas.microsoft.com/office/powerpoint/2010/main" val="3653716512"/>
       </p:ext>
     </p:extLst>
   </p:cSld>
@@ -5266,7 +5019,7 @@
           <p:cNvPr id="2" name="Title 1">
             <a:extLst>
               <a:ext uri="{FF2B5EF4-FFF2-40B4-BE49-F238E27FC236}">
-                <a16:creationId xmlns:a16="http://schemas.microsoft.com/office/drawing/2014/main" id="{FDF41021-4C15-7026-2A5B-B95AFC73A9DE}"/>
+                <a16:creationId xmlns:a16="http://schemas.microsoft.com/office/drawing/2014/main" id="{76F7E7E4-9827-C9EA-41A9-B8C6EF75B3BA}"/>
               </a:ext>
             </a:extLst>
           </p:cNvPr>
@@ -5282,101 +5035,470 @@
           <a:bodyPr/>
           <a:lstStyle/>
           <a:p>
+            <a:endParaRPr lang="en-GB" dirty="0"/>
+          </a:p>
+        </p:txBody>
+      </p:sp>
+      <p:sp>
+        <p:nvSpPr>
+          <p:cNvPr id="3" name="Content Placeholder 2">
+            <a:extLst>
+              <a:ext uri="{FF2B5EF4-FFF2-40B4-BE49-F238E27FC236}">
+                <a16:creationId xmlns:a16="http://schemas.microsoft.com/office/drawing/2014/main" id="{69D816C0-DEFD-6470-D46E-50B949AAE97C}"/>
+              </a:ext>
+            </a:extLst>
+          </p:cNvPr>
+          <p:cNvSpPr>
+            <a:spLocks noGrp="1"/>
+          </p:cNvSpPr>
+          <p:nvPr>
+            <p:ph idx="1"/>
+          </p:nvPr>
+        </p:nvSpPr>
+        <p:spPr/>
+        <p:txBody>
+          <a:bodyPr/>
+          <a:lstStyle/>
+          <a:p>
             <a:r>
               <a:rPr lang="en-GB" dirty="0"/>
-              <a:t>ISSUES </a:t>
-            </a:r>
-            <a:br>
+              <a:t>If I need to revert the z\</a:t>
+            </a:r>
+            <a:r>
+              <a:rPr lang="en-GB" dirty="0" err="1"/>
+              <a:t>ombie</a:t>
+            </a:r>
+            <a:r>
               <a:rPr lang="en-GB" dirty="0"/>
-            </a:br>
-            <a:endParaRPr lang="en-GB" dirty="0"/>
-          </a:p>
-        </p:txBody>
-      </p:sp>
-      <p:sp>
-        <p:nvSpPr>
-          <p:cNvPr id="3" name="Content Placeholder 2">
-            <a:extLst>
-              <a:ext uri="{FF2B5EF4-FFF2-40B4-BE49-F238E27FC236}">
-                <a16:creationId xmlns:a16="http://schemas.microsoft.com/office/drawing/2014/main" id="{FAA49033-DC5F-4BEA-86B6-ADA421639E6E}"/>
-              </a:ext>
-            </a:extLst>
-          </p:cNvPr>
-          <p:cNvSpPr>
-            <a:spLocks noGrp="1"/>
-          </p:cNvSpPr>
-          <p:nvPr>
-            <p:ph idx="1"/>
-          </p:nvPr>
+              <a:t> </a:t>
+            </a:r>
+            <a:r>
+              <a:rPr lang="en-GB" dirty="0" err="1"/>
+              <a:t>animiaton</a:t>
+            </a:r>
+            <a:r>
+              <a:rPr lang="en-GB" dirty="0"/>
+              <a:t> then delete links to attack and </a:t>
+            </a:r>
+          </a:p>
+        </p:txBody>
+      </p:sp>
+      <p:sp>
+        <p:nvSpPr>
+          <p:cNvPr id="4" name="TextBox 3">
+            <a:extLst>
+              <a:ext uri="{FF2B5EF4-FFF2-40B4-BE49-F238E27FC236}">
+                <a16:creationId xmlns:a16="http://schemas.microsoft.com/office/drawing/2014/main" id="{5BDA14E1-2B65-96B1-BBB5-FEEEF22049E4}"/>
+              </a:ext>
+            </a:extLst>
+          </p:cNvPr>
+          <p:cNvSpPr txBox="1"/>
+          <p:nvPr/>
         </p:nvSpPr>
         <p:spPr>
           <a:xfrm>
-            <a:off x="609600" y="1377569"/>
-            <a:ext cx="10515600" cy="4351338"/>
-          </a:xfrm>
-        </p:spPr>
-        <p:txBody>
-          <a:bodyPr/>
-          <a:lstStyle/>
-          <a:p>
-            <a:r>
-              <a:rPr lang="en-GB" dirty="0"/>
-              <a:t>Small issue but the bullets weren’t damaging the player and then I realised the collider was too low  so I made hight bigger and collider bigger</a:t>
-            </a:r>
-          </a:p>
-        </p:txBody>
-      </p:sp>
-      <p:pic>
-        <p:nvPicPr>
-          <p:cNvPr id="1026" name="Picture 2" descr="Uploaded image">
-            <a:extLst>
-              <a:ext uri="{FF2B5EF4-FFF2-40B4-BE49-F238E27FC236}">
-                <a16:creationId xmlns:a16="http://schemas.microsoft.com/office/drawing/2014/main" id="{DBF7FCB0-B845-6636-872A-3C8899E8C1EC}"/>
-              </a:ext>
-            </a:extLst>
-          </p:cNvPr>
-          <p:cNvPicPr>
-            <a:picLocks noChangeAspect="1" noChangeArrowheads="1"/>
-          </p:cNvPicPr>
-          <p:nvPr/>
-        </p:nvPicPr>
-        <p:blipFill>
-          <a:blip r:embed="rId2">
-            <a:extLst>
-              <a:ext uri="{28A0092B-C50C-407E-A947-70E740481C1C}">
-                <a14:useLocalDpi xmlns:a14="http://schemas.microsoft.com/office/drawing/2010/main" val="0"/>
-              </a:ext>
-            </a:extLst>
-          </a:blip>
-          <a:srcRect/>
-          <a:stretch>
-            <a:fillRect/>
-          </a:stretch>
-        </p:blipFill>
-        <p:spPr bwMode="auto">
-          <a:xfrm>
-            <a:off x="7054736" y="2396691"/>
-            <a:ext cx="3200244" cy="3903679"/>
+            <a:off x="4681728" y="2525967"/>
+            <a:ext cx="6153912" cy="4278094"/>
           </a:xfrm>
           <a:prstGeom prst="rect">
             <a:avLst/>
           </a:prstGeom>
           <a:noFill/>
-          <a:extLst>
-            <a:ext uri="{909E8E84-426E-40DD-AFC4-6F175D3DCCD1}">
-              <a14:hiddenFill xmlns:a14="http://schemas.microsoft.com/office/drawing/2010/main">
-                <a:solidFill>
-                  <a:srgbClr val="FFFFFF"/>
-                </a:solidFill>
-              </a14:hiddenFill>
-            </a:ext>
-          </a:extLst>
         </p:spPr>
-      </p:pic>
+        <p:txBody>
+          <a:bodyPr wrap="square" rtlCol="0">
+            <a:spAutoFit/>
+          </a:bodyPr>
+          <a:lstStyle/>
+          <a:p>
+            <a:r>
+              <a:rPr lang="en-GB" sz="800" dirty="0"/>
+              <a:t>using </a:t>
+            </a:r>
+            <a:r>
+              <a:rPr lang="en-GB" sz="800" dirty="0" err="1"/>
+              <a:t>UnityEngine</a:t>
+            </a:r>
+            <a:r>
+              <a:rPr lang="en-GB" sz="800" dirty="0"/>
+              <a:t>;</a:t>
+            </a:r>
+          </a:p>
+          <a:p>
+            <a:endParaRPr lang="en-GB" sz="800" dirty="0"/>
+          </a:p>
+          <a:p>
+            <a:r>
+              <a:rPr lang="en-GB" sz="800" dirty="0"/>
+              <a:t>public class </a:t>
+            </a:r>
+            <a:r>
+              <a:rPr lang="en-GB" sz="800" dirty="0" err="1"/>
+              <a:t>ZombieAttack</a:t>
+            </a:r>
+            <a:r>
+              <a:rPr lang="en-GB" sz="800" dirty="0"/>
+              <a:t> : </a:t>
+            </a:r>
+            <a:r>
+              <a:rPr lang="en-GB" sz="800" dirty="0" err="1"/>
+              <a:t>MonoBehaviour</a:t>
+            </a:r>
+            <a:endParaRPr lang="en-GB" sz="800" dirty="0"/>
+          </a:p>
+          <a:p>
+            <a:r>
+              <a:rPr lang="en-GB" sz="800" dirty="0"/>
+              <a:t>{</a:t>
+            </a:r>
+          </a:p>
+          <a:p>
+            <a:r>
+              <a:rPr lang="en-GB" sz="800" dirty="0"/>
+              <a:t>    public int damage = 10; // Damage per hit</a:t>
+            </a:r>
+          </a:p>
+          <a:p>
+            <a:r>
+              <a:rPr lang="en-GB" sz="800" dirty="0"/>
+              <a:t>    public float </a:t>
+            </a:r>
+            <a:r>
+              <a:rPr lang="en-GB" sz="800" dirty="0" err="1"/>
+              <a:t>attackRate</a:t>
+            </a:r>
+            <a:r>
+              <a:rPr lang="en-GB" sz="800" dirty="0"/>
+              <a:t> = 1.5f; // Attack every X seconds</a:t>
+            </a:r>
+          </a:p>
+          <a:p>
+            <a:endParaRPr lang="en-GB" sz="800" dirty="0"/>
+          </a:p>
+          <a:p>
+            <a:r>
+              <a:rPr lang="en-GB" sz="800" dirty="0"/>
+              <a:t>    private float </a:t>
+            </a:r>
+            <a:r>
+              <a:rPr lang="en-GB" sz="800" dirty="0" err="1"/>
+              <a:t>nextAttackTime</a:t>
+            </a:r>
+            <a:r>
+              <a:rPr lang="en-GB" sz="800" dirty="0"/>
+              <a:t> = 0f;</a:t>
+            </a:r>
+          </a:p>
+          <a:p>
+            <a:endParaRPr lang="en-GB" sz="800" dirty="0"/>
+          </a:p>
+          <a:p>
+            <a:r>
+              <a:rPr lang="en-GB" sz="800" dirty="0"/>
+              <a:t>    private void </a:t>
+            </a:r>
+            <a:r>
+              <a:rPr lang="en-GB" sz="800" dirty="0" err="1"/>
+              <a:t>OnCollisionStay</a:t>
+            </a:r>
+            <a:r>
+              <a:rPr lang="en-GB" sz="800" dirty="0"/>
+              <a:t>(Collision collision)</a:t>
+            </a:r>
+          </a:p>
+          <a:p>
+            <a:r>
+              <a:rPr lang="en-GB" sz="800" dirty="0"/>
+              <a:t>    {</a:t>
+            </a:r>
+          </a:p>
+          <a:p>
+            <a:r>
+              <a:rPr lang="en-GB" sz="800" dirty="0"/>
+              <a:t>        if (</a:t>
+            </a:r>
+            <a:r>
+              <a:rPr lang="en-GB" sz="800" dirty="0" err="1"/>
+              <a:t>collision.gameObject.CompareTag</a:t>
+            </a:r>
+            <a:r>
+              <a:rPr lang="en-GB" sz="800" dirty="0"/>
+              <a:t>("Player"))</a:t>
+            </a:r>
+          </a:p>
+          <a:p>
+            <a:r>
+              <a:rPr lang="en-GB" sz="800" dirty="0"/>
+              <a:t>        {</a:t>
+            </a:r>
+          </a:p>
+          <a:p>
+            <a:r>
+              <a:rPr lang="en-GB" sz="800" dirty="0"/>
+              <a:t>            if (</a:t>
+            </a:r>
+            <a:r>
+              <a:rPr lang="en-GB" sz="800" dirty="0" err="1"/>
+              <a:t>Time.time</a:t>
+            </a:r>
+            <a:r>
+              <a:rPr lang="en-GB" sz="800" dirty="0"/>
+              <a:t> &gt;= </a:t>
+            </a:r>
+            <a:r>
+              <a:rPr lang="en-GB" sz="800" dirty="0" err="1"/>
+              <a:t>nextAttackTime</a:t>
+            </a:r>
+            <a:r>
+              <a:rPr lang="en-GB" sz="800" dirty="0"/>
+              <a:t>)</a:t>
+            </a:r>
+          </a:p>
+          <a:p>
+            <a:r>
+              <a:rPr lang="en-GB" sz="800" dirty="0"/>
+              <a:t>            {</a:t>
+            </a:r>
+          </a:p>
+          <a:p>
+            <a:r>
+              <a:rPr lang="en-GB" sz="800" dirty="0"/>
+              <a:t>                </a:t>
+            </a:r>
+            <a:r>
+              <a:rPr lang="en-GB" sz="800" dirty="0" err="1"/>
+              <a:t>HealthManager</a:t>
+            </a:r>
+            <a:r>
+              <a:rPr lang="en-GB" sz="800" dirty="0"/>
+              <a:t> </a:t>
+            </a:r>
+            <a:r>
+              <a:rPr lang="en-GB" sz="800" dirty="0" err="1"/>
+              <a:t>playerHealth</a:t>
+            </a:r>
+            <a:r>
+              <a:rPr lang="en-GB" sz="800" dirty="0"/>
+              <a:t> = </a:t>
+            </a:r>
+            <a:r>
+              <a:rPr lang="en-GB" sz="800" dirty="0" err="1"/>
+              <a:t>collision.gameObject.GetComponent</a:t>
+            </a:r>
+            <a:r>
+              <a:rPr lang="en-GB" sz="800" dirty="0"/>
+              <a:t>&lt;</a:t>
+            </a:r>
+            <a:r>
+              <a:rPr lang="en-GB" sz="800" dirty="0" err="1"/>
+              <a:t>HealthManager</a:t>
+            </a:r>
+            <a:r>
+              <a:rPr lang="en-GB" sz="800" dirty="0"/>
+              <a:t>&gt;();</a:t>
+            </a:r>
+          </a:p>
+          <a:p>
+            <a:r>
+              <a:rPr lang="en-GB" sz="800" dirty="0"/>
+              <a:t>                </a:t>
+            </a:r>
+            <a:r>
+              <a:rPr lang="en-GB" sz="800" dirty="0" err="1"/>
+              <a:t>DamageOverlay</a:t>
+            </a:r>
+            <a:r>
+              <a:rPr lang="en-GB" sz="800" dirty="0"/>
+              <a:t> </a:t>
+            </a:r>
+            <a:r>
+              <a:rPr lang="en-GB" sz="800" dirty="0" err="1"/>
+              <a:t>screenEffect</a:t>
+            </a:r>
+            <a:r>
+              <a:rPr lang="en-GB" sz="800" dirty="0"/>
+              <a:t> = </a:t>
+            </a:r>
+            <a:r>
+              <a:rPr lang="en-GB" sz="800" dirty="0" err="1"/>
+              <a:t>collision.gameObject.GetComponent</a:t>
+            </a:r>
+            <a:r>
+              <a:rPr lang="en-GB" sz="800" dirty="0"/>
+              <a:t>&lt;</a:t>
+            </a:r>
+            <a:r>
+              <a:rPr lang="en-GB" sz="800" dirty="0" err="1"/>
+              <a:t>DamageOverlay</a:t>
+            </a:r>
+            <a:r>
+              <a:rPr lang="en-GB" sz="800" dirty="0"/>
+              <a:t>&gt;(); // Get the red pulse effect</a:t>
+            </a:r>
+          </a:p>
+          <a:p>
+            <a:endParaRPr lang="en-GB" sz="800" dirty="0"/>
+          </a:p>
+          <a:p>
+            <a:r>
+              <a:rPr lang="en-GB" sz="800" dirty="0"/>
+              <a:t>                if (</a:t>
+            </a:r>
+            <a:r>
+              <a:rPr lang="en-GB" sz="800" dirty="0" err="1"/>
+              <a:t>playerHealth</a:t>
+            </a:r>
+            <a:r>
+              <a:rPr lang="en-GB" sz="800" dirty="0"/>
+              <a:t> != null)</a:t>
+            </a:r>
+          </a:p>
+          <a:p>
+            <a:r>
+              <a:rPr lang="en-GB" sz="800" dirty="0"/>
+              <a:t>                {</a:t>
+            </a:r>
+          </a:p>
+          <a:p>
+            <a:r>
+              <a:rPr lang="en-GB" sz="800" dirty="0"/>
+              <a:t>                    </a:t>
+            </a:r>
+            <a:r>
+              <a:rPr lang="en-GB" sz="800" dirty="0" err="1"/>
+              <a:t>playerHealth.TakeDamage</a:t>
+            </a:r>
+            <a:r>
+              <a:rPr lang="en-GB" sz="800" dirty="0"/>
+              <a:t>(damage);</a:t>
+            </a:r>
+          </a:p>
+          <a:p>
+            <a:r>
+              <a:rPr lang="en-GB" sz="800" dirty="0"/>
+              <a:t>                    </a:t>
+            </a:r>
+            <a:r>
+              <a:rPr lang="en-GB" sz="800" dirty="0" err="1"/>
+              <a:t>Debug.Log</a:t>
+            </a:r>
+            <a:r>
+              <a:rPr lang="en-GB" sz="800" dirty="0"/>
+              <a:t>("Zombie dealt " + damage + " damage to player.");</a:t>
+            </a:r>
+          </a:p>
+          <a:p>
+            <a:r>
+              <a:rPr lang="en-GB" sz="800" dirty="0"/>
+              <a:t>                }</a:t>
+            </a:r>
+          </a:p>
+          <a:p>
+            <a:endParaRPr lang="en-GB" sz="800" dirty="0"/>
+          </a:p>
+          <a:p>
+            <a:r>
+              <a:rPr lang="en-GB" sz="800" dirty="0"/>
+              <a:t>                if (</a:t>
+            </a:r>
+            <a:r>
+              <a:rPr lang="en-GB" sz="800" dirty="0" err="1"/>
+              <a:t>screenEffect</a:t>
+            </a:r>
+            <a:r>
+              <a:rPr lang="en-GB" sz="800" dirty="0"/>
+              <a:t> != null)</a:t>
+            </a:r>
+          </a:p>
+          <a:p>
+            <a:r>
+              <a:rPr lang="en-GB" sz="800" dirty="0"/>
+              <a:t>                {</a:t>
+            </a:r>
+          </a:p>
+          <a:p>
+            <a:r>
+              <a:rPr lang="en-GB" sz="800" dirty="0"/>
+              <a:t>                    </a:t>
+            </a:r>
+            <a:r>
+              <a:rPr lang="en-GB" sz="800" dirty="0" err="1"/>
+              <a:t>screenEffect.ShowDamageEffect</a:t>
+            </a:r>
+            <a:r>
+              <a:rPr lang="en-GB" sz="800" dirty="0"/>
+              <a:t>(); // Trigger red screen pulse</a:t>
+            </a:r>
+          </a:p>
+          <a:p>
+            <a:r>
+              <a:rPr lang="en-GB" sz="800" dirty="0"/>
+              <a:t>                }</a:t>
+            </a:r>
+          </a:p>
+          <a:p>
+            <a:endParaRPr lang="en-GB" sz="800" dirty="0"/>
+          </a:p>
+          <a:p>
+            <a:r>
+              <a:rPr lang="en-GB" sz="800" dirty="0"/>
+              <a:t>                </a:t>
+            </a:r>
+            <a:r>
+              <a:rPr lang="en-GB" sz="800" dirty="0" err="1"/>
+              <a:t>nextAttackTime</a:t>
+            </a:r>
+            <a:r>
+              <a:rPr lang="en-GB" sz="800" dirty="0"/>
+              <a:t> = </a:t>
+            </a:r>
+            <a:r>
+              <a:rPr lang="en-GB" sz="800" dirty="0" err="1"/>
+              <a:t>Time.time</a:t>
+            </a:r>
+            <a:r>
+              <a:rPr lang="en-GB" sz="800" dirty="0"/>
+              <a:t> + </a:t>
+            </a:r>
+            <a:r>
+              <a:rPr lang="en-GB" sz="800" dirty="0" err="1"/>
+              <a:t>attackRate</a:t>
+            </a:r>
+            <a:r>
+              <a:rPr lang="en-GB" sz="800" dirty="0"/>
+              <a:t>;</a:t>
+            </a:r>
+          </a:p>
+          <a:p>
+            <a:r>
+              <a:rPr lang="en-GB" sz="800" dirty="0"/>
+              <a:t>            }</a:t>
+            </a:r>
+          </a:p>
+          <a:p>
+            <a:r>
+              <a:rPr lang="en-GB" sz="800" dirty="0"/>
+              <a:t>        }</a:t>
+            </a:r>
+          </a:p>
+          <a:p>
+            <a:r>
+              <a:rPr lang="en-GB" sz="800" dirty="0"/>
+              <a:t>    }</a:t>
+            </a:r>
+          </a:p>
+          <a:p>
+            <a:r>
+              <a:rPr lang="en-GB" sz="800" dirty="0"/>
+              <a:t>}</a:t>
+            </a:r>
+          </a:p>
+        </p:txBody>
+      </p:sp>
     </p:spTree>
     <p:extLst>
       <p:ext uri="{BB962C8B-B14F-4D97-AF65-F5344CB8AC3E}">
-        <p14:creationId xmlns:p14="http://schemas.microsoft.com/office/powerpoint/2010/main" val="3336898204"/>
+        <p14:creationId xmlns:p14="http://schemas.microsoft.com/office/powerpoint/2010/main" val="1016281087"/>
       </p:ext>
     </p:extLst>
   </p:cSld>

</xml_diff>

<commit_message>
Starting to Polish L1 ,also poster draft 3
</commit_message>
<xml_diff>
--- a/Documentation/Report/Documentationofstuff.pptx
+++ b/Documentation/Report/Documentationofstuff.pptx
@@ -11,13 +11,14 @@
     <p:sldId id="259" r:id="rId5"/>
     <p:sldId id="265" r:id="rId6"/>
     <p:sldId id="261" r:id="rId7"/>
-    <p:sldId id="268" r:id="rId8"/>
-    <p:sldId id="267" r:id="rId9"/>
-    <p:sldId id="264" r:id="rId10"/>
-    <p:sldId id="260" r:id="rId11"/>
-    <p:sldId id="262" r:id="rId12"/>
-    <p:sldId id="263" r:id="rId13"/>
-    <p:sldId id="266" r:id="rId14"/>
+    <p:sldId id="269" r:id="rId8"/>
+    <p:sldId id="268" r:id="rId9"/>
+    <p:sldId id="267" r:id="rId10"/>
+    <p:sldId id="264" r:id="rId11"/>
+    <p:sldId id="260" r:id="rId12"/>
+    <p:sldId id="262" r:id="rId13"/>
+    <p:sldId id="263" r:id="rId14"/>
+    <p:sldId id="266" r:id="rId15"/>
   </p:sldIdLst>
   <p:sldSz cx="12192000" cy="6858000"/>
   <p:notesSz cx="6858000" cy="9144000"/>
@@ -3715,6 +3716,517 @@
           <p:cNvPr id="2" name="Title 1">
             <a:extLst>
               <a:ext uri="{FF2B5EF4-FFF2-40B4-BE49-F238E27FC236}">
+                <a16:creationId xmlns:a16="http://schemas.microsoft.com/office/drawing/2014/main" id="{76F7E7E4-9827-C9EA-41A9-B8C6EF75B3BA}"/>
+              </a:ext>
+            </a:extLst>
+          </p:cNvPr>
+          <p:cNvSpPr>
+            <a:spLocks noGrp="1"/>
+          </p:cNvSpPr>
+          <p:nvPr>
+            <p:ph type="title"/>
+          </p:nvPr>
+        </p:nvSpPr>
+        <p:spPr/>
+        <p:txBody>
+          <a:bodyPr/>
+          <a:lstStyle/>
+          <a:p>
+            <a:endParaRPr lang="en-GB" dirty="0"/>
+          </a:p>
+        </p:txBody>
+      </p:sp>
+      <p:sp>
+        <p:nvSpPr>
+          <p:cNvPr id="3" name="Content Placeholder 2">
+            <a:extLst>
+              <a:ext uri="{FF2B5EF4-FFF2-40B4-BE49-F238E27FC236}">
+                <a16:creationId xmlns:a16="http://schemas.microsoft.com/office/drawing/2014/main" id="{69D816C0-DEFD-6470-D46E-50B949AAE97C}"/>
+              </a:ext>
+            </a:extLst>
+          </p:cNvPr>
+          <p:cNvSpPr>
+            <a:spLocks noGrp="1"/>
+          </p:cNvSpPr>
+          <p:nvPr>
+            <p:ph idx="1"/>
+          </p:nvPr>
+        </p:nvSpPr>
+        <p:spPr/>
+        <p:txBody>
+          <a:bodyPr/>
+          <a:lstStyle/>
+          <a:p>
+            <a:r>
+              <a:rPr lang="en-GB" dirty="0"/>
+              <a:t>If I need to revert the z\</a:t>
+            </a:r>
+            <a:r>
+              <a:rPr lang="en-GB" dirty="0" err="1"/>
+              <a:t>ombie</a:t>
+            </a:r>
+            <a:r>
+              <a:rPr lang="en-GB" dirty="0"/>
+              <a:t> </a:t>
+            </a:r>
+            <a:r>
+              <a:rPr lang="en-GB" dirty="0" err="1"/>
+              <a:t>animiaton</a:t>
+            </a:r>
+            <a:r>
+              <a:rPr lang="en-GB" dirty="0"/>
+              <a:t> then delete links to attack and </a:t>
+            </a:r>
+          </a:p>
+        </p:txBody>
+      </p:sp>
+      <p:sp>
+        <p:nvSpPr>
+          <p:cNvPr id="4" name="TextBox 3">
+            <a:extLst>
+              <a:ext uri="{FF2B5EF4-FFF2-40B4-BE49-F238E27FC236}">
+                <a16:creationId xmlns:a16="http://schemas.microsoft.com/office/drawing/2014/main" id="{5BDA14E1-2B65-96B1-BBB5-FEEEF22049E4}"/>
+              </a:ext>
+            </a:extLst>
+          </p:cNvPr>
+          <p:cNvSpPr txBox="1"/>
+          <p:nvPr/>
+        </p:nvSpPr>
+        <p:spPr>
+          <a:xfrm>
+            <a:off x="4681728" y="2525967"/>
+            <a:ext cx="6153912" cy="4278094"/>
+          </a:xfrm>
+          <a:prstGeom prst="rect">
+            <a:avLst/>
+          </a:prstGeom>
+          <a:noFill/>
+        </p:spPr>
+        <p:txBody>
+          <a:bodyPr wrap="square" rtlCol="0">
+            <a:spAutoFit/>
+          </a:bodyPr>
+          <a:lstStyle/>
+          <a:p>
+            <a:r>
+              <a:rPr lang="en-GB" sz="800" dirty="0"/>
+              <a:t>using </a:t>
+            </a:r>
+            <a:r>
+              <a:rPr lang="en-GB" sz="800" dirty="0" err="1"/>
+              <a:t>UnityEngine</a:t>
+            </a:r>
+            <a:r>
+              <a:rPr lang="en-GB" sz="800" dirty="0"/>
+              <a:t>;</a:t>
+            </a:r>
+          </a:p>
+          <a:p>
+            <a:endParaRPr lang="en-GB" sz="800" dirty="0"/>
+          </a:p>
+          <a:p>
+            <a:r>
+              <a:rPr lang="en-GB" sz="800" dirty="0"/>
+              <a:t>public class </a:t>
+            </a:r>
+            <a:r>
+              <a:rPr lang="en-GB" sz="800" dirty="0" err="1"/>
+              <a:t>ZombieAttack</a:t>
+            </a:r>
+            <a:r>
+              <a:rPr lang="en-GB" sz="800" dirty="0"/>
+              <a:t> : </a:t>
+            </a:r>
+            <a:r>
+              <a:rPr lang="en-GB" sz="800" dirty="0" err="1"/>
+              <a:t>MonoBehaviour</a:t>
+            </a:r>
+            <a:endParaRPr lang="en-GB" sz="800" dirty="0"/>
+          </a:p>
+          <a:p>
+            <a:r>
+              <a:rPr lang="en-GB" sz="800" dirty="0"/>
+              <a:t>{</a:t>
+            </a:r>
+          </a:p>
+          <a:p>
+            <a:r>
+              <a:rPr lang="en-GB" sz="800" dirty="0"/>
+              <a:t>    public int damage = 10; // Damage per hit</a:t>
+            </a:r>
+          </a:p>
+          <a:p>
+            <a:r>
+              <a:rPr lang="en-GB" sz="800" dirty="0"/>
+              <a:t>    public float </a:t>
+            </a:r>
+            <a:r>
+              <a:rPr lang="en-GB" sz="800" dirty="0" err="1"/>
+              <a:t>attackRate</a:t>
+            </a:r>
+            <a:r>
+              <a:rPr lang="en-GB" sz="800" dirty="0"/>
+              <a:t> = 1.5f; // Attack every X seconds</a:t>
+            </a:r>
+          </a:p>
+          <a:p>
+            <a:endParaRPr lang="en-GB" sz="800" dirty="0"/>
+          </a:p>
+          <a:p>
+            <a:r>
+              <a:rPr lang="en-GB" sz="800" dirty="0"/>
+              <a:t>    private float </a:t>
+            </a:r>
+            <a:r>
+              <a:rPr lang="en-GB" sz="800" dirty="0" err="1"/>
+              <a:t>nextAttackTime</a:t>
+            </a:r>
+            <a:r>
+              <a:rPr lang="en-GB" sz="800" dirty="0"/>
+              <a:t> = 0f;</a:t>
+            </a:r>
+          </a:p>
+          <a:p>
+            <a:endParaRPr lang="en-GB" sz="800" dirty="0"/>
+          </a:p>
+          <a:p>
+            <a:r>
+              <a:rPr lang="en-GB" sz="800" dirty="0"/>
+              <a:t>    private void </a:t>
+            </a:r>
+            <a:r>
+              <a:rPr lang="en-GB" sz="800" dirty="0" err="1"/>
+              <a:t>OnCollisionStay</a:t>
+            </a:r>
+            <a:r>
+              <a:rPr lang="en-GB" sz="800" dirty="0"/>
+              <a:t>(Collision collision)</a:t>
+            </a:r>
+          </a:p>
+          <a:p>
+            <a:r>
+              <a:rPr lang="en-GB" sz="800" dirty="0"/>
+              <a:t>    {</a:t>
+            </a:r>
+          </a:p>
+          <a:p>
+            <a:r>
+              <a:rPr lang="en-GB" sz="800" dirty="0"/>
+              <a:t>        if (</a:t>
+            </a:r>
+            <a:r>
+              <a:rPr lang="en-GB" sz="800" dirty="0" err="1"/>
+              <a:t>collision.gameObject.CompareTag</a:t>
+            </a:r>
+            <a:r>
+              <a:rPr lang="en-GB" sz="800" dirty="0"/>
+              <a:t>("Player"))</a:t>
+            </a:r>
+          </a:p>
+          <a:p>
+            <a:r>
+              <a:rPr lang="en-GB" sz="800" dirty="0"/>
+              <a:t>        {</a:t>
+            </a:r>
+          </a:p>
+          <a:p>
+            <a:r>
+              <a:rPr lang="en-GB" sz="800" dirty="0"/>
+              <a:t>            if (</a:t>
+            </a:r>
+            <a:r>
+              <a:rPr lang="en-GB" sz="800" dirty="0" err="1"/>
+              <a:t>Time.time</a:t>
+            </a:r>
+            <a:r>
+              <a:rPr lang="en-GB" sz="800" dirty="0"/>
+              <a:t> &gt;= </a:t>
+            </a:r>
+            <a:r>
+              <a:rPr lang="en-GB" sz="800" dirty="0" err="1"/>
+              <a:t>nextAttackTime</a:t>
+            </a:r>
+            <a:r>
+              <a:rPr lang="en-GB" sz="800" dirty="0"/>
+              <a:t>)</a:t>
+            </a:r>
+          </a:p>
+          <a:p>
+            <a:r>
+              <a:rPr lang="en-GB" sz="800" dirty="0"/>
+              <a:t>            {</a:t>
+            </a:r>
+          </a:p>
+          <a:p>
+            <a:r>
+              <a:rPr lang="en-GB" sz="800" dirty="0"/>
+              <a:t>                </a:t>
+            </a:r>
+            <a:r>
+              <a:rPr lang="en-GB" sz="800" dirty="0" err="1"/>
+              <a:t>HealthManager</a:t>
+            </a:r>
+            <a:r>
+              <a:rPr lang="en-GB" sz="800" dirty="0"/>
+              <a:t> </a:t>
+            </a:r>
+            <a:r>
+              <a:rPr lang="en-GB" sz="800" dirty="0" err="1"/>
+              <a:t>playerHealth</a:t>
+            </a:r>
+            <a:r>
+              <a:rPr lang="en-GB" sz="800" dirty="0"/>
+              <a:t> = </a:t>
+            </a:r>
+            <a:r>
+              <a:rPr lang="en-GB" sz="800" dirty="0" err="1"/>
+              <a:t>collision.gameObject.GetComponent</a:t>
+            </a:r>
+            <a:r>
+              <a:rPr lang="en-GB" sz="800" dirty="0"/>
+              <a:t>&lt;</a:t>
+            </a:r>
+            <a:r>
+              <a:rPr lang="en-GB" sz="800" dirty="0" err="1"/>
+              <a:t>HealthManager</a:t>
+            </a:r>
+            <a:r>
+              <a:rPr lang="en-GB" sz="800" dirty="0"/>
+              <a:t>&gt;();</a:t>
+            </a:r>
+          </a:p>
+          <a:p>
+            <a:r>
+              <a:rPr lang="en-GB" sz="800" dirty="0"/>
+              <a:t>                </a:t>
+            </a:r>
+            <a:r>
+              <a:rPr lang="en-GB" sz="800" dirty="0" err="1"/>
+              <a:t>DamageOverlay</a:t>
+            </a:r>
+            <a:r>
+              <a:rPr lang="en-GB" sz="800" dirty="0"/>
+              <a:t> </a:t>
+            </a:r>
+            <a:r>
+              <a:rPr lang="en-GB" sz="800" dirty="0" err="1"/>
+              <a:t>screenEffect</a:t>
+            </a:r>
+            <a:r>
+              <a:rPr lang="en-GB" sz="800" dirty="0"/>
+              <a:t> = </a:t>
+            </a:r>
+            <a:r>
+              <a:rPr lang="en-GB" sz="800" dirty="0" err="1"/>
+              <a:t>collision.gameObject.GetComponent</a:t>
+            </a:r>
+            <a:r>
+              <a:rPr lang="en-GB" sz="800" dirty="0"/>
+              <a:t>&lt;</a:t>
+            </a:r>
+            <a:r>
+              <a:rPr lang="en-GB" sz="800" dirty="0" err="1"/>
+              <a:t>DamageOverlay</a:t>
+            </a:r>
+            <a:r>
+              <a:rPr lang="en-GB" sz="800" dirty="0"/>
+              <a:t>&gt;(); // Get the red pulse effect</a:t>
+            </a:r>
+          </a:p>
+          <a:p>
+            <a:endParaRPr lang="en-GB" sz="800" dirty="0"/>
+          </a:p>
+          <a:p>
+            <a:r>
+              <a:rPr lang="en-GB" sz="800" dirty="0"/>
+              <a:t>                if (</a:t>
+            </a:r>
+            <a:r>
+              <a:rPr lang="en-GB" sz="800" dirty="0" err="1"/>
+              <a:t>playerHealth</a:t>
+            </a:r>
+            <a:r>
+              <a:rPr lang="en-GB" sz="800" dirty="0"/>
+              <a:t> != null)</a:t>
+            </a:r>
+          </a:p>
+          <a:p>
+            <a:r>
+              <a:rPr lang="en-GB" sz="800" dirty="0"/>
+              <a:t>                {</a:t>
+            </a:r>
+          </a:p>
+          <a:p>
+            <a:r>
+              <a:rPr lang="en-GB" sz="800" dirty="0"/>
+              <a:t>                    </a:t>
+            </a:r>
+            <a:r>
+              <a:rPr lang="en-GB" sz="800" dirty="0" err="1"/>
+              <a:t>playerHealth.TakeDamage</a:t>
+            </a:r>
+            <a:r>
+              <a:rPr lang="en-GB" sz="800" dirty="0"/>
+              <a:t>(damage);</a:t>
+            </a:r>
+          </a:p>
+          <a:p>
+            <a:r>
+              <a:rPr lang="en-GB" sz="800" dirty="0"/>
+              <a:t>                    </a:t>
+            </a:r>
+            <a:r>
+              <a:rPr lang="en-GB" sz="800" dirty="0" err="1"/>
+              <a:t>Debug.Log</a:t>
+            </a:r>
+            <a:r>
+              <a:rPr lang="en-GB" sz="800" dirty="0"/>
+              <a:t>("Zombie dealt " + damage + " damage to player.");</a:t>
+            </a:r>
+          </a:p>
+          <a:p>
+            <a:r>
+              <a:rPr lang="en-GB" sz="800" dirty="0"/>
+              <a:t>                }</a:t>
+            </a:r>
+          </a:p>
+          <a:p>
+            <a:endParaRPr lang="en-GB" sz="800" dirty="0"/>
+          </a:p>
+          <a:p>
+            <a:r>
+              <a:rPr lang="en-GB" sz="800" dirty="0"/>
+              <a:t>                if (</a:t>
+            </a:r>
+            <a:r>
+              <a:rPr lang="en-GB" sz="800" dirty="0" err="1"/>
+              <a:t>screenEffect</a:t>
+            </a:r>
+            <a:r>
+              <a:rPr lang="en-GB" sz="800" dirty="0"/>
+              <a:t> != null)</a:t>
+            </a:r>
+          </a:p>
+          <a:p>
+            <a:r>
+              <a:rPr lang="en-GB" sz="800" dirty="0"/>
+              <a:t>                {</a:t>
+            </a:r>
+          </a:p>
+          <a:p>
+            <a:r>
+              <a:rPr lang="en-GB" sz="800" dirty="0"/>
+              <a:t>                    </a:t>
+            </a:r>
+            <a:r>
+              <a:rPr lang="en-GB" sz="800" dirty="0" err="1"/>
+              <a:t>screenEffect.ShowDamageEffect</a:t>
+            </a:r>
+            <a:r>
+              <a:rPr lang="en-GB" sz="800" dirty="0"/>
+              <a:t>(); // Trigger red screen pulse</a:t>
+            </a:r>
+          </a:p>
+          <a:p>
+            <a:r>
+              <a:rPr lang="en-GB" sz="800" dirty="0"/>
+              <a:t>                }</a:t>
+            </a:r>
+          </a:p>
+          <a:p>
+            <a:endParaRPr lang="en-GB" sz="800" dirty="0"/>
+          </a:p>
+          <a:p>
+            <a:r>
+              <a:rPr lang="en-GB" sz="800" dirty="0"/>
+              <a:t>                </a:t>
+            </a:r>
+            <a:r>
+              <a:rPr lang="en-GB" sz="800" dirty="0" err="1"/>
+              <a:t>nextAttackTime</a:t>
+            </a:r>
+            <a:r>
+              <a:rPr lang="en-GB" sz="800" dirty="0"/>
+              <a:t> = </a:t>
+            </a:r>
+            <a:r>
+              <a:rPr lang="en-GB" sz="800" dirty="0" err="1"/>
+              <a:t>Time.time</a:t>
+            </a:r>
+            <a:r>
+              <a:rPr lang="en-GB" sz="800" dirty="0"/>
+              <a:t> + </a:t>
+            </a:r>
+            <a:r>
+              <a:rPr lang="en-GB" sz="800" dirty="0" err="1"/>
+              <a:t>attackRate</a:t>
+            </a:r>
+            <a:r>
+              <a:rPr lang="en-GB" sz="800" dirty="0"/>
+              <a:t>;</a:t>
+            </a:r>
+          </a:p>
+          <a:p>
+            <a:r>
+              <a:rPr lang="en-GB" sz="800" dirty="0"/>
+              <a:t>            }</a:t>
+            </a:r>
+          </a:p>
+          <a:p>
+            <a:r>
+              <a:rPr lang="en-GB" sz="800" dirty="0"/>
+              <a:t>        }</a:t>
+            </a:r>
+          </a:p>
+          <a:p>
+            <a:r>
+              <a:rPr lang="en-GB" sz="800" dirty="0"/>
+              <a:t>    }</a:t>
+            </a:r>
+          </a:p>
+          <a:p>
+            <a:r>
+              <a:rPr lang="en-GB" sz="800" dirty="0"/>
+              <a:t>}</a:t>
+            </a:r>
+          </a:p>
+        </p:txBody>
+      </p:sp>
+    </p:spTree>
+    <p:extLst>
+      <p:ext uri="{BB962C8B-B14F-4D97-AF65-F5344CB8AC3E}">
+        <p14:creationId xmlns:p14="http://schemas.microsoft.com/office/powerpoint/2010/main" val="1016281087"/>
+      </p:ext>
+    </p:extLst>
+  </p:cSld>
+  <p:clrMapOvr>
+    <a:masterClrMapping/>
+  </p:clrMapOvr>
+</p:sld>
+</file>
+
+<file path=ppt/slides/slide11.xml><?xml version="1.0" encoding="utf-8"?>
+<p:sld xmlns:a="http://schemas.openxmlformats.org/drawingml/2006/main" xmlns:r="http://schemas.openxmlformats.org/officeDocument/2006/relationships" xmlns:p="http://schemas.openxmlformats.org/presentationml/2006/main">
+  <p:cSld>
+    <p:spTree>
+      <p:nvGrpSpPr>
+        <p:cNvPr id="1" name=""/>
+        <p:cNvGrpSpPr/>
+        <p:nvPr/>
+      </p:nvGrpSpPr>
+      <p:grpSpPr>
+        <a:xfrm>
+          <a:off x="0" y="0"/>
+          <a:ext cx="0" cy="0"/>
+          <a:chOff x="0" y="0"/>
+          <a:chExt cx="0" cy="0"/>
+        </a:xfrm>
+      </p:grpSpPr>
+      <p:sp>
+        <p:nvSpPr>
+          <p:cNvPr id="2" name="Title 1">
+            <a:extLst>
+              <a:ext uri="{FF2B5EF4-FFF2-40B4-BE49-F238E27FC236}">
                 <a16:creationId xmlns:a16="http://schemas.microsoft.com/office/drawing/2014/main" id="{FDF41021-4C15-7026-2A5B-B95AFC73A9DE}"/>
               </a:ext>
             </a:extLst>
@@ -3835,7 +4347,7 @@
 </p:sld>
 </file>
 
-<file path=ppt/slides/slide11.xml><?xml version="1.0" encoding="utf-8"?>
+<file path=ppt/slides/slide12.xml><?xml version="1.0" encoding="utf-8"?>
 <p:sld xmlns:a="http://schemas.openxmlformats.org/drawingml/2006/main" xmlns:r="http://schemas.openxmlformats.org/officeDocument/2006/relationships" xmlns:p="http://schemas.openxmlformats.org/presentationml/2006/main">
   <p:cSld>
     <p:spTree>
@@ -3994,7 +4506,7 @@
 </p:sld>
 </file>
 
-<file path=ppt/slides/slide12.xml><?xml version="1.0" encoding="utf-8"?>
+<file path=ppt/slides/slide13.xml><?xml version="1.0" encoding="utf-8"?>
 <p:sld xmlns:a="http://schemas.openxmlformats.org/drawingml/2006/main" xmlns:r="http://schemas.openxmlformats.org/officeDocument/2006/relationships" xmlns:p="http://schemas.openxmlformats.org/presentationml/2006/main">
   <p:cSld>
     <p:spTree>
@@ -4116,7 +4628,7 @@
 </p:sld>
 </file>
 
-<file path=ppt/slides/slide13.xml><?xml version="1.0" encoding="utf-8"?>
+<file path=ppt/slides/slide14.xml><?xml version="1.0" encoding="utf-8"?>
 <p:sld xmlns:a="http://schemas.openxmlformats.org/drawingml/2006/main" xmlns:r="http://schemas.openxmlformats.org/officeDocument/2006/relationships" xmlns:p="http://schemas.openxmlformats.org/presentationml/2006/main">
   <p:cSld>
     <p:spTree>
@@ -4732,10 +5244,39 @@
           </a:p>
           <a:p>
             <a:r>
-              <a:rPr lang="en-GB"/>
+              <a:rPr lang="en-GB" dirty="0"/>
               <a:t>NEW MOVEMENT IS GOOD BUT JUMP NOT WORK (GROUNDCHECK) AND ENEMIES ARENT ATTACKINGBUT DO FOLLOW WHAT THE FUCK</a:t>
             </a:r>
-            <a:endParaRPr lang="en-GB" dirty="0"/>
+          </a:p>
+          <a:p>
+            <a:r>
+              <a:rPr lang="en-GB" dirty="0"/>
+              <a:t>Fuck </a:t>
+            </a:r>
+            <a:r>
+              <a:rPr lang="en-GB" dirty="0" err="1"/>
+              <a:t>alla</a:t>
+            </a:r>
+            <a:r>
+              <a:rPr lang="en-GB" dirty="0"/>
+              <a:t> that I need to finish polishing 1 and 2 </a:t>
+            </a:r>
+            <a:r>
+              <a:rPr lang="en-GB" dirty="0" err="1"/>
+              <a:t>cuz</a:t>
+            </a:r>
+            <a:r>
+              <a:rPr lang="en-GB" dirty="0"/>
+              <a:t> </a:t>
+            </a:r>
+            <a:r>
+              <a:rPr lang="en-GB" dirty="0" err="1"/>
+              <a:t>jj</a:t>
+            </a:r>
+            <a:r>
+              <a:rPr lang="en-GB" dirty="0"/>
+              <a:t> doesn’t like it</a:t>
+            </a:r>
           </a:p>
         </p:txBody>
       </p:sp>
@@ -4774,7 +5315,7 @@
           <p:cNvPr id="2" name="Title 1">
             <a:extLst>
               <a:ext uri="{FF2B5EF4-FFF2-40B4-BE49-F238E27FC236}">
-                <a16:creationId xmlns:a16="http://schemas.microsoft.com/office/drawing/2014/main" id="{F58F3967-18E6-8991-E8AE-620BDC2DE720}"/>
+                <a16:creationId xmlns:a16="http://schemas.microsoft.com/office/drawing/2014/main" id="{57C7B847-85C8-83BD-8B33-368E1675D7D2}"/>
               </a:ext>
             </a:extLst>
           </p:cNvPr>
@@ -4792,7 +5333,7 @@
           <a:p>
             <a:r>
               <a:rPr lang="en-GB" dirty="0"/>
-              <a:t>JJ MEETINGS </a:t>
+              <a:t>1 Enemy Model / Animation </a:t>
             </a:r>
           </a:p>
         </p:txBody>
@@ -4802,7 +5343,7 @@
           <p:cNvPr id="3" name="Content Placeholder 2">
             <a:extLst>
               <a:ext uri="{FF2B5EF4-FFF2-40B4-BE49-F238E27FC236}">
-                <a16:creationId xmlns:a16="http://schemas.microsoft.com/office/drawing/2014/main" id="{696F8D03-4BA6-E44A-EB92-62C49E851A3A}"/>
+                <a16:creationId xmlns:a16="http://schemas.microsoft.com/office/drawing/2014/main" id="{47A9B217-6AA4-39D7-6657-3D1ACD984C87}"/>
               </a:ext>
             </a:extLst>
           </p:cNvPr>
@@ -4819,51 +5360,35 @@
           <a:lstStyle/>
           <a:p>
             <a:r>
+              <a:rPr lang="en-GB" dirty="0"/>
+              <a:t>FUCK</a:t>
+            </a:r>
+          </a:p>
+          <a:p>
+            <a:r>
+              <a:rPr lang="en-GB" dirty="0"/>
+              <a:t>Moving the floor down seemed to fix this but so did turning off APPLY ROOOT MOTION , I reverted the floor space back to </a:t>
+            </a:r>
+            <a:r>
               <a:rPr lang="en-GB" dirty="0" err="1"/>
-              <a:t>Implementaiton</a:t>
+              <a:t>normall</a:t>
             </a:r>
             <a:r>
               <a:rPr lang="en-GB" dirty="0"/>
-              <a:t> – GDD, DESIGN LIKE THE MAP THINGS</a:t>
-            </a:r>
-          </a:p>
-          <a:p>
-            <a:r>
-              <a:rPr lang="en-GB" dirty="0"/>
-              <a:t>Methodology is how I created it like the design </a:t>
-            </a:r>
-            <a:r>
-              <a:rPr lang="en-GB" dirty="0" err="1"/>
-              <a:t>implemnation</a:t>
-            </a:r>
-            <a:r>
-              <a:rPr lang="en-GB" dirty="0"/>
-              <a:t> </a:t>
-            </a:r>
-          </a:p>
-          <a:p>
-            <a:r>
-              <a:rPr lang="en-GB" dirty="0"/>
-              <a:t>How I used user testing for feedback to make iterations and </a:t>
-            </a:r>
-            <a:r>
-              <a:rPr lang="en-GB" dirty="0" err="1"/>
-              <a:t>yh</a:t>
+              <a:t> so I can focus on the fix , if I do choose this option I will need to move all models down too </a:t>
+            </a:r>
+            <a:r>
+              <a:rPr lang="en-GB"/>
+              <a:t>lol long </a:t>
             </a:r>
             <a:endParaRPr lang="en-GB" dirty="0"/>
-          </a:p>
-          <a:p>
-            <a:r>
-              <a:rPr lang="en-GB"/>
-              <a:t>Analysis </a:t>
-            </a:r>
           </a:p>
         </p:txBody>
       </p:sp>
     </p:spTree>
     <p:extLst>
       <p:ext uri="{BB962C8B-B14F-4D97-AF65-F5344CB8AC3E}">
-        <p14:creationId xmlns:p14="http://schemas.microsoft.com/office/powerpoint/2010/main" val="2649845202"/>
+        <p14:creationId xmlns:p14="http://schemas.microsoft.com/office/powerpoint/2010/main" val="3446317224"/>
       </p:ext>
     </p:extLst>
   </p:cSld>
@@ -4895,7 +5420,7 @@
           <p:cNvPr id="2" name="Title 1">
             <a:extLst>
               <a:ext uri="{FF2B5EF4-FFF2-40B4-BE49-F238E27FC236}">
-                <a16:creationId xmlns:a16="http://schemas.microsoft.com/office/drawing/2014/main" id="{19B657D5-0D05-CDB3-E622-CC74399D9293}"/>
+                <a16:creationId xmlns:a16="http://schemas.microsoft.com/office/drawing/2014/main" id="{F58F3967-18E6-8991-E8AE-620BDC2DE720}"/>
               </a:ext>
             </a:extLst>
           </p:cNvPr>
@@ -4913,7 +5438,7 @@
           <a:p>
             <a:r>
               <a:rPr lang="en-GB" dirty="0"/>
-              <a:t>MOVEMENT 2</a:t>
+              <a:t>JJ MEETINGS </a:t>
             </a:r>
           </a:p>
         </p:txBody>
@@ -4923,7 +5448,7 @@
           <p:cNvPr id="3" name="Content Placeholder 2">
             <a:extLst>
               <a:ext uri="{FF2B5EF4-FFF2-40B4-BE49-F238E27FC236}">
-                <a16:creationId xmlns:a16="http://schemas.microsoft.com/office/drawing/2014/main" id="{6ADAF85F-3274-500B-24F1-77722205A975}"/>
+                <a16:creationId xmlns:a16="http://schemas.microsoft.com/office/drawing/2014/main" id="{696F8D03-4BA6-E44A-EB92-62C49E851A3A}"/>
               </a:ext>
             </a:extLst>
           </p:cNvPr>
@@ -4940,54 +5465,51 @@
           <a:lstStyle/>
           <a:p>
             <a:r>
+              <a:rPr lang="en-GB" dirty="0" err="1"/>
+              <a:t>Implementaiton</a:t>
+            </a:r>
+            <a:r>
               <a:rPr lang="en-GB" dirty="0"/>
-              <a:t>JUMP ONLY WORKS WHEN HELD</a:t>
+              <a:t> – GDD, DESIGN LIKE THE MAP THINGS</a:t>
             </a:r>
           </a:p>
           <a:p>
             <a:r>
               <a:rPr lang="en-GB" dirty="0"/>
-              <a:t>KINDA BUGGY WHEN PLAYER IS BEING PUSHED </a:t>
-            </a:r>
-          </a:p>
-          <a:p>
-            <a:r>
-              <a:rPr lang="en-GB" dirty="0">
-                <a:hlinkClick r:id="rId2"/>
-              </a:rPr>
-              <a:t>https://www.youtube.com/watch?v=_QajrabyTJc&amp;t=848s</a:t>
+              <a:t>Methodology is how I created it like the design </a:t>
+            </a:r>
+            <a:r>
+              <a:rPr lang="en-GB" dirty="0" err="1"/>
+              <a:t>implemnation</a:t>
+            </a:r>
+            <a:r>
+              <a:rPr lang="en-GB" dirty="0"/>
+              <a:t> </a:t>
+            </a:r>
+          </a:p>
+          <a:p>
+            <a:r>
+              <a:rPr lang="en-GB" dirty="0"/>
+              <a:t>How I used user testing for feedback to make iterations and </a:t>
+            </a:r>
+            <a:r>
+              <a:rPr lang="en-GB" dirty="0" err="1"/>
+              <a:t>yh</a:t>
             </a:r>
             <a:endParaRPr lang="en-GB" dirty="0"/>
           </a:p>
           <a:p>
-            <a:endParaRPr lang="en-GB" dirty="0"/>
-          </a:p>
-          <a:p>
-            <a:r>
-              <a:rPr lang="en-GB" dirty="0"/>
-              <a:t>Can always revert back to old as  I saved them as  prefabs and old movement in separate folder </a:t>
-            </a:r>
-          </a:p>
-          <a:p>
-            <a:r>
-              <a:rPr lang="en-GB" dirty="0"/>
-              <a:t>Make sure to change movement in lvl1 </a:t>
-            </a:r>
-            <a:r>
-              <a:rPr lang="en-GB" dirty="0" err="1"/>
-              <a:t>aswel</a:t>
-            </a:r>
-            <a:endParaRPr lang="en-GB"/>
-          </a:p>
-          <a:p>
-            <a:endParaRPr lang="en-GB"/>
+            <a:r>
+              <a:rPr lang="en-GB"/>
+              <a:t>Analysis </a:t>
+            </a:r>
           </a:p>
         </p:txBody>
       </p:sp>
     </p:spTree>
     <p:extLst>
       <p:ext uri="{BB962C8B-B14F-4D97-AF65-F5344CB8AC3E}">
-        <p14:creationId xmlns:p14="http://schemas.microsoft.com/office/powerpoint/2010/main" val="3653716512"/>
+        <p14:creationId xmlns:p14="http://schemas.microsoft.com/office/powerpoint/2010/main" val="2649845202"/>
       </p:ext>
     </p:extLst>
   </p:cSld>
@@ -5019,7 +5541,7 @@
           <p:cNvPr id="2" name="Title 1">
             <a:extLst>
               <a:ext uri="{FF2B5EF4-FFF2-40B4-BE49-F238E27FC236}">
-                <a16:creationId xmlns:a16="http://schemas.microsoft.com/office/drawing/2014/main" id="{76F7E7E4-9827-C9EA-41A9-B8C6EF75B3BA}"/>
+                <a16:creationId xmlns:a16="http://schemas.microsoft.com/office/drawing/2014/main" id="{19B657D5-0D05-CDB3-E622-CC74399D9293}"/>
               </a:ext>
             </a:extLst>
           </p:cNvPr>
@@ -5035,470 +5557,83 @@
           <a:bodyPr/>
           <a:lstStyle/>
           <a:p>
+            <a:r>
+              <a:rPr lang="en-GB" dirty="0"/>
+              <a:t>MOVEMENT 2</a:t>
+            </a:r>
+          </a:p>
+        </p:txBody>
+      </p:sp>
+      <p:sp>
+        <p:nvSpPr>
+          <p:cNvPr id="3" name="Content Placeholder 2">
+            <a:extLst>
+              <a:ext uri="{FF2B5EF4-FFF2-40B4-BE49-F238E27FC236}">
+                <a16:creationId xmlns:a16="http://schemas.microsoft.com/office/drawing/2014/main" id="{6ADAF85F-3274-500B-24F1-77722205A975}"/>
+              </a:ext>
+            </a:extLst>
+          </p:cNvPr>
+          <p:cNvSpPr>
+            <a:spLocks noGrp="1"/>
+          </p:cNvSpPr>
+          <p:nvPr>
+            <p:ph idx="1"/>
+          </p:nvPr>
+        </p:nvSpPr>
+        <p:spPr/>
+        <p:txBody>
+          <a:bodyPr/>
+          <a:lstStyle/>
+          <a:p>
+            <a:r>
+              <a:rPr lang="en-GB" dirty="0"/>
+              <a:t>JUMP ONLY WORKS WHEN HELD</a:t>
+            </a:r>
+          </a:p>
+          <a:p>
+            <a:r>
+              <a:rPr lang="en-GB" dirty="0"/>
+              <a:t>KINDA BUGGY WHEN PLAYER IS BEING PUSHED </a:t>
+            </a:r>
+          </a:p>
+          <a:p>
+            <a:r>
+              <a:rPr lang="en-GB" dirty="0">
+                <a:hlinkClick r:id="rId2"/>
+              </a:rPr>
+              <a:t>https://www.youtube.com/watch?v=_QajrabyTJc&amp;t=848s</a:t>
+            </a:r>
             <a:endParaRPr lang="en-GB" dirty="0"/>
           </a:p>
-        </p:txBody>
-      </p:sp>
-      <p:sp>
-        <p:nvSpPr>
-          <p:cNvPr id="3" name="Content Placeholder 2">
-            <a:extLst>
-              <a:ext uri="{FF2B5EF4-FFF2-40B4-BE49-F238E27FC236}">
-                <a16:creationId xmlns:a16="http://schemas.microsoft.com/office/drawing/2014/main" id="{69D816C0-DEFD-6470-D46E-50B949AAE97C}"/>
-              </a:ext>
-            </a:extLst>
-          </p:cNvPr>
-          <p:cNvSpPr>
-            <a:spLocks noGrp="1"/>
-          </p:cNvSpPr>
-          <p:nvPr>
-            <p:ph idx="1"/>
-          </p:nvPr>
-        </p:nvSpPr>
-        <p:spPr/>
-        <p:txBody>
-          <a:bodyPr/>
-          <a:lstStyle/>
+          <a:p>
+            <a:endParaRPr lang="en-GB" dirty="0"/>
+          </a:p>
           <a:p>
             <a:r>
               <a:rPr lang="en-GB" dirty="0"/>
-              <a:t>If I need to revert the z\</a:t>
+              <a:t>Can always revert back to old as  I saved them as  prefabs and old movement in separate folder </a:t>
+            </a:r>
+          </a:p>
+          <a:p>
+            <a:r>
+              <a:rPr lang="en-GB" dirty="0"/>
+              <a:t>Make sure to change movement in lvl1 </a:t>
             </a:r>
             <a:r>
               <a:rPr lang="en-GB" dirty="0" err="1"/>
-              <a:t>ombie</a:t>
-            </a:r>
-            <a:r>
-              <a:rPr lang="en-GB" dirty="0"/>
-              <a:t> </a:t>
-            </a:r>
-            <a:r>
-              <a:rPr lang="en-GB" dirty="0" err="1"/>
-              <a:t>animiaton</a:t>
-            </a:r>
-            <a:r>
-              <a:rPr lang="en-GB" dirty="0"/>
-              <a:t> then delete links to attack and </a:t>
-            </a:r>
-          </a:p>
-        </p:txBody>
-      </p:sp>
-      <p:sp>
-        <p:nvSpPr>
-          <p:cNvPr id="4" name="TextBox 3">
-            <a:extLst>
-              <a:ext uri="{FF2B5EF4-FFF2-40B4-BE49-F238E27FC236}">
-                <a16:creationId xmlns:a16="http://schemas.microsoft.com/office/drawing/2014/main" id="{5BDA14E1-2B65-96B1-BBB5-FEEEF22049E4}"/>
-              </a:ext>
-            </a:extLst>
-          </p:cNvPr>
-          <p:cNvSpPr txBox="1"/>
-          <p:nvPr/>
-        </p:nvSpPr>
-        <p:spPr>
-          <a:xfrm>
-            <a:off x="4681728" y="2525967"/>
-            <a:ext cx="6153912" cy="4278094"/>
-          </a:xfrm>
-          <a:prstGeom prst="rect">
-            <a:avLst/>
-          </a:prstGeom>
-          <a:noFill/>
-        </p:spPr>
-        <p:txBody>
-          <a:bodyPr wrap="square" rtlCol="0">
-            <a:spAutoFit/>
-          </a:bodyPr>
-          <a:lstStyle/>
-          <a:p>
-            <a:r>
-              <a:rPr lang="en-GB" sz="800" dirty="0"/>
-              <a:t>using </a:t>
-            </a:r>
-            <a:r>
-              <a:rPr lang="en-GB" sz="800" dirty="0" err="1"/>
-              <a:t>UnityEngine</a:t>
-            </a:r>
-            <a:r>
-              <a:rPr lang="en-GB" sz="800" dirty="0"/>
-              <a:t>;</a:t>
-            </a:r>
-          </a:p>
-          <a:p>
-            <a:endParaRPr lang="en-GB" sz="800" dirty="0"/>
-          </a:p>
-          <a:p>
-            <a:r>
-              <a:rPr lang="en-GB" sz="800" dirty="0"/>
-              <a:t>public class </a:t>
-            </a:r>
-            <a:r>
-              <a:rPr lang="en-GB" sz="800" dirty="0" err="1"/>
-              <a:t>ZombieAttack</a:t>
-            </a:r>
-            <a:r>
-              <a:rPr lang="en-GB" sz="800" dirty="0"/>
-              <a:t> : </a:t>
-            </a:r>
-            <a:r>
-              <a:rPr lang="en-GB" sz="800" dirty="0" err="1"/>
-              <a:t>MonoBehaviour</a:t>
-            </a:r>
-            <a:endParaRPr lang="en-GB" sz="800" dirty="0"/>
-          </a:p>
-          <a:p>
-            <a:r>
-              <a:rPr lang="en-GB" sz="800" dirty="0"/>
-              <a:t>{</a:t>
-            </a:r>
-          </a:p>
-          <a:p>
-            <a:r>
-              <a:rPr lang="en-GB" sz="800" dirty="0"/>
-              <a:t>    public int damage = 10; // Damage per hit</a:t>
-            </a:r>
-          </a:p>
-          <a:p>
-            <a:r>
-              <a:rPr lang="en-GB" sz="800" dirty="0"/>
-              <a:t>    public float </a:t>
-            </a:r>
-            <a:r>
-              <a:rPr lang="en-GB" sz="800" dirty="0" err="1"/>
-              <a:t>attackRate</a:t>
-            </a:r>
-            <a:r>
-              <a:rPr lang="en-GB" sz="800" dirty="0"/>
-              <a:t> = 1.5f; // Attack every X seconds</a:t>
-            </a:r>
-          </a:p>
-          <a:p>
-            <a:endParaRPr lang="en-GB" sz="800" dirty="0"/>
-          </a:p>
-          <a:p>
-            <a:r>
-              <a:rPr lang="en-GB" sz="800" dirty="0"/>
-              <a:t>    private float </a:t>
-            </a:r>
-            <a:r>
-              <a:rPr lang="en-GB" sz="800" dirty="0" err="1"/>
-              <a:t>nextAttackTime</a:t>
-            </a:r>
-            <a:r>
-              <a:rPr lang="en-GB" sz="800" dirty="0"/>
-              <a:t> = 0f;</a:t>
-            </a:r>
-          </a:p>
-          <a:p>
-            <a:endParaRPr lang="en-GB" sz="800" dirty="0"/>
-          </a:p>
-          <a:p>
-            <a:r>
-              <a:rPr lang="en-GB" sz="800" dirty="0"/>
-              <a:t>    private void </a:t>
-            </a:r>
-            <a:r>
-              <a:rPr lang="en-GB" sz="800" dirty="0" err="1"/>
-              <a:t>OnCollisionStay</a:t>
-            </a:r>
-            <a:r>
-              <a:rPr lang="en-GB" sz="800" dirty="0"/>
-              <a:t>(Collision collision)</a:t>
-            </a:r>
-          </a:p>
-          <a:p>
-            <a:r>
-              <a:rPr lang="en-GB" sz="800" dirty="0"/>
-              <a:t>    {</a:t>
-            </a:r>
-          </a:p>
-          <a:p>
-            <a:r>
-              <a:rPr lang="en-GB" sz="800" dirty="0"/>
-              <a:t>        if (</a:t>
-            </a:r>
-            <a:r>
-              <a:rPr lang="en-GB" sz="800" dirty="0" err="1"/>
-              <a:t>collision.gameObject.CompareTag</a:t>
-            </a:r>
-            <a:r>
-              <a:rPr lang="en-GB" sz="800" dirty="0"/>
-              <a:t>("Player"))</a:t>
-            </a:r>
-          </a:p>
-          <a:p>
-            <a:r>
-              <a:rPr lang="en-GB" sz="800" dirty="0"/>
-              <a:t>        {</a:t>
-            </a:r>
-          </a:p>
-          <a:p>
-            <a:r>
-              <a:rPr lang="en-GB" sz="800" dirty="0"/>
-              <a:t>            if (</a:t>
-            </a:r>
-            <a:r>
-              <a:rPr lang="en-GB" sz="800" dirty="0" err="1"/>
-              <a:t>Time.time</a:t>
-            </a:r>
-            <a:r>
-              <a:rPr lang="en-GB" sz="800" dirty="0"/>
-              <a:t> &gt;= </a:t>
-            </a:r>
-            <a:r>
-              <a:rPr lang="en-GB" sz="800" dirty="0" err="1"/>
-              <a:t>nextAttackTime</a:t>
-            </a:r>
-            <a:r>
-              <a:rPr lang="en-GB" sz="800" dirty="0"/>
-              <a:t>)</a:t>
-            </a:r>
-          </a:p>
-          <a:p>
-            <a:r>
-              <a:rPr lang="en-GB" sz="800" dirty="0"/>
-              <a:t>            {</a:t>
-            </a:r>
-          </a:p>
-          <a:p>
-            <a:r>
-              <a:rPr lang="en-GB" sz="800" dirty="0"/>
-              <a:t>                </a:t>
-            </a:r>
-            <a:r>
-              <a:rPr lang="en-GB" sz="800" dirty="0" err="1"/>
-              <a:t>HealthManager</a:t>
-            </a:r>
-            <a:r>
-              <a:rPr lang="en-GB" sz="800" dirty="0"/>
-              <a:t> </a:t>
-            </a:r>
-            <a:r>
-              <a:rPr lang="en-GB" sz="800" dirty="0" err="1"/>
-              <a:t>playerHealth</a:t>
-            </a:r>
-            <a:r>
-              <a:rPr lang="en-GB" sz="800" dirty="0"/>
-              <a:t> = </a:t>
-            </a:r>
-            <a:r>
-              <a:rPr lang="en-GB" sz="800" dirty="0" err="1"/>
-              <a:t>collision.gameObject.GetComponent</a:t>
-            </a:r>
-            <a:r>
-              <a:rPr lang="en-GB" sz="800" dirty="0"/>
-              <a:t>&lt;</a:t>
-            </a:r>
-            <a:r>
-              <a:rPr lang="en-GB" sz="800" dirty="0" err="1"/>
-              <a:t>HealthManager</a:t>
-            </a:r>
-            <a:r>
-              <a:rPr lang="en-GB" sz="800" dirty="0"/>
-              <a:t>&gt;();</a:t>
-            </a:r>
-          </a:p>
-          <a:p>
-            <a:r>
-              <a:rPr lang="en-GB" sz="800" dirty="0"/>
-              <a:t>                </a:t>
-            </a:r>
-            <a:r>
-              <a:rPr lang="en-GB" sz="800" dirty="0" err="1"/>
-              <a:t>DamageOverlay</a:t>
-            </a:r>
-            <a:r>
-              <a:rPr lang="en-GB" sz="800" dirty="0"/>
-              <a:t> </a:t>
-            </a:r>
-            <a:r>
-              <a:rPr lang="en-GB" sz="800" dirty="0" err="1"/>
-              <a:t>screenEffect</a:t>
-            </a:r>
-            <a:r>
-              <a:rPr lang="en-GB" sz="800" dirty="0"/>
-              <a:t> = </a:t>
-            </a:r>
-            <a:r>
-              <a:rPr lang="en-GB" sz="800" dirty="0" err="1"/>
-              <a:t>collision.gameObject.GetComponent</a:t>
-            </a:r>
-            <a:r>
-              <a:rPr lang="en-GB" sz="800" dirty="0"/>
-              <a:t>&lt;</a:t>
-            </a:r>
-            <a:r>
-              <a:rPr lang="en-GB" sz="800" dirty="0" err="1"/>
-              <a:t>DamageOverlay</a:t>
-            </a:r>
-            <a:r>
-              <a:rPr lang="en-GB" sz="800" dirty="0"/>
-              <a:t>&gt;(); // Get the red pulse effect</a:t>
-            </a:r>
-          </a:p>
-          <a:p>
-            <a:endParaRPr lang="en-GB" sz="800" dirty="0"/>
-          </a:p>
-          <a:p>
-            <a:r>
-              <a:rPr lang="en-GB" sz="800" dirty="0"/>
-              <a:t>                if (</a:t>
-            </a:r>
-            <a:r>
-              <a:rPr lang="en-GB" sz="800" dirty="0" err="1"/>
-              <a:t>playerHealth</a:t>
-            </a:r>
-            <a:r>
-              <a:rPr lang="en-GB" sz="800" dirty="0"/>
-              <a:t> != null)</a:t>
-            </a:r>
-          </a:p>
-          <a:p>
-            <a:r>
-              <a:rPr lang="en-GB" sz="800" dirty="0"/>
-              <a:t>                {</a:t>
-            </a:r>
-          </a:p>
-          <a:p>
-            <a:r>
-              <a:rPr lang="en-GB" sz="800" dirty="0"/>
-              <a:t>                    </a:t>
-            </a:r>
-            <a:r>
-              <a:rPr lang="en-GB" sz="800" dirty="0" err="1"/>
-              <a:t>playerHealth.TakeDamage</a:t>
-            </a:r>
-            <a:r>
-              <a:rPr lang="en-GB" sz="800" dirty="0"/>
-              <a:t>(damage);</a:t>
-            </a:r>
-          </a:p>
-          <a:p>
-            <a:r>
-              <a:rPr lang="en-GB" sz="800" dirty="0"/>
-              <a:t>                    </a:t>
-            </a:r>
-            <a:r>
-              <a:rPr lang="en-GB" sz="800" dirty="0" err="1"/>
-              <a:t>Debug.Log</a:t>
-            </a:r>
-            <a:r>
-              <a:rPr lang="en-GB" sz="800" dirty="0"/>
-              <a:t>("Zombie dealt " + damage + " damage to player.");</a:t>
-            </a:r>
-          </a:p>
-          <a:p>
-            <a:r>
-              <a:rPr lang="en-GB" sz="800" dirty="0"/>
-              <a:t>                }</a:t>
-            </a:r>
-          </a:p>
-          <a:p>
-            <a:endParaRPr lang="en-GB" sz="800" dirty="0"/>
-          </a:p>
-          <a:p>
-            <a:r>
-              <a:rPr lang="en-GB" sz="800" dirty="0"/>
-              <a:t>                if (</a:t>
-            </a:r>
-            <a:r>
-              <a:rPr lang="en-GB" sz="800" dirty="0" err="1"/>
-              <a:t>screenEffect</a:t>
-            </a:r>
-            <a:r>
-              <a:rPr lang="en-GB" sz="800" dirty="0"/>
-              <a:t> != null)</a:t>
-            </a:r>
-          </a:p>
-          <a:p>
-            <a:r>
-              <a:rPr lang="en-GB" sz="800" dirty="0"/>
-              <a:t>                {</a:t>
-            </a:r>
-          </a:p>
-          <a:p>
-            <a:r>
-              <a:rPr lang="en-GB" sz="800" dirty="0"/>
-              <a:t>                    </a:t>
-            </a:r>
-            <a:r>
-              <a:rPr lang="en-GB" sz="800" dirty="0" err="1"/>
-              <a:t>screenEffect.ShowDamageEffect</a:t>
-            </a:r>
-            <a:r>
-              <a:rPr lang="en-GB" sz="800" dirty="0"/>
-              <a:t>(); // Trigger red screen pulse</a:t>
-            </a:r>
-          </a:p>
-          <a:p>
-            <a:r>
-              <a:rPr lang="en-GB" sz="800" dirty="0"/>
-              <a:t>                }</a:t>
-            </a:r>
-          </a:p>
-          <a:p>
-            <a:endParaRPr lang="en-GB" sz="800" dirty="0"/>
-          </a:p>
-          <a:p>
-            <a:r>
-              <a:rPr lang="en-GB" sz="800" dirty="0"/>
-              <a:t>                </a:t>
-            </a:r>
-            <a:r>
-              <a:rPr lang="en-GB" sz="800" dirty="0" err="1"/>
-              <a:t>nextAttackTime</a:t>
-            </a:r>
-            <a:r>
-              <a:rPr lang="en-GB" sz="800" dirty="0"/>
-              <a:t> = </a:t>
-            </a:r>
-            <a:r>
-              <a:rPr lang="en-GB" sz="800" dirty="0" err="1"/>
-              <a:t>Time.time</a:t>
-            </a:r>
-            <a:r>
-              <a:rPr lang="en-GB" sz="800" dirty="0"/>
-              <a:t> + </a:t>
-            </a:r>
-            <a:r>
-              <a:rPr lang="en-GB" sz="800" dirty="0" err="1"/>
-              <a:t>attackRate</a:t>
-            </a:r>
-            <a:r>
-              <a:rPr lang="en-GB" sz="800" dirty="0"/>
-              <a:t>;</a:t>
-            </a:r>
-          </a:p>
-          <a:p>
-            <a:r>
-              <a:rPr lang="en-GB" sz="800" dirty="0"/>
-              <a:t>            }</a:t>
-            </a:r>
-          </a:p>
-          <a:p>
-            <a:r>
-              <a:rPr lang="en-GB" sz="800" dirty="0"/>
-              <a:t>        }</a:t>
-            </a:r>
-          </a:p>
-          <a:p>
-            <a:r>
-              <a:rPr lang="en-GB" sz="800" dirty="0"/>
-              <a:t>    }</a:t>
-            </a:r>
-          </a:p>
-          <a:p>
-            <a:r>
-              <a:rPr lang="en-GB" sz="800" dirty="0"/>
-              <a:t>}</a:t>
-            </a:r>
+              <a:t>aswel</a:t>
+            </a:r>
+            <a:endParaRPr lang="en-GB"/>
+          </a:p>
+          <a:p>
+            <a:endParaRPr lang="en-GB"/>
           </a:p>
         </p:txBody>
       </p:sp>
     </p:spTree>
     <p:extLst>
       <p:ext uri="{BB962C8B-B14F-4D97-AF65-F5344CB8AC3E}">
-        <p14:creationId xmlns:p14="http://schemas.microsoft.com/office/powerpoint/2010/main" val="1016281087"/>
+        <p14:creationId xmlns:p14="http://schemas.microsoft.com/office/powerpoint/2010/main" val="3653716512"/>
       </p:ext>
     </p:extLst>
   </p:cSld>

</xml_diff>

<commit_message>
Poster Submitted , L1 Polish
Feet Clipping fix, weapon tweaking
</commit_message>
<xml_diff>
--- a/Documentation/Report/Documentationofstuff.pptx
+++ b/Documentation/Report/Documentationofstuff.pptx
@@ -11,14 +11,15 @@
     <p:sldId id="259" r:id="rId5"/>
     <p:sldId id="265" r:id="rId6"/>
     <p:sldId id="261" r:id="rId7"/>
-    <p:sldId id="269" r:id="rId8"/>
-    <p:sldId id="268" r:id="rId9"/>
-    <p:sldId id="267" r:id="rId10"/>
-    <p:sldId id="264" r:id="rId11"/>
-    <p:sldId id="260" r:id="rId12"/>
-    <p:sldId id="262" r:id="rId13"/>
-    <p:sldId id="263" r:id="rId14"/>
-    <p:sldId id="266" r:id="rId15"/>
+    <p:sldId id="270" r:id="rId8"/>
+    <p:sldId id="269" r:id="rId9"/>
+    <p:sldId id="268" r:id="rId10"/>
+    <p:sldId id="267" r:id="rId11"/>
+    <p:sldId id="264" r:id="rId12"/>
+    <p:sldId id="260" r:id="rId13"/>
+    <p:sldId id="262" r:id="rId14"/>
+    <p:sldId id="263" r:id="rId15"/>
+    <p:sldId id="266" r:id="rId16"/>
   </p:sldIdLst>
   <p:sldSz cx="12192000" cy="6858000"/>
   <p:notesSz cx="6858000" cy="9144000"/>
@@ -274,7 +275,7 @@
           <a:p>
             <a:fld id="{C272013D-9C3F-40F8-8AC4-43A405D33223}" type="datetimeFigureOut">
               <a:rPr lang="en-GB" smtClean="0"/>
-              <a:t>03/04/2025</a:t>
+              <a:t>04/04/2025</a:t>
             </a:fld>
             <a:endParaRPr lang="en-GB"/>
           </a:p>
@@ -474,7 +475,7 @@
           <a:p>
             <a:fld id="{C272013D-9C3F-40F8-8AC4-43A405D33223}" type="datetimeFigureOut">
               <a:rPr lang="en-GB" smtClean="0"/>
-              <a:t>03/04/2025</a:t>
+              <a:t>04/04/2025</a:t>
             </a:fld>
             <a:endParaRPr lang="en-GB"/>
           </a:p>
@@ -684,7 +685,7 @@
           <a:p>
             <a:fld id="{C272013D-9C3F-40F8-8AC4-43A405D33223}" type="datetimeFigureOut">
               <a:rPr lang="en-GB" smtClean="0"/>
-              <a:t>03/04/2025</a:t>
+              <a:t>04/04/2025</a:t>
             </a:fld>
             <a:endParaRPr lang="en-GB"/>
           </a:p>
@@ -884,7 +885,7 @@
           <a:p>
             <a:fld id="{C272013D-9C3F-40F8-8AC4-43A405D33223}" type="datetimeFigureOut">
               <a:rPr lang="en-GB" smtClean="0"/>
-              <a:t>03/04/2025</a:t>
+              <a:t>04/04/2025</a:t>
             </a:fld>
             <a:endParaRPr lang="en-GB"/>
           </a:p>
@@ -1160,7 +1161,7 @@
           <a:p>
             <a:fld id="{C272013D-9C3F-40F8-8AC4-43A405D33223}" type="datetimeFigureOut">
               <a:rPr lang="en-GB" smtClean="0"/>
-              <a:t>03/04/2025</a:t>
+              <a:t>04/04/2025</a:t>
             </a:fld>
             <a:endParaRPr lang="en-GB"/>
           </a:p>
@@ -1428,7 +1429,7 @@
           <a:p>
             <a:fld id="{C272013D-9C3F-40F8-8AC4-43A405D33223}" type="datetimeFigureOut">
               <a:rPr lang="en-GB" smtClean="0"/>
-              <a:t>03/04/2025</a:t>
+              <a:t>04/04/2025</a:t>
             </a:fld>
             <a:endParaRPr lang="en-GB"/>
           </a:p>
@@ -1843,7 +1844,7 @@
           <a:p>
             <a:fld id="{C272013D-9C3F-40F8-8AC4-43A405D33223}" type="datetimeFigureOut">
               <a:rPr lang="en-GB" smtClean="0"/>
-              <a:t>03/04/2025</a:t>
+              <a:t>04/04/2025</a:t>
             </a:fld>
             <a:endParaRPr lang="en-GB"/>
           </a:p>
@@ -1985,7 +1986,7 @@
           <a:p>
             <a:fld id="{C272013D-9C3F-40F8-8AC4-43A405D33223}" type="datetimeFigureOut">
               <a:rPr lang="en-GB" smtClean="0"/>
-              <a:t>03/04/2025</a:t>
+              <a:t>04/04/2025</a:t>
             </a:fld>
             <a:endParaRPr lang="en-GB"/>
           </a:p>
@@ -2098,7 +2099,7 @@
           <a:p>
             <a:fld id="{C272013D-9C3F-40F8-8AC4-43A405D33223}" type="datetimeFigureOut">
               <a:rPr lang="en-GB" smtClean="0"/>
-              <a:t>03/04/2025</a:t>
+              <a:t>04/04/2025</a:t>
             </a:fld>
             <a:endParaRPr lang="en-GB"/>
           </a:p>
@@ -2411,7 +2412,7 @@
           <a:p>
             <a:fld id="{C272013D-9C3F-40F8-8AC4-43A405D33223}" type="datetimeFigureOut">
               <a:rPr lang="en-GB" smtClean="0"/>
-              <a:t>03/04/2025</a:t>
+              <a:t>04/04/2025</a:t>
             </a:fld>
             <a:endParaRPr lang="en-GB"/>
           </a:p>
@@ -2700,7 +2701,7 @@
           <a:p>
             <a:fld id="{C272013D-9C3F-40F8-8AC4-43A405D33223}" type="datetimeFigureOut">
               <a:rPr lang="en-GB" smtClean="0"/>
-              <a:t>03/04/2025</a:t>
+              <a:t>04/04/2025</a:t>
             </a:fld>
             <a:endParaRPr lang="en-GB"/>
           </a:p>
@@ -2943,7 +2944,7 @@
           <a:p>
             <a:fld id="{C272013D-9C3F-40F8-8AC4-43A405D33223}" type="datetimeFigureOut">
               <a:rPr lang="en-GB" smtClean="0"/>
-              <a:t>03/04/2025</a:t>
+              <a:t>04/04/2025</a:t>
             </a:fld>
             <a:endParaRPr lang="en-GB"/>
           </a:p>
@@ -3716,6 +3717,130 @@
           <p:cNvPr id="2" name="Title 1">
             <a:extLst>
               <a:ext uri="{FF2B5EF4-FFF2-40B4-BE49-F238E27FC236}">
+                <a16:creationId xmlns:a16="http://schemas.microsoft.com/office/drawing/2014/main" id="{19B657D5-0D05-CDB3-E622-CC74399D9293}"/>
+              </a:ext>
+            </a:extLst>
+          </p:cNvPr>
+          <p:cNvSpPr>
+            <a:spLocks noGrp="1"/>
+          </p:cNvSpPr>
+          <p:nvPr>
+            <p:ph type="title"/>
+          </p:nvPr>
+        </p:nvSpPr>
+        <p:spPr/>
+        <p:txBody>
+          <a:bodyPr/>
+          <a:lstStyle/>
+          <a:p>
+            <a:r>
+              <a:rPr lang="en-GB" dirty="0"/>
+              <a:t>MOVEMENT 2</a:t>
+            </a:r>
+          </a:p>
+        </p:txBody>
+      </p:sp>
+      <p:sp>
+        <p:nvSpPr>
+          <p:cNvPr id="3" name="Content Placeholder 2">
+            <a:extLst>
+              <a:ext uri="{FF2B5EF4-FFF2-40B4-BE49-F238E27FC236}">
+                <a16:creationId xmlns:a16="http://schemas.microsoft.com/office/drawing/2014/main" id="{6ADAF85F-3274-500B-24F1-77722205A975}"/>
+              </a:ext>
+            </a:extLst>
+          </p:cNvPr>
+          <p:cNvSpPr>
+            <a:spLocks noGrp="1"/>
+          </p:cNvSpPr>
+          <p:nvPr>
+            <p:ph idx="1"/>
+          </p:nvPr>
+        </p:nvSpPr>
+        <p:spPr/>
+        <p:txBody>
+          <a:bodyPr/>
+          <a:lstStyle/>
+          <a:p>
+            <a:r>
+              <a:rPr lang="en-GB" dirty="0"/>
+              <a:t>JUMP ONLY WORKS WHEN HELD</a:t>
+            </a:r>
+          </a:p>
+          <a:p>
+            <a:r>
+              <a:rPr lang="en-GB" dirty="0"/>
+              <a:t>KINDA BUGGY WHEN PLAYER IS BEING PUSHED </a:t>
+            </a:r>
+          </a:p>
+          <a:p>
+            <a:r>
+              <a:rPr lang="en-GB" dirty="0">
+                <a:hlinkClick r:id="rId2"/>
+              </a:rPr>
+              <a:t>https://www.youtube.com/watch?v=_QajrabyTJc&amp;t=848s</a:t>
+            </a:r>
+            <a:endParaRPr lang="en-GB" dirty="0"/>
+          </a:p>
+          <a:p>
+            <a:endParaRPr lang="en-GB" dirty="0"/>
+          </a:p>
+          <a:p>
+            <a:r>
+              <a:rPr lang="en-GB" dirty="0"/>
+              <a:t>Can always revert back to old as  I saved them as  prefabs and old movement in separate folder </a:t>
+            </a:r>
+          </a:p>
+          <a:p>
+            <a:r>
+              <a:rPr lang="en-GB" dirty="0"/>
+              <a:t>Make sure to change movement in lvl1 </a:t>
+            </a:r>
+            <a:r>
+              <a:rPr lang="en-GB" dirty="0" err="1"/>
+              <a:t>aswel</a:t>
+            </a:r>
+            <a:endParaRPr lang="en-GB"/>
+          </a:p>
+          <a:p>
+            <a:endParaRPr lang="en-GB"/>
+          </a:p>
+        </p:txBody>
+      </p:sp>
+    </p:spTree>
+    <p:extLst>
+      <p:ext uri="{BB962C8B-B14F-4D97-AF65-F5344CB8AC3E}">
+        <p14:creationId xmlns:p14="http://schemas.microsoft.com/office/powerpoint/2010/main" val="3653716512"/>
+      </p:ext>
+    </p:extLst>
+  </p:cSld>
+  <p:clrMapOvr>
+    <a:masterClrMapping/>
+  </p:clrMapOvr>
+</p:sld>
+</file>
+
+<file path=ppt/slides/slide11.xml><?xml version="1.0" encoding="utf-8"?>
+<p:sld xmlns:a="http://schemas.openxmlformats.org/drawingml/2006/main" xmlns:r="http://schemas.openxmlformats.org/officeDocument/2006/relationships" xmlns:p="http://schemas.openxmlformats.org/presentationml/2006/main">
+  <p:cSld>
+    <p:spTree>
+      <p:nvGrpSpPr>
+        <p:cNvPr id="1" name=""/>
+        <p:cNvGrpSpPr/>
+        <p:nvPr/>
+      </p:nvGrpSpPr>
+      <p:grpSpPr>
+        <a:xfrm>
+          <a:off x="0" y="0"/>
+          <a:ext cx="0" cy="0"/>
+          <a:chOff x="0" y="0"/>
+          <a:chExt cx="0" cy="0"/>
+        </a:xfrm>
+      </p:grpSpPr>
+      <p:sp>
+        <p:nvSpPr>
+          <p:cNvPr id="2" name="Title 1">
+            <a:extLst>
+              <a:ext uri="{FF2B5EF4-FFF2-40B4-BE49-F238E27FC236}">
                 <a16:creationId xmlns:a16="http://schemas.microsoft.com/office/drawing/2014/main" id="{76F7E7E4-9827-C9EA-41A9-B8C6EF75B3BA}"/>
               </a:ext>
             </a:extLst>
@@ -4205,7 +4330,7 @@
 </p:sld>
 </file>
 
-<file path=ppt/slides/slide11.xml><?xml version="1.0" encoding="utf-8"?>
+<file path=ppt/slides/slide12.xml><?xml version="1.0" encoding="utf-8"?>
 <p:sld xmlns:a="http://schemas.openxmlformats.org/drawingml/2006/main" xmlns:r="http://schemas.openxmlformats.org/officeDocument/2006/relationships" xmlns:p="http://schemas.openxmlformats.org/presentationml/2006/main">
   <p:cSld>
     <p:spTree>
@@ -4347,7 +4472,7 @@
 </p:sld>
 </file>
 
-<file path=ppt/slides/slide12.xml><?xml version="1.0" encoding="utf-8"?>
+<file path=ppt/slides/slide13.xml><?xml version="1.0" encoding="utf-8"?>
 <p:sld xmlns:a="http://schemas.openxmlformats.org/drawingml/2006/main" xmlns:r="http://schemas.openxmlformats.org/officeDocument/2006/relationships" xmlns:p="http://schemas.openxmlformats.org/presentationml/2006/main">
   <p:cSld>
     <p:spTree>
@@ -4506,7 +4631,7 @@
 </p:sld>
 </file>
 
-<file path=ppt/slides/slide13.xml><?xml version="1.0" encoding="utf-8"?>
+<file path=ppt/slides/slide14.xml><?xml version="1.0" encoding="utf-8"?>
 <p:sld xmlns:a="http://schemas.openxmlformats.org/drawingml/2006/main" xmlns:r="http://schemas.openxmlformats.org/officeDocument/2006/relationships" xmlns:p="http://schemas.openxmlformats.org/presentationml/2006/main">
   <p:cSld>
     <p:spTree>
@@ -4628,7 +4753,7 @@
 </p:sld>
 </file>
 
-<file path=ppt/slides/slide14.xml><?xml version="1.0" encoding="utf-8"?>
+<file path=ppt/slides/slide15.xml><?xml version="1.0" encoding="utf-8"?>
 <p:sld xmlns:a="http://schemas.openxmlformats.org/drawingml/2006/main" xmlns:r="http://schemas.openxmlformats.org/officeDocument/2006/relationships" xmlns:p="http://schemas.openxmlformats.org/presentationml/2006/main">
   <p:cSld>
     <p:spTree>
@@ -5315,72 +5440,94 @@
           <p:cNvPr id="2" name="Title 1">
             <a:extLst>
               <a:ext uri="{FF2B5EF4-FFF2-40B4-BE49-F238E27FC236}">
-                <a16:creationId xmlns:a16="http://schemas.microsoft.com/office/drawing/2014/main" id="{57C7B847-85C8-83BD-8B33-368E1675D7D2}"/>
-              </a:ext>
-            </a:extLst>
-          </p:cNvPr>
-          <p:cNvSpPr>
-            <a:spLocks noGrp="1"/>
-          </p:cNvSpPr>
-          <p:nvPr>
-            <p:ph type="title"/>
-          </p:nvPr>
-        </p:nvSpPr>
-        <p:spPr/>
-        <p:txBody>
-          <a:bodyPr/>
+                <a16:creationId xmlns:a16="http://schemas.microsoft.com/office/drawing/2014/main" id="{5D5F5164-6823-21E0-1DB7-07824192D311}"/>
+              </a:ext>
+            </a:extLst>
+          </p:cNvPr>
+          <p:cNvSpPr>
+            <a:spLocks noGrp="1"/>
+          </p:cNvSpPr>
+          <p:nvPr>
+            <p:ph type="ctrTitle"/>
+          </p:nvPr>
+        </p:nvSpPr>
+        <p:spPr>
+          <a:xfrm>
+            <a:off x="1322832" y="281115"/>
+            <a:ext cx="9144000" cy="715581"/>
+          </a:xfrm>
+        </p:spPr>
+        <p:txBody>
+          <a:bodyPr>
+            <a:normAutofit fontScale="90000"/>
+          </a:bodyPr>
           <a:lstStyle/>
           <a:p>
             <a:r>
               <a:rPr lang="en-GB" dirty="0"/>
-              <a:t>1 Enemy Model / Animation </a:t>
-            </a:r>
-          </a:p>
-        </p:txBody>
-      </p:sp>
-      <p:sp>
-        <p:nvSpPr>
-          <p:cNvPr id="3" name="Content Placeholder 2">
-            <a:extLst>
-              <a:ext uri="{FF2B5EF4-FFF2-40B4-BE49-F238E27FC236}">
-                <a16:creationId xmlns:a16="http://schemas.microsoft.com/office/drawing/2014/main" id="{47A9B217-6AA4-39D7-6657-3D1ACD984C87}"/>
-              </a:ext>
-            </a:extLst>
-          </p:cNvPr>
-          <p:cNvSpPr>
-            <a:spLocks noGrp="1"/>
-          </p:cNvSpPr>
-          <p:nvPr>
-            <p:ph idx="1"/>
-          </p:nvPr>
-        </p:nvSpPr>
-        <p:spPr/>
-        <p:txBody>
-          <a:bodyPr/>
-          <a:lstStyle/>
-          <a:p>
+              <a:t>What I have polished from 1 </a:t>
+            </a:r>
+          </a:p>
+        </p:txBody>
+      </p:sp>
+      <p:sp>
+        <p:nvSpPr>
+          <p:cNvPr id="3" name="Subtitle 2">
+            <a:extLst>
+              <a:ext uri="{FF2B5EF4-FFF2-40B4-BE49-F238E27FC236}">
+                <a16:creationId xmlns:a16="http://schemas.microsoft.com/office/drawing/2014/main" id="{B59FC20C-371C-A448-F7BD-A2A9098205E1}"/>
+              </a:ext>
+            </a:extLst>
+          </p:cNvPr>
+          <p:cNvSpPr>
+            <a:spLocks noGrp="1"/>
+          </p:cNvSpPr>
+          <p:nvPr>
+            <p:ph type="subTitle" idx="1"/>
+          </p:nvPr>
+        </p:nvSpPr>
+        <p:spPr>
+          <a:xfrm>
+            <a:off x="1524000" y="1252728"/>
+            <a:ext cx="9144000" cy="4005072"/>
+          </a:xfrm>
+        </p:spPr>
+        <p:txBody>
+          <a:bodyPr/>
+          <a:lstStyle/>
+          <a:p>
+            <a:pPr marL="342900" indent="-342900">
+              <a:buFont typeface="Arial" panose="020B0604020202020204" pitchFamily="34" charset="0"/>
+              <a:buChar char="•"/>
+            </a:pPr>
             <a:r>
               <a:rPr lang="en-GB" dirty="0"/>
-              <a:t>FUCK</a:t>
-            </a:r>
-          </a:p>
-          <a:p>
+              <a:t>Walking / Foot clipping thro floor (Still need to </a:t>
+            </a:r>
+            <a:r>
+              <a:rPr lang="en-GB" dirty="0" err="1"/>
+              <a:t>fuckking</a:t>
+            </a:r>
             <a:r>
               <a:rPr lang="en-GB" dirty="0"/>
-              <a:t>Moving the floor down seemed to fix this but so did turning off APPLY ROOOT MOTION , I reverted the floor space back to </a:t>
-            </a:r>
-            <a:r>
-              <a:rPr lang="en-GB" dirty="0" err="1"/>
-              <a:t>normall</a:t>
-            </a:r>
+              <a:t> move everything else down) </a:t>
+            </a:r>
+          </a:p>
+          <a:p>
+            <a:pPr marL="342900" indent="-342900">
+              <a:buFont typeface="Arial" panose="020B0604020202020204" pitchFamily="34" charset="0"/>
+              <a:buChar char="•"/>
+            </a:pPr>
             <a:r>
               <a:rPr lang="en-GB" dirty="0"/>
-              <a:t> so I can focus on the fix , if I do choose this option I will need to move all models down too </a:t>
-            </a:r>
-            <a:r>
-              <a:rPr lang="en-GB"/>
-              <a:t>lol long </a:t>
-            </a:r>
+              <a:t>Weapons (Anubis’ Staff ) , Bullet (Fire Energy Blasts) – I think some errors are still occurring so need to fix this and then add sound </a:t>
+            </a:r>
+          </a:p>
+          <a:p>
+            <a:pPr marL="342900" indent="-342900">
+              <a:buFont typeface="Arial" panose="020B0604020202020204" pitchFamily="34" charset="0"/>
+              <a:buChar char="•"/>
+            </a:pPr>
             <a:endParaRPr lang="en-GB" dirty="0"/>
           </a:p>
         </p:txBody>
@@ -5388,7 +5535,7 @@
     </p:spTree>
     <p:extLst>
       <p:ext uri="{BB962C8B-B14F-4D97-AF65-F5344CB8AC3E}">
-        <p14:creationId xmlns:p14="http://schemas.microsoft.com/office/powerpoint/2010/main" val="3446317224"/>
+        <p14:creationId xmlns:p14="http://schemas.microsoft.com/office/powerpoint/2010/main" val="1595508834"/>
       </p:ext>
     </p:extLst>
   </p:cSld>
@@ -5420,7 +5567,7 @@
           <p:cNvPr id="2" name="Title 1">
             <a:extLst>
               <a:ext uri="{FF2B5EF4-FFF2-40B4-BE49-F238E27FC236}">
-                <a16:creationId xmlns:a16="http://schemas.microsoft.com/office/drawing/2014/main" id="{F58F3967-18E6-8991-E8AE-620BDC2DE720}"/>
+                <a16:creationId xmlns:a16="http://schemas.microsoft.com/office/drawing/2014/main" id="{57C7B847-85C8-83BD-8B33-368E1675D7D2}"/>
               </a:ext>
             </a:extLst>
           </p:cNvPr>
@@ -5438,7 +5585,7 @@
           <a:p>
             <a:r>
               <a:rPr lang="en-GB" dirty="0"/>
-              <a:t>JJ MEETINGS </a:t>
+              <a:t>1 Enemy Model / Animation </a:t>
             </a:r>
           </a:p>
         </p:txBody>
@@ -5448,7 +5595,7 @@
           <p:cNvPr id="3" name="Content Placeholder 2">
             <a:extLst>
               <a:ext uri="{FF2B5EF4-FFF2-40B4-BE49-F238E27FC236}">
-                <a16:creationId xmlns:a16="http://schemas.microsoft.com/office/drawing/2014/main" id="{696F8D03-4BA6-E44A-EB92-62C49E851A3A}"/>
+                <a16:creationId xmlns:a16="http://schemas.microsoft.com/office/drawing/2014/main" id="{47A9B217-6AA4-39D7-6657-3D1ACD984C87}"/>
               </a:ext>
             </a:extLst>
           </p:cNvPr>
@@ -5465,43 +5612,36 @@
           <a:lstStyle/>
           <a:p>
             <a:r>
+              <a:rPr lang="en-GB" dirty="0"/>
+              <a:t>FUCK</a:t>
+            </a:r>
+          </a:p>
+          <a:p>
+            <a:r>
+              <a:rPr lang="en-GB" dirty="0"/>
+              <a:t>Moving the floor down seemed to fix this but so did turning off APPLY ROOOT MOTION , I reverted the floor space back to </a:t>
+            </a:r>
+            <a:r>
               <a:rPr lang="en-GB" dirty="0" err="1"/>
-              <a:t>Implementaiton</a:t>
+              <a:t>normall</a:t>
             </a:r>
             <a:r>
               <a:rPr lang="en-GB" dirty="0"/>
-              <a:t> – GDD, DESIGN LIKE THE MAP THINGS</a:t>
+              <a:t> so I can focus on the fix , if I do choose this option I will need to move all models down too lol long </a:t>
             </a:r>
           </a:p>
           <a:p>
             <a:r>
               <a:rPr lang="en-GB" dirty="0"/>
-              <a:t>Methodology is how I created it like the design </a:t>
+              <a:t>Think </a:t>
             </a:r>
             <a:r>
               <a:rPr lang="en-GB" dirty="0" err="1"/>
-              <a:t>implemnation</a:t>
+              <a:t>im</a:t>
             </a:r>
             <a:r>
               <a:rPr lang="en-GB" dirty="0"/>
-              <a:t> </a:t>
-            </a:r>
-          </a:p>
-          <a:p>
-            <a:r>
-              <a:rPr lang="en-GB" dirty="0"/>
-              <a:t>How I used user testing for feedback to make iterations and </a:t>
-            </a:r>
-            <a:r>
-              <a:rPr lang="en-GB" dirty="0" err="1"/>
-              <a:t>yh</a:t>
-            </a:r>
-            <a:endParaRPr lang="en-GB" dirty="0"/>
-          </a:p>
-          <a:p>
-            <a:r>
-              <a:rPr lang="en-GB"/>
-              <a:t>Analysis </a:t>
+              <a:t> going to stick to the Floor being moved down </a:t>
             </a:r>
           </a:p>
         </p:txBody>
@@ -5509,7 +5649,7 @@
     </p:spTree>
     <p:extLst>
       <p:ext uri="{BB962C8B-B14F-4D97-AF65-F5344CB8AC3E}">
-        <p14:creationId xmlns:p14="http://schemas.microsoft.com/office/powerpoint/2010/main" val="2649845202"/>
+        <p14:creationId xmlns:p14="http://schemas.microsoft.com/office/powerpoint/2010/main" val="3446317224"/>
       </p:ext>
     </p:extLst>
   </p:cSld>
@@ -5541,7 +5681,7 @@
           <p:cNvPr id="2" name="Title 1">
             <a:extLst>
               <a:ext uri="{FF2B5EF4-FFF2-40B4-BE49-F238E27FC236}">
-                <a16:creationId xmlns:a16="http://schemas.microsoft.com/office/drawing/2014/main" id="{19B657D5-0D05-CDB3-E622-CC74399D9293}"/>
+                <a16:creationId xmlns:a16="http://schemas.microsoft.com/office/drawing/2014/main" id="{F58F3967-18E6-8991-E8AE-620BDC2DE720}"/>
               </a:ext>
             </a:extLst>
           </p:cNvPr>
@@ -5559,7 +5699,7 @@
           <a:p>
             <a:r>
               <a:rPr lang="en-GB" dirty="0"/>
-              <a:t>MOVEMENT 2</a:t>
+              <a:t>JJ MEETINGS </a:t>
             </a:r>
           </a:p>
         </p:txBody>
@@ -5569,7 +5709,7 @@
           <p:cNvPr id="3" name="Content Placeholder 2">
             <a:extLst>
               <a:ext uri="{FF2B5EF4-FFF2-40B4-BE49-F238E27FC236}">
-                <a16:creationId xmlns:a16="http://schemas.microsoft.com/office/drawing/2014/main" id="{6ADAF85F-3274-500B-24F1-77722205A975}"/>
+                <a16:creationId xmlns:a16="http://schemas.microsoft.com/office/drawing/2014/main" id="{696F8D03-4BA6-E44A-EB92-62C49E851A3A}"/>
               </a:ext>
             </a:extLst>
           </p:cNvPr>
@@ -5586,54 +5726,51 @@
           <a:lstStyle/>
           <a:p>
             <a:r>
+              <a:rPr lang="en-GB" dirty="0" err="1"/>
+              <a:t>Implementaiton</a:t>
+            </a:r>
+            <a:r>
               <a:rPr lang="en-GB" dirty="0"/>
-              <a:t>JUMP ONLY WORKS WHEN HELD</a:t>
+              <a:t> – GDD, DESIGN LIKE THE MAP THINGS</a:t>
             </a:r>
           </a:p>
           <a:p>
             <a:r>
               <a:rPr lang="en-GB" dirty="0"/>
-              <a:t>KINDA BUGGY WHEN PLAYER IS BEING PUSHED </a:t>
-            </a:r>
-          </a:p>
-          <a:p>
-            <a:r>
-              <a:rPr lang="en-GB" dirty="0">
-                <a:hlinkClick r:id="rId2"/>
-              </a:rPr>
-              <a:t>https://www.youtube.com/watch?v=_QajrabyTJc&amp;t=848s</a:t>
+              <a:t>Methodology is how I created it like the design </a:t>
+            </a:r>
+            <a:r>
+              <a:rPr lang="en-GB" dirty="0" err="1"/>
+              <a:t>implemnation</a:t>
+            </a:r>
+            <a:r>
+              <a:rPr lang="en-GB" dirty="0"/>
+              <a:t> </a:t>
+            </a:r>
+          </a:p>
+          <a:p>
+            <a:r>
+              <a:rPr lang="en-GB" dirty="0"/>
+              <a:t>How I used user testing for feedback to make iterations and </a:t>
+            </a:r>
+            <a:r>
+              <a:rPr lang="en-GB" dirty="0" err="1"/>
+              <a:t>yh</a:t>
             </a:r>
             <a:endParaRPr lang="en-GB" dirty="0"/>
           </a:p>
           <a:p>
-            <a:endParaRPr lang="en-GB" dirty="0"/>
-          </a:p>
-          <a:p>
-            <a:r>
-              <a:rPr lang="en-GB" dirty="0"/>
-              <a:t>Can always revert back to old as  I saved them as  prefabs and old movement in separate folder </a:t>
-            </a:r>
-          </a:p>
-          <a:p>
-            <a:r>
-              <a:rPr lang="en-GB" dirty="0"/>
-              <a:t>Make sure to change movement in lvl1 </a:t>
-            </a:r>
-            <a:r>
-              <a:rPr lang="en-GB" dirty="0" err="1"/>
-              <a:t>aswel</a:t>
-            </a:r>
-            <a:endParaRPr lang="en-GB"/>
-          </a:p>
-          <a:p>
-            <a:endParaRPr lang="en-GB"/>
+            <a:r>
+              <a:rPr lang="en-GB"/>
+              <a:t>Analysis </a:t>
+            </a:r>
           </a:p>
         </p:txBody>
       </p:sp>
     </p:spTree>
     <p:extLst>
       <p:ext uri="{BB962C8B-B14F-4D97-AF65-F5344CB8AC3E}">
-        <p14:creationId xmlns:p14="http://schemas.microsoft.com/office/powerpoint/2010/main" val="3653716512"/>
+        <p14:creationId xmlns:p14="http://schemas.microsoft.com/office/powerpoint/2010/main" val="2649845202"/>
       </p:ext>
     </p:extLst>
   </p:cSld>

</xml_diff>

<commit_message>
Polished level 2 map
Added roofs to 2 corridors and wall textures on missing walls , also some game objects inside the final room
</commit_message>
<xml_diff>
--- a/Documentation/Report/Documentationofstuff.pptx
+++ b/Documentation/Report/Documentationofstuff.pptx
@@ -11,15 +11,23 @@
     <p:sldId id="259" r:id="rId5"/>
     <p:sldId id="265" r:id="rId6"/>
     <p:sldId id="261" r:id="rId7"/>
-    <p:sldId id="270" r:id="rId8"/>
-    <p:sldId id="269" r:id="rId9"/>
-    <p:sldId id="268" r:id="rId10"/>
-    <p:sldId id="267" r:id="rId11"/>
-    <p:sldId id="264" r:id="rId12"/>
-    <p:sldId id="260" r:id="rId13"/>
-    <p:sldId id="262" r:id="rId14"/>
-    <p:sldId id="263" r:id="rId15"/>
-    <p:sldId id="266" r:id="rId16"/>
+    <p:sldId id="278" r:id="rId8"/>
+    <p:sldId id="270" r:id="rId9"/>
+    <p:sldId id="269" r:id="rId10"/>
+    <p:sldId id="271" r:id="rId11"/>
+    <p:sldId id="272" r:id="rId12"/>
+    <p:sldId id="273" r:id="rId13"/>
+    <p:sldId id="274" r:id="rId14"/>
+    <p:sldId id="275" r:id="rId15"/>
+    <p:sldId id="276" r:id="rId16"/>
+    <p:sldId id="277" r:id="rId17"/>
+    <p:sldId id="268" r:id="rId18"/>
+    <p:sldId id="267" r:id="rId19"/>
+    <p:sldId id="264" r:id="rId20"/>
+    <p:sldId id="260" r:id="rId21"/>
+    <p:sldId id="262" r:id="rId22"/>
+    <p:sldId id="263" r:id="rId23"/>
+    <p:sldId id="266" r:id="rId24"/>
   </p:sldIdLst>
   <p:sldSz cx="12192000" cy="6858000"/>
   <p:notesSz cx="6858000" cy="9144000"/>
@@ -275,7 +283,7 @@
           <a:p>
             <a:fld id="{C272013D-9C3F-40F8-8AC4-43A405D33223}" type="datetimeFigureOut">
               <a:rPr lang="en-GB" smtClean="0"/>
-              <a:t>04/04/2025</a:t>
+              <a:t>08/04/2025</a:t>
             </a:fld>
             <a:endParaRPr lang="en-GB"/>
           </a:p>
@@ -475,7 +483,7 @@
           <a:p>
             <a:fld id="{C272013D-9C3F-40F8-8AC4-43A405D33223}" type="datetimeFigureOut">
               <a:rPr lang="en-GB" smtClean="0"/>
-              <a:t>04/04/2025</a:t>
+              <a:t>08/04/2025</a:t>
             </a:fld>
             <a:endParaRPr lang="en-GB"/>
           </a:p>
@@ -685,7 +693,7 @@
           <a:p>
             <a:fld id="{C272013D-9C3F-40F8-8AC4-43A405D33223}" type="datetimeFigureOut">
               <a:rPr lang="en-GB" smtClean="0"/>
-              <a:t>04/04/2025</a:t>
+              <a:t>08/04/2025</a:t>
             </a:fld>
             <a:endParaRPr lang="en-GB"/>
           </a:p>
@@ -885,7 +893,7 @@
           <a:p>
             <a:fld id="{C272013D-9C3F-40F8-8AC4-43A405D33223}" type="datetimeFigureOut">
               <a:rPr lang="en-GB" smtClean="0"/>
-              <a:t>04/04/2025</a:t>
+              <a:t>08/04/2025</a:t>
             </a:fld>
             <a:endParaRPr lang="en-GB"/>
           </a:p>
@@ -1161,7 +1169,7 @@
           <a:p>
             <a:fld id="{C272013D-9C3F-40F8-8AC4-43A405D33223}" type="datetimeFigureOut">
               <a:rPr lang="en-GB" smtClean="0"/>
-              <a:t>04/04/2025</a:t>
+              <a:t>08/04/2025</a:t>
             </a:fld>
             <a:endParaRPr lang="en-GB"/>
           </a:p>
@@ -1429,7 +1437,7 @@
           <a:p>
             <a:fld id="{C272013D-9C3F-40F8-8AC4-43A405D33223}" type="datetimeFigureOut">
               <a:rPr lang="en-GB" smtClean="0"/>
-              <a:t>04/04/2025</a:t>
+              <a:t>08/04/2025</a:t>
             </a:fld>
             <a:endParaRPr lang="en-GB"/>
           </a:p>
@@ -1844,7 +1852,7 @@
           <a:p>
             <a:fld id="{C272013D-9C3F-40F8-8AC4-43A405D33223}" type="datetimeFigureOut">
               <a:rPr lang="en-GB" smtClean="0"/>
-              <a:t>04/04/2025</a:t>
+              <a:t>08/04/2025</a:t>
             </a:fld>
             <a:endParaRPr lang="en-GB"/>
           </a:p>
@@ -1986,7 +1994,7 @@
           <a:p>
             <a:fld id="{C272013D-9C3F-40F8-8AC4-43A405D33223}" type="datetimeFigureOut">
               <a:rPr lang="en-GB" smtClean="0"/>
-              <a:t>04/04/2025</a:t>
+              <a:t>08/04/2025</a:t>
             </a:fld>
             <a:endParaRPr lang="en-GB"/>
           </a:p>
@@ -2099,7 +2107,7 @@
           <a:p>
             <a:fld id="{C272013D-9C3F-40F8-8AC4-43A405D33223}" type="datetimeFigureOut">
               <a:rPr lang="en-GB" smtClean="0"/>
-              <a:t>04/04/2025</a:t>
+              <a:t>08/04/2025</a:t>
             </a:fld>
             <a:endParaRPr lang="en-GB"/>
           </a:p>
@@ -2412,7 +2420,7 @@
           <a:p>
             <a:fld id="{C272013D-9C3F-40F8-8AC4-43A405D33223}" type="datetimeFigureOut">
               <a:rPr lang="en-GB" smtClean="0"/>
-              <a:t>04/04/2025</a:t>
+              <a:t>08/04/2025</a:t>
             </a:fld>
             <a:endParaRPr lang="en-GB"/>
           </a:p>
@@ -2701,7 +2709,7 @@
           <a:p>
             <a:fld id="{C272013D-9C3F-40F8-8AC4-43A405D33223}" type="datetimeFigureOut">
               <a:rPr lang="en-GB" smtClean="0"/>
-              <a:t>04/04/2025</a:t>
+              <a:t>08/04/2025</a:t>
             </a:fld>
             <a:endParaRPr lang="en-GB"/>
           </a:p>
@@ -2944,7 +2952,7 @@
           <a:p>
             <a:fld id="{C272013D-9C3F-40F8-8AC4-43A405D33223}" type="datetimeFigureOut">
               <a:rPr lang="en-GB" smtClean="0"/>
-              <a:t>04/04/2025</a:t>
+              <a:t>08/04/2025</a:t>
             </a:fld>
             <a:endParaRPr lang="en-GB"/>
           </a:p>
@@ -3717,7 +3725,7 @@
           <p:cNvPr id="2" name="Title 1">
             <a:extLst>
               <a:ext uri="{FF2B5EF4-FFF2-40B4-BE49-F238E27FC236}">
-                <a16:creationId xmlns:a16="http://schemas.microsoft.com/office/drawing/2014/main" id="{19B657D5-0D05-CDB3-E622-CC74399D9293}"/>
+                <a16:creationId xmlns:a16="http://schemas.microsoft.com/office/drawing/2014/main" id="{F7DE0487-4631-3ED0-1DC0-E15CA3D6C02F}"/>
               </a:ext>
             </a:extLst>
           </p:cNvPr>
@@ -3735,7 +3743,7 @@
           <a:p>
             <a:r>
               <a:rPr lang="en-GB" dirty="0"/>
-              <a:t>MOVEMENT 2</a:t>
+              <a:t>Enemy Shoot</a:t>
             </a:r>
           </a:p>
         </p:txBody>
@@ -3745,7 +3753,7 @@
           <p:cNvPr id="3" name="Content Placeholder 2">
             <a:extLst>
               <a:ext uri="{FF2B5EF4-FFF2-40B4-BE49-F238E27FC236}">
-                <a16:creationId xmlns:a16="http://schemas.microsoft.com/office/drawing/2014/main" id="{6ADAF85F-3274-500B-24F1-77722205A975}"/>
+                <a16:creationId xmlns:a16="http://schemas.microsoft.com/office/drawing/2014/main" id="{845461F8-2BD3-76F1-C139-F952972A7763}"/>
               </a:ext>
             </a:extLst>
           </p:cNvPr>
@@ -3763,53 +3771,29 @@
           <a:p>
             <a:r>
               <a:rPr lang="en-GB" dirty="0"/>
-              <a:t>JUMP ONLY WORKS WHEN HELD</a:t>
-            </a:r>
-          </a:p>
-          <a:p>
-            <a:r>
-              <a:rPr lang="en-GB" dirty="0"/>
-              <a:t>KINDA BUGGY WHEN PLAYER IS BEING PUSHED </a:t>
-            </a:r>
-          </a:p>
-          <a:p>
-            <a:r>
-              <a:rPr lang="en-GB" dirty="0">
-                <a:hlinkClick r:id="rId2"/>
-              </a:rPr>
-              <a:t>https://www.youtube.com/watch?v=_QajrabyTJc&amp;t=848s</a:t>
-            </a:r>
-            <a:endParaRPr lang="en-GB" dirty="0"/>
-          </a:p>
-          <a:p>
-            <a:endParaRPr lang="en-GB" dirty="0"/>
-          </a:p>
-          <a:p>
-            <a:r>
-              <a:rPr lang="en-GB" dirty="0"/>
-              <a:t>Can always revert back to old as  I saved them as  prefabs and old movement in separate folder </a:t>
-            </a:r>
-          </a:p>
-          <a:p>
-            <a:r>
-              <a:rPr lang="en-GB" dirty="0"/>
-              <a:t>Make sure to change movement in lvl1 </a:t>
+              <a:t>Seems to be shooting bent left, also seems as the </a:t>
             </a:r>
             <a:r>
               <a:rPr lang="en-GB" dirty="0" err="1"/>
-              <a:t>aswel</a:t>
-            </a:r>
-            <a:endParaRPr lang="en-GB"/>
-          </a:p>
-          <a:p>
-            <a:endParaRPr lang="en-GB"/>
+              <a:t>ememies</a:t>
+            </a:r>
+            <a:r>
+              <a:rPr lang="en-GB" dirty="0"/>
+              <a:t> damage themselves</a:t>
+            </a:r>
+          </a:p>
+          <a:p>
+            <a:r>
+              <a:rPr lang="en-GB" dirty="0"/>
+              <a:t>I actual don’t know it just de spawns</a:t>
+            </a:r>
           </a:p>
         </p:txBody>
       </p:sp>
     </p:spTree>
     <p:extLst>
       <p:ext uri="{BB962C8B-B14F-4D97-AF65-F5344CB8AC3E}">
-        <p14:creationId xmlns:p14="http://schemas.microsoft.com/office/powerpoint/2010/main" val="3653716512"/>
+        <p14:creationId xmlns:p14="http://schemas.microsoft.com/office/powerpoint/2010/main" val="1736404469"/>
       </p:ext>
     </p:extLst>
   </p:cSld>
@@ -3841,6 +3825,1718 @@
           <p:cNvPr id="2" name="Title 1">
             <a:extLst>
               <a:ext uri="{FF2B5EF4-FFF2-40B4-BE49-F238E27FC236}">
+                <a16:creationId xmlns:a16="http://schemas.microsoft.com/office/drawing/2014/main" id="{AEC528E2-D0EC-21BF-75C9-1B15F7A24F18}"/>
+              </a:ext>
+            </a:extLst>
+          </p:cNvPr>
+          <p:cNvSpPr>
+            <a:spLocks noGrp="1"/>
+          </p:cNvSpPr>
+          <p:nvPr>
+            <p:ph type="title"/>
+          </p:nvPr>
+        </p:nvSpPr>
+        <p:spPr/>
+        <p:txBody>
+          <a:bodyPr/>
+          <a:lstStyle/>
+          <a:p>
+            <a:r>
+              <a:rPr lang="en-GB" dirty="0"/>
+              <a:t>Layout of report </a:t>
+            </a:r>
+            <a:br>
+              <a:rPr lang="en-GB" dirty="0"/>
+            </a:br>
+            <a:endParaRPr lang="en-GB" dirty="0"/>
+          </a:p>
+        </p:txBody>
+      </p:sp>
+      <p:sp>
+        <p:nvSpPr>
+          <p:cNvPr id="3" name="Content Placeholder 2">
+            <a:extLst>
+              <a:ext uri="{FF2B5EF4-FFF2-40B4-BE49-F238E27FC236}">
+                <a16:creationId xmlns:a16="http://schemas.microsoft.com/office/drawing/2014/main" id="{D42AEA1C-C17D-EBEB-7E9A-75FFF669370B}"/>
+              </a:ext>
+            </a:extLst>
+          </p:cNvPr>
+          <p:cNvSpPr>
+            <a:spLocks noGrp="1"/>
+          </p:cNvSpPr>
+          <p:nvPr>
+            <p:ph idx="1"/>
+          </p:nvPr>
+        </p:nvSpPr>
+        <p:spPr>
+          <a:xfrm>
+            <a:off x="838200" y="1271016"/>
+            <a:ext cx="3642360" cy="4905947"/>
+          </a:xfrm>
+        </p:spPr>
+        <p:txBody>
+          <a:bodyPr/>
+          <a:lstStyle/>
+          <a:p>
+            <a:r>
+              <a:rPr lang="en-GB" b="1" dirty="0"/>
+              <a:t>Start Of Report: </a:t>
+            </a:r>
+          </a:p>
+          <a:p>
+            <a:endParaRPr lang="en-GB" dirty="0"/>
+          </a:p>
+          <a:p>
+            <a:r>
+              <a:rPr lang="en-GB" dirty="0"/>
+              <a:t>Acknowledgements </a:t>
+            </a:r>
+          </a:p>
+          <a:p>
+            <a:r>
+              <a:rPr lang="en-GB" dirty="0"/>
+              <a:t>Abstract </a:t>
+            </a:r>
+          </a:p>
+          <a:p>
+            <a:r>
+              <a:rPr lang="en-GB" dirty="0"/>
+              <a:t>Table of contents </a:t>
+            </a:r>
+          </a:p>
+          <a:p>
+            <a:r>
+              <a:rPr lang="en-GB" dirty="0"/>
+              <a:t>Word Count </a:t>
+            </a:r>
+          </a:p>
+          <a:p>
+            <a:r>
+              <a:rPr lang="en-GB" dirty="0"/>
+              <a:t>Code Link </a:t>
+            </a:r>
+          </a:p>
+        </p:txBody>
+      </p:sp>
+      <p:sp>
+        <p:nvSpPr>
+          <p:cNvPr id="4" name="Content Placeholder 2">
+            <a:extLst>
+              <a:ext uri="{FF2B5EF4-FFF2-40B4-BE49-F238E27FC236}">
+                <a16:creationId xmlns:a16="http://schemas.microsoft.com/office/drawing/2014/main" id="{A14D82B7-962D-F70A-AB9F-F1C07F1082A2}"/>
+              </a:ext>
+            </a:extLst>
+          </p:cNvPr>
+          <p:cNvSpPr txBox="1">
+            <a:spLocks/>
+          </p:cNvSpPr>
+          <p:nvPr/>
+        </p:nvSpPr>
+        <p:spPr>
+          <a:xfrm>
+            <a:off x="5315712" y="618745"/>
+            <a:ext cx="5410200" cy="4108704"/>
+          </a:xfrm>
+          <a:prstGeom prst="rect">
+            <a:avLst/>
+          </a:prstGeom>
+        </p:spPr>
+        <p:txBody>
+          <a:bodyPr vert="horz" lIns="91440" tIns="45720" rIns="91440" bIns="45720" rtlCol="0">
+            <a:normAutofit fontScale="92500" lnSpcReduction="10000"/>
+          </a:bodyPr>
+          <a:lstStyle>
+            <a:lvl1pPr marL="228600" indent="-228600" algn="l" defTabSz="914400" rtl="0" eaLnBrk="1" latinLnBrk="0" hangingPunct="1">
+              <a:lnSpc>
+                <a:spcPct val="90000"/>
+              </a:lnSpc>
+              <a:spcBef>
+                <a:spcPts val="1000"/>
+              </a:spcBef>
+              <a:buFont typeface="Arial" panose="020B0604020202020204" pitchFamily="34" charset="0"/>
+              <a:buChar char="•"/>
+              <a:defRPr sz="2800" kern="1200">
+                <a:solidFill>
+                  <a:schemeClr val="tx1"/>
+                </a:solidFill>
+                <a:latin typeface="+mn-lt"/>
+                <a:ea typeface="+mn-ea"/>
+                <a:cs typeface="+mn-cs"/>
+              </a:defRPr>
+            </a:lvl1pPr>
+            <a:lvl2pPr marL="685800" indent="-228600" algn="l" defTabSz="914400" rtl="0" eaLnBrk="1" latinLnBrk="0" hangingPunct="1">
+              <a:lnSpc>
+                <a:spcPct val="90000"/>
+              </a:lnSpc>
+              <a:spcBef>
+                <a:spcPts val="500"/>
+              </a:spcBef>
+              <a:buFont typeface="Arial" panose="020B0604020202020204" pitchFamily="34" charset="0"/>
+              <a:buChar char="•"/>
+              <a:defRPr sz="2400" kern="1200">
+                <a:solidFill>
+                  <a:schemeClr val="tx1"/>
+                </a:solidFill>
+                <a:latin typeface="+mn-lt"/>
+                <a:ea typeface="+mn-ea"/>
+                <a:cs typeface="+mn-cs"/>
+              </a:defRPr>
+            </a:lvl2pPr>
+            <a:lvl3pPr marL="1143000" indent="-228600" algn="l" defTabSz="914400" rtl="0" eaLnBrk="1" latinLnBrk="0" hangingPunct="1">
+              <a:lnSpc>
+                <a:spcPct val="90000"/>
+              </a:lnSpc>
+              <a:spcBef>
+                <a:spcPts val="500"/>
+              </a:spcBef>
+              <a:buFont typeface="Arial" panose="020B0604020202020204" pitchFamily="34" charset="0"/>
+              <a:buChar char="•"/>
+              <a:defRPr sz="2000" kern="1200">
+                <a:solidFill>
+                  <a:schemeClr val="tx1"/>
+                </a:solidFill>
+                <a:latin typeface="+mn-lt"/>
+                <a:ea typeface="+mn-ea"/>
+                <a:cs typeface="+mn-cs"/>
+              </a:defRPr>
+            </a:lvl3pPr>
+            <a:lvl4pPr marL="1600200" indent="-228600" algn="l" defTabSz="914400" rtl="0" eaLnBrk="1" latinLnBrk="0" hangingPunct="1">
+              <a:lnSpc>
+                <a:spcPct val="90000"/>
+              </a:lnSpc>
+              <a:spcBef>
+                <a:spcPts val="500"/>
+              </a:spcBef>
+              <a:buFont typeface="Arial" panose="020B0604020202020204" pitchFamily="34" charset="0"/>
+              <a:buChar char="•"/>
+              <a:defRPr sz="1800" kern="1200">
+                <a:solidFill>
+                  <a:schemeClr val="tx1"/>
+                </a:solidFill>
+                <a:latin typeface="+mn-lt"/>
+                <a:ea typeface="+mn-ea"/>
+                <a:cs typeface="+mn-cs"/>
+              </a:defRPr>
+            </a:lvl4pPr>
+            <a:lvl5pPr marL="2057400" indent="-228600" algn="l" defTabSz="914400" rtl="0" eaLnBrk="1" latinLnBrk="0" hangingPunct="1">
+              <a:lnSpc>
+                <a:spcPct val="90000"/>
+              </a:lnSpc>
+              <a:spcBef>
+                <a:spcPts val="500"/>
+              </a:spcBef>
+              <a:buFont typeface="Arial" panose="020B0604020202020204" pitchFamily="34" charset="0"/>
+              <a:buChar char="•"/>
+              <a:defRPr sz="1800" kern="1200">
+                <a:solidFill>
+                  <a:schemeClr val="tx1"/>
+                </a:solidFill>
+                <a:latin typeface="+mn-lt"/>
+                <a:ea typeface="+mn-ea"/>
+                <a:cs typeface="+mn-cs"/>
+              </a:defRPr>
+            </a:lvl5pPr>
+            <a:lvl6pPr marL="2514600" indent="-228600" algn="l" defTabSz="914400" rtl="0" eaLnBrk="1" latinLnBrk="0" hangingPunct="1">
+              <a:lnSpc>
+                <a:spcPct val="90000"/>
+              </a:lnSpc>
+              <a:spcBef>
+                <a:spcPts val="500"/>
+              </a:spcBef>
+              <a:buFont typeface="Arial" panose="020B0604020202020204" pitchFamily="34" charset="0"/>
+              <a:buChar char="•"/>
+              <a:defRPr sz="1800" kern="1200">
+                <a:solidFill>
+                  <a:schemeClr val="tx1"/>
+                </a:solidFill>
+                <a:latin typeface="+mn-lt"/>
+                <a:ea typeface="+mn-ea"/>
+                <a:cs typeface="+mn-cs"/>
+              </a:defRPr>
+            </a:lvl6pPr>
+            <a:lvl7pPr marL="2971800" indent="-228600" algn="l" defTabSz="914400" rtl="0" eaLnBrk="1" latinLnBrk="0" hangingPunct="1">
+              <a:lnSpc>
+                <a:spcPct val="90000"/>
+              </a:lnSpc>
+              <a:spcBef>
+                <a:spcPts val="500"/>
+              </a:spcBef>
+              <a:buFont typeface="Arial" panose="020B0604020202020204" pitchFamily="34" charset="0"/>
+              <a:buChar char="•"/>
+              <a:defRPr sz="1800" kern="1200">
+                <a:solidFill>
+                  <a:schemeClr val="tx1"/>
+                </a:solidFill>
+                <a:latin typeface="+mn-lt"/>
+                <a:ea typeface="+mn-ea"/>
+                <a:cs typeface="+mn-cs"/>
+              </a:defRPr>
+            </a:lvl7pPr>
+            <a:lvl8pPr marL="3429000" indent="-228600" algn="l" defTabSz="914400" rtl="0" eaLnBrk="1" latinLnBrk="0" hangingPunct="1">
+              <a:lnSpc>
+                <a:spcPct val="90000"/>
+              </a:lnSpc>
+              <a:spcBef>
+                <a:spcPts val="500"/>
+              </a:spcBef>
+              <a:buFont typeface="Arial" panose="020B0604020202020204" pitchFamily="34" charset="0"/>
+              <a:buChar char="•"/>
+              <a:defRPr sz="1800" kern="1200">
+                <a:solidFill>
+                  <a:schemeClr val="tx1"/>
+                </a:solidFill>
+                <a:latin typeface="+mn-lt"/>
+                <a:ea typeface="+mn-ea"/>
+                <a:cs typeface="+mn-cs"/>
+              </a:defRPr>
+            </a:lvl8pPr>
+            <a:lvl9pPr marL="3886200" indent="-228600" algn="l" defTabSz="914400" rtl="0" eaLnBrk="1" latinLnBrk="0" hangingPunct="1">
+              <a:lnSpc>
+                <a:spcPct val="90000"/>
+              </a:lnSpc>
+              <a:spcBef>
+                <a:spcPts val="500"/>
+              </a:spcBef>
+              <a:buFont typeface="Arial" panose="020B0604020202020204" pitchFamily="34" charset="0"/>
+              <a:buChar char="•"/>
+              <a:defRPr sz="1800" kern="1200">
+                <a:solidFill>
+                  <a:schemeClr val="tx1"/>
+                </a:solidFill>
+                <a:latin typeface="+mn-lt"/>
+                <a:ea typeface="+mn-ea"/>
+                <a:cs typeface="+mn-cs"/>
+              </a:defRPr>
+            </a:lvl9pPr>
+          </a:lstStyle>
+          <a:p>
+            <a:pPr>
+              <a:lnSpc>
+                <a:spcPct val="115000"/>
+              </a:lnSpc>
+              <a:spcAft>
+                <a:spcPts val="800"/>
+              </a:spcAft>
+              <a:buNone/>
+            </a:pPr>
+            <a:r>
+              <a:rPr lang="en-GB" sz="1800" dirty="0">
+                <a:effectLst/>
+                <a:latin typeface="Arial" panose="020B0604020202020204" pitchFamily="34" charset="0"/>
+                <a:ea typeface="Calibri" panose="020F0502020204030204" pitchFamily="34" charset="0"/>
+              </a:rPr>
+              <a:t>yourself repeating some of the material from your abstract in your introduction (don’t worry about this). </a:t>
+            </a:r>
+          </a:p>
+          <a:p>
+            <a:pPr>
+              <a:lnSpc>
+                <a:spcPct val="115000"/>
+              </a:lnSpc>
+              <a:spcAft>
+                <a:spcPts val="800"/>
+              </a:spcAft>
+              <a:buNone/>
+            </a:pPr>
+            <a:r>
+              <a:rPr lang="en-GB" sz="1800" dirty="0">
+                <a:effectLst/>
+                <a:latin typeface="Arial" panose="020B0604020202020204" pitchFamily="34" charset="0"/>
+                <a:ea typeface="Calibri" panose="020F0502020204030204" pitchFamily="34" charset="0"/>
+              </a:rPr>
+              <a:t>Think carefully about your reader:  they know nothing about your project, so don’t dive straight into the details. In general terms think about </a:t>
+            </a:r>
+          </a:p>
+          <a:p>
+            <a:pPr marL="342900" lvl="0" indent="-342900">
+              <a:lnSpc>
+                <a:spcPct val="115000"/>
+              </a:lnSpc>
+              <a:buFont typeface="Symbol" panose="05050102010706020507" pitchFamily="18" charset="2"/>
+              <a:buChar char=""/>
+            </a:pPr>
+            <a:r>
+              <a:rPr lang="en-GB" sz="1800" dirty="0">
+                <a:effectLst/>
+                <a:latin typeface="Arial" panose="020B0604020202020204" pitchFamily="34" charset="0"/>
+                <a:ea typeface="Calibri" panose="020F0502020204030204" pitchFamily="34" charset="0"/>
+              </a:rPr>
+              <a:t>Who is the client (if you have one) </a:t>
+            </a:r>
+          </a:p>
+          <a:p>
+            <a:pPr marL="342900" lvl="0" indent="-342900">
+              <a:lnSpc>
+                <a:spcPct val="115000"/>
+              </a:lnSpc>
+              <a:buFont typeface="Symbol" panose="05050102010706020507" pitchFamily="18" charset="2"/>
+              <a:buChar char=""/>
+            </a:pPr>
+            <a:r>
+              <a:rPr lang="en-GB" sz="1800" dirty="0">
+                <a:effectLst/>
+                <a:latin typeface="Arial" panose="020B0604020202020204" pitchFamily="34" charset="0"/>
+                <a:ea typeface="Calibri" panose="020F0502020204030204" pitchFamily="34" charset="0"/>
+              </a:rPr>
+              <a:t>What are their needs/objectives?   </a:t>
+            </a:r>
+          </a:p>
+          <a:p>
+            <a:pPr marL="342900" lvl="0" indent="-342900">
+              <a:lnSpc>
+                <a:spcPct val="115000"/>
+              </a:lnSpc>
+              <a:spcAft>
+                <a:spcPts val="800"/>
+              </a:spcAft>
+              <a:buFont typeface="Symbol" panose="05050102010706020507" pitchFamily="18" charset="2"/>
+              <a:buChar char=""/>
+            </a:pPr>
+            <a:r>
+              <a:rPr lang="en-GB" sz="1800" dirty="0">
+                <a:effectLst/>
+                <a:latin typeface="Arial" panose="020B0604020202020204" pitchFamily="34" charset="0"/>
+                <a:ea typeface="Calibri" panose="020F0502020204030204" pitchFamily="34" charset="0"/>
+              </a:rPr>
+              <a:t>What are your primary objectives of the project? How do these relate to the objectives of the client? This is not intended to be your definitive, precise statement of needs and objectives: you can give these in a subsequent chapter.</a:t>
+            </a:r>
+          </a:p>
+        </p:txBody>
+      </p:sp>
+    </p:spTree>
+    <p:extLst>
+      <p:ext uri="{BB962C8B-B14F-4D97-AF65-F5344CB8AC3E}">
+        <p14:creationId xmlns:p14="http://schemas.microsoft.com/office/powerpoint/2010/main" val="2236624815"/>
+      </p:ext>
+    </p:extLst>
+  </p:cSld>
+  <p:clrMapOvr>
+    <a:masterClrMapping/>
+  </p:clrMapOvr>
+</p:sld>
+</file>
+
+<file path=ppt/slides/slide12.xml><?xml version="1.0" encoding="utf-8"?>
+<p:sld xmlns:a="http://schemas.openxmlformats.org/drawingml/2006/main" xmlns:r="http://schemas.openxmlformats.org/officeDocument/2006/relationships" xmlns:p="http://schemas.openxmlformats.org/presentationml/2006/main">
+  <p:cSld>
+    <p:spTree>
+      <p:nvGrpSpPr>
+        <p:cNvPr id="1" name="">
+          <a:extLst>
+            <a:ext uri="{FF2B5EF4-FFF2-40B4-BE49-F238E27FC236}">
+              <a16:creationId xmlns:a16="http://schemas.microsoft.com/office/drawing/2014/main" id="{2DF80725-14D5-F61D-AFAE-3B4DA7BBA7BF}"/>
+            </a:ext>
+          </a:extLst>
+        </p:cNvPr>
+        <p:cNvGrpSpPr/>
+        <p:nvPr/>
+      </p:nvGrpSpPr>
+      <p:grpSpPr>
+        <a:xfrm>
+          <a:off x="0" y="0"/>
+          <a:ext cx="0" cy="0"/>
+          <a:chOff x="0" y="0"/>
+          <a:chExt cx="0" cy="0"/>
+        </a:xfrm>
+      </p:grpSpPr>
+      <p:sp>
+        <p:nvSpPr>
+          <p:cNvPr id="2" name="Title 1">
+            <a:extLst>
+              <a:ext uri="{FF2B5EF4-FFF2-40B4-BE49-F238E27FC236}">
+                <a16:creationId xmlns:a16="http://schemas.microsoft.com/office/drawing/2014/main" id="{1F9333E4-9574-FF4E-F05D-027633EF59A3}"/>
+              </a:ext>
+            </a:extLst>
+          </p:cNvPr>
+          <p:cNvSpPr>
+            <a:spLocks noGrp="1"/>
+          </p:cNvSpPr>
+          <p:nvPr>
+            <p:ph type="title"/>
+          </p:nvPr>
+        </p:nvSpPr>
+        <p:spPr/>
+        <p:txBody>
+          <a:bodyPr/>
+          <a:lstStyle/>
+          <a:p>
+            <a:r>
+              <a:rPr lang="en-GB" dirty="0"/>
+              <a:t>Layout of report </a:t>
+            </a:r>
+            <a:br>
+              <a:rPr lang="en-GB" dirty="0"/>
+            </a:br>
+            <a:endParaRPr lang="en-GB" dirty="0"/>
+          </a:p>
+        </p:txBody>
+      </p:sp>
+      <p:sp>
+        <p:nvSpPr>
+          <p:cNvPr id="3" name="Content Placeholder 2">
+            <a:extLst>
+              <a:ext uri="{FF2B5EF4-FFF2-40B4-BE49-F238E27FC236}">
+                <a16:creationId xmlns:a16="http://schemas.microsoft.com/office/drawing/2014/main" id="{0231FD74-BF70-994E-EC2D-9A018250DD40}"/>
+              </a:ext>
+            </a:extLst>
+          </p:cNvPr>
+          <p:cNvSpPr>
+            <a:spLocks noGrp="1"/>
+          </p:cNvSpPr>
+          <p:nvPr>
+            <p:ph idx="1"/>
+          </p:nvPr>
+        </p:nvSpPr>
+        <p:spPr>
+          <a:xfrm>
+            <a:off x="838200" y="1271016"/>
+            <a:ext cx="3642360" cy="4905947"/>
+          </a:xfrm>
+        </p:spPr>
+        <p:txBody>
+          <a:bodyPr/>
+          <a:lstStyle/>
+          <a:p>
+            <a:r>
+              <a:rPr lang="en-GB" b="1" dirty="0"/>
+              <a:t>Main Body</a:t>
+            </a:r>
+          </a:p>
+          <a:p>
+            <a:endParaRPr lang="en-GB" dirty="0"/>
+          </a:p>
+          <a:p>
+            <a:r>
+              <a:rPr lang="en-GB" dirty="0"/>
+              <a:t>Introduction </a:t>
+            </a:r>
+          </a:p>
+          <a:p>
+            <a:r>
+              <a:rPr lang="en-GB" dirty="0"/>
+              <a:t>Chapters </a:t>
+            </a:r>
+          </a:p>
+          <a:p>
+            <a:r>
+              <a:rPr lang="en-GB" dirty="0"/>
+              <a:t>End Project Report</a:t>
+            </a:r>
+          </a:p>
+          <a:p>
+            <a:r>
+              <a:rPr lang="en-GB" dirty="0"/>
+              <a:t>Reflections </a:t>
+            </a:r>
+          </a:p>
+          <a:p>
+            <a:r>
+              <a:rPr lang="en-GB" dirty="0"/>
+              <a:t>Conclusions </a:t>
+            </a:r>
+          </a:p>
+          <a:p>
+            <a:r>
+              <a:rPr lang="en-GB" dirty="0"/>
+              <a:t>References / Bibliography</a:t>
+            </a:r>
+          </a:p>
+        </p:txBody>
+      </p:sp>
+      <p:sp>
+        <p:nvSpPr>
+          <p:cNvPr id="4" name="Content Placeholder 2">
+            <a:extLst>
+              <a:ext uri="{FF2B5EF4-FFF2-40B4-BE49-F238E27FC236}">
+                <a16:creationId xmlns:a16="http://schemas.microsoft.com/office/drawing/2014/main" id="{D714DBD6-5363-0D24-2AC8-5DEAC28B5004}"/>
+              </a:ext>
+            </a:extLst>
+          </p:cNvPr>
+          <p:cNvSpPr txBox="1">
+            <a:spLocks/>
+          </p:cNvSpPr>
+          <p:nvPr/>
+        </p:nvSpPr>
+        <p:spPr>
+          <a:xfrm>
+            <a:off x="5315712" y="618744"/>
+            <a:ext cx="6038088" cy="5233415"/>
+          </a:xfrm>
+          <a:prstGeom prst="rect">
+            <a:avLst/>
+          </a:prstGeom>
+        </p:spPr>
+        <p:txBody>
+          <a:bodyPr vert="horz" lIns="91440" tIns="45720" rIns="91440" bIns="45720" rtlCol="0">
+            <a:normAutofit fontScale="92500" lnSpcReduction="10000"/>
+          </a:bodyPr>
+          <a:lstStyle>
+            <a:lvl1pPr marL="228600" indent="-228600" algn="l" defTabSz="914400" rtl="0" eaLnBrk="1" latinLnBrk="0" hangingPunct="1">
+              <a:lnSpc>
+                <a:spcPct val="90000"/>
+              </a:lnSpc>
+              <a:spcBef>
+                <a:spcPts val="1000"/>
+              </a:spcBef>
+              <a:buFont typeface="Arial" panose="020B0604020202020204" pitchFamily="34" charset="0"/>
+              <a:buChar char="•"/>
+              <a:defRPr sz="2800" kern="1200">
+                <a:solidFill>
+                  <a:schemeClr val="tx1"/>
+                </a:solidFill>
+                <a:latin typeface="+mn-lt"/>
+                <a:ea typeface="+mn-ea"/>
+                <a:cs typeface="+mn-cs"/>
+              </a:defRPr>
+            </a:lvl1pPr>
+            <a:lvl2pPr marL="685800" indent="-228600" algn="l" defTabSz="914400" rtl="0" eaLnBrk="1" latinLnBrk="0" hangingPunct="1">
+              <a:lnSpc>
+                <a:spcPct val="90000"/>
+              </a:lnSpc>
+              <a:spcBef>
+                <a:spcPts val="500"/>
+              </a:spcBef>
+              <a:buFont typeface="Arial" panose="020B0604020202020204" pitchFamily="34" charset="0"/>
+              <a:buChar char="•"/>
+              <a:defRPr sz="2400" kern="1200">
+                <a:solidFill>
+                  <a:schemeClr val="tx1"/>
+                </a:solidFill>
+                <a:latin typeface="+mn-lt"/>
+                <a:ea typeface="+mn-ea"/>
+                <a:cs typeface="+mn-cs"/>
+              </a:defRPr>
+            </a:lvl2pPr>
+            <a:lvl3pPr marL="1143000" indent="-228600" algn="l" defTabSz="914400" rtl="0" eaLnBrk="1" latinLnBrk="0" hangingPunct="1">
+              <a:lnSpc>
+                <a:spcPct val="90000"/>
+              </a:lnSpc>
+              <a:spcBef>
+                <a:spcPts val="500"/>
+              </a:spcBef>
+              <a:buFont typeface="Arial" panose="020B0604020202020204" pitchFamily="34" charset="0"/>
+              <a:buChar char="•"/>
+              <a:defRPr sz="2000" kern="1200">
+                <a:solidFill>
+                  <a:schemeClr val="tx1"/>
+                </a:solidFill>
+                <a:latin typeface="+mn-lt"/>
+                <a:ea typeface="+mn-ea"/>
+                <a:cs typeface="+mn-cs"/>
+              </a:defRPr>
+            </a:lvl3pPr>
+            <a:lvl4pPr marL="1600200" indent="-228600" algn="l" defTabSz="914400" rtl="0" eaLnBrk="1" latinLnBrk="0" hangingPunct="1">
+              <a:lnSpc>
+                <a:spcPct val="90000"/>
+              </a:lnSpc>
+              <a:spcBef>
+                <a:spcPts val="500"/>
+              </a:spcBef>
+              <a:buFont typeface="Arial" panose="020B0604020202020204" pitchFamily="34" charset="0"/>
+              <a:buChar char="•"/>
+              <a:defRPr sz="1800" kern="1200">
+                <a:solidFill>
+                  <a:schemeClr val="tx1"/>
+                </a:solidFill>
+                <a:latin typeface="+mn-lt"/>
+                <a:ea typeface="+mn-ea"/>
+                <a:cs typeface="+mn-cs"/>
+              </a:defRPr>
+            </a:lvl4pPr>
+            <a:lvl5pPr marL="2057400" indent="-228600" algn="l" defTabSz="914400" rtl="0" eaLnBrk="1" latinLnBrk="0" hangingPunct="1">
+              <a:lnSpc>
+                <a:spcPct val="90000"/>
+              </a:lnSpc>
+              <a:spcBef>
+                <a:spcPts val="500"/>
+              </a:spcBef>
+              <a:buFont typeface="Arial" panose="020B0604020202020204" pitchFamily="34" charset="0"/>
+              <a:buChar char="•"/>
+              <a:defRPr sz="1800" kern="1200">
+                <a:solidFill>
+                  <a:schemeClr val="tx1"/>
+                </a:solidFill>
+                <a:latin typeface="+mn-lt"/>
+                <a:ea typeface="+mn-ea"/>
+                <a:cs typeface="+mn-cs"/>
+              </a:defRPr>
+            </a:lvl5pPr>
+            <a:lvl6pPr marL="2514600" indent="-228600" algn="l" defTabSz="914400" rtl="0" eaLnBrk="1" latinLnBrk="0" hangingPunct="1">
+              <a:lnSpc>
+                <a:spcPct val="90000"/>
+              </a:lnSpc>
+              <a:spcBef>
+                <a:spcPts val="500"/>
+              </a:spcBef>
+              <a:buFont typeface="Arial" panose="020B0604020202020204" pitchFamily="34" charset="0"/>
+              <a:buChar char="•"/>
+              <a:defRPr sz="1800" kern="1200">
+                <a:solidFill>
+                  <a:schemeClr val="tx1"/>
+                </a:solidFill>
+                <a:latin typeface="+mn-lt"/>
+                <a:ea typeface="+mn-ea"/>
+                <a:cs typeface="+mn-cs"/>
+              </a:defRPr>
+            </a:lvl6pPr>
+            <a:lvl7pPr marL="2971800" indent="-228600" algn="l" defTabSz="914400" rtl="0" eaLnBrk="1" latinLnBrk="0" hangingPunct="1">
+              <a:lnSpc>
+                <a:spcPct val="90000"/>
+              </a:lnSpc>
+              <a:spcBef>
+                <a:spcPts val="500"/>
+              </a:spcBef>
+              <a:buFont typeface="Arial" panose="020B0604020202020204" pitchFamily="34" charset="0"/>
+              <a:buChar char="•"/>
+              <a:defRPr sz="1800" kern="1200">
+                <a:solidFill>
+                  <a:schemeClr val="tx1"/>
+                </a:solidFill>
+                <a:latin typeface="+mn-lt"/>
+                <a:ea typeface="+mn-ea"/>
+                <a:cs typeface="+mn-cs"/>
+              </a:defRPr>
+            </a:lvl7pPr>
+            <a:lvl8pPr marL="3429000" indent="-228600" algn="l" defTabSz="914400" rtl="0" eaLnBrk="1" latinLnBrk="0" hangingPunct="1">
+              <a:lnSpc>
+                <a:spcPct val="90000"/>
+              </a:lnSpc>
+              <a:spcBef>
+                <a:spcPts val="500"/>
+              </a:spcBef>
+              <a:buFont typeface="Arial" panose="020B0604020202020204" pitchFamily="34" charset="0"/>
+              <a:buChar char="•"/>
+              <a:defRPr sz="1800" kern="1200">
+                <a:solidFill>
+                  <a:schemeClr val="tx1"/>
+                </a:solidFill>
+                <a:latin typeface="+mn-lt"/>
+                <a:ea typeface="+mn-ea"/>
+                <a:cs typeface="+mn-cs"/>
+              </a:defRPr>
+            </a:lvl8pPr>
+            <a:lvl9pPr marL="3886200" indent="-228600" algn="l" defTabSz="914400" rtl="0" eaLnBrk="1" latinLnBrk="0" hangingPunct="1">
+              <a:lnSpc>
+                <a:spcPct val="90000"/>
+              </a:lnSpc>
+              <a:spcBef>
+                <a:spcPts val="500"/>
+              </a:spcBef>
+              <a:buFont typeface="Arial" panose="020B0604020202020204" pitchFamily="34" charset="0"/>
+              <a:buChar char="•"/>
+              <a:defRPr sz="1800" kern="1200">
+                <a:solidFill>
+                  <a:schemeClr val="tx1"/>
+                </a:solidFill>
+                <a:latin typeface="+mn-lt"/>
+                <a:ea typeface="+mn-ea"/>
+                <a:cs typeface="+mn-cs"/>
+              </a:defRPr>
+            </a:lvl9pPr>
+          </a:lstStyle>
+          <a:p>
+            <a:pPr>
+              <a:lnSpc>
+                <a:spcPct val="115000"/>
+              </a:lnSpc>
+              <a:spcAft>
+                <a:spcPts val="800"/>
+              </a:spcAft>
+              <a:buNone/>
+            </a:pPr>
+            <a:r>
+              <a:rPr lang="en-GB" sz="1800" dirty="0">
+                <a:effectLst/>
+                <a:latin typeface="Arial" panose="020B0604020202020204" pitchFamily="34" charset="0"/>
+                <a:ea typeface="Calibri" panose="020F0502020204030204" pitchFamily="34" charset="0"/>
+              </a:rPr>
+              <a:t>Example </a:t>
+            </a:r>
+          </a:p>
+          <a:p>
+            <a:pPr marL="342900" lvl="0" indent="-342900">
+              <a:lnSpc>
+                <a:spcPct val="115000"/>
+              </a:lnSpc>
+              <a:buFont typeface="Symbol" panose="05050102010706020507" pitchFamily="18" charset="2"/>
+              <a:buChar char=""/>
+            </a:pPr>
+            <a:r>
+              <a:rPr lang="en-GB" sz="1800" dirty="0">
+                <a:effectLst/>
+                <a:latin typeface="Arial" panose="020B0604020202020204" pitchFamily="34" charset="0"/>
+                <a:ea typeface="Calibri" panose="020F0502020204030204" pitchFamily="34" charset="0"/>
+              </a:rPr>
+              <a:t>Introduction </a:t>
+            </a:r>
+          </a:p>
+          <a:p>
+            <a:pPr marL="342900" lvl="0" indent="-342900">
+              <a:lnSpc>
+                <a:spcPct val="115000"/>
+              </a:lnSpc>
+              <a:buFont typeface="Symbol" panose="05050102010706020507" pitchFamily="18" charset="2"/>
+              <a:buChar char=""/>
+            </a:pPr>
+            <a:r>
+              <a:rPr lang="en-GB" sz="1800" dirty="0">
+                <a:effectLst/>
+                <a:latin typeface="Arial" panose="020B0604020202020204" pitchFamily="34" charset="0"/>
+                <a:ea typeface="Calibri" panose="020F0502020204030204" pitchFamily="34" charset="0"/>
+              </a:rPr>
+              <a:t>Background, objectives &amp; deliverables </a:t>
+            </a:r>
+          </a:p>
+          <a:p>
+            <a:pPr marL="342900" lvl="0" indent="-342900">
+              <a:lnSpc>
+                <a:spcPct val="115000"/>
+              </a:lnSpc>
+              <a:buFont typeface="Symbol" panose="05050102010706020507" pitchFamily="18" charset="2"/>
+              <a:buChar char=""/>
+            </a:pPr>
+            <a:r>
+              <a:rPr lang="en-GB" sz="1800" dirty="0">
+                <a:effectLst/>
+                <a:latin typeface="Arial" panose="020B0604020202020204" pitchFamily="34" charset="0"/>
+                <a:ea typeface="Calibri" panose="020F0502020204030204" pitchFamily="34" charset="0"/>
+              </a:rPr>
+              <a:t>Literature review (if applicable.  Most usually found in a research project)</a:t>
+            </a:r>
+          </a:p>
+          <a:p>
+            <a:pPr marL="342900" lvl="0" indent="-342900">
+              <a:lnSpc>
+                <a:spcPct val="115000"/>
+              </a:lnSpc>
+              <a:buFont typeface="Symbol" panose="05050102010706020507" pitchFamily="18" charset="2"/>
+              <a:buChar char=""/>
+            </a:pPr>
+            <a:r>
+              <a:rPr lang="en-GB" sz="1800" dirty="0">
+                <a:effectLst/>
+                <a:latin typeface="Arial" panose="020B0604020202020204" pitchFamily="34" charset="0"/>
+                <a:ea typeface="Calibri" panose="020F0502020204030204" pitchFamily="34" charset="0"/>
+              </a:rPr>
+              <a:t>Method of approach (or Methodology if a research project)</a:t>
+            </a:r>
+          </a:p>
+          <a:p>
+            <a:pPr marL="342900" lvl="0" indent="-342900">
+              <a:lnSpc>
+                <a:spcPct val="115000"/>
+              </a:lnSpc>
+              <a:buFont typeface="Symbol" panose="05050102010706020507" pitchFamily="18" charset="2"/>
+              <a:buChar char=""/>
+            </a:pPr>
+            <a:r>
+              <a:rPr lang="en-GB" sz="1800" dirty="0">
+                <a:effectLst/>
+                <a:latin typeface="Arial" panose="020B0604020202020204" pitchFamily="34" charset="0"/>
+                <a:ea typeface="Calibri" panose="020F0502020204030204" pitchFamily="34" charset="0"/>
+              </a:rPr>
+              <a:t>Legal, social, ethical and professional issues </a:t>
+            </a:r>
+          </a:p>
+          <a:p>
+            <a:pPr marL="342900" lvl="0" indent="-342900">
+              <a:lnSpc>
+                <a:spcPct val="115000"/>
+              </a:lnSpc>
+              <a:buFont typeface="Symbol" panose="05050102010706020507" pitchFamily="18" charset="2"/>
+              <a:buChar char=""/>
+            </a:pPr>
+            <a:r>
+              <a:rPr lang="en-GB" sz="1800" dirty="0">
+                <a:effectLst/>
+                <a:latin typeface="Arial" panose="020B0604020202020204" pitchFamily="34" charset="0"/>
+                <a:ea typeface="Calibri" panose="020F0502020204030204" pitchFamily="34" charset="0"/>
+              </a:rPr>
+              <a:t>Project management</a:t>
+            </a:r>
+          </a:p>
+          <a:p>
+            <a:pPr marL="342900" lvl="0" indent="-342900">
+              <a:lnSpc>
+                <a:spcPct val="115000"/>
+              </a:lnSpc>
+              <a:buFont typeface="Symbol" panose="05050102010706020507" pitchFamily="18" charset="2"/>
+              <a:buChar char=""/>
+            </a:pPr>
+            <a:r>
+              <a:rPr lang="en-GB" sz="1800" dirty="0">
+                <a:effectLst/>
+                <a:latin typeface="Arial" panose="020B0604020202020204" pitchFamily="34" charset="0"/>
+                <a:ea typeface="Calibri" panose="020F0502020204030204" pitchFamily="34" charset="0"/>
+              </a:rPr>
+              <a:t>End-project report</a:t>
+            </a:r>
+          </a:p>
+          <a:p>
+            <a:pPr marL="342900" lvl="0" indent="-342900">
+              <a:lnSpc>
+                <a:spcPct val="115000"/>
+              </a:lnSpc>
+              <a:buFont typeface="Symbol" panose="05050102010706020507" pitchFamily="18" charset="2"/>
+              <a:buChar char=""/>
+            </a:pPr>
+            <a:r>
+              <a:rPr lang="en-GB" sz="1800" dirty="0">
+                <a:effectLst/>
+                <a:latin typeface="Arial" panose="020B0604020202020204" pitchFamily="34" charset="0"/>
+                <a:ea typeface="Calibri" panose="020F0502020204030204" pitchFamily="34" charset="0"/>
+              </a:rPr>
+              <a:t>Project reflections</a:t>
+            </a:r>
+          </a:p>
+          <a:p>
+            <a:pPr marL="342900" lvl="0" indent="-342900">
+              <a:lnSpc>
+                <a:spcPct val="115000"/>
+              </a:lnSpc>
+              <a:buFont typeface="Symbol" panose="05050102010706020507" pitchFamily="18" charset="2"/>
+              <a:buChar char=""/>
+            </a:pPr>
+            <a:r>
+              <a:rPr lang="en-GB" sz="1800" dirty="0">
+                <a:effectLst/>
+                <a:latin typeface="Arial" panose="020B0604020202020204" pitchFamily="34" charset="0"/>
+                <a:ea typeface="Calibri" panose="020F0502020204030204" pitchFamily="34" charset="0"/>
+              </a:rPr>
+              <a:t>Conclusions</a:t>
+            </a:r>
+          </a:p>
+          <a:p>
+            <a:pPr marL="342900" lvl="0" indent="-342900">
+              <a:lnSpc>
+                <a:spcPct val="115000"/>
+              </a:lnSpc>
+              <a:spcAft>
+                <a:spcPts val="800"/>
+              </a:spcAft>
+              <a:buFont typeface="Symbol" panose="05050102010706020507" pitchFamily="18" charset="2"/>
+              <a:buChar char=""/>
+            </a:pPr>
+            <a:r>
+              <a:rPr lang="en-GB" sz="1800" dirty="0">
+                <a:effectLst/>
+                <a:latin typeface="Arial" panose="020B0604020202020204" pitchFamily="34" charset="0"/>
+                <a:ea typeface="Calibri" panose="020F0502020204030204" pitchFamily="34" charset="0"/>
+              </a:rPr>
+              <a:t>Reference list and bibliography</a:t>
+            </a:r>
+          </a:p>
+          <a:p>
+            <a:pPr>
+              <a:lnSpc>
+                <a:spcPct val="115000"/>
+              </a:lnSpc>
+              <a:spcAft>
+                <a:spcPts val="800"/>
+              </a:spcAft>
+              <a:buNone/>
+            </a:pPr>
+            <a:endParaRPr lang="en-GB" sz="1800" dirty="0">
+              <a:effectLst/>
+              <a:latin typeface="Arial" panose="020B0604020202020204" pitchFamily="34" charset="0"/>
+              <a:ea typeface="Calibri" panose="020F0502020204030204" pitchFamily="34" charset="0"/>
+            </a:endParaRPr>
+          </a:p>
+        </p:txBody>
+      </p:sp>
+    </p:spTree>
+    <p:extLst>
+      <p:ext uri="{BB962C8B-B14F-4D97-AF65-F5344CB8AC3E}">
+        <p14:creationId xmlns:p14="http://schemas.microsoft.com/office/powerpoint/2010/main" val="3657470224"/>
+      </p:ext>
+    </p:extLst>
+  </p:cSld>
+  <p:clrMapOvr>
+    <a:masterClrMapping/>
+  </p:clrMapOvr>
+</p:sld>
+</file>
+
+<file path=ppt/slides/slide13.xml><?xml version="1.0" encoding="utf-8"?>
+<p:sld xmlns:a="http://schemas.openxmlformats.org/drawingml/2006/main" xmlns:r="http://schemas.openxmlformats.org/officeDocument/2006/relationships" xmlns:p="http://schemas.openxmlformats.org/presentationml/2006/main">
+  <p:cSld>
+    <p:spTree>
+      <p:nvGrpSpPr>
+        <p:cNvPr id="1" name=""/>
+        <p:cNvGrpSpPr/>
+        <p:nvPr/>
+      </p:nvGrpSpPr>
+      <p:grpSpPr>
+        <a:xfrm>
+          <a:off x="0" y="0"/>
+          <a:ext cx="0" cy="0"/>
+          <a:chOff x="0" y="0"/>
+          <a:chExt cx="0" cy="0"/>
+        </a:xfrm>
+      </p:grpSpPr>
+      <p:sp>
+        <p:nvSpPr>
+          <p:cNvPr id="2" name="Title 1">
+            <a:extLst>
+              <a:ext uri="{FF2B5EF4-FFF2-40B4-BE49-F238E27FC236}">
+                <a16:creationId xmlns:a16="http://schemas.microsoft.com/office/drawing/2014/main" id="{E4A5284B-2B78-6C72-4731-8C9C1CC1FE71}"/>
+              </a:ext>
+            </a:extLst>
+          </p:cNvPr>
+          <p:cNvSpPr>
+            <a:spLocks noGrp="1"/>
+          </p:cNvSpPr>
+          <p:nvPr>
+            <p:ph type="title"/>
+          </p:nvPr>
+        </p:nvSpPr>
+        <p:spPr/>
+        <p:txBody>
+          <a:bodyPr/>
+          <a:lstStyle/>
+          <a:p>
+            <a:r>
+              <a:rPr lang="en-GB" dirty="0"/>
+              <a:t>Chapters</a:t>
+            </a:r>
+          </a:p>
+        </p:txBody>
+      </p:sp>
+      <p:sp>
+        <p:nvSpPr>
+          <p:cNvPr id="3" name="Content Placeholder 2">
+            <a:extLst>
+              <a:ext uri="{FF2B5EF4-FFF2-40B4-BE49-F238E27FC236}">
+                <a16:creationId xmlns:a16="http://schemas.microsoft.com/office/drawing/2014/main" id="{CE06AFE5-056A-8A3D-3AC6-9560571FC194}"/>
+              </a:ext>
+            </a:extLst>
+          </p:cNvPr>
+          <p:cNvSpPr>
+            <a:spLocks noGrp="1"/>
+          </p:cNvSpPr>
+          <p:nvPr>
+            <p:ph idx="1"/>
+          </p:nvPr>
+        </p:nvSpPr>
+        <p:spPr/>
+        <p:txBody>
+          <a:bodyPr/>
+          <a:lstStyle/>
+          <a:p>
+            <a:r>
+              <a:rPr lang="en-GB" dirty="0"/>
+              <a:t>Background , Objectives &amp; Deliverables </a:t>
+            </a:r>
+          </a:p>
+          <a:p>
+            <a:r>
+              <a:rPr lang="en-GB" dirty="0"/>
+              <a:t>Lit review</a:t>
+            </a:r>
+          </a:p>
+          <a:p>
+            <a:r>
+              <a:rPr lang="en-GB" dirty="0"/>
+              <a:t>Method of approach </a:t>
+            </a:r>
+          </a:p>
+          <a:p>
+            <a:r>
+              <a:rPr lang="en-GB" dirty="0"/>
+              <a:t>User Testing </a:t>
+            </a:r>
+          </a:p>
+          <a:p>
+            <a:r>
+              <a:rPr lang="en-GB" dirty="0"/>
+              <a:t>Legal social ethical professional</a:t>
+            </a:r>
+          </a:p>
+          <a:p>
+            <a:r>
+              <a:rPr lang="en-GB" dirty="0"/>
+              <a:t>Project Management </a:t>
+            </a:r>
+          </a:p>
+          <a:p>
+            <a:r>
+              <a:rPr lang="en-GB" dirty="0"/>
+              <a:t>Implementation </a:t>
+            </a:r>
+          </a:p>
+          <a:p>
+            <a:pPr marL="0" indent="0">
+              <a:buNone/>
+            </a:pPr>
+            <a:endParaRPr lang="en-GB" dirty="0"/>
+          </a:p>
+        </p:txBody>
+      </p:sp>
+    </p:spTree>
+    <p:extLst>
+      <p:ext uri="{BB962C8B-B14F-4D97-AF65-F5344CB8AC3E}">
+        <p14:creationId xmlns:p14="http://schemas.microsoft.com/office/powerpoint/2010/main" val="640221836"/>
+      </p:ext>
+    </p:extLst>
+  </p:cSld>
+  <p:clrMapOvr>
+    <a:masterClrMapping/>
+  </p:clrMapOvr>
+</p:sld>
+</file>
+
+<file path=ppt/slides/slide14.xml><?xml version="1.0" encoding="utf-8"?>
+<p:sld xmlns:a="http://schemas.openxmlformats.org/drawingml/2006/main" xmlns:r="http://schemas.openxmlformats.org/officeDocument/2006/relationships" xmlns:p="http://schemas.openxmlformats.org/presentationml/2006/main">
+  <p:cSld>
+    <p:spTree>
+      <p:nvGrpSpPr>
+        <p:cNvPr id="1" name="">
+          <a:extLst>
+            <a:ext uri="{FF2B5EF4-FFF2-40B4-BE49-F238E27FC236}">
+              <a16:creationId xmlns:a16="http://schemas.microsoft.com/office/drawing/2014/main" id="{027724F4-6D2C-12C5-7A35-184FC984564F}"/>
+            </a:ext>
+          </a:extLst>
+        </p:cNvPr>
+        <p:cNvGrpSpPr/>
+        <p:nvPr/>
+      </p:nvGrpSpPr>
+      <p:grpSpPr>
+        <a:xfrm>
+          <a:off x="0" y="0"/>
+          <a:ext cx="0" cy="0"/>
+          <a:chOff x="0" y="0"/>
+          <a:chExt cx="0" cy="0"/>
+        </a:xfrm>
+      </p:grpSpPr>
+      <p:sp>
+        <p:nvSpPr>
+          <p:cNvPr id="2" name="Title 1">
+            <a:extLst>
+              <a:ext uri="{FF2B5EF4-FFF2-40B4-BE49-F238E27FC236}">
+                <a16:creationId xmlns:a16="http://schemas.microsoft.com/office/drawing/2014/main" id="{CABF0469-FC34-120E-35CB-F5DC5FA0EDCB}"/>
+              </a:ext>
+            </a:extLst>
+          </p:cNvPr>
+          <p:cNvSpPr>
+            <a:spLocks noGrp="1"/>
+          </p:cNvSpPr>
+          <p:nvPr>
+            <p:ph type="title"/>
+          </p:nvPr>
+        </p:nvSpPr>
+        <p:spPr/>
+        <p:txBody>
+          <a:bodyPr/>
+          <a:lstStyle/>
+          <a:p>
+            <a:r>
+              <a:rPr lang="en-GB" dirty="0"/>
+              <a:t>Chapters</a:t>
+            </a:r>
+          </a:p>
+        </p:txBody>
+      </p:sp>
+      <p:sp>
+        <p:nvSpPr>
+          <p:cNvPr id="3" name="Content Placeholder 2">
+            <a:extLst>
+              <a:ext uri="{FF2B5EF4-FFF2-40B4-BE49-F238E27FC236}">
+                <a16:creationId xmlns:a16="http://schemas.microsoft.com/office/drawing/2014/main" id="{529B8C6C-8B27-E3EC-8F06-7B2E9C77AFD6}"/>
+              </a:ext>
+            </a:extLst>
+          </p:cNvPr>
+          <p:cNvSpPr>
+            <a:spLocks noGrp="1"/>
+          </p:cNvSpPr>
+          <p:nvPr>
+            <p:ph idx="1"/>
+          </p:nvPr>
+        </p:nvSpPr>
+        <p:spPr/>
+        <p:txBody>
+          <a:bodyPr/>
+          <a:lstStyle/>
+          <a:p>
+            <a:r>
+              <a:rPr lang="en-GB" u="sng" dirty="0"/>
+              <a:t>Background , Objectives &amp; Deliverables </a:t>
+            </a:r>
+          </a:p>
+          <a:p>
+            <a:pPr marL="0" indent="0">
+              <a:buNone/>
+            </a:pPr>
+            <a:r>
+              <a:rPr lang="en-GB" dirty="0"/>
+              <a:t>Project background, competitor Analysis , Project objectives and deliverables </a:t>
+            </a:r>
+          </a:p>
+          <a:p>
+            <a:r>
+              <a:rPr lang="en-GB" u="sng" dirty="0"/>
+              <a:t>Lit review </a:t>
+            </a:r>
+          </a:p>
+          <a:p>
+            <a:r>
+              <a:rPr lang="en-GB" u="sng" dirty="0"/>
+              <a:t>Method of Approach </a:t>
+            </a:r>
+          </a:p>
+          <a:p>
+            <a:pPr marL="0" indent="0">
+              <a:buNone/>
+            </a:pPr>
+            <a:r>
+              <a:rPr lang="en-GB" dirty="0"/>
+              <a:t> Methodologies (How I created the design implementation) , Technologies, Project Management Approach ( Trello ) , Supervisor meetings</a:t>
+            </a:r>
+          </a:p>
+        </p:txBody>
+      </p:sp>
+    </p:spTree>
+    <p:extLst>
+      <p:ext uri="{BB962C8B-B14F-4D97-AF65-F5344CB8AC3E}">
+        <p14:creationId xmlns:p14="http://schemas.microsoft.com/office/powerpoint/2010/main" val="1119958177"/>
+      </p:ext>
+    </p:extLst>
+  </p:cSld>
+  <p:clrMapOvr>
+    <a:masterClrMapping/>
+  </p:clrMapOvr>
+</p:sld>
+</file>
+
+<file path=ppt/slides/slide15.xml><?xml version="1.0" encoding="utf-8"?>
+<p:sld xmlns:a="http://schemas.openxmlformats.org/drawingml/2006/main" xmlns:r="http://schemas.openxmlformats.org/officeDocument/2006/relationships" xmlns:p="http://schemas.openxmlformats.org/presentationml/2006/main">
+  <p:cSld>
+    <p:spTree>
+      <p:nvGrpSpPr>
+        <p:cNvPr id="1" name=""/>
+        <p:cNvGrpSpPr/>
+        <p:nvPr/>
+      </p:nvGrpSpPr>
+      <p:grpSpPr>
+        <a:xfrm>
+          <a:off x="0" y="0"/>
+          <a:ext cx="0" cy="0"/>
+          <a:chOff x="0" y="0"/>
+          <a:chExt cx="0" cy="0"/>
+        </a:xfrm>
+      </p:grpSpPr>
+      <p:sp>
+        <p:nvSpPr>
+          <p:cNvPr id="3" name="Content Placeholder 2">
+            <a:extLst>
+              <a:ext uri="{FF2B5EF4-FFF2-40B4-BE49-F238E27FC236}">
+                <a16:creationId xmlns:a16="http://schemas.microsoft.com/office/drawing/2014/main" id="{7C2CF119-C955-F860-0960-F8935F2740BB}"/>
+              </a:ext>
+            </a:extLst>
+          </p:cNvPr>
+          <p:cNvSpPr>
+            <a:spLocks noGrp="1"/>
+          </p:cNvSpPr>
+          <p:nvPr>
+            <p:ph idx="1"/>
+          </p:nvPr>
+        </p:nvSpPr>
+        <p:spPr>
+          <a:xfrm>
+            <a:off x="838200" y="365760"/>
+            <a:ext cx="10515600" cy="5811203"/>
+          </a:xfrm>
+        </p:spPr>
+        <p:txBody>
+          <a:bodyPr/>
+          <a:lstStyle/>
+          <a:p>
+            <a:pPr marL="0" indent="0">
+              <a:buNone/>
+            </a:pPr>
+            <a:r>
+              <a:rPr lang="en-GB" u="sng" dirty="0"/>
+              <a:t>Issues and Considerations ?</a:t>
+            </a:r>
+          </a:p>
+          <a:p>
+            <a:r>
+              <a:rPr lang="en-GB" dirty="0"/>
+              <a:t>Legal</a:t>
+            </a:r>
+          </a:p>
+          <a:p>
+            <a:r>
+              <a:rPr lang="en-GB" dirty="0"/>
+              <a:t>Social </a:t>
+            </a:r>
+          </a:p>
+          <a:p>
+            <a:r>
+              <a:rPr lang="en-GB" dirty="0"/>
+              <a:t>Ethical </a:t>
+            </a:r>
+          </a:p>
+          <a:p>
+            <a:r>
+              <a:rPr lang="en-GB" dirty="0"/>
+              <a:t>PEGI rating</a:t>
+            </a:r>
+          </a:p>
+          <a:p>
+            <a:pPr marL="0" indent="0">
+              <a:buNone/>
+            </a:pPr>
+            <a:r>
+              <a:rPr lang="en-GB" u="sng" dirty="0"/>
+              <a:t>Project Management tools</a:t>
+            </a:r>
+          </a:p>
+          <a:p>
+            <a:r>
+              <a:rPr lang="en-GB" dirty="0"/>
+              <a:t>Project Management  (</a:t>
+            </a:r>
+            <a:r>
+              <a:rPr lang="en-GB" dirty="0" err="1"/>
+              <a:t>Devlogs</a:t>
+            </a:r>
+            <a:r>
+              <a:rPr lang="en-GB" dirty="0"/>
+              <a:t> ) (Trello)</a:t>
+            </a:r>
+          </a:p>
+          <a:p>
+            <a:r>
+              <a:rPr lang="en-GB" dirty="0"/>
+              <a:t>Version Control (</a:t>
+            </a:r>
+            <a:r>
+              <a:rPr lang="en-GB" dirty="0" err="1"/>
+              <a:t>Github</a:t>
+            </a:r>
+            <a:r>
+              <a:rPr lang="en-GB" dirty="0"/>
+              <a:t> ?) </a:t>
+            </a:r>
+          </a:p>
+          <a:p>
+            <a:r>
+              <a:rPr lang="en-GB" dirty="0"/>
+              <a:t>Weekly meetings  </a:t>
+            </a:r>
+          </a:p>
+          <a:p>
+            <a:pPr marL="0" indent="0">
+              <a:buNone/>
+            </a:pPr>
+            <a:endParaRPr lang="en-GB" dirty="0"/>
+          </a:p>
+        </p:txBody>
+      </p:sp>
+    </p:spTree>
+    <p:extLst>
+      <p:ext uri="{BB962C8B-B14F-4D97-AF65-F5344CB8AC3E}">
+        <p14:creationId xmlns:p14="http://schemas.microsoft.com/office/powerpoint/2010/main" val="2027209302"/>
+      </p:ext>
+    </p:extLst>
+  </p:cSld>
+  <p:clrMapOvr>
+    <a:masterClrMapping/>
+  </p:clrMapOvr>
+</p:sld>
+</file>
+
+<file path=ppt/slides/slide16.xml><?xml version="1.0" encoding="utf-8"?>
+<p:sld xmlns:a="http://schemas.openxmlformats.org/drawingml/2006/main" xmlns:r="http://schemas.openxmlformats.org/officeDocument/2006/relationships" xmlns:p="http://schemas.openxmlformats.org/presentationml/2006/main">
+  <p:cSld>
+    <p:spTree>
+      <p:nvGrpSpPr>
+        <p:cNvPr id="1" name=""/>
+        <p:cNvGrpSpPr/>
+        <p:nvPr/>
+      </p:nvGrpSpPr>
+      <p:grpSpPr>
+        <a:xfrm>
+          <a:off x="0" y="0"/>
+          <a:ext cx="0" cy="0"/>
+          <a:chOff x="0" y="0"/>
+          <a:chExt cx="0" cy="0"/>
+        </a:xfrm>
+      </p:grpSpPr>
+      <p:sp>
+        <p:nvSpPr>
+          <p:cNvPr id="2" name="Title 1">
+            <a:extLst>
+              <a:ext uri="{FF2B5EF4-FFF2-40B4-BE49-F238E27FC236}">
+                <a16:creationId xmlns:a16="http://schemas.microsoft.com/office/drawing/2014/main" id="{2017CAD9-CFDC-9744-AA0D-E7940B1A9F3C}"/>
+              </a:ext>
+            </a:extLst>
+          </p:cNvPr>
+          <p:cNvSpPr>
+            <a:spLocks noGrp="1"/>
+          </p:cNvSpPr>
+          <p:nvPr>
+            <p:ph type="title"/>
+          </p:nvPr>
+        </p:nvSpPr>
+        <p:spPr/>
+        <p:txBody>
+          <a:bodyPr/>
+          <a:lstStyle/>
+          <a:p>
+            <a:r>
+              <a:rPr lang="en-GB" dirty="0"/>
+              <a:t>Implementation </a:t>
+            </a:r>
+          </a:p>
+        </p:txBody>
+      </p:sp>
+      <p:sp>
+        <p:nvSpPr>
+          <p:cNvPr id="3" name="Content Placeholder 2">
+            <a:extLst>
+              <a:ext uri="{FF2B5EF4-FFF2-40B4-BE49-F238E27FC236}">
+                <a16:creationId xmlns:a16="http://schemas.microsoft.com/office/drawing/2014/main" id="{C92EEC66-FAFD-F359-C432-4B6C94FA981C}"/>
+              </a:ext>
+            </a:extLst>
+          </p:cNvPr>
+          <p:cNvSpPr>
+            <a:spLocks noGrp="1"/>
+          </p:cNvSpPr>
+          <p:nvPr>
+            <p:ph idx="1"/>
+          </p:nvPr>
+        </p:nvSpPr>
+        <p:spPr/>
+        <p:txBody>
+          <a:bodyPr/>
+          <a:lstStyle/>
+          <a:p>
+            <a:r>
+              <a:rPr lang="en-GB" dirty="0"/>
+              <a:t>IDK IF I do a planning section but if so </a:t>
+            </a:r>
+          </a:p>
+          <a:p>
+            <a:r>
+              <a:rPr lang="en-GB" dirty="0"/>
+              <a:t>Planning – GDD – DESIGNS </a:t>
+            </a:r>
+          </a:p>
+          <a:p>
+            <a:r>
+              <a:rPr lang="en-GB" dirty="0"/>
+              <a:t>Sprints </a:t>
+            </a:r>
+          </a:p>
+          <a:p>
+            <a:r>
+              <a:rPr lang="en-GB" dirty="0"/>
+              <a:t>User Testing (how I used feedback to refine)</a:t>
+            </a:r>
+          </a:p>
+          <a:p>
+            <a:r>
+              <a:rPr lang="en-GB" dirty="0"/>
+              <a:t>Minimum Viable Product </a:t>
+            </a:r>
+          </a:p>
+          <a:p>
+            <a:r>
+              <a:rPr lang="en-GB" dirty="0"/>
+              <a:t>Minimum </a:t>
+            </a:r>
+            <a:r>
+              <a:rPr lang="en-GB" dirty="0" err="1"/>
+              <a:t>Awsome</a:t>
+            </a:r>
+            <a:r>
+              <a:rPr lang="en-GB" dirty="0"/>
+              <a:t> Product </a:t>
+            </a:r>
+          </a:p>
+        </p:txBody>
+      </p:sp>
+    </p:spTree>
+    <p:extLst>
+      <p:ext uri="{BB962C8B-B14F-4D97-AF65-F5344CB8AC3E}">
+        <p14:creationId xmlns:p14="http://schemas.microsoft.com/office/powerpoint/2010/main" val="840637842"/>
+      </p:ext>
+    </p:extLst>
+  </p:cSld>
+  <p:clrMapOvr>
+    <a:masterClrMapping/>
+  </p:clrMapOvr>
+</p:sld>
+</file>
+
+<file path=ppt/slides/slide17.xml><?xml version="1.0" encoding="utf-8"?>
+<p:sld xmlns:a="http://schemas.openxmlformats.org/drawingml/2006/main" xmlns:r="http://schemas.openxmlformats.org/officeDocument/2006/relationships" xmlns:p="http://schemas.openxmlformats.org/presentationml/2006/main">
+  <p:cSld>
+    <p:spTree>
+      <p:nvGrpSpPr>
+        <p:cNvPr id="1" name=""/>
+        <p:cNvGrpSpPr/>
+        <p:nvPr/>
+      </p:nvGrpSpPr>
+      <p:grpSpPr>
+        <a:xfrm>
+          <a:off x="0" y="0"/>
+          <a:ext cx="0" cy="0"/>
+          <a:chOff x="0" y="0"/>
+          <a:chExt cx="0" cy="0"/>
+        </a:xfrm>
+      </p:grpSpPr>
+      <p:sp>
+        <p:nvSpPr>
+          <p:cNvPr id="2" name="Title 1">
+            <a:extLst>
+              <a:ext uri="{FF2B5EF4-FFF2-40B4-BE49-F238E27FC236}">
+                <a16:creationId xmlns:a16="http://schemas.microsoft.com/office/drawing/2014/main" id="{F58F3967-18E6-8991-E8AE-620BDC2DE720}"/>
+              </a:ext>
+            </a:extLst>
+          </p:cNvPr>
+          <p:cNvSpPr>
+            <a:spLocks noGrp="1"/>
+          </p:cNvSpPr>
+          <p:nvPr>
+            <p:ph type="title"/>
+          </p:nvPr>
+        </p:nvSpPr>
+        <p:spPr/>
+        <p:txBody>
+          <a:bodyPr/>
+          <a:lstStyle/>
+          <a:p>
+            <a:r>
+              <a:rPr lang="en-GB" dirty="0"/>
+              <a:t>JJ MEETINGS </a:t>
+            </a:r>
+          </a:p>
+        </p:txBody>
+      </p:sp>
+      <p:sp>
+        <p:nvSpPr>
+          <p:cNvPr id="3" name="Content Placeholder 2">
+            <a:extLst>
+              <a:ext uri="{FF2B5EF4-FFF2-40B4-BE49-F238E27FC236}">
+                <a16:creationId xmlns:a16="http://schemas.microsoft.com/office/drawing/2014/main" id="{696F8D03-4BA6-E44A-EB92-62C49E851A3A}"/>
+              </a:ext>
+            </a:extLst>
+          </p:cNvPr>
+          <p:cNvSpPr>
+            <a:spLocks noGrp="1"/>
+          </p:cNvSpPr>
+          <p:nvPr>
+            <p:ph idx="1"/>
+          </p:nvPr>
+        </p:nvSpPr>
+        <p:spPr/>
+        <p:txBody>
+          <a:bodyPr/>
+          <a:lstStyle/>
+          <a:p>
+            <a:r>
+              <a:rPr lang="en-GB" dirty="0" err="1"/>
+              <a:t>Implementaiton</a:t>
+            </a:r>
+            <a:r>
+              <a:rPr lang="en-GB" dirty="0"/>
+              <a:t> – GDD, DESIGN LIKE THE MAP THINGS</a:t>
+            </a:r>
+          </a:p>
+          <a:p>
+            <a:r>
+              <a:rPr lang="en-GB" dirty="0"/>
+              <a:t>Methodology is how I created it like the design </a:t>
+            </a:r>
+            <a:r>
+              <a:rPr lang="en-GB" dirty="0" err="1"/>
+              <a:t>implemnation</a:t>
+            </a:r>
+            <a:r>
+              <a:rPr lang="en-GB" dirty="0"/>
+              <a:t> </a:t>
+            </a:r>
+          </a:p>
+          <a:p>
+            <a:r>
+              <a:rPr lang="en-GB" dirty="0"/>
+              <a:t>How I used user testing for feedback to make iterations and </a:t>
+            </a:r>
+            <a:r>
+              <a:rPr lang="en-GB" dirty="0" err="1"/>
+              <a:t>yh</a:t>
+            </a:r>
+            <a:endParaRPr lang="en-GB" dirty="0"/>
+          </a:p>
+          <a:p>
+            <a:r>
+              <a:rPr lang="en-GB"/>
+              <a:t>Analysis </a:t>
+            </a:r>
+          </a:p>
+        </p:txBody>
+      </p:sp>
+    </p:spTree>
+    <p:extLst>
+      <p:ext uri="{BB962C8B-B14F-4D97-AF65-F5344CB8AC3E}">
+        <p14:creationId xmlns:p14="http://schemas.microsoft.com/office/powerpoint/2010/main" val="2649845202"/>
+      </p:ext>
+    </p:extLst>
+  </p:cSld>
+  <p:clrMapOvr>
+    <a:masterClrMapping/>
+  </p:clrMapOvr>
+</p:sld>
+</file>
+
+<file path=ppt/slides/slide18.xml><?xml version="1.0" encoding="utf-8"?>
+<p:sld xmlns:a="http://schemas.openxmlformats.org/drawingml/2006/main" xmlns:r="http://schemas.openxmlformats.org/officeDocument/2006/relationships" xmlns:p="http://schemas.openxmlformats.org/presentationml/2006/main">
+  <p:cSld>
+    <p:spTree>
+      <p:nvGrpSpPr>
+        <p:cNvPr id="1" name=""/>
+        <p:cNvGrpSpPr/>
+        <p:nvPr/>
+      </p:nvGrpSpPr>
+      <p:grpSpPr>
+        <a:xfrm>
+          <a:off x="0" y="0"/>
+          <a:ext cx="0" cy="0"/>
+          <a:chOff x="0" y="0"/>
+          <a:chExt cx="0" cy="0"/>
+        </a:xfrm>
+      </p:grpSpPr>
+      <p:sp>
+        <p:nvSpPr>
+          <p:cNvPr id="2" name="Title 1">
+            <a:extLst>
+              <a:ext uri="{FF2B5EF4-FFF2-40B4-BE49-F238E27FC236}">
+                <a16:creationId xmlns:a16="http://schemas.microsoft.com/office/drawing/2014/main" id="{19B657D5-0D05-CDB3-E622-CC74399D9293}"/>
+              </a:ext>
+            </a:extLst>
+          </p:cNvPr>
+          <p:cNvSpPr>
+            <a:spLocks noGrp="1"/>
+          </p:cNvSpPr>
+          <p:nvPr>
+            <p:ph type="title"/>
+          </p:nvPr>
+        </p:nvSpPr>
+        <p:spPr/>
+        <p:txBody>
+          <a:bodyPr/>
+          <a:lstStyle/>
+          <a:p>
+            <a:r>
+              <a:rPr lang="en-GB" dirty="0"/>
+              <a:t>MOVEMENT 2</a:t>
+            </a:r>
+          </a:p>
+        </p:txBody>
+      </p:sp>
+      <p:sp>
+        <p:nvSpPr>
+          <p:cNvPr id="3" name="Content Placeholder 2">
+            <a:extLst>
+              <a:ext uri="{FF2B5EF4-FFF2-40B4-BE49-F238E27FC236}">
+                <a16:creationId xmlns:a16="http://schemas.microsoft.com/office/drawing/2014/main" id="{6ADAF85F-3274-500B-24F1-77722205A975}"/>
+              </a:ext>
+            </a:extLst>
+          </p:cNvPr>
+          <p:cNvSpPr>
+            <a:spLocks noGrp="1"/>
+          </p:cNvSpPr>
+          <p:nvPr>
+            <p:ph idx="1"/>
+          </p:nvPr>
+        </p:nvSpPr>
+        <p:spPr/>
+        <p:txBody>
+          <a:bodyPr/>
+          <a:lstStyle/>
+          <a:p>
+            <a:r>
+              <a:rPr lang="en-GB" dirty="0"/>
+              <a:t>JUMP ONLY WORKS WHEN HELD</a:t>
+            </a:r>
+          </a:p>
+          <a:p>
+            <a:r>
+              <a:rPr lang="en-GB" dirty="0"/>
+              <a:t>KINDA BUGGY WHEN PLAYER IS BEING PUSHED </a:t>
+            </a:r>
+          </a:p>
+          <a:p>
+            <a:r>
+              <a:rPr lang="en-GB" dirty="0">
+                <a:hlinkClick r:id="rId2"/>
+              </a:rPr>
+              <a:t>https://www.youtube.com/watch?v=_QajrabyTJc&amp;t=848s</a:t>
+            </a:r>
+            <a:endParaRPr lang="en-GB" dirty="0"/>
+          </a:p>
+          <a:p>
+            <a:endParaRPr lang="en-GB" dirty="0"/>
+          </a:p>
+          <a:p>
+            <a:r>
+              <a:rPr lang="en-GB" dirty="0"/>
+              <a:t>Can always revert back to old as  I saved them as  prefabs and old movement in separate folder </a:t>
+            </a:r>
+          </a:p>
+          <a:p>
+            <a:r>
+              <a:rPr lang="en-GB" dirty="0"/>
+              <a:t>Make sure to change movement in lvl1 </a:t>
+            </a:r>
+            <a:r>
+              <a:rPr lang="en-GB" dirty="0" err="1"/>
+              <a:t>aswel</a:t>
+            </a:r>
+            <a:endParaRPr lang="en-GB"/>
+          </a:p>
+          <a:p>
+            <a:endParaRPr lang="en-GB"/>
+          </a:p>
+        </p:txBody>
+      </p:sp>
+    </p:spTree>
+    <p:extLst>
+      <p:ext uri="{BB962C8B-B14F-4D97-AF65-F5344CB8AC3E}">
+        <p14:creationId xmlns:p14="http://schemas.microsoft.com/office/powerpoint/2010/main" val="3653716512"/>
+      </p:ext>
+    </p:extLst>
+  </p:cSld>
+  <p:clrMapOvr>
+    <a:masterClrMapping/>
+  </p:clrMapOvr>
+</p:sld>
+</file>
+
+<file path=ppt/slides/slide19.xml><?xml version="1.0" encoding="utf-8"?>
+<p:sld xmlns:a="http://schemas.openxmlformats.org/drawingml/2006/main" xmlns:r="http://schemas.openxmlformats.org/officeDocument/2006/relationships" xmlns:p="http://schemas.openxmlformats.org/presentationml/2006/main">
+  <p:cSld>
+    <p:spTree>
+      <p:nvGrpSpPr>
+        <p:cNvPr id="1" name=""/>
+        <p:cNvGrpSpPr/>
+        <p:nvPr/>
+      </p:nvGrpSpPr>
+      <p:grpSpPr>
+        <a:xfrm>
+          <a:off x="0" y="0"/>
+          <a:ext cx="0" cy="0"/>
+          <a:chOff x="0" y="0"/>
+          <a:chExt cx="0" cy="0"/>
+        </a:xfrm>
+      </p:grpSpPr>
+      <p:sp>
+        <p:nvSpPr>
+          <p:cNvPr id="2" name="Title 1">
+            <a:extLst>
+              <a:ext uri="{FF2B5EF4-FFF2-40B4-BE49-F238E27FC236}">
                 <a16:creationId xmlns:a16="http://schemas.microsoft.com/office/drawing/2014/main" id="{76F7E7E4-9827-C9EA-41A9-B8C6EF75B3BA}"/>
               </a:ext>
             </a:extLst>
@@ -4330,7 +6026,95 @@
 </p:sld>
 </file>
 
-<file path=ppt/slides/slide12.xml><?xml version="1.0" encoding="utf-8"?>
+<file path=ppt/slides/slide2.xml><?xml version="1.0" encoding="utf-8"?>
+<p:sld xmlns:a="http://schemas.openxmlformats.org/drawingml/2006/main" xmlns:r="http://schemas.openxmlformats.org/officeDocument/2006/relationships" xmlns:p="http://schemas.openxmlformats.org/presentationml/2006/main">
+  <p:cSld>
+    <p:spTree>
+      <p:nvGrpSpPr>
+        <p:cNvPr id="1" name=""/>
+        <p:cNvGrpSpPr/>
+        <p:nvPr/>
+      </p:nvGrpSpPr>
+      <p:grpSpPr>
+        <a:xfrm>
+          <a:off x="0" y="0"/>
+          <a:ext cx="0" cy="0"/>
+          <a:chOff x="0" y="0"/>
+          <a:chExt cx="0" cy="0"/>
+        </a:xfrm>
+      </p:grpSpPr>
+      <p:sp>
+        <p:nvSpPr>
+          <p:cNvPr id="2" name="Title 1">
+            <a:extLst>
+              <a:ext uri="{FF2B5EF4-FFF2-40B4-BE49-F238E27FC236}">
+                <a16:creationId xmlns:a16="http://schemas.microsoft.com/office/drawing/2014/main" id="{73CF15A7-67CA-7E90-6544-7B3816DE7B0A}"/>
+              </a:ext>
+            </a:extLst>
+          </p:cNvPr>
+          <p:cNvSpPr>
+            <a:spLocks noGrp="1"/>
+          </p:cNvSpPr>
+          <p:nvPr>
+            <p:ph type="title"/>
+          </p:nvPr>
+        </p:nvSpPr>
+        <p:spPr/>
+        <p:txBody>
+          <a:bodyPr/>
+          <a:lstStyle/>
+          <a:p>
+            <a:r>
+              <a:rPr lang="en-GB" dirty="0"/>
+              <a:t>How the round works – Script </a:t>
+            </a:r>
+          </a:p>
+        </p:txBody>
+      </p:sp>
+      <p:pic>
+        <p:nvPicPr>
+          <p:cNvPr id="5" name="Picture 4">
+            <a:extLst>
+              <a:ext uri="{FF2B5EF4-FFF2-40B4-BE49-F238E27FC236}">
+                <a16:creationId xmlns:a16="http://schemas.microsoft.com/office/drawing/2014/main" id="{58A0BC6B-E811-B0D9-19BE-1ABC1029471C}"/>
+              </a:ext>
+            </a:extLst>
+          </p:cNvPr>
+          <p:cNvPicPr>
+            <a:picLocks noChangeAspect="1"/>
+          </p:cNvPicPr>
+          <p:nvPr/>
+        </p:nvPicPr>
+        <p:blipFill>
+          <a:blip r:embed="rId2"/>
+          <a:stretch>
+            <a:fillRect/>
+          </a:stretch>
+        </p:blipFill>
+        <p:spPr>
+          <a:xfrm>
+            <a:off x="982661" y="1690688"/>
+            <a:ext cx="5331030" cy="4455219"/>
+          </a:xfrm>
+          <a:prstGeom prst="rect">
+            <a:avLst/>
+          </a:prstGeom>
+        </p:spPr>
+      </p:pic>
+    </p:spTree>
+    <p:extLst>
+      <p:ext uri="{BB962C8B-B14F-4D97-AF65-F5344CB8AC3E}">
+        <p14:creationId xmlns:p14="http://schemas.microsoft.com/office/powerpoint/2010/main" val="1482087551"/>
+      </p:ext>
+    </p:extLst>
+  </p:cSld>
+  <p:clrMapOvr>
+    <a:masterClrMapping/>
+  </p:clrMapOvr>
+</p:sld>
+</file>
+
+<file path=ppt/slides/slide20.xml><?xml version="1.0" encoding="utf-8"?>
 <p:sld xmlns:a="http://schemas.openxmlformats.org/drawingml/2006/main" xmlns:r="http://schemas.openxmlformats.org/officeDocument/2006/relationships" xmlns:p="http://schemas.openxmlformats.org/presentationml/2006/main">
   <p:cSld>
     <p:spTree>
@@ -4472,7 +6256,7 @@
 </p:sld>
 </file>
 
-<file path=ppt/slides/slide13.xml><?xml version="1.0" encoding="utf-8"?>
+<file path=ppt/slides/slide21.xml><?xml version="1.0" encoding="utf-8"?>
 <p:sld xmlns:a="http://schemas.openxmlformats.org/drawingml/2006/main" xmlns:r="http://schemas.openxmlformats.org/officeDocument/2006/relationships" xmlns:p="http://schemas.openxmlformats.org/presentationml/2006/main">
   <p:cSld>
     <p:spTree>
@@ -4631,7 +6415,7 @@
 </p:sld>
 </file>
 
-<file path=ppt/slides/slide14.xml><?xml version="1.0" encoding="utf-8"?>
+<file path=ppt/slides/slide22.xml><?xml version="1.0" encoding="utf-8"?>
 <p:sld xmlns:a="http://schemas.openxmlformats.org/drawingml/2006/main" xmlns:r="http://schemas.openxmlformats.org/officeDocument/2006/relationships" xmlns:p="http://schemas.openxmlformats.org/presentationml/2006/main">
   <p:cSld>
     <p:spTree>
@@ -4753,7 +6537,7 @@
 </p:sld>
 </file>
 
-<file path=ppt/slides/slide15.xml><?xml version="1.0" encoding="utf-8"?>
+<file path=ppt/slides/slide23.xml><?xml version="1.0" encoding="utf-8"?>
 <p:sld xmlns:a="http://schemas.openxmlformats.org/drawingml/2006/main" xmlns:r="http://schemas.openxmlformats.org/officeDocument/2006/relationships" xmlns:p="http://schemas.openxmlformats.org/presentationml/2006/main">
   <p:cSld>
     <p:spTree>
@@ -4853,94 +6637,6 @@
     <p:extLst>
       <p:ext uri="{BB962C8B-B14F-4D97-AF65-F5344CB8AC3E}">
         <p14:creationId xmlns:p14="http://schemas.microsoft.com/office/powerpoint/2010/main" val="4223885075"/>
-      </p:ext>
-    </p:extLst>
-  </p:cSld>
-  <p:clrMapOvr>
-    <a:masterClrMapping/>
-  </p:clrMapOvr>
-</p:sld>
-</file>
-
-<file path=ppt/slides/slide2.xml><?xml version="1.0" encoding="utf-8"?>
-<p:sld xmlns:a="http://schemas.openxmlformats.org/drawingml/2006/main" xmlns:r="http://schemas.openxmlformats.org/officeDocument/2006/relationships" xmlns:p="http://schemas.openxmlformats.org/presentationml/2006/main">
-  <p:cSld>
-    <p:spTree>
-      <p:nvGrpSpPr>
-        <p:cNvPr id="1" name=""/>
-        <p:cNvGrpSpPr/>
-        <p:nvPr/>
-      </p:nvGrpSpPr>
-      <p:grpSpPr>
-        <a:xfrm>
-          <a:off x="0" y="0"/>
-          <a:ext cx="0" cy="0"/>
-          <a:chOff x="0" y="0"/>
-          <a:chExt cx="0" cy="0"/>
-        </a:xfrm>
-      </p:grpSpPr>
-      <p:sp>
-        <p:nvSpPr>
-          <p:cNvPr id="2" name="Title 1">
-            <a:extLst>
-              <a:ext uri="{FF2B5EF4-FFF2-40B4-BE49-F238E27FC236}">
-                <a16:creationId xmlns:a16="http://schemas.microsoft.com/office/drawing/2014/main" id="{73CF15A7-67CA-7E90-6544-7B3816DE7B0A}"/>
-              </a:ext>
-            </a:extLst>
-          </p:cNvPr>
-          <p:cNvSpPr>
-            <a:spLocks noGrp="1"/>
-          </p:cNvSpPr>
-          <p:nvPr>
-            <p:ph type="title"/>
-          </p:nvPr>
-        </p:nvSpPr>
-        <p:spPr/>
-        <p:txBody>
-          <a:bodyPr/>
-          <a:lstStyle/>
-          <a:p>
-            <a:r>
-              <a:rPr lang="en-GB" dirty="0"/>
-              <a:t>How the round works – Script </a:t>
-            </a:r>
-          </a:p>
-        </p:txBody>
-      </p:sp>
-      <p:pic>
-        <p:nvPicPr>
-          <p:cNvPr id="5" name="Picture 4">
-            <a:extLst>
-              <a:ext uri="{FF2B5EF4-FFF2-40B4-BE49-F238E27FC236}">
-                <a16:creationId xmlns:a16="http://schemas.microsoft.com/office/drawing/2014/main" id="{58A0BC6B-E811-B0D9-19BE-1ABC1029471C}"/>
-              </a:ext>
-            </a:extLst>
-          </p:cNvPr>
-          <p:cNvPicPr>
-            <a:picLocks noChangeAspect="1"/>
-          </p:cNvPicPr>
-          <p:nvPr/>
-        </p:nvPicPr>
-        <p:blipFill>
-          <a:blip r:embed="rId2"/>
-          <a:stretch>
-            <a:fillRect/>
-          </a:stretch>
-        </p:blipFill>
-        <p:spPr>
-          <a:xfrm>
-            <a:off x="982661" y="1690688"/>
-            <a:ext cx="5331030" cy="4455219"/>
-          </a:xfrm>
-          <a:prstGeom prst="rect">
-            <a:avLst/>
-          </a:prstGeom>
-        </p:spPr>
-      </p:pic>
-    </p:spTree>
-    <p:extLst>
-      <p:ext uri="{BB962C8B-B14F-4D97-AF65-F5344CB8AC3E}">
-        <p14:creationId xmlns:p14="http://schemas.microsoft.com/office/powerpoint/2010/main" val="1482087551"/>
       </p:ext>
     </p:extLst>
   </p:cSld>
@@ -5440,102 +7136,91 @@
           <p:cNvPr id="2" name="Title 1">
             <a:extLst>
               <a:ext uri="{FF2B5EF4-FFF2-40B4-BE49-F238E27FC236}">
-                <a16:creationId xmlns:a16="http://schemas.microsoft.com/office/drawing/2014/main" id="{5D5F5164-6823-21E0-1DB7-07824192D311}"/>
-              </a:ext>
-            </a:extLst>
-          </p:cNvPr>
-          <p:cNvSpPr>
-            <a:spLocks noGrp="1"/>
-          </p:cNvSpPr>
-          <p:nvPr>
-            <p:ph type="ctrTitle"/>
-          </p:nvPr>
-        </p:nvSpPr>
-        <p:spPr>
-          <a:xfrm>
-            <a:off x="1322832" y="281115"/>
-            <a:ext cx="9144000" cy="715581"/>
-          </a:xfrm>
-        </p:spPr>
-        <p:txBody>
-          <a:bodyPr>
-            <a:normAutofit fontScale="90000"/>
-          </a:bodyPr>
-          <a:lstStyle/>
-          <a:p>
-            <a:r>
-              <a:rPr lang="en-GB" dirty="0"/>
-              <a:t>What I have polished from 1 </a:t>
-            </a:r>
-          </a:p>
-        </p:txBody>
-      </p:sp>
-      <p:sp>
-        <p:nvSpPr>
-          <p:cNvPr id="3" name="Subtitle 2">
-            <a:extLst>
-              <a:ext uri="{FF2B5EF4-FFF2-40B4-BE49-F238E27FC236}">
-                <a16:creationId xmlns:a16="http://schemas.microsoft.com/office/drawing/2014/main" id="{B59FC20C-371C-A448-F7BD-A2A9098205E1}"/>
-              </a:ext>
-            </a:extLst>
-          </p:cNvPr>
-          <p:cNvSpPr>
-            <a:spLocks noGrp="1"/>
-          </p:cNvSpPr>
-          <p:nvPr>
-            <p:ph type="subTitle" idx="1"/>
-          </p:nvPr>
-        </p:nvSpPr>
-        <p:spPr>
-          <a:xfrm>
-            <a:off x="1524000" y="1252728"/>
-            <a:ext cx="9144000" cy="4005072"/>
-          </a:xfrm>
-        </p:spPr>
-        <p:txBody>
-          <a:bodyPr/>
-          <a:lstStyle/>
-          <a:p>
-            <a:pPr marL="342900" indent="-342900">
-              <a:buFont typeface="Arial" panose="020B0604020202020204" pitchFamily="34" charset="0"/>
-              <a:buChar char="•"/>
-            </a:pPr>
-            <a:r>
-              <a:rPr lang="en-GB" dirty="0"/>
-              <a:t>Walking / Foot clipping thro floor (Still need to </a:t>
-            </a:r>
-            <a:r>
-              <a:rPr lang="en-GB" dirty="0" err="1"/>
-              <a:t>fuckking</a:t>
-            </a:r>
-            <a:r>
-              <a:rPr lang="en-GB" dirty="0"/>
-              <a:t> move everything else down) </a:t>
-            </a:r>
-          </a:p>
-          <a:p>
-            <a:pPr marL="342900" indent="-342900">
-              <a:buFont typeface="Arial" panose="020B0604020202020204" pitchFamily="34" charset="0"/>
-              <a:buChar char="•"/>
-            </a:pPr>
-            <a:r>
-              <a:rPr lang="en-GB" dirty="0"/>
-              <a:t>Weapons (Anubis’ Staff ) , Bullet (Fire Energy Blasts) – I think some errors are still occurring so need to fix this and then add sound </a:t>
-            </a:r>
-          </a:p>
-          <a:p>
-            <a:pPr marL="342900" indent="-342900">
-              <a:buFont typeface="Arial" panose="020B0604020202020204" pitchFamily="34" charset="0"/>
-              <a:buChar char="•"/>
-            </a:pPr>
-            <a:endParaRPr lang="en-GB" dirty="0"/>
+                <a16:creationId xmlns:a16="http://schemas.microsoft.com/office/drawing/2014/main" id="{96DB6391-18EC-681A-BFBA-0802844ED020}"/>
+              </a:ext>
+            </a:extLst>
+          </p:cNvPr>
+          <p:cNvSpPr>
+            <a:spLocks noGrp="1"/>
+          </p:cNvSpPr>
+          <p:nvPr>
+            <p:ph type="title"/>
+          </p:nvPr>
+        </p:nvSpPr>
+        <p:spPr/>
+        <p:txBody>
+          <a:bodyPr/>
+          <a:lstStyle/>
+          <a:p>
+            <a:r>
+              <a:rPr lang="en-GB" dirty="0"/>
+              <a:t>Boss</a:t>
+            </a:r>
+          </a:p>
+        </p:txBody>
+      </p:sp>
+      <p:sp>
+        <p:nvSpPr>
+          <p:cNvPr id="3" name="Content Placeholder 2">
+            <a:extLst>
+              <a:ext uri="{FF2B5EF4-FFF2-40B4-BE49-F238E27FC236}">
+                <a16:creationId xmlns:a16="http://schemas.microsoft.com/office/drawing/2014/main" id="{EE726FCD-E8F2-E446-5B7C-C925AFCFC243}"/>
+              </a:ext>
+            </a:extLst>
+          </p:cNvPr>
+          <p:cNvSpPr>
+            <a:spLocks noGrp="1"/>
+          </p:cNvSpPr>
+          <p:nvPr>
+            <p:ph idx="1"/>
+          </p:nvPr>
+        </p:nvSpPr>
+        <p:spPr/>
+        <p:txBody>
+          <a:bodyPr/>
+          <a:lstStyle/>
+          <a:p>
+            <a:r>
+              <a:rPr lang="en-GB" dirty="0"/>
+              <a:t>Model</a:t>
+            </a:r>
+          </a:p>
+          <a:p>
+            <a:r>
+              <a:rPr lang="en-GB" dirty="0"/>
+              <a:t>Animation </a:t>
+            </a:r>
+          </a:p>
+          <a:p>
+            <a:r>
+              <a:rPr lang="en-GB" dirty="0"/>
+              <a:t>Attack</a:t>
+            </a:r>
+          </a:p>
+          <a:p>
+            <a:r>
+              <a:rPr lang="en-GB" dirty="0"/>
+              <a:t>Ok so the Boss Spawns in when there is not bullet script attached</a:t>
+            </a:r>
+          </a:p>
+          <a:p>
+            <a:r>
+              <a:rPr lang="en-GB" dirty="0"/>
+              <a:t>Looks like there is just a huge issue in enemy  bullets</a:t>
+            </a:r>
+          </a:p>
+          <a:p>
+            <a:r>
+              <a:rPr lang="en-GB" dirty="0"/>
+              <a:t>Ok I HAVE NO FUCKING IDEA IT JUST BREAKS</a:t>
+            </a:r>
           </a:p>
         </p:txBody>
       </p:sp>
     </p:spTree>
     <p:extLst>
       <p:ext uri="{BB962C8B-B14F-4D97-AF65-F5344CB8AC3E}">
-        <p14:creationId xmlns:p14="http://schemas.microsoft.com/office/powerpoint/2010/main" val="1595508834"/>
+        <p14:creationId xmlns:p14="http://schemas.microsoft.com/office/powerpoint/2010/main" val="1031901185"/>
       </p:ext>
     </p:extLst>
   </p:cSld>
@@ -5567,89 +7252,112 @@
           <p:cNvPr id="2" name="Title 1">
             <a:extLst>
               <a:ext uri="{FF2B5EF4-FFF2-40B4-BE49-F238E27FC236}">
-                <a16:creationId xmlns:a16="http://schemas.microsoft.com/office/drawing/2014/main" id="{57C7B847-85C8-83BD-8B33-368E1675D7D2}"/>
-              </a:ext>
-            </a:extLst>
-          </p:cNvPr>
-          <p:cNvSpPr>
-            <a:spLocks noGrp="1"/>
-          </p:cNvSpPr>
-          <p:nvPr>
-            <p:ph type="title"/>
-          </p:nvPr>
-        </p:nvSpPr>
-        <p:spPr/>
-        <p:txBody>
-          <a:bodyPr/>
-          <a:lstStyle/>
-          <a:p>
-            <a:r>
-              <a:rPr lang="en-GB" dirty="0"/>
-              <a:t>1 Enemy Model / Animation </a:t>
-            </a:r>
-          </a:p>
-        </p:txBody>
-      </p:sp>
-      <p:sp>
-        <p:nvSpPr>
-          <p:cNvPr id="3" name="Content Placeholder 2">
-            <a:extLst>
-              <a:ext uri="{FF2B5EF4-FFF2-40B4-BE49-F238E27FC236}">
-                <a16:creationId xmlns:a16="http://schemas.microsoft.com/office/drawing/2014/main" id="{47A9B217-6AA4-39D7-6657-3D1ACD984C87}"/>
-              </a:ext>
-            </a:extLst>
-          </p:cNvPr>
-          <p:cNvSpPr>
-            <a:spLocks noGrp="1"/>
-          </p:cNvSpPr>
-          <p:nvPr>
-            <p:ph idx="1"/>
-          </p:nvPr>
-        </p:nvSpPr>
-        <p:spPr/>
-        <p:txBody>
-          <a:bodyPr/>
-          <a:lstStyle/>
-          <a:p>
-            <a:r>
-              <a:rPr lang="en-GB" dirty="0"/>
-              <a:t>FUCK</a:t>
-            </a:r>
-          </a:p>
-          <a:p>
-            <a:r>
-              <a:rPr lang="en-GB" dirty="0"/>
-              <a:t>Moving the floor down seemed to fix this but so did turning off APPLY ROOOT MOTION , I reverted the floor space back to </a:t>
+                <a16:creationId xmlns:a16="http://schemas.microsoft.com/office/drawing/2014/main" id="{5D5F5164-6823-21E0-1DB7-07824192D311}"/>
+              </a:ext>
+            </a:extLst>
+          </p:cNvPr>
+          <p:cNvSpPr>
+            <a:spLocks noGrp="1"/>
+          </p:cNvSpPr>
+          <p:nvPr>
+            <p:ph type="ctrTitle"/>
+          </p:nvPr>
+        </p:nvSpPr>
+        <p:spPr>
+          <a:xfrm>
+            <a:off x="1322832" y="281115"/>
+            <a:ext cx="9144000" cy="715581"/>
+          </a:xfrm>
+        </p:spPr>
+        <p:txBody>
+          <a:bodyPr>
+            <a:normAutofit fontScale="90000"/>
+          </a:bodyPr>
+          <a:lstStyle/>
+          <a:p>
+            <a:r>
+              <a:rPr lang="en-GB" dirty="0"/>
+              <a:t>What I have polished from 1 </a:t>
+            </a:r>
+          </a:p>
+        </p:txBody>
+      </p:sp>
+      <p:sp>
+        <p:nvSpPr>
+          <p:cNvPr id="3" name="Subtitle 2">
+            <a:extLst>
+              <a:ext uri="{FF2B5EF4-FFF2-40B4-BE49-F238E27FC236}">
+                <a16:creationId xmlns:a16="http://schemas.microsoft.com/office/drawing/2014/main" id="{B59FC20C-371C-A448-F7BD-A2A9098205E1}"/>
+              </a:ext>
+            </a:extLst>
+          </p:cNvPr>
+          <p:cNvSpPr>
+            <a:spLocks noGrp="1"/>
+          </p:cNvSpPr>
+          <p:nvPr>
+            <p:ph type="subTitle" idx="1"/>
+          </p:nvPr>
+        </p:nvSpPr>
+        <p:spPr>
+          <a:xfrm>
+            <a:off x="1524000" y="1252728"/>
+            <a:ext cx="9144000" cy="4005072"/>
+          </a:xfrm>
+        </p:spPr>
+        <p:txBody>
+          <a:bodyPr/>
+          <a:lstStyle/>
+          <a:p>
+            <a:pPr marL="342900" indent="-342900">
+              <a:buFont typeface="Arial" panose="020B0604020202020204" pitchFamily="34" charset="0"/>
+              <a:buChar char="•"/>
+            </a:pPr>
+            <a:r>
+              <a:rPr lang="en-GB" dirty="0"/>
+              <a:t>Walking / Foot clipping thro floor (Still need to </a:t>
             </a:r>
             <a:r>
               <a:rPr lang="en-GB" dirty="0" err="1"/>
-              <a:t>normall</a:t>
-            </a:r>
-            <a:r>
-              <a:rPr lang="en-GB" dirty="0"/>
-              <a:t> so I can focus on the fix , if I do choose this option I will need to move all models down too lol long </a:t>
-            </a:r>
-          </a:p>
-          <a:p>
-            <a:r>
-              <a:rPr lang="en-GB" dirty="0"/>
-              <a:t>Think </a:t>
-            </a:r>
-            <a:r>
-              <a:rPr lang="en-GB" dirty="0" err="1"/>
-              <a:t>im</a:t>
-            </a:r>
-            <a:r>
-              <a:rPr lang="en-GB" dirty="0"/>
-              <a:t> going to stick to the Floor being moved down </a:t>
-            </a:r>
+              <a:t>fuckking</a:t>
+            </a:r>
+            <a:r>
+              <a:rPr lang="en-GB" dirty="0"/>
+              <a:t> move everything else down) </a:t>
+            </a:r>
+          </a:p>
+          <a:p>
+            <a:pPr marL="342900" indent="-342900">
+              <a:buFont typeface="Arial" panose="020B0604020202020204" pitchFamily="34" charset="0"/>
+              <a:buChar char="•"/>
+            </a:pPr>
+            <a:r>
+              <a:rPr lang="en-GB" dirty="0"/>
+              <a:t>Weapons (Anubis’ Staff ) , Bullet (Fire Energy Blasts) – I think some errors are still occurring so need to fix this and then add sound </a:t>
+            </a:r>
+          </a:p>
+          <a:p>
+            <a:pPr marL="342900" indent="-342900">
+              <a:buFont typeface="Arial" panose="020B0604020202020204" pitchFamily="34" charset="0"/>
+              <a:buChar char="•"/>
+            </a:pPr>
+            <a:r>
+              <a:rPr lang="en-GB" dirty="0"/>
+              <a:t>Now - Enemy Animations (cant fix the drop , maybe cut time )</a:t>
+            </a:r>
+          </a:p>
+          <a:p>
+            <a:pPr marL="342900" indent="-342900">
+              <a:buFont typeface="Arial" panose="020B0604020202020204" pitchFamily="34" charset="0"/>
+              <a:buChar char="•"/>
+            </a:pPr>
+            <a:endParaRPr lang="en-GB" dirty="0"/>
           </a:p>
         </p:txBody>
       </p:sp>
     </p:spTree>
     <p:extLst>
       <p:ext uri="{BB962C8B-B14F-4D97-AF65-F5344CB8AC3E}">
-        <p14:creationId xmlns:p14="http://schemas.microsoft.com/office/powerpoint/2010/main" val="3446317224"/>
+        <p14:creationId xmlns:p14="http://schemas.microsoft.com/office/powerpoint/2010/main" val="1595508834"/>
       </p:ext>
     </p:extLst>
   </p:cSld>
@@ -5681,7 +7389,7 @@
           <p:cNvPr id="2" name="Title 1">
             <a:extLst>
               <a:ext uri="{FF2B5EF4-FFF2-40B4-BE49-F238E27FC236}">
-                <a16:creationId xmlns:a16="http://schemas.microsoft.com/office/drawing/2014/main" id="{F58F3967-18E6-8991-E8AE-620BDC2DE720}"/>
+                <a16:creationId xmlns:a16="http://schemas.microsoft.com/office/drawing/2014/main" id="{57C7B847-85C8-83BD-8B33-368E1675D7D2}"/>
               </a:ext>
             </a:extLst>
           </p:cNvPr>
@@ -5699,7 +7407,7 @@
           <a:p>
             <a:r>
               <a:rPr lang="en-GB" dirty="0"/>
-              <a:t>JJ MEETINGS </a:t>
+              <a:t>1 Enemy Model / Animation </a:t>
             </a:r>
           </a:p>
         </p:txBody>
@@ -5709,7 +7417,7 @@
           <p:cNvPr id="3" name="Content Placeholder 2">
             <a:extLst>
               <a:ext uri="{FF2B5EF4-FFF2-40B4-BE49-F238E27FC236}">
-                <a16:creationId xmlns:a16="http://schemas.microsoft.com/office/drawing/2014/main" id="{696F8D03-4BA6-E44A-EB92-62C49E851A3A}"/>
+                <a16:creationId xmlns:a16="http://schemas.microsoft.com/office/drawing/2014/main" id="{47A9B217-6AA4-39D7-6657-3D1ACD984C87}"/>
               </a:ext>
             </a:extLst>
           </p:cNvPr>
@@ -5726,43 +7434,36 @@
           <a:lstStyle/>
           <a:p>
             <a:r>
+              <a:rPr lang="en-GB" dirty="0"/>
+              <a:t>FUCK</a:t>
+            </a:r>
+          </a:p>
+          <a:p>
+            <a:r>
+              <a:rPr lang="en-GB" dirty="0"/>
+              <a:t>Moving the floor down seemed to fix this but so did turning off APPLY ROOOT MOTION , I reverted the floor space back to </a:t>
+            </a:r>
+            <a:r>
               <a:rPr lang="en-GB" dirty="0" err="1"/>
-              <a:t>Implementaiton</a:t>
-            </a:r>
-            <a:r>
-              <a:rPr lang="en-GB" dirty="0"/>
-              <a:t> – GDD, DESIGN LIKE THE MAP THINGS</a:t>
-            </a:r>
-          </a:p>
-          <a:p>
-            <a:r>
-              <a:rPr lang="en-GB" dirty="0"/>
-              <a:t>Methodology is how I created it like the design </a:t>
+              <a:t>normall</a:t>
+            </a:r>
+            <a:r>
+              <a:rPr lang="en-GB" dirty="0"/>
+              <a:t> so I can focus on the fix , if I do choose this option I will need to move all models down too lol long </a:t>
+            </a:r>
+          </a:p>
+          <a:p>
+            <a:r>
+              <a:rPr lang="en-GB" dirty="0"/>
+              <a:t>Think </a:t>
             </a:r>
             <a:r>
               <a:rPr lang="en-GB" dirty="0" err="1"/>
-              <a:t>implemnation</a:t>
-            </a:r>
-            <a:r>
-              <a:rPr lang="en-GB" dirty="0"/>
-              <a:t> </a:t>
-            </a:r>
-          </a:p>
-          <a:p>
-            <a:r>
-              <a:rPr lang="en-GB" dirty="0"/>
-              <a:t>How I used user testing for feedback to make iterations and </a:t>
-            </a:r>
-            <a:r>
-              <a:rPr lang="en-GB" dirty="0" err="1"/>
-              <a:t>yh</a:t>
-            </a:r>
-            <a:endParaRPr lang="en-GB" dirty="0"/>
-          </a:p>
-          <a:p>
-            <a:r>
-              <a:rPr lang="en-GB"/>
-              <a:t>Analysis </a:t>
+              <a:t>im</a:t>
+            </a:r>
+            <a:r>
+              <a:rPr lang="en-GB" dirty="0"/>
+              <a:t> going to stick to the Floor being moved down </a:t>
             </a:r>
           </a:p>
         </p:txBody>
@@ -5770,7 +7471,7 @@
     </p:spTree>
     <p:extLst>
       <p:ext uri="{BB962C8B-B14F-4D97-AF65-F5344CB8AC3E}">
-        <p14:creationId xmlns:p14="http://schemas.microsoft.com/office/powerpoint/2010/main" val="2649845202"/>
+        <p14:creationId xmlns:p14="http://schemas.microsoft.com/office/powerpoint/2010/main" val="3446317224"/>
       </p:ext>
     </p:extLst>
   </p:cSld>

</xml_diff>

<commit_message>
Power Up added - Shield
</commit_message>
<xml_diff>
--- a/Documentation/Report/Documentationofstuff.pptx
+++ b/Documentation/Report/Documentationofstuff.pptx
@@ -3982,15 +3982,33 @@
           </a:p>
           <a:p>
             <a:r>
-              <a:rPr lang="en-GB" dirty="0"/>
-              <a:t>One where all zombies die instantly for 30 sec</a:t>
-            </a:r>
-          </a:p>
-          <a:p>
-            <a:r>
-              <a:rPr lang="en-GB" dirty="0"/>
-              <a:t>All die instantly </a:t>
-            </a:r>
+              <a:rPr lang="en-GB" dirty="0" err="1"/>
+              <a:t>Infanite</a:t>
+            </a:r>
+            <a:r>
+              <a:rPr lang="en-GB" dirty="0"/>
+              <a:t> ammo (30 sec)</a:t>
+            </a:r>
+          </a:p>
+          <a:p>
+            <a:r>
+              <a:rPr lang="en-GB" dirty="0" err="1"/>
+              <a:t>Invinicability</a:t>
+            </a:r>
+            <a:r>
+              <a:rPr lang="en-GB" dirty="0"/>
+              <a:t> (15 sec) DONE</a:t>
+            </a:r>
+          </a:p>
+          <a:p>
+            <a:endParaRPr lang="en-GB" dirty="0"/>
+          </a:p>
+          <a:p>
+            <a:r>
+              <a:rPr lang="en-GB"/>
+              <a:t>UI AND COLOUR MAYBE SFX</a:t>
+            </a:r>
+            <a:endParaRPr lang="en-GB" dirty="0"/>
           </a:p>
         </p:txBody>
       </p:sp>

</xml_diff>

<commit_message>
UI For all powerups created and in process of adding to scripts
</commit_message>
<xml_diff>
--- a/Documentation/Report/Documentationofstuff.pptx
+++ b/Documentation/Report/Documentationofstuff.pptx
@@ -3972,43 +3972,101 @@
         </p:nvSpPr>
         <p:spPr/>
         <p:txBody>
-          <a:bodyPr/>
-          <a:lstStyle/>
-          <a:p>
-            <a:r>
-              <a:rPr lang="en-GB" dirty="0"/>
-              <a:t>Health (Put health to max)</a:t>
-            </a:r>
-          </a:p>
-          <a:p>
-            <a:r>
-              <a:rPr lang="en-GB" dirty="0" err="1"/>
+          <a:bodyPr>
+            <a:normAutofit/>
+          </a:bodyPr>
+          <a:lstStyle/>
+          <a:p>
+            <a:r>
+              <a:rPr lang="en-GB" sz="1800" dirty="0"/>
+              <a:t>Health (Put health to max) Done</a:t>
+            </a:r>
+          </a:p>
+          <a:p>
+            <a:r>
+              <a:rPr lang="en-GB" sz="1800" dirty="0" err="1"/>
               <a:t>Infanite</a:t>
             </a:r>
             <a:r>
-              <a:rPr lang="en-GB" dirty="0"/>
-              <a:t> ammo (30 sec)</a:t>
-            </a:r>
-          </a:p>
-          <a:p>
-            <a:r>
-              <a:rPr lang="en-GB" dirty="0" err="1"/>
+              <a:rPr lang="en-GB" sz="1800" dirty="0"/>
+              <a:t> ammo (30 sec)   </a:t>
+            </a:r>
+          </a:p>
+          <a:p>
+            <a:r>
+              <a:rPr lang="en-GB" sz="1800" dirty="0" err="1"/>
+              <a:t>Doubble</a:t>
+            </a:r>
+            <a:r>
+              <a:rPr lang="en-GB" sz="1800" dirty="0"/>
+              <a:t> Speed?</a:t>
+            </a:r>
+          </a:p>
+          <a:p>
+            <a:r>
+              <a:rPr lang="en-GB" sz="1800" dirty="0" err="1"/>
               <a:t>Invinicability</a:t>
             </a:r>
             <a:r>
-              <a:rPr lang="en-GB" dirty="0"/>
+              <a:rPr lang="en-GB" sz="1800" dirty="0"/>
               <a:t> (15 sec) DONE</a:t>
             </a:r>
           </a:p>
           <a:p>
-            <a:endParaRPr lang="en-GB" dirty="0"/>
-          </a:p>
-          <a:p>
-            <a:r>
-              <a:rPr lang="en-GB"/>
+            <a:endParaRPr lang="en-GB" sz="1800" dirty="0"/>
+          </a:p>
+          <a:p>
+            <a:r>
+              <a:rPr lang="en-GB" sz="1800" dirty="0"/>
               <a:t>UI AND COLOUR MAYBE SFX</a:t>
             </a:r>
-            <a:endParaRPr lang="en-GB" dirty="0"/>
+          </a:p>
+          <a:p>
+            <a:r>
+              <a:rPr lang="en-GB" sz="1800" dirty="0" err="1"/>
+              <a:t>Deleteed</a:t>
+            </a:r>
+            <a:r>
+              <a:rPr lang="en-GB" sz="1800" dirty="0"/>
+              <a:t> a script from player or </a:t>
+            </a:r>
+            <a:r>
+              <a:rPr lang="en-GB" sz="1800" dirty="0" err="1"/>
+              <a:t>canvus</a:t>
+            </a:r>
+            <a:r>
+              <a:rPr lang="en-GB" sz="1800" dirty="0"/>
+              <a:t> idk , deleted a lot , make sure all works on l2 before messing </a:t>
+            </a:r>
+            <a:r>
+              <a:rPr lang="en-GB" sz="1800"/>
+              <a:t>w scene 1</a:t>
+            </a:r>
+          </a:p>
+          <a:p>
+            <a:pPr marL="0" indent="0">
+              <a:buNone/>
+            </a:pPr>
+            <a:endParaRPr lang="en-GB" sz="1800"/>
+          </a:p>
+          <a:p>
+            <a:endParaRPr lang="en-GB" sz="1800" dirty="0"/>
+          </a:p>
+          <a:p>
+            <a:r>
+              <a:rPr lang="en-GB" sz="1800" dirty="0" err="1"/>
+              <a:t>Inviciability</a:t>
+            </a:r>
+            <a:r>
+              <a:rPr lang="en-GB" sz="1800" dirty="0"/>
+              <a:t> only lets you pick up from certain angle?????</a:t>
+            </a:r>
+          </a:p>
+          <a:p>
+            <a:r>
+              <a:rPr lang="en-GB" sz="1800" dirty="0"/>
+              <a:t>Health works fine now </a:t>
+            </a:r>
           </a:p>
         </p:txBody>
       </p:sp>

</xml_diff>

<commit_message>
Speed Boost Powerup Script + UI , report
</commit_message>
<xml_diff>
--- a/Documentation/Report/Documentationofstuff.pptx
+++ b/Documentation/Report/Documentationofstuff.pptx
@@ -285,7 +285,7 @@
           <a:p>
             <a:fld id="{C272013D-9C3F-40F8-8AC4-43A405D33223}" type="datetimeFigureOut">
               <a:rPr lang="en-GB" smtClean="0"/>
-              <a:t>08/04/2025</a:t>
+              <a:t>09/04/2025</a:t>
             </a:fld>
             <a:endParaRPr lang="en-GB"/>
           </a:p>
@@ -485,7 +485,7 @@
           <a:p>
             <a:fld id="{C272013D-9C3F-40F8-8AC4-43A405D33223}" type="datetimeFigureOut">
               <a:rPr lang="en-GB" smtClean="0"/>
-              <a:t>08/04/2025</a:t>
+              <a:t>09/04/2025</a:t>
             </a:fld>
             <a:endParaRPr lang="en-GB"/>
           </a:p>
@@ -695,7 +695,7 @@
           <a:p>
             <a:fld id="{C272013D-9C3F-40F8-8AC4-43A405D33223}" type="datetimeFigureOut">
               <a:rPr lang="en-GB" smtClean="0"/>
-              <a:t>08/04/2025</a:t>
+              <a:t>09/04/2025</a:t>
             </a:fld>
             <a:endParaRPr lang="en-GB"/>
           </a:p>
@@ -895,7 +895,7 @@
           <a:p>
             <a:fld id="{C272013D-9C3F-40F8-8AC4-43A405D33223}" type="datetimeFigureOut">
               <a:rPr lang="en-GB" smtClean="0"/>
-              <a:t>08/04/2025</a:t>
+              <a:t>09/04/2025</a:t>
             </a:fld>
             <a:endParaRPr lang="en-GB"/>
           </a:p>
@@ -1171,7 +1171,7 @@
           <a:p>
             <a:fld id="{C272013D-9C3F-40F8-8AC4-43A405D33223}" type="datetimeFigureOut">
               <a:rPr lang="en-GB" smtClean="0"/>
-              <a:t>08/04/2025</a:t>
+              <a:t>09/04/2025</a:t>
             </a:fld>
             <a:endParaRPr lang="en-GB"/>
           </a:p>
@@ -1439,7 +1439,7 @@
           <a:p>
             <a:fld id="{C272013D-9C3F-40F8-8AC4-43A405D33223}" type="datetimeFigureOut">
               <a:rPr lang="en-GB" smtClean="0"/>
-              <a:t>08/04/2025</a:t>
+              <a:t>09/04/2025</a:t>
             </a:fld>
             <a:endParaRPr lang="en-GB"/>
           </a:p>
@@ -1854,7 +1854,7 @@
           <a:p>
             <a:fld id="{C272013D-9C3F-40F8-8AC4-43A405D33223}" type="datetimeFigureOut">
               <a:rPr lang="en-GB" smtClean="0"/>
-              <a:t>08/04/2025</a:t>
+              <a:t>09/04/2025</a:t>
             </a:fld>
             <a:endParaRPr lang="en-GB"/>
           </a:p>
@@ -1996,7 +1996,7 @@
           <a:p>
             <a:fld id="{C272013D-9C3F-40F8-8AC4-43A405D33223}" type="datetimeFigureOut">
               <a:rPr lang="en-GB" smtClean="0"/>
-              <a:t>08/04/2025</a:t>
+              <a:t>09/04/2025</a:t>
             </a:fld>
             <a:endParaRPr lang="en-GB"/>
           </a:p>
@@ -2109,7 +2109,7 @@
           <a:p>
             <a:fld id="{C272013D-9C3F-40F8-8AC4-43A405D33223}" type="datetimeFigureOut">
               <a:rPr lang="en-GB" smtClean="0"/>
-              <a:t>08/04/2025</a:t>
+              <a:t>09/04/2025</a:t>
             </a:fld>
             <a:endParaRPr lang="en-GB"/>
           </a:p>
@@ -2422,7 +2422,7 @@
           <a:p>
             <a:fld id="{C272013D-9C3F-40F8-8AC4-43A405D33223}" type="datetimeFigureOut">
               <a:rPr lang="en-GB" smtClean="0"/>
-              <a:t>08/04/2025</a:t>
+              <a:t>09/04/2025</a:t>
             </a:fld>
             <a:endParaRPr lang="en-GB"/>
           </a:p>
@@ -2711,7 +2711,7 @@
           <a:p>
             <a:fld id="{C272013D-9C3F-40F8-8AC4-43A405D33223}" type="datetimeFigureOut">
               <a:rPr lang="en-GB" smtClean="0"/>
-              <a:t>08/04/2025</a:t>
+              <a:t>09/04/2025</a:t>
             </a:fld>
             <a:endParaRPr lang="en-GB"/>
           </a:p>
@@ -2954,7 +2954,7 @@
           <a:p>
             <a:fld id="{C272013D-9C3F-40F8-8AC4-43A405D33223}" type="datetimeFigureOut">
               <a:rPr lang="en-GB" smtClean="0"/>
-              <a:t>08/04/2025</a:t>
+              <a:t>09/04/2025</a:t>
             </a:fld>
             <a:endParaRPr lang="en-GB"/>
           </a:p>
@@ -3989,7 +3989,7 @@
             </a:r>
             <a:r>
               <a:rPr lang="en-GB" sz="1800" dirty="0"/>
-              <a:t> ammo (30 sec)   </a:t>
+              <a:t> ammo (30 sec)   Not Done </a:t>
             </a:r>
           </a:p>
           <a:p>
@@ -3999,7 +3999,7 @@
             </a:r>
             <a:r>
               <a:rPr lang="en-GB" sz="1800" dirty="0"/>
-              <a:t> Speed?</a:t>
+              <a:t> Speed? Done – If I want in L1 I need to update the movement </a:t>
             </a:r>
           </a:p>
           <a:p>
@@ -4013,6 +4013,33 @@
             </a:r>
           </a:p>
           <a:p>
+            <a:pPr marL="0" indent="0">
+              <a:buNone/>
+            </a:pPr>
+            <a:endParaRPr lang="en-GB" sz="1800" dirty="0"/>
+          </a:p>
+          <a:p>
+            <a:r>
+              <a:rPr lang="en-GB" sz="1800" dirty="0" err="1"/>
+              <a:t>Deleteed</a:t>
+            </a:r>
+            <a:r>
+              <a:rPr lang="en-GB" sz="1800" dirty="0"/>
+              <a:t> a script from player or </a:t>
+            </a:r>
+            <a:r>
+              <a:rPr lang="en-GB" sz="1800" dirty="0" err="1"/>
+              <a:t>canvus</a:t>
+            </a:r>
+            <a:r>
+              <a:rPr lang="en-GB" sz="1800" dirty="0"/>
+              <a:t> idk , deleted a lot , make sure all works on l2 before messing w scene 1</a:t>
+            </a:r>
+          </a:p>
+          <a:p>
+            <a:pPr marL="0" indent="0">
+              <a:buNone/>
+            </a:pPr>
             <a:endParaRPr lang="en-GB" sz="1800" dirty="0"/>
           </a:p>
           <a:p>
@@ -4023,50 +4050,12 @@
           </a:p>
           <a:p>
             <a:r>
-              <a:rPr lang="en-GB" sz="1800" dirty="0" err="1"/>
-              <a:t>Deleteed</a:t>
-            </a:r>
-            <a:r>
               <a:rPr lang="en-GB" sz="1800" dirty="0"/>
-              <a:t> a script from player or </a:t>
-            </a:r>
-            <a:r>
-              <a:rPr lang="en-GB" sz="1800" dirty="0" err="1"/>
-              <a:t>canvus</a:t>
-            </a:r>
-            <a:r>
-              <a:rPr lang="en-GB" sz="1800" dirty="0"/>
-              <a:t> idk , deleted a lot , make sure all works on l2 before messing </a:t>
-            </a:r>
-            <a:r>
-              <a:rPr lang="en-GB" sz="1800"/>
-              <a:t>w scene 1</a:t>
-            </a:r>
-          </a:p>
-          <a:p>
-            <a:pPr marL="0" indent="0">
-              <a:buNone/>
-            </a:pPr>
-            <a:endParaRPr lang="en-GB" sz="1800"/>
+              <a:t>SFX / Timer </a:t>
+            </a:r>
           </a:p>
           <a:p>
             <a:endParaRPr lang="en-GB" sz="1800" dirty="0"/>
-          </a:p>
-          <a:p>
-            <a:r>
-              <a:rPr lang="en-GB" sz="1800" dirty="0" err="1"/>
-              <a:t>Inviciability</a:t>
-            </a:r>
-            <a:r>
-              <a:rPr lang="en-GB" sz="1800" dirty="0"/>
-              <a:t> only lets you pick up from certain angle?????</a:t>
-            </a:r>
-          </a:p>
-          <a:p>
-            <a:r>
-              <a:rPr lang="en-GB" sz="1800" dirty="0"/>
-              <a:t>Health works fine now </a:t>
-            </a:r>
           </a:p>
         </p:txBody>
       </p:sp>

</xml_diff>

<commit_message>
Power ups finished , Finalising the wave system
</commit_message>
<xml_diff>
--- a/Documentation/Report/Documentationofstuff.pptx
+++ b/Documentation/Report/Documentationofstuff.pptx
@@ -17,19 +17,20 @@
     <p:sldId id="271" r:id="rId11"/>
     <p:sldId id="279" r:id="rId12"/>
     <p:sldId id="280" r:id="rId13"/>
-    <p:sldId id="272" r:id="rId14"/>
-    <p:sldId id="273" r:id="rId15"/>
-    <p:sldId id="274" r:id="rId16"/>
-    <p:sldId id="275" r:id="rId17"/>
-    <p:sldId id="276" r:id="rId18"/>
-    <p:sldId id="277" r:id="rId19"/>
-    <p:sldId id="268" r:id="rId20"/>
-    <p:sldId id="267" r:id="rId21"/>
-    <p:sldId id="264" r:id="rId22"/>
-    <p:sldId id="260" r:id="rId23"/>
-    <p:sldId id="262" r:id="rId24"/>
-    <p:sldId id="263" r:id="rId25"/>
-    <p:sldId id="266" r:id="rId26"/>
+    <p:sldId id="281" r:id="rId14"/>
+    <p:sldId id="272" r:id="rId15"/>
+    <p:sldId id="273" r:id="rId16"/>
+    <p:sldId id="274" r:id="rId17"/>
+    <p:sldId id="275" r:id="rId18"/>
+    <p:sldId id="276" r:id="rId19"/>
+    <p:sldId id="277" r:id="rId20"/>
+    <p:sldId id="268" r:id="rId21"/>
+    <p:sldId id="267" r:id="rId22"/>
+    <p:sldId id="264" r:id="rId23"/>
+    <p:sldId id="260" r:id="rId24"/>
+    <p:sldId id="262" r:id="rId25"/>
+    <p:sldId id="263" r:id="rId26"/>
+    <p:sldId id="266" r:id="rId27"/>
   </p:sldIdLst>
   <p:sldSz cx="12192000" cy="6858000"/>
   <p:notesSz cx="6858000" cy="9144000"/>
@@ -285,7 +286,7 @@
           <a:p>
             <a:fld id="{C272013D-9C3F-40F8-8AC4-43A405D33223}" type="datetimeFigureOut">
               <a:rPr lang="en-GB" smtClean="0"/>
-              <a:t>09/04/2025</a:t>
+              <a:t>10/04/2025</a:t>
             </a:fld>
             <a:endParaRPr lang="en-GB"/>
           </a:p>
@@ -485,7 +486,7 @@
           <a:p>
             <a:fld id="{C272013D-9C3F-40F8-8AC4-43A405D33223}" type="datetimeFigureOut">
               <a:rPr lang="en-GB" smtClean="0"/>
-              <a:t>09/04/2025</a:t>
+              <a:t>10/04/2025</a:t>
             </a:fld>
             <a:endParaRPr lang="en-GB"/>
           </a:p>
@@ -695,7 +696,7 @@
           <a:p>
             <a:fld id="{C272013D-9C3F-40F8-8AC4-43A405D33223}" type="datetimeFigureOut">
               <a:rPr lang="en-GB" smtClean="0"/>
-              <a:t>09/04/2025</a:t>
+              <a:t>10/04/2025</a:t>
             </a:fld>
             <a:endParaRPr lang="en-GB"/>
           </a:p>
@@ -895,7 +896,7 @@
           <a:p>
             <a:fld id="{C272013D-9C3F-40F8-8AC4-43A405D33223}" type="datetimeFigureOut">
               <a:rPr lang="en-GB" smtClean="0"/>
-              <a:t>09/04/2025</a:t>
+              <a:t>10/04/2025</a:t>
             </a:fld>
             <a:endParaRPr lang="en-GB"/>
           </a:p>
@@ -1171,7 +1172,7 @@
           <a:p>
             <a:fld id="{C272013D-9C3F-40F8-8AC4-43A405D33223}" type="datetimeFigureOut">
               <a:rPr lang="en-GB" smtClean="0"/>
-              <a:t>09/04/2025</a:t>
+              <a:t>10/04/2025</a:t>
             </a:fld>
             <a:endParaRPr lang="en-GB"/>
           </a:p>
@@ -1439,7 +1440,7 @@
           <a:p>
             <a:fld id="{C272013D-9C3F-40F8-8AC4-43A405D33223}" type="datetimeFigureOut">
               <a:rPr lang="en-GB" smtClean="0"/>
-              <a:t>09/04/2025</a:t>
+              <a:t>10/04/2025</a:t>
             </a:fld>
             <a:endParaRPr lang="en-GB"/>
           </a:p>
@@ -1854,7 +1855,7 @@
           <a:p>
             <a:fld id="{C272013D-9C3F-40F8-8AC4-43A405D33223}" type="datetimeFigureOut">
               <a:rPr lang="en-GB" smtClean="0"/>
-              <a:t>09/04/2025</a:t>
+              <a:t>10/04/2025</a:t>
             </a:fld>
             <a:endParaRPr lang="en-GB"/>
           </a:p>
@@ -1996,7 +1997,7 @@
           <a:p>
             <a:fld id="{C272013D-9C3F-40F8-8AC4-43A405D33223}" type="datetimeFigureOut">
               <a:rPr lang="en-GB" smtClean="0"/>
-              <a:t>09/04/2025</a:t>
+              <a:t>10/04/2025</a:t>
             </a:fld>
             <a:endParaRPr lang="en-GB"/>
           </a:p>
@@ -2109,7 +2110,7 @@
           <a:p>
             <a:fld id="{C272013D-9C3F-40F8-8AC4-43A405D33223}" type="datetimeFigureOut">
               <a:rPr lang="en-GB" smtClean="0"/>
-              <a:t>09/04/2025</a:t>
+              <a:t>10/04/2025</a:t>
             </a:fld>
             <a:endParaRPr lang="en-GB"/>
           </a:p>
@@ -2422,7 +2423,7 @@
           <a:p>
             <a:fld id="{C272013D-9C3F-40F8-8AC4-43A405D33223}" type="datetimeFigureOut">
               <a:rPr lang="en-GB" smtClean="0"/>
-              <a:t>09/04/2025</a:t>
+              <a:t>10/04/2025</a:t>
             </a:fld>
             <a:endParaRPr lang="en-GB"/>
           </a:p>
@@ -2711,7 +2712,7 @@
           <a:p>
             <a:fld id="{C272013D-9C3F-40F8-8AC4-43A405D33223}" type="datetimeFigureOut">
               <a:rPr lang="en-GB" smtClean="0"/>
-              <a:t>09/04/2025</a:t>
+              <a:t>10/04/2025</a:t>
             </a:fld>
             <a:endParaRPr lang="en-GB"/>
           </a:p>
@@ -2954,7 +2955,7 @@
           <a:p>
             <a:fld id="{C272013D-9C3F-40F8-8AC4-43A405D33223}" type="datetimeFigureOut">
               <a:rPr lang="en-GB" smtClean="0"/>
-              <a:t>09/04/2025</a:t>
+              <a:t>10/04/2025</a:t>
             </a:fld>
             <a:endParaRPr lang="en-GB"/>
           </a:p>
@@ -4094,6 +4095,122 @@
           <p:cNvPr id="2" name="Title 1">
             <a:extLst>
               <a:ext uri="{FF2B5EF4-FFF2-40B4-BE49-F238E27FC236}">
+                <a16:creationId xmlns:a16="http://schemas.microsoft.com/office/drawing/2014/main" id="{C86B405D-1AFF-9C18-2581-45CEDF044D91}"/>
+              </a:ext>
+            </a:extLst>
+          </p:cNvPr>
+          <p:cNvSpPr>
+            <a:spLocks noGrp="1"/>
+          </p:cNvSpPr>
+          <p:nvPr>
+            <p:ph type="title"/>
+          </p:nvPr>
+        </p:nvSpPr>
+        <p:spPr/>
+        <p:txBody>
+          <a:bodyPr/>
+          <a:lstStyle/>
+          <a:p>
+            <a:r>
+              <a:rPr lang="en-GB" dirty="0" err="1"/>
+              <a:t>Gamelogic</a:t>
+            </a:r>
+            <a:endParaRPr lang="en-GB" dirty="0"/>
+          </a:p>
+        </p:txBody>
+      </p:sp>
+      <p:sp>
+        <p:nvSpPr>
+          <p:cNvPr id="3" name="Content Placeholder 2">
+            <a:extLst>
+              <a:ext uri="{FF2B5EF4-FFF2-40B4-BE49-F238E27FC236}">
+                <a16:creationId xmlns:a16="http://schemas.microsoft.com/office/drawing/2014/main" id="{61694F7A-A030-E8D2-9132-537F48E594E7}"/>
+              </a:ext>
+            </a:extLst>
+          </p:cNvPr>
+          <p:cNvSpPr>
+            <a:spLocks noGrp="1"/>
+          </p:cNvSpPr>
+          <p:nvPr>
+            <p:ph idx="1"/>
+          </p:nvPr>
+        </p:nvSpPr>
+        <p:spPr/>
+        <p:txBody>
+          <a:bodyPr/>
+          <a:lstStyle/>
+          <a:p>
+            <a:r>
+              <a:rPr lang="en-GB" dirty="0" err="1"/>
+              <a:t>Wavemanager</a:t>
+            </a:r>
+            <a:r>
+              <a:rPr lang="en-GB" dirty="0"/>
+              <a:t> </a:t>
+            </a:r>
+          </a:p>
+          <a:p>
+            <a:r>
+              <a:rPr lang="en-GB" dirty="0" err="1"/>
+              <a:t>Takehealth</a:t>
+            </a:r>
+            <a:r>
+              <a:rPr lang="en-GB" dirty="0"/>
+              <a:t> bars off</a:t>
+            </a:r>
+          </a:p>
+          <a:p>
+            <a:r>
+              <a:rPr lang="en-GB" dirty="0" err="1"/>
+              <a:t>Moveemnt</a:t>
+            </a:r>
+            <a:r>
+              <a:rPr lang="en-GB" dirty="0"/>
+              <a:t> ask </a:t>
+            </a:r>
+            <a:r>
+              <a:rPr lang="en-GB"/>
+              <a:t>to polish it</a:t>
+            </a:r>
+            <a:endParaRPr lang="en-GB" dirty="0"/>
+          </a:p>
+        </p:txBody>
+      </p:sp>
+    </p:spTree>
+    <p:extLst>
+      <p:ext uri="{BB962C8B-B14F-4D97-AF65-F5344CB8AC3E}">
+        <p14:creationId xmlns:p14="http://schemas.microsoft.com/office/powerpoint/2010/main" val="870652483"/>
+      </p:ext>
+    </p:extLst>
+  </p:cSld>
+  <p:clrMapOvr>
+    <a:masterClrMapping/>
+  </p:clrMapOvr>
+</p:sld>
+</file>
+
+<file path=ppt/slides/slide14.xml><?xml version="1.0" encoding="utf-8"?>
+<p:sld xmlns:a="http://schemas.openxmlformats.org/drawingml/2006/main" xmlns:r="http://schemas.openxmlformats.org/officeDocument/2006/relationships" xmlns:p="http://schemas.openxmlformats.org/presentationml/2006/main">
+  <p:cSld>
+    <p:spTree>
+      <p:nvGrpSpPr>
+        <p:cNvPr id="1" name=""/>
+        <p:cNvGrpSpPr/>
+        <p:nvPr/>
+      </p:nvGrpSpPr>
+      <p:grpSpPr>
+        <a:xfrm>
+          <a:off x="0" y="0"/>
+          <a:ext cx="0" cy="0"/>
+          <a:chOff x="0" y="0"/>
+          <a:chExt cx="0" cy="0"/>
+        </a:xfrm>
+      </p:grpSpPr>
+      <p:sp>
+        <p:nvSpPr>
+          <p:cNvPr id="2" name="Title 1">
+            <a:extLst>
+              <a:ext uri="{FF2B5EF4-FFF2-40B4-BE49-F238E27FC236}">
                 <a16:creationId xmlns:a16="http://schemas.microsoft.com/office/drawing/2014/main" id="{AEC528E2-D0EC-21BF-75C9-1B15F7A24F18}"/>
               </a:ext>
             </a:extLst>
@@ -4485,7 +4602,7 @@
 </p:sld>
 </file>
 
-<file path=ppt/slides/slide14.xml><?xml version="1.0" encoding="utf-8"?>
+<file path=ppt/slides/slide15.xml><?xml version="1.0" encoding="utf-8"?>
 <p:sld xmlns:a="http://schemas.openxmlformats.org/drawingml/2006/main" xmlns:r="http://schemas.openxmlformats.org/officeDocument/2006/relationships" xmlns:p="http://schemas.openxmlformats.org/presentationml/2006/main">
   <p:cSld>
     <p:spTree>
@@ -5026,7 +5143,7 @@
 </p:sld>
 </file>
 
-<file path=ppt/slides/slide15.xml><?xml version="1.0" encoding="utf-8"?>
+<file path=ppt/slides/slide16.xml><?xml version="1.0" encoding="utf-8"?>
 <p:sld xmlns:a="http://schemas.openxmlformats.org/drawingml/2006/main" xmlns:r="http://schemas.openxmlformats.org/officeDocument/2006/relationships" xmlns:p="http://schemas.openxmlformats.org/presentationml/2006/main">
   <p:cSld>
     <p:spTree>
@@ -5154,7 +5271,7 @@
 </p:sld>
 </file>
 
-<file path=ppt/slides/slide16.xml><?xml version="1.0" encoding="utf-8"?>
+<file path=ppt/slides/slide17.xml><?xml version="1.0" encoding="utf-8"?>
 <p:sld xmlns:a="http://schemas.openxmlformats.org/drawingml/2006/main" xmlns:r="http://schemas.openxmlformats.org/officeDocument/2006/relationships" xmlns:p="http://schemas.openxmlformats.org/presentationml/2006/main">
   <p:cSld>
     <p:spTree>
@@ -5267,145 +5384,6 @@
     <p:extLst>
       <p:ext uri="{BB962C8B-B14F-4D97-AF65-F5344CB8AC3E}">
         <p14:creationId xmlns:p14="http://schemas.microsoft.com/office/powerpoint/2010/main" val="1119958177"/>
-      </p:ext>
-    </p:extLst>
-  </p:cSld>
-  <p:clrMapOvr>
-    <a:masterClrMapping/>
-  </p:clrMapOvr>
-</p:sld>
-</file>
-
-<file path=ppt/slides/slide17.xml><?xml version="1.0" encoding="utf-8"?>
-<p:sld xmlns:a="http://schemas.openxmlformats.org/drawingml/2006/main" xmlns:r="http://schemas.openxmlformats.org/officeDocument/2006/relationships" xmlns:p="http://schemas.openxmlformats.org/presentationml/2006/main">
-  <p:cSld>
-    <p:spTree>
-      <p:nvGrpSpPr>
-        <p:cNvPr id="1" name=""/>
-        <p:cNvGrpSpPr/>
-        <p:nvPr/>
-      </p:nvGrpSpPr>
-      <p:grpSpPr>
-        <a:xfrm>
-          <a:off x="0" y="0"/>
-          <a:ext cx="0" cy="0"/>
-          <a:chOff x="0" y="0"/>
-          <a:chExt cx="0" cy="0"/>
-        </a:xfrm>
-      </p:grpSpPr>
-      <p:sp>
-        <p:nvSpPr>
-          <p:cNvPr id="3" name="Content Placeholder 2">
-            <a:extLst>
-              <a:ext uri="{FF2B5EF4-FFF2-40B4-BE49-F238E27FC236}">
-                <a16:creationId xmlns:a16="http://schemas.microsoft.com/office/drawing/2014/main" id="{7C2CF119-C955-F860-0960-F8935F2740BB}"/>
-              </a:ext>
-            </a:extLst>
-          </p:cNvPr>
-          <p:cNvSpPr>
-            <a:spLocks noGrp="1"/>
-          </p:cNvSpPr>
-          <p:nvPr>
-            <p:ph idx="1"/>
-          </p:nvPr>
-        </p:nvSpPr>
-        <p:spPr>
-          <a:xfrm>
-            <a:off x="838200" y="365760"/>
-            <a:ext cx="10515600" cy="5811203"/>
-          </a:xfrm>
-        </p:spPr>
-        <p:txBody>
-          <a:bodyPr/>
-          <a:lstStyle/>
-          <a:p>
-            <a:pPr marL="0" indent="0">
-              <a:buNone/>
-            </a:pPr>
-            <a:r>
-              <a:rPr lang="en-GB" u="sng" dirty="0"/>
-              <a:t>Issues and Considerations ?</a:t>
-            </a:r>
-          </a:p>
-          <a:p>
-            <a:r>
-              <a:rPr lang="en-GB" dirty="0"/>
-              <a:t>Legal</a:t>
-            </a:r>
-          </a:p>
-          <a:p>
-            <a:r>
-              <a:rPr lang="en-GB" dirty="0"/>
-              <a:t>Social </a:t>
-            </a:r>
-          </a:p>
-          <a:p>
-            <a:r>
-              <a:rPr lang="en-GB" dirty="0"/>
-              <a:t>Ethical </a:t>
-            </a:r>
-          </a:p>
-          <a:p>
-            <a:r>
-              <a:rPr lang="en-GB" dirty="0"/>
-              <a:t>PEGI rating</a:t>
-            </a:r>
-          </a:p>
-          <a:p>
-            <a:pPr marL="0" indent="0">
-              <a:buNone/>
-            </a:pPr>
-            <a:r>
-              <a:rPr lang="en-GB" u="sng" dirty="0"/>
-              <a:t>Project Management tools</a:t>
-            </a:r>
-          </a:p>
-          <a:p>
-            <a:r>
-              <a:rPr lang="en-GB" dirty="0"/>
-              <a:t>Project Management  (</a:t>
-            </a:r>
-            <a:r>
-              <a:rPr lang="en-GB" dirty="0" err="1"/>
-              <a:t>Devlogs</a:t>
-            </a:r>
-            <a:r>
-              <a:rPr lang="en-GB" dirty="0"/>
-              <a:t> ) (Trello)</a:t>
-            </a:r>
-          </a:p>
-          <a:p>
-            <a:r>
-              <a:rPr lang="en-GB" dirty="0"/>
-              <a:t>Version Control (</a:t>
-            </a:r>
-            <a:r>
-              <a:rPr lang="en-GB" dirty="0" err="1"/>
-              <a:t>Github</a:t>
-            </a:r>
-            <a:r>
-              <a:rPr lang="en-GB" dirty="0"/>
-              <a:t> ?) </a:t>
-            </a:r>
-          </a:p>
-          <a:p>
-            <a:r>
-              <a:rPr lang="en-GB" dirty="0"/>
-              <a:t>Weekly meetings  </a:t>
-            </a:r>
-          </a:p>
-          <a:p>
-            <a:pPr marL="0" indent="0">
-              <a:buNone/>
-            </a:pPr>
-            <a:endParaRPr lang="en-GB" dirty="0"/>
-          </a:p>
-        </p:txBody>
-      </p:sp>
-    </p:spTree>
-    <p:extLst>
-      <p:ext uri="{BB962C8B-B14F-4D97-AF65-F5344CB8AC3E}">
-        <p14:creationId xmlns:p14="http://schemas.microsoft.com/office/powerpoint/2010/main" val="2027209302"/>
       </p:ext>
     </p:extLst>
   </p:cSld>
@@ -5434,38 +5412,10 @@
       </p:grpSpPr>
       <p:sp>
         <p:nvSpPr>
-          <p:cNvPr id="2" name="Title 1">
-            <a:extLst>
-              <a:ext uri="{FF2B5EF4-FFF2-40B4-BE49-F238E27FC236}">
-                <a16:creationId xmlns:a16="http://schemas.microsoft.com/office/drawing/2014/main" id="{2017CAD9-CFDC-9744-AA0D-E7940B1A9F3C}"/>
-              </a:ext>
-            </a:extLst>
-          </p:cNvPr>
-          <p:cNvSpPr>
-            <a:spLocks noGrp="1"/>
-          </p:cNvSpPr>
-          <p:nvPr>
-            <p:ph type="title"/>
-          </p:nvPr>
-        </p:nvSpPr>
-        <p:spPr/>
-        <p:txBody>
-          <a:bodyPr/>
-          <a:lstStyle/>
-          <a:p>
-            <a:r>
-              <a:rPr lang="en-GB" dirty="0"/>
-              <a:t>Implementation </a:t>
-            </a:r>
-          </a:p>
-        </p:txBody>
-      </p:sp>
-      <p:sp>
-        <p:nvSpPr>
           <p:cNvPr id="3" name="Content Placeholder 2">
             <a:extLst>
               <a:ext uri="{FF2B5EF4-FFF2-40B4-BE49-F238E27FC236}">
-                <a16:creationId xmlns:a16="http://schemas.microsoft.com/office/drawing/2014/main" id="{C92EEC66-FAFD-F359-C432-4B6C94FA981C}"/>
+                <a16:creationId xmlns:a16="http://schemas.microsoft.com/office/drawing/2014/main" id="{7C2CF119-C955-F860-0960-F8935F2740BB}"/>
               </a:ext>
             </a:extLst>
           </p:cNvPr>
@@ -5476,60 +5426,103 @@
             <p:ph idx="1"/>
           </p:nvPr>
         </p:nvSpPr>
-        <p:spPr/>
-        <p:txBody>
-          <a:bodyPr/>
-          <a:lstStyle/>
-          <a:p>
-            <a:r>
-              <a:rPr lang="en-GB" dirty="0"/>
-              <a:t>IDK IF I do a planning section but if so </a:t>
-            </a:r>
-          </a:p>
-          <a:p>
-            <a:r>
-              <a:rPr lang="en-GB" dirty="0"/>
-              <a:t>Planning – GDD – DESIGNS </a:t>
-            </a:r>
-          </a:p>
-          <a:p>
-            <a:r>
-              <a:rPr lang="en-GB" dirty="0"/>
-              <a:t>Sprints </a:t>
-            </a:r>
-          </a:p>
-          <a:p>
-            <a:r>
-              <a:rPr lang="en-GB" dirty="0"/>
-              <a:t>User Testing (how I used feedback to refine)</a:t>
-            </a:r>
-          </a:p>
-          <a:p>
-            <a:r>
-              <a:rPr lang="en-GB" dirty="0"/>
-              <a:t>Minimum Viable Product </a:t>
-            </a:r>
-          </a:p>
-          <a:p>
-            <a:r>
-              <a:rPr lang="en-GB" dirty="0"/>
-              <a:t>Minimum </a:t>
+        <p:spPr>
+          <a:xfrm>
+            <a:off x="838200" y="365760"/>
+            <a:ext cx="10515600" cy="5811203"/>
+          </a:xfrm>
+        </p:spPr>
+        <p:txBody>
+          <a:bodyPr/>
+          <a:lstStyle/>
+          <a:p>
+            <a:pPr marL="0" indent="0">
+              <a:buNone/>
+            </a:pPr>
+            <a:r>
+              <a:rPr lang="en-GB" u="sng" dirty="0"/>
+              <a:t>Issues and Considerations ?</a:t>
+            </a:r>
+          </a:p>
+          <a:p>
+            <a:r>
+              <a:rPr lang="en-GB" dirty="0"/>
+              <a:t>Legal</a:t>
+            </a:r>
+          </a:p>
+          <a:p>
+            <a:r>
+              <a:rPr lang="en-GB" dirty="0"/>
+              <a:t>Social </a:t>
+            </a:r>
+          </a:p>
+          <a:p>
+            <a:r>
+              <a:rPr lang="en-GB" dirty="0"/>
+              <a:t>Ethical </a:t>
+            </a:r>
+          </a:p>
+          <a:p>
+            <a:r>
+              <a:rPr lang="en-GB" dirty="0"/>
+              <a:t>PEGI rating</a:t>
+            </a:r>
+          </a:p>
+          <a:p>
+            <a:pPr marL="0" indent="0">
+              <a:buNone/>
+            </a:pPr>
+            <a:r>
+              <a:rPr lang="en-GB" u="sng" dirty="0"/>
+              <a:t>Project Management tools</a:t>
+            </a:r>
+          </a:p>
+          <a:p>
+            <a:r>
+              <a:rPr lang="en-GB" dirty="0"/>
+              <a:t>Project Management  (</a:t>
             </a:r>
             <a:r>
               <a:rPr lang="en-GB" dirty="0" err="1"/>
-              <a:t>Awsome</a:t>
-            </a:r>
-            <a:r>
-              <a:rPr lang="en-GB" dirty="0"/>
-              <a:t> Product </a:t>
-            </a:r>
+              <a:t>Devlogs</a:t>
+            </a:r>
+            <a:r>
+              <a:rPr lang="en-GB" dirty="0"/>
+              <a:t> ) (Trello)</a:t>
+            </a:r>
+          </a:p>
+          <a:p>
+            <a:r>
+              <a:rPr lang="en-GB" dirty="0"/>
+              <a:t>Version Control (</a:t>
+            </a:r>
+            <a:r>
+              <a:rPr lang="en-GB" dirty="0" err="1"/>
+              <a:t>Github</a:t>
+            </a:r>
+            <a:r>
+              <a:rPr lang="en-GB" dirty="0"/>
+              <a:t> ?) </a:t>
+            </a:r>
+          </a:p>
+          <a:p>
+            <a:r>
+              <a:rPr lang="en-GB" dirty="0"/>
+              <a:t>Weekly meetings  </a:t>
+            </a:r>
+          </a:p>
+          <a:p>
+            <a:pPr marL="0" indent="0">
+              <a:buNone/>
+            </a:pPr>
+            <a:endParaRPr lang="en-GB" dirty="0"/>
           </a:p>
         </p:txBody>
       </p:sp>
     </p:spTree>
     <p:extLst>
       <p:ext uri="{BB962C8B-B14F-4D97-AF65-F5344CB8AC3E}">
-        <p14:creationId xmlns:p14="http://schemas.microsoft.com/office/powerpoint/2010/main" val="840637842"/>
+        <p14:creationId xmlns:p14="http://schemas.microsoft.com/office/powerpoint/2010/main" val="2027209302"/>
       </p:ext>
     </p:extLst>
   </p:cSld>
@@ -5561,7 +5554,7 @@
           <p:cNvPr id="2" name="Title 1">
             <a:extLst>
               <a:ext uri="{FF2B5EF4-FFF2-40B4-BE49-F238E27FC236}">
-                <a16:creationId xmlns:a16="http://schemas.microsoft.com/office/drawing/2014/main" id="{F58F3967-18E6-8991-E8AE-620BDC2DE720}"/>
+                <a16:creationId xmlns:a16="http://schemas.microsoft.com/office/drawing/2014/main" id="{2017CAD9-CFDC-9744-AA0D-E7940B1A9F3C}"/>
               </a:ext>
             </a:extLst>
           </p:cNvPr>
@@ -5579,7 +5572,7 @@
           <a:p>
             <a:r>
               <a:rPr lang="en-GB" dirty="0"/>
-              <a:t>JJ MEETINGS </a:t>
+              <a:t>Implementation </a:t>
             </a:r>
           </a:p>
         </p:txBody>
@@ -5589,7 +5582,7 @@
           <p:cNvPr id="3" name="Content Placeholder 2">
             <a:extLst>
               <a:ext uri="{FF2B5EF4-FFF2-40B4-BE49-F238E27FC236}">
-                <a16:creationId xmlns:a16="http://schemas.microsoft.com/office/drawing/2014/main" id="{696F8D03-4BA6-E44A-EB92-62C49E851A3A}"/>
+                <a16:creationId xmlns:a16="http://schemas.microsoft.com/office/drawing/2014/main" id="{C92EEC66-FAFD-F359-C432-4B6C94FA981C}"/>
               </a:ext>
             </a:extLst>
           </p:cNvPr>
@@ -5606,43 +5599,46 @@
           <a:lstStyle/>
           <a:p>
             <a:r>
+              <a:rPr lang="en-GB" dirty="0"/>
+              <a:t>IDK IF I do a planning section but if so </a:t>
+            </a:r>
+          </a:p>
+          <a:p>
+            <a:r>
+              <a:rPr lang="en-GB" dirty="0"/>
+              <a:t>Planning – GDD – DESIGNS </a:t>
+            </a:r>
+          </a:p>
+          <a:p>
+            <a:r>
+              <a:rPr lang="en-GB" dirty="0"/>
+              <a:t>Sprints </a:t>
+            </a:r>
+          </a:p>
+          <a:p>
+            <a:r>
+              <a:rPr lang="en-GB" dirty="0"/>
+              <a:t>User Testing (how I used feedback to refine)</a:t>
+            </a:r>
+          </a:p>
+          <a:p>
+            <a:r>
+              <a:rPr lang="en-GB" dirty="0"/>
+              <a:t>Minimum Viable Product </a:t>
+            </a:r>
+          </a:p>
+          <a:p>
+            <a:r>
+              <a:rPr lang="en-GB" dirty="0"/>
+              <a:t>Minimum </a:t>
+            </a:r>
+            <a:r>
               <a:rPr lang="en-GB" dirty="0" err="1"/>
-              <a:t>Implementaiton</a:t>
-            </a:r>
-            <a:r>
-              <a:rPr lang="en-GB" dirty="0"/>
-              <a:t> – GDD, DESIGN LIKE THE MAP THINGS</a:t>
-            </a:r>
-          </a:p>
-          <a:p>
-            <a:r>
-              <a:rPr lang="en-GB" dirty="0"/>
-              <a:t>Methodology is how I created it like the design </a:t>
-            </a:r>
-            <a:r>
-              <a:rPr lang="en-GB" dirty="0" err="1"/>
-              <a:t>implemnation</a:t>
-            </a:r>
-            <a:r>
-              <a:rPr lang="en-GB" dirty="0"/>
-              <a:t> </a:t>
-            </a:r>
-          </a:p>
-          <a:p>
-            <a:r>
-              <a:rPr lang="en-GB" dirty="0"/>
-              <a:t>How I used user testing for feedback to make iterations and </a:t>
-            </a:r>
-            <a:r>
-              <a:rPr lang="en-GB" dirty="0" err="1"/>
-              <a:t>yh</a:t>
-            </a:r>
-            <a:endParaRPr lang="en-GB" dirty="0"/>
-          </a:p>
-          <a:p>
-            <a:r>
-              <a:rPr lang="en-GB"/>
-              <a:t>Analysis </a:t>
+              <a:t>Awsome</a:t>
+            </a:r>
+            <a:r>
+              <a:rPr lang="en-GB" dirty="0"/>
+              <a:t> Product </a:t>
             </a:r>
           </a:p>
         </p:txBody>
@@ -5650,7 +5646,7 @@
     </p:spTree>
     <p:extLst>
       <p:ext uri="{BB962C8B-B14F-4D97-AF65-F5344CB8AC3E}">
-        <p14:creationId xmlns:p14="http://schemas.microsoft.com/office/powerpoint/2010/main" val="2649845202"/>
+        <p14:creationId xmlns:p14="http://schemas.microsoft.com/office/powerpoint/2010/main" val="840637842"/>
       </p:ext>
     </p:extLst>
   </p:cSld>
@@ -5770,7 +5766,7 @@
           <p:cNvPr id="2" name="Title 1">
             <a:extLst>
               <a:ext uri="{FF2B5EF4-FFF2-40B4-BE49-F238E27FC236}">
-                <a16:creationId xmlns:a16="http://schemas.microsoft.com/office/drawing/2014/main" id="{19B657D5-0D05-CDB3-E622-CC74399D9293}"/>
+                <a16:creationId xmlns:a16="http://schemas.microsoft.com/office/drawing/2014/main" id="{F58F3967-18E6-8991-E8AE-620BDC2DE720}"/>
               </a:ext>
             </a:extLst>
           </p:cNvPr>
@@ -5788,7 +5784,7 @@
           <a:p>
             <a:r>
               <a:rPr lang="en-GB" dirty="0"/>
-              <a:t>MOVEMENT 2</a:t>
+              <a:t>JJ MEETINGS </a:t>
             </a:r>
           </a:p>
         </p:txBody>
@@ -5798,7 +5794,7 @@
           <p:cNvPr id="3" name="Content Placeholder 2">
             <a:extLst>
               <a:ext uri="{FF2B5EF4-FFF2-40B4-BE49-F238E27FC236}">
-                <a16:creationId xmlns:a16="http://schemas.microsoft.com/office/drawing/2014/main" id="{6ADAF85F-3274-500B-24F1-77722205A975}"/>
+                <a16:creationId xmlns:a16="http://schemas.microsoft.com/office/drawing/2014/main" id="{696F8D03-4BA6-E44A-EB92-62C49E851A3A}"/>
               </a:ext>
             </a:extLst>
           </p:cNvPr>
@@ -5815,54 +5811,51 @@
           <a:lstStyle/>
           <a:p>
             <a:r>
-              <a:rPr lang="en-GB" dirty="0"/>
-              <a:t>JUMP ONLY WORKS WHEN HELD</a:t>
-            </a:r>
-          </a:p>
-          <a:p>
-            <a:r>
-              <a:rPr lang="en-GB" dirty="0"/>
-              <a:t>KINDA BUGGY WHEN PLAYER IS BEING PUSHED </a:t>
-            </a:r>
-          </a:p>
-          <a:p>
-            <a:r>
-              <a:rPr lang="en-GB" dirty="0">
-                <a:hlinkClick r:id="rId2"/>
-              </a:rPr>
-              <a:t>https://www.youtube.com/watch?v=_QajrabyTJc&amp;t=848s</a:t>
+              <a:rPr lang="en-GB" dirty="0" err="1"/>
+              <a:t>Implementaiton</a:t>
+            </a:r>
+            <a:r>
+              <a:rPr lang="en-GB" dirty="0"/>
+              <a:t> – GDD, DESIGN LIKE THE MAP THINGS</a:t>
+            </a:r>
+          </a:p>
+          <a:p>
+            <a:r>
+              <a:rPr lang="en-GB" dirty="0"/>
+              <a:t>Methodology is how I created it like the design </a:t>
+            </a:r>
+            <a:r>
+              <a:rPr lang="en-GB" dirty="0" err="1"/>
+              <a:t>implemnation</a:t>
+            </a:r>
+            <a:r>
+              <a:rPr lang="en-GB" dirty="0"/>
+              <a:t> </a:t>
+            </a:r>
+          </a:p>
+          <a:p>
+            <a:r>
+              <a:rPr lang="en-GB" dirty="0"/>
+              <a:t>How I used user testing for feedback to make iterations and </a:t>
+            </a:r>
+            <a:r>
+              <a:rPr lang="en-GB" dirty="0" err="1"/>
+              <a:t>yh</a:t>
             </a:r>
             <a:endParaRPr lang="en-GB" dirty="0"/>
           </a:p>
           <a:p>
-            <a:endParaRPr lang="en-GB" dirty="0"/>
-          </a:p>
-          <a:p>
-            <a:r>
-              <a:rPr lang="en-GB" dirty="0"/>
-              <a:t>Can always revert back to old as  I saved them as  prefabs and old movement in separate folder </a:t>
-            </a:r>
-          </a:p>
-          <a:p>
-            <a:r>
-              <a:rPr lang="en-GB" dirty="0"/>
-              <a:t>Make sure to change movement in lvl1 </a:t>
-            </a:r>
-            <a:r>
-              <a:rPr lang="en-GB" dirty="0" err="1"/>
-              <a:t>aswel</a:t>
-            </a:r>
-            <a:endParaRPr lang="en-GB"/>
-          </a:p>
-          <a:p>
-            <a:endParaRPr lang="en-GB"/>
+            <a:r>
+              <a:rPr lang="en-GB"/>
+              <a:t>Analysis </a:t>
+            </a:r>
           </a:p>
         </p:txBody>
       </p:sp>
     </p:spTree>
     <p:extLst>
       <p:ext uri="{BB962C8B-B14F-4D97-AF65-F5344CB8AC3E}">
-        <p14:creationId xmlns:p14="http://schemas.microsoft.com/office/powerpoint/2010/main" val="3653716512"/>
+        <p14:creationId xmlns:p14="http://schemas.microsoft.com/office/powerpoint/2010/main" val="2649845202"/>
       </p:ext>
     </p:extLst>
   </p:cSld>
@@ -5894,6 +5887,130 @@
           <p:cNvPr id="2" name="Title 1">
             <a:extLst>
               <a:ext uri="{FF2B5EF4-FFF2-40B4-BE49-F238E27FC236}">
+                <a16:creationId xmlns:a16="http://schemas.microsoft.com/office/drawing/2014/main" id="{19B657D5-0D05-CDB3-E622-CC74399D9293}"/>
+              </a:ext>
+            </a:extLst>
+          </p:cNvPr>
+          <p:cNvSpPr>
+            <a:spLocks noGrp="1"/>
+          </p:cNvSpPr>
+          <p:nvPr>
+            <p:ph type="title"/>
+          </p:nvPr>
+        </p:nvSpPr>
+        <p:spPr/>
+        <p:txBody>
+          <a:bodyPr/>
+          <a:lstStyle/>
+          <a:p>
+            <a:r>
+              <a:rPr lang="en-GB" dirty="0"/>
+              <a:t>MOVEMENT 2</a:t>
+            </a:r>
+          </a:p>
+        </p:txBody>
+      </p:sp>
+      <p:sp>
+        <p:nvSpPr>
+          <p:cNvPr id="3" name="Content Placeholder 2">
+            <a:extLst>
+              <a:ext uri="{FF2B5EF4-FFF2-40B4-BE49-F238E27FC236}">
+                <a16:creationId xmlns:a16="http://schemas.microsoft.com/office/drawing/2014/main" id="{6ADAF85F-3274-500B-24F1-77722205A975}"/>
+              </a:ext>
+            </a:extLst>
+          </p:cNvPr>
+          <p:cNvSpPr>
+            <a:spLocks noGrp="1"/>
+          </p:cNvSpPr>
+          <p:nvPr>
+            <p:ph idx="1"/>
+          </p:nvPr>
+        </p:nvSpPr>
+        <p:spPr/>
+        <p:txBody>
+          <a:bodyPr/>
+          <a:lstStyle/>
+          <a:p>
+            <a:r>
+              <a:rPr lang="en-GB" dirty="0"/>
+              <a:t>JUMP ONLY WORKS WHEN HELD</a:t>
+            </a:r>
+          </a:p>
+          <a:p>
+            <a:r>
+              <a:rPr lang="en-GB" dirty="0"/>
+              <a:t>KINDA BUGGY WHEN PLAYER IS BEING PUSHED </a:t>
+            </a:r>
+          </a:p>
+          <a:p>
+            <a:r>
+              <a:rPr lang="en-GB" dirty="0">
+                <a:hlinkClick r:id="rId2"/>
+              </a:rPr>
+              <a:t>https://www.youtube.com/watch?v=_QajrabyTJc&amp;t=848s</a:t>
+            </a:r>
+            <a:endParaRPr lang="en-GB" dirty="0"/>
+          </a:p>
+          <a:p>
+            <a:endParaRPr lang="en-GB" dirty="0"/>
+          </a:p>
+          <a:p>
+            <a:r>
+              <a:rPr lang="en-GB" dirty="0"/>
+              <a:t>Can always revert back to old as  I saved them as  prefabs and old movement in separate folder </a:t>
+            </a:r>
+          </a:p>
+          <a:p>
+            <a:r>
+              <a:rPr lang="en-GB" dirty="0"/>
+              <a:t>Make sure to change movement in lvl1 </a:t>
+            </a:r>
+            <a:r>
+              <a:rPr lang="en-GB" dirty="0" err="1"/>
+              <a:t>aswel</a:t>
+            </a:r>
+            <a:endParaRPr lang="en-GB"/>
+          </a:p>
+          <a:p>
+            <a:endParaRPr lang="en-GB"/>
+          </a:p>
+        </p:txBody>
+      </p:sp>
+    </p:spTree>
+    <p:extLst>
+      <p:ext uri="{BB962C8B-B14F-4D97-AF65-F5344CB8AC3E}">
+        <p14:creationId xmlns:p14="http://schemas.microsoft.com/office/powerpoint/2010/main" val="3653716512"/>
+      </p:ext>
+    </p:extLst>
+  </p:cSld>
+  <p:clrMapOvr>
+    <a:masterClrMapping/>
+  </p:clrMapOvr>
+</p:sld>
+</file>
+
+<file path=ppt/slides/slide22.xml><?xml version="1.0" encoding="utf-8"?>
+<p:sld xmlns:a="http://schemas.openxmlformats.org/drawingml/2006/main" xmlns:r="http://schemas.openxmlformats.org/officeDocument/2006/relationships" xmlns:p="http://schemas.openxmlformats.org/presentationml/2006/main">
+  <p:cSld>
+    <p:spTree>
+      <p:nvGrpSpPr>
+        <p:cNvPr id="1" name=""/>
+        <p:cNvGrpSpPr/>
+        <p:nvPr/>
+      </p:nvGrpSpPr>
+      <p:grpSpPr>
+        <a:xfrm>
+          <a:off x="0" y="0"/>
+          <a:ext cx="0" cy="0"/>
+          <a:chOff x="0" y="0"/>
+          <a:chExt cx="0" cy="0"/>
+        </a:xfrm>
+      </p:grpSpPr>
+      <p:sp>
+        <p:nvSpPr>
+          <p:cNvPr id="2" name="Title 1">
+            <a:extLst>
+              <a:ext uri="{FF2B5EF4-FFF2-40B4-BE49-F238E27FC236}">
                 <a16:creationId xmlns:a16="http://schemas.microsoft.com/office/drawing/2014/main" id="{76F7E7E4-9827-C9EA-41A9-B8C6EF75B3BA}"/>
               </a:ext>
             </a:extLst>
@@ -6383,7 +6500,7 @@
 </p:sld>
 </file>
 
-<file path=ppt/slides/slide22.xml><?xml version="1.0" encoding="utf-8"?>
+<file path=ppt/slides/slide23.xml><?xml version="1.0" encoding="utf-8"?>
 <p:sld xmlns:a="http://schemas.openxmlformats.org/drawingml/2006/main" xmlns:r="http://schemas.openxmlformats.org/officeDocument/2006/relationships" xmlns:p="http://schemas.openxmlformats.org/presentationml/2006/main">
   <p:cSld>
     <p:spTree>
@@ -6525,7 +6642,7 @@
 </p:sld>
 </file>
 
-<file path=ppt/slides/slide23.xml><?xml version="1.0" encoding="utf-8"?>
+<file path=ppt/slides/slide24.xml><?xml version="1.0" encoding="utf-8"?>
 <p:sld xmlns:a="http://schemas.openxmlformats.org/drawingml/2006/main" xmlns:r="http://schemas.openxmlformats.org/officeDocument/2006/relationships" xmlns:p="http://schemas.openxmlformats.org/presentationml/2006/main">
   <p:cSld>
     <p:spTree>
@@ -6684,7 +6801,7 @@
 </p:sld>
 </file>
 
-<file path=ppt/slides/slide24.xml><?xml version="1.0" encoding="utf-8"?>
+<file path=ppt/slides/slide25.xml><?xml version="1.0" encoding="utf-8"?>
 <p:sld xmlns:a="http://schemas.openxmlformats.org/drawingml/2006/main" xmlns:r="http://schemas.openxmlformats.org/officeDocument/2006/relationships" xmlns:p="http://schemas.openxmlformats.org/presentationml/2006/main">
   <p:cSld>
     <p:spTree>
@@ -6806,7 +6923,7 @@
 </p:sld>
 </file>
 
-<file path=ppt/slides/slide25.xml><?xml version="1.0" encoding="utf-8"?>
+<file path=ppt/slides/slide26.xml><?xml version="1.0" encoding="utf-8"?>
 <p:sld xmlns:a="http://schemas.openxmlformats.org/drawingml/2006/main" xmlns:r="http://schemas.openxmlformats.org/officeDocument/2006/relationships" xmlns:p="http://schemas.openxmlformats.org/presentationml/2006/main">
   <p:cSld>
     <p:spTree>

</xml_diff>

<commit_message>
L2 Wave manager Finalised
Correct # of enemies spawn now instead of debug1,2,3,4,5
</commit_message>
<xml_diff>
--- a/Documentation/Report/Documentationofstuff.pptx
+++ b/Documentation/Report/Documentationofstuff.pptx
@@ -4146,7 +4146,7 @@
             </a:r>
             <a:r>
               <a:rPr lang="en-GB" dirty="0"/>
-              <a:t> </a:t>
+              <a:t> DONE</a:t>
             </a:r>
           </a:p>
           <a:p>
@@ -4166,13 +4166,31 @@
             </a:r>
             <a:r>
               <a:rPr lang="en-GB" dirty="0"/>
-              <a:t> ask </a:t>
+              <a:t> ask to polish it</a:t>
+            </a:r>
+          </a:p>
+          <a:p>
+            <a:r>
+              <a:rPr lang="en-GB" dirty="0"/>
+              <a:t>Game Over</a:t>
+            </a:r>
+          </a:p>
+          <a:p>
+            <a:r>
+              <a:rPr lang="en-GB" dirty="0"/>
+              <a:t>Start Screen – Lore – Maybe I can get a </a:t>
             </a:r>
             <a:r>
               <a:rPr lang="en-GB"/>
-              <a:t>to polish it</a:t>
+              <a:t>vid in there</a:t>
             </a:r>
             <a:endParaRPr lang="en-GB" dirty="0"/>
+          </a:p>
+          <a:p>
+            <a:r>
+              <a:rPr lang="en-GB" dirty="0"/>
+              <a:t>Pause works?</a:t>
+            </a:r>
           </a:p>
         </p:txBody>
       </p:sp>

</xml_diff>

<commit_message>
End game Ui final, button, narrator
</commit_message>
<xml_diff>
--- a/Documentation/Report/Documentationofstuff.pptx
+++ b/Documentation/Report/Documentationofstuff.pptx
@@ -286,7 +286,7 @@
           <a:p>
             <a:fld id="{C272013D-9C3F-40F8-8AC4-43A405D33223}" type="datetimeFigureOut">
               <a:rPr lang="en-GB" smtClean="0"/>
-              <a:t>10/04/2025</a:t>
+              <a:t>13/04/2025</a:t>
             </a:fld>
             <a:endParaRPr lang="en-GB"/>
           </a:p>
@@ -486,7 +486,7 @@
           <a:p>
             <a:fld id="{C272013D-9C3F-40F8-8AC4-43A405D33223}" type="datetimeFigureOut">
               <a:rPr lang="en-GB" smtClean="0"/>
-              <a:t>10/04/2025</a:t>
+              <a:t>13/04/2025</a:t>
             </a:fld>
             <a:endParaRPr lang="en-GB"/>
           </a:p>
@@ -696,7 +696,7 @@
           <a:p>
             <a:fld id="{C272013D-9C3F-40F8-8AC4-43A405D33223}" type="datetimeFigureOut">
               <a:rPr lang="en-GB" smtClean="0"/>
-              <a:t>10/04/2025</a:t>
+              <a:t>13/04/2025</a:t>
             </a:fld>
             <a:endParaRPr lang="en-GB"/>
           </a:p>
@@ -896,7 +896,7 @@
           <a:p>
             <a:fld id="{C272013D-9C3F-40F8-8AC4-43A405D33223}" type="datetimeFigureOut">
               <a:rPr lang="en-GB" smtClean="0"/>
-              <a:t>10/04/2025</a:t>
+              <a:t>13/04/2025</a:t>
             </a:fld>
             <a:endParaRPr lang="en-GB"/>
           </a:p>
@@ -1172,7 +1172,7 @@
           <a:p>
             <a:fld id="{C272013D-9C3F-40F8-8AC4-43A405D33223}" type="datetimeFigureOut">
               <a:rPr lang="en-GB" smtClean="0"/>
-              <a:t>10/04/2025</a:t>
+              <a:t>13/04/2025</a:t>
             </a:fld>
             <a:endParaRPr lang="en-GB"/>
           </a:p>
@@ -1440,7 +1440,7 @@
           <a:p>
             <a:fld id="{C272013D-9C3F-40F8-8AC4-43A405D33223}" type="datetimeFigureOut">
               <a:rPr lang="en-GB" smtClean="0"/>
-              <a:t>10/04/2025</a:t>
+              <a:t>13/04/2025</a:t>
             </a:fld>
             <a:endParaRPr lang="en-GB"/>
           </a:p>
@@ -1855,7 +1855,7 @@
           <a:p>
             <a:fld id="{C272013D-9C3F-40F8-8AC4-43A405D33223}" type="datetimeFigureOut">
               <a:rPr lang="en-GB" smtClean="0"/>
-              <a:t>10/04/2025</a:t>
+              <a:t>13/04/2025</a:t>
             </a:fld>
             <a:endParaRPr lang="en-GB"/>
           </a:p>
@@ -1997,7 +1997,7 @@
           <a:p>
             <a:fld id="{C272013D-9C3F-40F8-8AC4-43A405D33223}" type="datetimeFigureOut">
               <a:rPr lang="en-GB" smtClean="0"/>
-              <a:t>10/04/2025</a:t>
+              <a:t>13/04/2025</a:t>
             </a:fld>
             <a:endParaRPr lang="en-GB"/>
           </a:p>
@@ -2110,7 +2110,7 @@
           <a:p>
             <a:fld id="{C272013D-9C3F-40F8-8AC4-43A405D33223}" type="datetimeFigureOut">
               <a:rPr lang="en-GB" smtClean="0"/>
-              <a:t>10/04/2025</a:t>
+              <a:t>13/04/2025</a:t>
             </a:fld>
             <a:endParaRPr lang="en-GB"/>
           </a:p>
@@ -2423,7 +2423,7 @@
           <a:p>
             <a:fld id="{C272013D-9C3F-40F8-8AC4-43A405D33223}" type="datetimeFigureOut">
               <a:rPr lang="en-GB" smtClean="0"/>
-              <a:t>10/04/2025</a:t>
+              <a:t>13/04/2025</a:t>
             </a:fld>
             <a:endParaRPr lang="en-GB"/>
           </a:p>
@@ -2712,7 +2712,7 @@
           <a:p>
             <a:fld id="{C272013D-9C3F-40F8-8AC4-43A405D33223}" type="datetimeFigureOut">
               <a:rPr lang="en-GB" smtClean="0"/>
-              <a:t>10/04/2025</a:t>
+              <a:t>13/04/2025</a:t>
             </a:fld>
             <a:endParaRPr lang="en-GB"/>
           </a:p>
@@ -2955,7 +2955,7 @@
           <a:p>
             <a:fld id="{C272013D-9C3F-40F8-8AC4-43A405D33223}" type="datetimeFigureOut">
               <a:rPr lang="en-GB" smtClean="0"/>
-              <a:t>10/04/2025</a:t>
+              <a:t>13/04/2025</a:t>
             </a:fld>
             <a:endParaRPr lang="en-GB"/>
           </a:p>
@@ -4146,8 +4146,25 @@
             </a:r>
             <a:r>
               <a:rPr lang="en-GB" dirty="0"/>
-              <a:t> DONE</a:t>
-            </a:r>
+              <a:t> proper spawn  </a:t>
+            </a:r>
+            <a:r>
+              <a:rPr lang="en-GB" dirty="0">
+                <a:highlight>
+                  <a:srgbClr val="00FF00"/>
+                </a:highlight>
+              </a:rPr>
+              <a:t>DONE</a:t>
+            </a:r>
+          </a:p>
+          <a:p>
+            <a:r>
+              <a:rPr lang="en-GB" dirty="0"/>
+              <a:t>Start Screen – Lore – Maybe I can get a vid in there</a:t>
+            </a:r>
+          </a:p>
+          <a:p>
+            <a:endParaRPr lang="en-GB" dirty="0"/>
           </a:p>
           <a:p>
             <a:r>
@@ -4174,17 +4191,6 @@
               <a:rPr lang="en-GB" dirty="0"/>
               <a:t>Game Over</a:t>
             </a:r>
-          </a:p>
-          <a:p>
-            <a:r>
-              <a:rPr lang="en-GB" dirty="0"/>
-              <a:t>Start Screen – Lore – Maybe I can get a </a:t>
-            </a:r>
-            <a:r>
-              <a:rPr lang="en-GB"/>
-              <a:t>vid in there</a:t>
-            </a:r>
-            <a:endParaRPr lang="en-GB" dirty="0"/>
           </a:p>
           <a:p>
             <a:r>

</xml_diff>

<commit_message>
Start Menu + Intro "Cutscene" audio and ui
</commit_message>
<xml_diff>
--- a/Documentation/Report/Documentationofstuff.pptx
+++ b/Documentation/Report/Documentationofstuff.pptx
@@ -9,14 +9,14 @@
     <p:sldId id="257" r:id="rId3"/>
     <p:sldId id="258" r:id="rId4"/>
     <p:sldId id="259" r:id="rId5"/>
-    <p:sldId id="265" r:id="rId6"/>
-    <p:sldId id="261" r:id="rId7"/>
-    <p:sldId id="278" r:id="rId8"/>
-    <p:sldId id="270" r:id="rId9"/>
-    <p:sldId id="269" r:id="rId10"/>
-    <p:sldId id="271" r:id="rId11"/>
-    <p:sldId id="279" r:id="rId12"/>
-    <p:sldId id="280" r:id="rId13"/>
+    <p:sldId id="261" r:id="rId6"/>
+    <p:sldId id="278" r:id="rId7"/>
+    <p:sldId id="270" r:id="rId8"/>
+    <p:sldId id="269" r:id="rId9"/>
+    <p:sldId id="271" r:id="rId10"/>
+    <p:sldId id="279" r:id="rId11"/>
+    <p:sldId id="280" r:id="rId12"/>
+    <p:sldId id="265" r:id="rId13"/>
     <p:sldId id="281" r:id="rId14"/>
     <p:sldId id="272" r:id="rId15"/>
     <p:sldId id="273" r:id="rId16"/>
@@ -3728,7 +3728,7 @@
           <p:cNvPr id="2" name="Title 1">
             <a:extLst>
               <a:ext uri="{FF2B5EF4-FFF2-40B4-BE49-F238E27FC236}">
-                <a16:creationId xmlns:a16="http://schemas.microsoft.com/office/drawing/2014/main" id="{F7DE0487-4631-3ED0-1DC0-E15CA3D6C02F}"/>
+                <a16:creationId xmlns:a16="http://schemas.microsoft.com/office/drawing/2014/main" id="{B77D41FD-9986-1522-7F39-2F3797ACF905}"/>
               </a:ext>
             </a:extLst>
           </p:cNvPr>
@@ -3746,7 +3746,7 @@
           <a:p>
             <a:r>
               <a:rPr lang="en-GB" dirty="0"/>
-              <a:t>Enemy Shoot</a:t>
+              <a:t>L2 Polish - AUDIO</a:t>
             </a:r>
           </a:p>
         </p:txBody>
@@ -3756,7 +3756,7 @@
           <p:cNvPr id="3" name="Content Placeholder 2">
             <a:extLst>
               <a:ext uri="{FF2B5EF4-FFF2-40B4-BE49-F238E27FC236}">
-                <a16:creationId xmlns:a16="http://schemas.microsoft.com/office/drawing/2014/main" id="{845461F8-2BD3-76F1-C139-F952972A7763}"/>
+                <a16:creationId xmlns:a16="http://schemas.microsoft.com/office/drawing/2014/main" id="{337ECE3A-AF22-F6A8-4E19-9B18C7257820}"/>
               </a:ext>
             </a:extLst>
           </p:cNvPr>
@@ -3774,21 +3774,25 @@
           <a:p>
             <a:r>
               <a:rPr lang="en-GB" dirty="0"/>
-              <a:t>Seems to be shooting bent left, also seems as the </a:t>
-            </a:r>
-            <a:r>
-              <a:rPr lang="en-GB" dirty="0" err="1"/>
-              <a:t>ememies</a:t>
-            </a:r>
-            <a:r>
-              <a:rPr lang="en-GB" dirty="0"/>
-              <a:t> damage themselves</a:t>
-            </a:r>
-          </a:p>
-          <a:p>
-            <a:r>
-              <a:rPr lang="en-GB" dirty="0"/>
-              <a:t>I actual don’t know it just de spawns</a:t>
+              <a:t>Audio https://pixabay.com/sound-effects/building-happy-dreams-251941/</a:t>
+            </a:r>
+          </a:p>
+          <a:p>
+            <a:r>
+              <a:rPr lang="en-GB" dirty="0"/>
+              <a:t>Metal drilling in the morgue -https://pixabay.com/sound-effects/eerie-metalic-noise-75420/</a:t>
+            </a:r>
+          </a:p>
+          <a:p>
+            <a:r>
+              <a:rPr lang="en-GB" dirty="0"/>
+              <a:t>Background audio across whole ting -https://pixabay.com/sound-effects/eerie-background-54412/</a:t>
+            </a:r>
+          </a:p>
+          <a:p>
+            <a:r>
+              <a:rPr lang="en-GB" dirty="0"/>
+              <a:t>Zombie https://pixabay.com/sound-effects/zombie-1-22336/</a:t>
             </a:r>
           </a:p>
         </p:txBody>
@@ -3796,7 +3800,7 @@
     </p:spTree>
     <p:extLst>
       <p:ext uri="{BB962C8B-B14F-4D97-AF65-F5344CB8AC3E}">
-        <p14:creationId xmlns:p14="http://schemas.microsoft.com/office/powerpoint/2010/main" val="1736404469"/>
+        <p14:creationId xmlns:p14="http://schemas.microsoft.com/office/powerpoint/2010/main" val="1436974950"/>
       </p:ext>
     </p:extLst>
   </p:cSld>
@@ -3828,7 +3832,7 @@
           <p:cNvPr id="2" name="Title 1">
             <a:extLst>
               <a:ext uri="{FF2B5EF4-FFF2-40B4-BE49-F238E27FC236}">
-                <a16:creationId xmlns:a16="http://schemas.microsoft.com/office/drawing/2014/main" id="{B77D41FD-9986-1522-7F39-2F3797ACF905}"/>
+                <a16:creationId xmlns:a16="http://schemas.microsoft.com/office/drawing/2014/main" id="{45CABA0E-A29F-5EC3-E64A-F95AED7B7134}"/>
               </a:ext>
             </a:extLst>
           </p:cNvPr>
@@ -3846,7 +3850,7 @@
           <a:p>
             <a:r>
               <a:rPr lang="en-GB" dirty="0"/>
-              <a:t>L2 Polish - AUDIO</a:t>
+              <a:t>Power Ups (if I get this working it can be used on all)</a:t>
             </a:r>
           </a:p>
         </p:txBody>
@@ -3856,7 +3860,7 @@
           <p:cNvPr id="3" name="Content Placeholder 2">
             <a:extLst>
               <a:ext uri="{FF2B5EF4-FFF2-40B4-BE49-F238E27FC236}">
-                <a16:creationId xmlns:a16="http://schemas.microsoft.com/office/drawing/2014/main" id="{337ECE3A-AF22-F6A8-4E19-9B18C7257820}"/>
+                <a16:creationId xmlns:a16="http://schemas.microsoft.com/office/drawing/2014/main" id="{8053B12C-00CE-BE4E-7D14-C7B9E9DB069C}"/>
               </a:ext>
             </a:extLst>
           </p:cNvPr>
@@ -3869,38 +3873,97 @@
         </p:nvSpPr>
         <p:spPr/>
         <p:txBody>
-          <a:bodyPr/>
-          <a:lstStyle/>
-          <a:p>
-            <a:r>
-              <a:rPr lang="en-GB" dirty="0"/>
-              <a:t>Audio https://pixabay.com/sound-effects/building-happy-dreams-251941/</a:t>
-            </a:r>
-          </a:p>
-          <a:p>
-            <a:r>
-              <a:rPr lang="en-GB" dirty="0"/>
-              <a:t>Metal drilling in the morgue -https://pixabay.com/sound-effects/eerie-metalic-noise-75420/</a:t>
-            </a:r>
-          </a:p>
-          <a:p>
-            <a:r>
-              <a:rPr lang="en-GB" dirty="0"/>
-              <a:t>Background audio across whole ting -https://pixabay.com/sound-effects/eerie-background-54412/</a:t>
-            </a:r>
-          </a:p>
-          <a:p>
-            <a:r>
-              <a:rPr lang="en-GB" dirty="0"/>
-              <a:t>Zombie https://pixabay.com/sound-effects/zombie-1-22336/</a:t>
-            </a:r>
+          <a:bodyPr>
+            <a:normAutofit/>
+          </a:bodyPr>
+          <a:lstStyle/>
+          <a:p>
+            <a:r>
+              <a:rPr lang="en-GB" sz="1800" dirty="0"/>
+              <a:t>Health (Put health to max) Done</a:t>
+            </a:r>
+          </a:p>
+          <a:p>
+            <a:r>
+              <a:rPr lang="en-GB" sz="1800" dirty="0" err="1"/>
+              <a:t>Infanite</a:t>
+            </a:r>
+            <a:r>
+              <a:rPr lang="en-GB" sz="1800" dirty="0"/>
+              <a:t> ammo (30 sec)   Not Done </a:t>
+            </a:r>
+          </a:p>
+          <a:p>
+            <a:r>
+              <a:rPr lang="en-GB" sz="1800" dirty="0" err="1"/>
+              <a:t>Doubble</a:t>
+            </a:r>
+            <a:r>
+              <a:rPr lang="en-GB" sz="1800" dirty="0"/>
+              <a:t> Speed? Done – If I want in L1 I need to update the movement </a:t>
+            </a:r>
+          </a:p>
+          <a:p>
+            <a:r>
+              <a:rPr lang="en-GB" sz="1800" dirty="0" err="1"/>
+              <a:t>Invinicability</a:t>
+            </a:r>
+            <a:r>
+              <a:rPr lang="en-GB" sz="1800" dirty="0"/>
+              <a:t> (15 sec) DONE</a:t>
+            </a:r>
+          </a:p>
+          <a:p>
+            <a:pPr marL="0" indent="0">
+              <a:buNone/>
+            </a:pPr>
+            <a:endParaRPr lang="en-GB" sz="1800" dirty="0"/>
+          </a:p>
+          <a:p>
+            <a:r>
+              <a:rPr lang="en-GB" sz="1800" dirty="0" err="1"/>
+              <a:t>Deleteed</a:t>
+            </a:r>
+            <a:r>
+              <a:rPr lang="en-GB" sz="1800" dirty="0"/>
+              <a:t> a script from player or </a:t>
+            </a:r>
+            <a:r>
+              <a:rPr lang="en-GB" sz="1800" dirty="0" err="1"/>
+              <a:t>canvus</a:t>
+            </a:r>
+            <a:r>
+              <a:rPr lang="en-GB" sz="1800" dirty="0"/>
+              <a:t> idk , deleted a lot , make sure all works on l2 before messing w scene 1</a:t>
+            </a:r>
+          </a:p>
+          <a:p>
+            <a:pPr marL="0" indent="0">
+              <a:buNone/>
+            </a:pPr>
+            <a:endParaRPr lang="en-GB" sz="1800" dirty="0"/>
+          </a:p>
+          <a:p>
+            <a:r>
+              <a:rPr lang="en-GB" sz="1800" dirty="0"/>
+              <a:t>UI AND COLOUR MAYBE SFX</a:t>
+            </a:r>
+          </a:p>
+          <a:p>
+            <a:r>
+              <a:rPr lang="en-GB" sz="1800" dirty="0"/>
+              <a:t>SFX / Timer </a:t>
+            </a:r>
+          </a:p>
+          <a:p>
+            <a:endParaRPr lang="en-GB" sz="1800" dirty="0"/>
           </a:p>
         </p:txBody>
       </p:sp>
     </p:spTree>
     <p:extLst>
       <p:ext uri="{BB962C8B-B14F-4D97-AF65-F5344CB8AC3E}">
-        <p14:creationId xmlns:p14="http://schemas.microsoft.com/office/powerpoint/2010/main" val="1436974950"/>
+        <p14:creationId xmlns:p14="http://schemas.microsoft.com/office/powerpoint/2010/main" val="2410738142"/>
       </p:ext>
     </p:extLst>
   </p:cSld>
@@ -3932,7 +3995,7 @@
           <p:cNvPr id="2" name="Title 1">
             <a:extLst>
               <a:ext uri="{FF2B5EF4-FFF2-40B4-BE49-F238E27FC236}">
-                <a16:creationId xmlns:a16="http://schemas.microsoft.com/office/drawing/2014/main" id="{45CABA0E-A29F-5EC3-E64A-F95AED7B7134}"/>
+                <a16:creationId xmlns:a16="http://schemas.microsoft.com/office/drawing/2014/main" id="{A74688DE-9C4C-94A4-28D9-89EA6EB9A93F}"/>
               </a:ext>
             </a:extLst>
           </p:cNvPr>
@@ -3949,9 +4012,13 @@
           <a:lstStyle/>
           <a:p>
             <a:r>
-              <a:rPr lang="en-GB" dirty="0"/>
-              <a:t>Power Ups (if I get this working it can be used on all)</a:t>
-            </a:r>
+              <a:rPr lang="en-GB" b="1" dirty="0"/>
+              <a:t>Scene Flow</a:t>
+            </a:r>
+            <a:br>
+              <a:rPr lang="en-GB" b="1" dirty="0"/>
+            </a:br>
+            <a:endParaRPr lang="en-GB" dirty="0"/>
           </a:p>
         </p:txBody>
       </p:sp>
@@ -3960,7 +4027,7 @@
           <p:cNvPr id="3" name="Content Placeholder 2">
             <a:extLst>
               <a:ext uri="{FF2B5EF4-FFF2-40B4-BE49-F238E27FC236}">
-                <a16:creationId xmlns:a16="http://schemas.microsoft.com/office/drawing/2014/main" id="{8053B12C-00CE-BE4E-7D14-C7B9E9DB069C}"/>
+                <a16:creationId xmlns:a16="http://schemas.microsoft.com/office/drawing/2014/main" id="{F0A16279-9A53-323B-3B2C-1B5C11E7D0EF}"/>
               </a:ext>
             </a:extLst>
           </p:cNvPr>
@@ -3973,97 +4040,44 @@
         </p:nvSpPr>
         <p:spPr/>
         <p:txBody>
-          <a:bodyPr>
-            <a:normAutofit/>
-          </a:bodyPr>
-          <a:lstStyle/>
-          <a:p>
-            <a:r>
-              <a:rPr lang="en-GB" sz="1800" dirty="0"/>
-              <a:t>Health (Put health to max) Done</a:t>
-            </a:r>
-          </a:p>
-          <a:p>
-            <a:r>
-              <a:rPr lang="en-GB" sz="1800" dirty="0" err="1"/>
-              <a:t>Infanite</a:t>
-            </a:r>
-            <a:r>
-              <a:rPr lang="en-GB" sz="1800" dirty="0"/>
-              <a:t> ammo (30 sec)   Not Done </a:t>
-            </a:r>
-          </a:p>
-          <a:p>
-            <a:r>
-              <a:rPr lang="en-GB" sz="1800" dirty="0" err="1"/>
-              <a:t>Doubble</a:t>
-            </a:r>
-            <a:r>
-              <a:rPr lang="en-GB" sz="1800" dirty="0"/>
-              <a:t> Speed? Done – If I want in L1 I need to update the movement </a:t>
-            </a:r>
-          </a:p>
-          <a:p>
-            <a:r>
-              <a:rPr lang="en-GB" sz="1800" dirty="0" err="1"/>
-              <a:t>Invinicability</a:t>
-            </a:r>
-            <a:r>
-              <a:rPr lang="en-GB" sz="1800" dirty="0"/>
-              <a:t> (15 sec) DONE</a:t>
-            </a:r>
-          </a:p>
-          <a:p>
-            <a:pPr marL="0" indent="0">
-              <a:buNone/>
+          <a:bodyPr/>
+          <a:lstStyle/>
+          <a:p>
+            <a:pPr>
+              <a:buFont typeface="Arial" panose="020B0604020202020204" pitchFamily="34" charset="0"/>
+              <a:buChar char="•"/>
             </a:pPr>
-            <a:endParaRPr lang="en-GB" sz="1800" dirty="0"/>
-          </a:p>
-          <a:p>
-            <a:r>
-              <a:rPr lang="en-GB" sz="1800" dirty="0" err="1"/>
-              <a:t>Deleteed</a:t>
-            </a:r>
-            <a:r>
-              <a:rPr lang="en-GB" sz="1800" dirty="0"/>
-              <a:t> a script from player or </a:t>
-            </a:r>
-            <a:r>
-              <a:rPr lang="en-GB" sz="1800" dirty="0" err="1"/>
-              <a:t>canvus</a:t>
-            </a:r>
-            <a:r>
-              <a:rPr lang="en-GB" sz="1800" dirty="0"/>
-              <a:t> idk , deleted a lot , make sure all works on l2 before messing w scene 1</a:t>
-            </a:r>
-          </a:p>
-          <a:p>
-            <a:pPr marL="0" indent="0">
-              <a:buNone/>
-            </a:pPr>
-            <a:endParaRPr lang="en-GB" sz="1800" dirty="0"/>
-          </a:p>
-          <a:p>
-            <a:r>
-              <a:rPr lang="en-GB" sz="1800" dirty="0"/>
-              <a:t>UI AND COLOUR MAYBE SFX</a:t>
-            </a:r>
-          </a:p>
-          <a:p>
-            <a:r>
-              <a:rPr lang="en-GB" sz="1800" dirty="0"/>
-              <a:t>SFX / Timer </a:t>
-            </a:r>
-          </a:p>
-          <a:p>
-            <a:endParaRPr lang="en-GB" sz="1800" dirty="0"/>
+            <a:r>
+              <a:rPr lang="en-GB" b="1" dirty="0" err="1"/>
+              <a:t>MainMenu</a:t>
+            </a:r>
+            <a:r>
+              <a:rPr lang="en-GB" b="1" dirty="0"/>
+              <a:t> → Level1 → Loading → Level2 → Loading → Level3 → </a:t>
+            </a:r>
+            <a:r>
+              <a:rPr lang="en-GB" b="1" dirty="0" err="1"/>
+              <a:t>EndScreen</a:t>
+            </a:r>
+            <a:r>
+              <a:rPr lang="en-GB" b="1" dirty="0"/>
+              <a:t> → </a:t>
+            </a:r>
+            <a:r>
+              <a:rPr lang="en-GB" b="1" dirty="0" err="1"/>
+              <a:t>MainMenu</a:t>
+            </a:r>
+            <a:endParaRPr lang="en-GB" dirty="0"/>
+          </a:p>
+          <a:p>
+            <a:endParaRPr lang="en-GB" dirty="0"/>
           </a:p>
         </p:txBody>
       </p:sp>
     </p:spTree>
     <p:extLst>
       <p:ext uri="{BB962C8B-B14F-4D97-AF65-F5344CB8AC3E}">
-        <p14:creationId xmlns:p14="http://schemas.microsoft.com/office/powerpoint/2010/main" val="2410738142"/>
+        <p14:creationId xmlns:p14="http://schemas.microsoft.com/office/powerpoint/2010/main" val="2796165813"/>
       </p:ext>
     </p:extLst>
   </p:cSld>
@@ -4188,8 +4202,44 @@
           </a:p>
           <a:p>
             <a:r>
-              <a:rPr lang="en-GB" dirty="0"/>
-              <a:t>Game Over</a:t>
+              <a:rPr lang="en-GB" dirty="0">
+                <a:highlight>
+                  <a:srgbClr val="00FF00"/>
+                </a:highlight>
+              </a:rPr>
+              <a:t>Game Over (</a:t>
+            </a:r>
+            <a:r>
+              <a:rPr lang="en-GB" dirty="0" err="1">
+                <a:highlight>
+                  <a:srgbClr val="FFFF00"/>
+                </a:highlight>
+              </a:rPr>
+              <a:t>btn</a:t>
+            </a:r>
+            <a:r>
+              <a:rPr lang="en-GB" dirty="0">
+                <a:highlight>
+                  <a:srgbClr val="FFFF00"/>
+                </a:highlight>
+              </a:rPr>
+              <a:t> to go back 2 start screen </a:t>
+            </a:r>
+            <a:r>
+              <a:rPr lang="en-GB" dirty="0" err="1">
+                <a:highlight>
+                  <a:srgbClr val="FFFF00"/>
+                </a:highlight>
+              </a:rPr>
+              <a:t>tho</a:t>
+            </a:r>
+            <a:r>
+              <a:rPr lang="en-GB" dirty="0">
+                <a:highlight>
+                  <a:srgbClr val="FFFF00"/>
+                </a:highlight>
+              </a:rPr>
+              <a:t>)</a:t>
             </a:r>
           </a:p>
           <a:p>
@@ -7298,7 +7348,7 @@
           <p:cNvPr id="2" name="Title 1">
             <a:extLst>
               <a:ext uri="{FF2B5EF4-FFF2-40B4-BE49-F238E27FC236}">
-                <a16:creationId xmlns:a16="http://schemas.microsoft.com/office/drawing/2014/main" id="{A74688DE-9C4C-94A4-28D9-89EA6EB9A93F}"/>
+                <a16:creationId xmlns:a16="http://schemas.microsoft.com/office/drawing/2014/main" id="{5B68C855-5DB6-9A1A-D0CF-E16FEB6FFD48}"/>
               </a:ext>
             </a:extLst>
           </p:cNvPr>
@@ -7315,13 +7365,9 @@
           <a:lstStyle/>
           <a:p>
             <a:r>
-              <a:rPr lang="en-GB" b="1" dirty="0"/>
-              <a:t>Scene Flow</a:t>
-            </a:r>
-            <a:br>
-              <a:rPr lang="en-GB" b="1" dirty="0"/>
-            </a:br>
-            <a:endParaRPr lang="en-GB" dirty="0"/>
+              <a:rPr lang="en-GB" dirty="0"/>
+              <a:t>I THINK RN</a:t>
+            </a:r>
           </a:p>
         </p:txBody>
       </p:sp>
@@ -7330,7 +7376,7 @@
           <p:cNvPr id="3" name="Content Placeholder 2">
             <a:extLst>
               <a:ext uri="{FF2B5EF4-FFF2-40B4-BE49-F238E27FC236}">
-                <a16:creationId xmlns:a16="http://schemas.microsoft.com/office/drawing/2014/main" id="{F0A16279-9A53-323B-3B2C-1B5C11E7D0EF}"/>
+                <a16:creationId xmlns:a16="http://schemas.microsoft.com/office/drawing/2014/main" id="{513ED3D6-07D7-A298-9458-397260D7FA2C}"/>
               </a:ext>
             </a:extLst>
           </p:cNvPr>
@@ -7346,41 +7392,65 @@
           <a:bodyPr/>
           <a:lstStyle/>
           <a:p>
-            <a:pPr>
-              <a:buFont typeface="Arial" panose="020B0604020202020204" pitchFamily="34" charset="0"/>
-              <a:buChar char="•"/>
-            </a:pPr>
-            <a:r>
-              <a:rPr lang="en-GB" b="1" dirty="0" err="1"/>
-              <a:t>MainMenu</a:t>
-            </a:r>
-            <a:r>
-              <a:rPr lang="en-GB" b="1" dirty="0"/>
-              <a:t> → Level1 → Loading → Level2 → Loading → Level3 → </a:t>
-            </a:r>
-            <a:r>
-              <a:rPr lang="en-GB" b="1" dirty="0" err="1"/>
-              <a:t>EndScreen</a:t>
-            </a:r>
-            <a:r>
-              <a:rPr lang="en-GB" b="1" dirty="0"/>
-              <a:t> → </a:t>
-            </a:r>
-            <a:r>
-              <a:rPr lang="en-GB" b="1" dirty="0" err="1"/>
-              <a:t>MainMenu</a:t>
-            </a:r>
-            <a:endParaRPr lang="en-GB" dirty="0"/>
-          </a:p>
-          <a:p>
-            <a:endParaRPr lang="en-GB" dirty="0"/>
+            <a:r>
+              <a:rPr lang="en-GB" dirty="0"/>
+              <a:t>Going to get all levels working , enemies , boss , part , next level</a:t>
+            </a:r>
+          </a:p>
+          <a:p>
+            <a:r>
+              <a:rPr lang="en-GB" dirty="0"/>
+              <a:t> </a:t>
+            </a:r>
+          </a:p>
+          <a:p>
+            <a:r>
+              <a:rPr lang="en-GB" dirty="0"/>
+              <a:t>Then , Audio, Power Ups, Animations </a:t>
+            </a:r>
+          </a:p>
+          <a:p>
+            <a:r>
+              <a:rPr lang="en-GB" dirty="0"/>
+              <a:t>NEW MOVEMENT IS GOOD BUT JUMP NOT WORK (GROUNDCHECK) AND ENEMIES ARENT ATTACKINGBUT DO FOLLOW WHAT THE FUCK</a:t>
+            </a:r>
+          </a:p>
+          <a:p>
+            <a:r>
+              <a:rPr lang="en-GB" dirty="0"/>
+              <a:t>Fuck </a:t>
+            </a:r>
+            <a:r>
+              <a:rPr lang="en-GB" dirty="0" err="1"/>
+              <a:t>alla</a:t>
+            </a:r>
+            <a:r>
+              <a:rPr lang="en-GB" dirty="0"/>
+              <a:t> that I need to finish polishing 1 and 2 </a:t>
+            </a:r>
+            <a:r>
+              <a:rPr lang="en-GB" dirty="0" err="1"/>
+              <a:t>cuz</a:t>
+            </a:r>
+            <a:r>
+              <a:rPr lang="en-GB" dirty="0"/>
+              <a:t> </a:t>
+            </a:r>
+            <a:r>
+              <a:rPr lang="en-GB" dirty="0" err="1"/>
+              <a:t>jj</a:t>
+            </a:r>
+            <a:r>
+              <a:rPr lang="en-GB" dirty="0"/>
+              <a:t> doesn’t like it</a:t>
+            </a:r>
           </a:p>
         </p:txBody>
       </p:sp>
     </p:spTree>
     <p:extLst>
       <p:ext uri="{BB962C8B-B14F-4D97-AF65-F5344CB8AC3E}">
-        <p14:creationId xmlns:p14="http://schemas.microsoft.com/office/powerpoint/2010/main" val="2796165813"/>
+        <p14:creationId xmlns:p14="http://schemas.microsoft.com/office/powerpoint/2010/main" val="3884251571"/>
       </p:ext>
     </p:extLst>
   </p:cSld>
@@ -7412,7 +7482,7 @@
           <p:cNvPr id="2" name="Title 1">
             <a:extLst>
               <a:ext uri="{FF2B5EF4-FFF2-40B4-BE49-F238E27FC236}">
-                <a16:creationId xmlns:a16="http://schemas.microsoft.com/office/drawing/2014/main" id="{5B68C855-5DB6-9A1A-D0CF-E16FEB6FFD48}"/>
+                <a16:creationId xmlns:a16="http://schemas.microsoft.com/office/drawing/2014/main" id="{96DB6391-18EC-681A-BFBA-0802844ED020}"/>
               </a:ext>
             </a:extLst>
           </p:cNvPr>
@@ -7430,7 +7500,7 @@
           <a:p>
             <a:r>
               <a:rPr lang="en-GB" dirty="0"/>
-              <a:t>I THINK RN</a:t>
+              <a:t>Boss</a:t>
             </a:r>
           </a:p>
         </p:txBody>
@@ -7440,7 +7510,7 @@
           <p:cNvPr id="3" name="Content Placeholder 2">
             <a:extLst>
               <a:ext uri="{FF2B5EF4-FFF2-40B4-BE49-F238E27FC236}">
-                <a16:creationId xmlns:a16="http://schemas.microsoft.com/office/drawing/2014/main" id="{513ED3D6-07D7-A298-9458-397260D7FA2C}"/>
+                <a16:creationId xmlns:a16="http://schemas.microsoft.com/office/drawing/2014/main" id="{EE726FCD-E8F2-E446-5B7C-C925AFCFC243}"/>
               </a:ext>
             </a:extLst>
           </p:cNvPr>
@@ -7458,55 +7528,37 @@
           <a:p>
             <a:r>
               <a:rPr lang="en-GB" dirty="0"/>
-              <a:t>Going to get all levels working , enemies , boss , part , next level</a:t>
-            </a:r>
-          </a:p>
-          <a:p>
-            <a:r>
-              <a:rPr lang="en-GB" dirty="0"/>
-              <a:t> </a:t>
-            </a:r>
-          </a:p>
-          <a:p>
-            <a:r>
-              <a:rPr lang="en-GB" dirty="0"/>
-              <a:t>Then , Audio, Power Ups, Animations </a:t>
-            </a:r>
-          </a:p>
-          <a:p>
-            <a:r>
-              <a:rPr lang="en-GB" dirty="0"/>
-              <a:t>NEW MOVEMENT IS GOOD BUT JUMP NOT WORK (GROUNDCHECK) AND ENEMIES ARENT ATTACKINGBUT DO FOLLOW WHAT THE FUCK</a:t>
-            </a:r>
-          </a:p>
-          <a:p>
-            <a:r>
-              <a:rPr lang="en-GB" dirty="0"/>
-              <a:t>Fuck </a:t>
-            </a:r>
-            <a:r>
-              <a:rPr lang="en-GB" dirty="0" err="1"/>
-              <a:t>alla</a:t>
-            </a:r>
-            <a:r>
-              <a:rPr lang="en-GB" dirty="0"/>
-              <a:t> that I need to finish polishing 1 and 2 </a:t>
-            </a:r>
-            <a:r>
-              <a:rPr lang="en-GB" dirty="0" err="1"/>
-              <a:t>cuz</a:t>
-            </a:r>
-            <a:r>
-              <a:rPr lang="en-GB" dirty="0"/>
-              <a:t> </a:t>
-            </a:r>
-            <a:r>
-              <a:rPr lang="en-GB" dirty="0" err="1"/>
-              <a:t>jj</a:t>
-            </a:r>
-            <a:r>
-              <a:rPr lang="en-GB" dirty="0"/>
-              <a:t> doesn’t like it</a:t>
+              <a:t>Model</a:t>
+            </a:r>
+          </a:p>
+          <a:p>
+            <a:r>
+              <a:rPr lang="en-GB" dirty="0"/>
+              <a:t>Animation </a:t>
+            </a:r>
+          </a:p>
+          <a:p>
+            <a:r>
+              <a:rPr lang="en-GB" dirty="0"/>
+              <a:t>Attack</a:t>
+            </a:r>
+          </a:p>
+          <a:p>
+            <a:r>
+              <a:rPr lang="en-GB" dirty="0"/>
+              <a:t>Ok so the Boss Spawns in when there is not bullet script attached</a:t>
+            </a:r>
+          </a:p>
+          <a:p>
+            <a:r>
+              <a:rPr lang="en-GB" dirty="0"/>
+              <a:t>Looks like there is just a huge issue in enemy  bullets</a:t>
+            </a:r>
+          </a:p>
+          <a:p>
+            <a:r>
+              <a:rPr lang="en-GB" dirty="0"/>
+              <a:t>Ok I HAVE NO FUCKING IDEA IT JUST BREAKS</a:t>
             </a:r>
           </a:p>
         </p:txBody>
@@ -7514,7 +7566,7 @@
     </p:spTree>
     <p:extLst>
       <p:ext uri="{BB962C8B-B14F-4D97-AF65-F5344CB8AC3E}">
-        <p14:creationId xmlns:p14="http://schemas.microsoft.com/office/powerpoint/2010/main" val="3884251571"/>
+        <p14:creationId xmlns:p14="http://schemas.microsoft.com/office/powerpoint/2010/main" val="1031901185"/>
       </p:ext>
     </p:extLst>
   </p:cSld>
@@ -7546,91 +7598,112 @@
           <p:cNvPr id="2" name="Title 1">
             <a:extLst>
               <a:ext uri="{FF2B5EF4-FFF2-40B4-BE49-F238E27FC236}">
-                <a16:creationId xmlns:a16="http://schemas.microsoft.com/office/drawing/2014/main" id="{96DB6391-18EC-681A-BFBA-0802844ED020}"/>
-              </a:ext>
-            </a:extLst>
-          </p:cNvPr>
-          <p:cNvSpPr>
-            <a:spLocks noGrp="1"/>
-          </p:cNvSpPr>
-          <p:nvPr>
-            <p:ph type="title"/>
-          </p:nvPr>
-        </p:nvSpPr>
-        <p:spPr/>
-        <p:txBody>
-          <a:bodyPr/>
-          <a:lstStyle/>
-          <a:p>
-            <a:r>
-              <a:rPr lang="en-GB" dirty="0"/>
-              <a:t>Boss</a:t>
-            </a:r>
-          </a:p>
-        </p:txBody>
-      </p:sp>
-      <p:sp>
-        <p:nvSpPr>
-          <p:cNvPr id="3" name="Content Placeholder 2">
-            <a:extLst>
-              <a:ext uri="{FF2B5EF4-FFF2-40B4-BE49-F238E27FC236}">
-                <a16:creationId xmlns:a16="http://schemas.microsoft.com/office/drawing/2014/main" id="{EE726FCD-E8F2-E446-5B7C-C925AFCFC243}"/>
-              </a:ext>
-            </a:extLst>
-          </p:cNvPr>
-          <p:cNvSpPr>
-            <a:spLocks noGrp="1"/>
-          </p:cNvSpPr>
-          <p:nvPr>
-            <p:ph idx="1"/>
-          </p:nvPr>
-        </p:nvSpPr>
-        <p:spPr/>
-        <p:txBody>
-          <a:bodyPr/>
-          <a:lstStyle/>
-          <a:p>
-            <a:r>
-              <a:rPr lang="en-GB" dirty="0"/>
-              <a:t>Model</a:t>
-            </a:r>
-          </a:p>
-          <a:p>
-            <a:r>
-              <a:rPr lang="en-GB" dirty="0"/>
-              <a:t>Animation </a:t>
-            </a:r>
-          </a:p>
-          <a:p>
-            <a:r>
-              <a:rPr lang="en-GB" dirty="0"/>
-              <a:t>Attack</a:t>
-            </a:r>
-          </a:p>
-          <a:p>
-            <a:r>
-              <a:rPr lang="en-GB" dirty="0"/>
-              <a:t>Ok so the Boss Spawns in when there is not bullet script attached</a:t>
-            </a:r>
-          </a:p>
-          <a:p>
-            <a:r>
-              <a:rPr lang="en-GB" dirty="0"/>
-              <a:t>Looks like there is just a huge issue in enemy  bullets</a:t>
-            </a:r>
-          </a:p>
-          <a:p>
-            <a:r>
-              <a:rPr lang="en-GB" dirty="0"/>
-              <a:t>Ok I HAVE NO FUCKING IDEA IT JUST BREAKS</a:t>
-            </a:r>
+                <a16:creationId xmlns:a16="http://schemas.microsoft.com/office/drawing/2014/main" id="{5D5F5164-6823-21E0-1DB7-07824192D311}"/>
+              </a:ext>
+            </a:extLst>
+          </p:cNvPr>
+          <p:cNvSpPr>
+            <a:spLocks noGrp="1"/>
+          </p:cNvSpPr>
+          <p:nvPr>
+            <p:ph type="ctrTitle"/>
+          </p:nvPr>
+        </p:nvSpPr>
+        <p:spPr>
+          <a:xfrm>
+            <a:off x="1322832" y="281115"/>
+            <a:ext cx="9144000" cy="715581"/>
+          </a:xfrm>
+        </p:spPr>
+        <p:txBody>
+          <a:bodyPr>
+            <a:normAutofit fontScale="90000"/>
+          </a:bodyPr>
+          <a:lstStyle/>
+          <a:p>
+            <a:r>
+              <a:rPr lang="en-GB" dirty="0"/>
+              <a:t>What I have polished from 1 </a:t>
+            </a:r>
+          </a:p>
+        </p:txBody>
+      </p:sp>
+      <p:sp>
+        <p:nvSpPr>
+          <p:cNvPr id="3" name="Subtitle 2">
+            <a:extLst>
+              <a:ext uri="{FF2B5EF4-FFF2-40B4-BE49-F238E27FC236}">
+                <a16:creationId xmlns:a16="http://schemas.microsoft.com/office/drawing/2014/main" id="{B59FC20C-371C-A448-F7BD-A2A9098205E1}"/>
+              </a:ext>
+            </a:extLst>
+          </p:cNvPr>
+          <p:cNvSpPr>
+            <a:spLocks noGrp="1"/>
+          </p:cNvSpPr>
+          <p:nvPr>
+            <p:ph type="subTitle" idx="1"/>
+          </p:nvPr>
+        </p:nvSpPr>
+        <p:spPr>
+          <a:xfrm>
+            <a:off x="1524000" y="1252728"/>
+            <a:ext cx="9144000" cy="4005072"/>
+          </a:xfrm>
+        </p:spPr>
+        <p:txBody>
+          <a:bodyPr/>
+          <a:lstStyle/>
+          <a:p>
+            <a:pPr marL="342900" indent="-342900">
+              <a:buFont typeface="Arial" panose="020B0604020202020204" pitchFamily="34" charset="0"/>
+              <a:buChar char="•"/>
+            </a:pPr>
+            <a:r>
+              <a:rPr lang="en-GB" dirty="0"/>
+              <a:t>Walking / Foot clipping thro floor (Still need to </a:t>
+            </a:r>
+            <a:r>
+              <a:rPr lang="en-GB" dirty="0" err="1"/>
+              <a:t>fuckking</a:t>
+            </a:r>
+            <a:r>
+              <a:rPr lang="en-GB" dirty="0"/>
+              <a:t> move everything else down) </a:t>
+            </a:r>
+          </a:p>
+          <a:p>
+            <a:pPr marL="342900" indent="-342900">
+              <a:buFont typeface="Arial" panose="020B0604020202020204" pitchFamily="34" charset="0"/>
+              <a:buChar char="•"/>
+            </a:pPr>
+            <a:r>
+              <a:rPr lang="en-GB" dirty="0"/>
+              <a:t>Weapons (Anubis’ Staff ) , Bullet (Fire Energy Blasts) – I think some errors are still occurring so need to fix this and then add sound </a:t>
+            </a:r>
+          </a:p>
+          <a:p>
+            <a:pPr marL="342900" indent="-342900">
+              <a:buFont typeface="Arial" panose="020B0604020202020204" pitchFamily="34" charset="0"/>
+              <a:buChar char="•"/>
+            </a:pPr>
+            <a:r>
+              <a:rPr lang="en-GB" dirty="0"/>
+              <a:t>Now - Enemy Animations (cant fix the drop , maybe cut time )</a:t>
+            </a:r>
+          </a:p>
+          <a:p>
+            <a:pPr marL="342900" indent="-342900">
+              <a:buFont typeface="Arial" panose="020B0604020202020204" pitchFamily="34" charset="0"/>
+              <a:buChar char="•"/>
+            </a:pPr>
+            <a:endParaRPr lang="en-GB" dirty="0"/>
           </a:p>
         </p:txBody>
       </p:sp>
     </p:spTree>
     <p:extLst>
       <p:ext uri="{BB962C8B-B14F-4D97-AF65-F5344CB8AC3E}">
-        <p14:creationId xmlns:p14="http://schemas.microsoft.com/office/powerpoint/2010/main" val="1031901185"/>
+        <p14:creationId xmlns:p14="http://schemas.microsoft.com/office/powerpoint/2010/main" val="1595508834"/>
       </p:ext>
     </p:extLst>
   </p:cSld>
@@ -7662,112 +7735,89 @@
           <p:cNvPr id="2" name="Title 1">
             <a:extLst>
               <a:ext uri="{FF2B5EF4-FFF2-40B4-BE49-F238E27FC236}">
-                <a16:creationId xmlns:a16="http://schemas.microsoft.com/office/drawing/2014/main" id="{5D5F5164-6823-21E0-1DB7-07824192D311}"/>
-              </a:ext>
-            </a:extLst>
-          </p:cNvPr>
-          <p:cNvSpPr>
-            <a:spLocks noGrp="1"/>
-          </p:cNvSpPr>
-          <p:nvPr>
-            <p:ph type="ctrTitle"/>
-          </p:nvPr>
-        </p:nvSpPr>
-        <p:spPr>
-          <a:xfrm>
-            <a:off x="1322832" y="281115"/>
-            <a:ext cx="9144000" cy="715581"/>
-          </a:xfrm>
-        </p:spPr>
-        <p:txBody>
-          <a:bodyPr>
-            <a:normAutofit fontScale="90000"/>
-          </a:bodyPr>
-          <a:lstStyle/>
-          <a:p>
-            <a:r>
-              <a:rPr lang="en-GB" dirty="0"/>
-              <a:t>What I have polished from 1 </a:t>
-            </a:r>
-          </a:p>
-        </p:txBody>
-      </p:sp>
-      <p:sp>
-        <p:nvSpPr>
-          <p:cNvPr id="3" name="Subtitle 2">
-            <a:extLst>
-              <a:ext uri="{FF2B5EF4-FFF2-40B4-BE49-F238E27FC236}">
-                <a16:creationId xmlns:a16="http://schemas.microsoft.com/office/drawing/2014/main" id="{B59FC20C-371C-A448-F7BD-A2A9098205E1}"/>
-              </a:ext>
-            </a:extLst>
-          </p:cNvPr>
-          <p:cNvSpPr>
-            <a:spLocks noGrp="1"/>
-          </p:cNvSpPr>
-          <p:nvPr>
-            <p:ph type="subTitle" idx="1"/>
-          </p:nvPr>
-        </p:nvSpPr>
-        <p:spPr>
-          <a:xfrm>
-            <a:off x="1524000" y="1252728"/>
-            <a:ext cx="9144000" cy="4005072"/>
-          </a:xfrm>
-        </p:spPr>
-        <p:txBody>
-          <a:bodyPr/>
-          <a:lstStyle/>
-          <a:p>
-            <a:pPr marL="342900" indent="-342900">
-              <a:buFont typeface="Arial" panose="020B0604020202020204" pitchFamily="34" charset="0"/>
-              <a:buChar char="•"/>
-            </a:pPr>
-            <a:r>
-              <a:rPr lang="en-GB" dirty="0"/>
-              <a:t>Walking / Foot clipping thro floor (Still need to </a:t>
+                <a16:creationId xmlns:a16="http://schemas.microsoft.com/office/drawing/2014/main" id="{57C7B847-85C8-83BD-8B33-368E1675D7D2}"/>
+              </a:ext>
+            </a:extLst>
+          </p:cNvPr>
+          <p:cNvSpPr>
+            <a:spLocks noGrp="1"/>
+          </p:cNvSpPr>
+          <p:nvPr>
+            <p:ph type="title"/>
+          </p:nvPr>
+        </p:nvSpPr>
+        <p:spPr/>
+        <p:txBody>
+          <a:bodyPr/>
+          <a:lstStyle/>
+          <a:p>
+            <a:r>
+              <a:rPr lang="en-GB" dirty="0"/>
+              <a:t>1 Enemy Model / Animation </a:t>
+            </a:r>
+          </a:p>
+        </p:txBody>
+      </p:sp>
+      <p:sp>
+        <p:nvSpPr>
+          <p:cNvPr id="3" name="Content Placeholder 2">
+            <a:extLst>
+              <a:ext uri="{FF2B5EF4-FFF2-40B4-BE49-F238E27FC236}">
+                <a16:creationId xmlns:a16="http://schemas.microsoft.com/office/drawing/2014/main" id="{47A9B217-6AA4-39D7-6657-3D1ACD984C87}"/>
+              </a:ext>
+            </a:extLst>
+          </p:cNvPr>
+          <p:cNvSpPr>
+            <a:spLocks noGrp="1"/>
+          </p:cNvSpPr>
+          <p:nvPr>
+            <p:ph idx="1"/>
+          </p:nvPr>
+        </p:nvSpPr>
+        <p:spPr/>
+        <p:txBody>
+          <a:bodyPr/>
+          <a:lstStyle/>
+          <a:p>
+            <a:r>
+              <a:rPr lang="en-GB" dirty="0"/>
+              <a:t>FUCK</a:t>
+            </a:r>
+          </a:p>
+          <a:p>
+            <a:r>
+              <a:rPr lang="en-GB" dirty="0"/>
+              <a:t>Moving the floor down seemed to fix this but so did turning off APPLY ROOOT MOTION , I reverted the floor space back to </a:t>
             </a:r>
             <a:r>
               <a:rPr lang="en-GB" dirty="0" err="1"/>
-              <a:t>fuckking</a:t>
-            </a:r>
-            <a:r>
-              <a:rPr lang="en-GB" dirty="0"/>
-              <a:t> move everything else down) </a:t>
-            </a:r>
-          </a:p>
-          <a:p>
-            <a:pPr marL="342900" indent="-342900">
-              <a:buFont typeface="Arial" panose="020B0604020202020204" pitchFamily="34" charset="0"/>
-              <a:buChar char="•"/>
-            </a:pPr>
-            <a:r>
-              <a:rPr lang="en-GB" dirty="0"/>
-              <a:t>Weapons (Anubis’ Staff ) , Bullet (Fire Energy Blasts) – I think some errors are still occurring so need to fix this and then add sound </a:t>
-            </a:r>
-          </a:p>
-          <a:p>
-            <a:pPr marL="342900" indent="-342900">
-              <a:buFont typeface="Arial" panose="020B0604020202020204" pitchFamily="34" charset="0"/>
-              <a:buChar char="•"/>
-            </a:pPr>
-            <a:r>
-              <a:rPr lang="en-GB" dirty="0"/>
-              <a:t>Now - Enemy Animations (cant fix the drop , maybe cut time )</a:t>
-            </a:r>
-          </a:p>
-          <a:p>
-            <a:pPr marL="342900" indent="-342900">
-              <a:buFont typeface="Arial" panose="020B0604020202020204" pitchFamily="34" charset="0"/>
-              <a:buChar char="•"/>
-            </a:pPr>
-            <a:endParaRPr lang="en-GB" dirty="0"/>
+              <a:t>normall</a:t>
+            </a:r>
+            <a:r>
+              <a:rPr lang="en-GB" dirty="0"/>
+              <a:t> so I can focus on the fix , if I do choose this option I will need to move all models down too lol long </a:t>
+            </a:r>
+          </a:p>
+          <a:p>
+            <a:r>
+              <a:rPr lang="en-GB" dirty="0"/>
+              <a:t>Think </a:t>
+            </a:r>
+            <a:r>
+              <a:rPr lang="en-GB" dirty="0" err="1"/>
+              <a:t>im</a:t>
+            </a:r>
+            <a:r>
+              <a:rPr lang="en-GB" dirty="0"/>
+              <a:t> going to stick to the Floor being moved down </a:t>
+            </a:r>
           </a:p>
         </p:txBody>
       </p:sp>
     </p:spTree>
     <p:extLst>
       <p:ext uri="{BB962C8B-B14F-4D97-AF65-F5344CB8AC3E}">
-        <p14:creationId xmlns:p14="http://schemas.microsoft.com/office/powerpoint/2010/main" val="1595508834"/>
+        <p14:creationId xmlns:p14="http://schemas.microsoft.com/office/powerpoint/2010/main" val="3446317224"/>
       </p:ext>
     </p:extLst>
   </p:cSld>
@@ -7799,7 +7849,7 @@
           <p:cNvPr id="2" name="Title 1">
             <a:extLst>
               <a:ext uri="{FF2B5EF4-FFF2-40B4-BE49-F238E27FC236}">
-                <a16:creationId xmlns:a16="http://schemas.microsoft.com/office/drawing/2014/main" id="{57C7B847-85C8-83BD-8B33-368E1675D7D2}"/>
+                <a16:creationId xmlns:a16="http://schemas.microsoft.com/office/drawing/2014/main" id="{F7DE0487-4631-3ED0-1DC0-E15CA3D6C02F}"/>
               </a:ext>
             </a:extLst>
           </p:cNvPr>
@@ -7817,7 +7867,7 @@
           <a:p>
             <a:r>
               <a:rPr lang="en-GB" dirty="0"/>
-              <a:t>1 Enemy Model / Animation </a:t>
+              <a:t>Enemy Shoot</a:t>
             </a:r>
           </a:p>
         </p:txBody>
@@ -7827,7 +7877,7 @@
           <p:cNvPr id="3" name="Content Placeholder 2">
             <a:extLst>
               <a:ext uri="{FF2B5EF4-FFF2-40B4-BE49-F238E27FC236}">
-                <a16:creationId xmlns:a16="http://schemas.microsoft.com/office/drawing/2014/main" id="{47A9B217-6AA4-39D7-6657-3D1ACD984C87}"/>
+                <a16:creationId xmlns:a16="http://schemas.microsoft.com/office/drawing/2014/main" id="{845461F8-2BD3-76F1-C139-F952972A7763}"/>
               </a:ext>
             </a:extLst>
           </p:cNvPr>
@@ -7845,35 +7895,21 @@
           <a:p>
             <a:r>
               <a:rPr lang="en-GB" dirty="0"/>
-              <a:t>FUCK</a:t>
-            </a:r>
-          </a:p>
-          <a:p>
-            <a:r>
-              <a:rPr lang="en-GB" dirty="0"/>
-              <a:t>Moving the floor down seemed to fix this but so did turning off APPLY ROOOT MOTION , I reverted the floor space back to </a:t>
+              <a:t>Seems to be shooting bent left, also seems as the </a:t>
             </a:r>
             <a:r>
               <a:rPr lang="en-GB" dirty="0" err="1"/>
-              <a:t>normall</a:t>
-            </a:r>
-            <a:r>
-              <a:rPr lang="en-GB" dirty="0"/>
-              <a:t> so I can focus on the fix , if I do choose this option I will need to move all models down too lol long </a:t>
-            </a:r>
-          </a:p>
-          <a:p>
-            <a:r>
-              <a:rPr lang="en-GB" dirty="0"/>
-              <a:t>Think </a:t>
-            </a:r>
-            <a:r>
-              <a:rPr lang="en-GB" dirty="0" err="1"/>
-              <a:t>im</a:t>
-            </a:r>
-            <a:r>
-              <a:rPr lang="en-GB" dirty="0"/>
-              <a:t> going to stick to the Floor being moved down </a:t>
+              <a:t>ememies</a:t>
+            </a:r>
+            <a:r>
+              <a:rPr lang="en-GB" dirty="0"/>
+              <a:t> damage themselves</a:t>
+            </a:r>
+          </a:p>
+          <a:p>
+            <a:r>
+              <a:rPr lang="en-GB" dirty="0"/>
+              <a:t>I actual don’t know it just de spawns</a:t>
             </a:r>
           </a:p>
         </p:txBody>
@@ -7881,7 +7917,7 @@
     </p:spTree>
     <p:extLst>
       <p:ext uri="{BB962C8B-B14F-4D97-AF65-F5344CB8AC3E}">
-        <p14:creationId xmlns:p14="http://schemas.microsoft.com/office/powerpoint/2010/main" val="3446317224"/>
+        <p14:creationId xmlns:p14="http://schemas.microsoft.com/office/powerpoint/2010/main" val="1736404469"/>
       </p:ext>
     </p:extLst>
   </p:cSld>

</xml_diff>

<commit_message>
User Testing more organsided and started to sort out feedback in a spreadsheet
</commit_message>
<xml_diff>
--- a/Documentation/Report/Documentationofstuff.pptx
+++ b/Documentation/Report/Documentationofstuff.pptx
@@ -25,12 +25,13 @@
     <p:sldId id="276" r:id="rId19"/>
     <p:sldId id="277" r:id="rId20"/>
     <p:sldId id="268" r:id="rId21"/>
-    <p:sldId id="267" r:id="rId22"/>
-    <p:sldId id="264" r:id="rId23"/>
-    <p:sldId id="260" r:id="rId24"/>
-    <p:sldId id="262" r:id="rId25"/>
-    <p:sldId id="263" r:id="rId26"/>
-    <p:sldId id="266" r:id="rId27"/>
+    <p:sldId id="282" r:id="rId22"/>
+    <p:sldId id="267" r:id="rId23"/>
+    <p:sldId id="264" r:id="rId24"/>
+    <p:sldId id="260" r:id="rId25"/>
+    <p:sldId id="262" r:id="rId26"/>
+    <p:sldId id="263" r:id="rId27"/>
+    <p:sldId id="266" r:id="rId28"/>
   </p:sldIdLst>
   <p:sldSz cx="12192000" cy="6858000"/>
   <p:notesSz cx="6858000" cy="9144000"/>
@@ -286,7 +287,7 @@
           <a:p>
             <a:fld id="{C272013D-9C3F-40F8-8AC4-43A405D33223}" type="datetimeFigureOut">
               <a:rPr lang="en-GB" smtClean="0"/>
-              <a:t>13/04/2025</a:t>
+              <a:t>14/04/2025</a:t>
             </a:fld>
             <a:endParaRPr lang="en-GB"/>
           </a:p>
@@ -486,7 +487,7 @@
           <a:p>
             <a:fld id="{C272013D-9C3F-40F8-8AC4-43A405D33223}" type="datetimeFigureOut">
               <a:rPr lang="en-GB" smtClean="0"/>
-              <a:t>13/04/2025</a:t>
+              <a:t>14/04/2025</a:t>
             </a:fld>
             <a:endParaRPr lang="en-GB"/>
           </a:p>
@@ -696,7 +697,7 @@
           <a:p>
             <a:fld id="{C272013D-9C3F-40F8-8AC4-43A405D33223}" type="datetimeFigureOut">
               <a:rPr lang="en-GB" smtClean="0"/>
-              <a:t>13/04/2025</a:t>
+              <a:t>14/04/2025</a:t>
             </a:fld>
             <a:endParaRPr lang="en-GB"/>
           </a:p>
@@ -896,7 +897,7 @@
           <a:p>
             <a:fld id="{C272013D-9C3F-40F8-8AC4-43A405D33223}" type="datetimeFigureOut">
               <a:rPr lang="en-GB" smtClean="0"/>
-              <a:t>13/04/2025</a:t>
+              <a:t>14/04/2025</a:t>
             </a:fld>
             <a:endParaRPr lang="en-GB"/>
           </a:p>
@@ -1172,7 +1173,7 @@
           <a:p>
             <a:fld id="{C272013D-9C3F-40F8-8AC4-43A405D33223}" type="datetimeFigureOut">
               <a:rPr lang="en-GB" smtClean="0"/>
-              <a:t>13/04/2025</a:t>
+              <a:t>14/04/2025</a:t>
             </a:fld>
             <a:endParaRPr lang="en-GB"/>
           </a:p>
@@ -1440,7 +1441,7 @@
           <a:p>
             <a:fld id="{C272013D-9C3F-40F8-8AC4-43A405D33223}" type="datetimeFigureOut">
               <a:rPr lang="en-GB" smtClean="0"/>
-              <a:t>13/04/2025</a:t>
+              <a:t>14/04/2025</a:t>
             </a:fld>
             <a:endParaRPr lang="en-GB"/>
           </a:p>
@@ -1855,7 +1856,7 @@
           <a:p>
             <a:fld id="{C272013D-9C3F-40F8-8AC4-43A405D33223}" type="datetimeFigureOut">
               <a:rPr lang="en-GB" smtClean="0"/>
-              <a:t>13/04/2025</a:t>
+              <a:t>14/04/2025</a:t>
             </a:fld>
             <a:endParaRPr lang="en-GB"/>
           </a:p>
@@ -1997,7 +1998,7 @@
           <a:p>
             <a:fld id="{C272013D-9C3F-40F8-8AC4-43A405D33223}" type="datetimeFigureOut">
               <a:rPr lang="en-GB" smtClean="0"/>
-              <a:t>13/04/2025</a:t>
+              <a:t>14/04/2025</a:t>
             </a:fld>
             <a:endParaRPr lang="en-GB"/>
           </a:p>
@@ -2110,7 +2111,7 @@
           <a:p>
             <a:fld id="{C272013D-9C3F-40F8-8AC4-43A405D33223}" type="datetimeFigureOut">
               <a:rPr lang="en-GB" smtClean="0"/>
-              <a:t>13/04/2025</a:t>
+              <a:t>14/04/2025</a:t>
             </a:fld>
             <a:endParaRPr lang="en-GB"/>
           </a:p>
@@ -2423,7 +2424,7 @@
           <a:p>
             <a:fld id="{C272013D-9C3F-40F8-8AC4-43A405D33223}" type="datetimeFigureOut">
               <a:rPr lang="en-GB" smtClean="0"/>
-              <a:t>13/04/2025</a:t>
+              <a:t>14/04/2025</a:t>
             </a:fld>
             <a:endParaRPr lang="en-GB"/>
           </a:p>
@@ -2712,7 +2713,7 @@
           <a:p>
             <a:fld id="{C272013D-9C3F-40F8-8AC4-43A405D33223}" type="datetimeFigureOut">
               <a:rPr lang="en-GB" smtClean="0"/>
-              <a:t>13/04/2025</a:t>
+              <a:t>14/04/2025</a:t>
             </a:fld>
             <a:endParaRPr lang="en-GB"/>
           </a:p>
@@ -2955,7 +2956,7 @@
           <a:p>
             <a:fld id="{C272013D-9C3F-40F8-8AC4-43A405D33223}" type="datetimeFigureOut">
               <a:rPr lang="en-GB" smtClean="0"/>
-              <a:t>13/04/2025</a:t>
+              <a:t>14/04/2025</a:t>
             </a:fld>
             <a:endParaRPr lang="en-GB"/>
           </a:p>
@@ -5940,8 +5941,37 @@
           </a:p>
           <a:p>
             <a:r>
-              <a:rPr lang="en-GB"/>
+              <a:rPr lang="en-GB" dirty="0"/>
               <a:t>Analysis </a:t>
+            </a:r>
+          </a:p>
+          <a:p>
+            <a:endParaRPr lang="en-GB" dirty="0"/>
+          </a:p>
+          <a:p>
+            <a:r>
+              <a:rPr lang="en-GB" dirty="0"/>
+              <a:t>Talk about </a:t>
+            </a:r>
+            <a:r>
+              <a:rPr lang="en-GB" dirty="0" err="1"/>
+              <a:t>abience</a:t>
+            </a:r>
+            <a:r>
+              <a:rPr lang="en-GB" dirty="0"/>
+              <a:t> sound in those games and how I added</a:t>
+            </a:r>
+          </a:p>
+          <a:p>
+            <a:r>
+              <a:rPr lang="en-GB" dirty="0"/>
+              <a:t>Also methodology, research? Books I got </a:t>
+            </a:r>
+          </a:p>
+          <a:p>
+            <a:r>
+              <a:rPr lang="en-GB" dirty="0"/>
+              <a:t>Show UI drafts by the paper based shit</a:t>
             </a:r>
           </a:p>
         </p:txBody>
@@ -5981,7 +6011,7 @@
           <p:cNvPr id="2" name="Title 1">
             <a:extLst>
               <a:ext uri="{FF2B5EF4-FFF2-40B4-BE49-F238E27FC236}">
-                <a16:creationId xmlns:a16="http://schemas.microsoft.com/office/drawing/2014/main" id="{19B657D5-0D05-CDB3-E622-CC74399D9293}"/>
+                <a16:creationId xmlns:a16="http://schemas.microsoft.com/office/drawing/2014/main" id="{B1B0BDDB-B9C6-D382-ABEA-3F7187C26E5E}"/>
               </a:ext>
             </a:extLst>
           </p:cNvPr>
@@ -5999,7 +6029,7 @@
           <a:p>
             <a:r>
               <a:rPr lang="en-GB" dirty="0"/>
-              <a:t>MOVEMENT 2</a:t>
+              <a:t>Testing </a:t>
             </a:r>
           </a:p>
         </p:txBody>
@@ -6009,7 +6039,7 @@
           <p:cNvPr id="3" name="Content Placeholder 2">
             <a:extLst>
               <a:ext uri="{FF2B5EF4-FFF2-40B4-BE49-F238E27FC236}">
-                <a16:creationId xmlns:a16="http://schemas.microsoft.com/office/drawing/2014/main" id="{6ADAF85F-3274-500B-24F1-77722205A975}"/>
+                <a16:creationId xmlns:a16="http://schemas.microsoft.com/office/drawing/2014/main" id="{5FB02605-0B9C-C8B4-1EBC-D20C2A45B3BF}"/>
               </a:ext>
             </a:extLst>
           </p:cNvPr>
@@ -6025,55 +6055,86 @@
           <a:bodyPr/>
           <a:lstStyle/>
           <a:p>
-            <a:r>
-              <a:rPr lang="en-GB" dirty="0"/>
-              <a:t>JUMP ONLY WORKS WHEN HELD</a:t>
-            </a:r>
-          </a:p>
-          <a:p>
-            <a:r>
-              <a:rPr lang="en-GB" dirty="0"/>
-              <a:t>KINDA BUGGY WHEN PLAYER IS BEING PUSHED </a:t>
-            </a:r>
-          </a:p>
-          <a:p>
-            <a:r>
-              <a:rPr lang="en-GB" dirty="0">
-                <a:hlinkClick r:id="rId2"/>
-              </a:rPr>
-              <a:t>https://www.youtube.com/watch?v=_QajrabyTJc&amp;t=848s</a:t>
-            </a:r>
+            <a:pPr marL="0" indent="0">
+              <a:buNone/>
+            </a:pPr>
+            <a:r>
+              <a:rPr lang="en-GB" dirty="0"/>
+              <a:t>anonymous is best, coz if you get their PI then you have to be careful about GDPR and what you want to do with it </a:t>
+            </a:r>
+          </a:p>
+          <a:p>
+            <a:pPr marL="0" indent="0">
+              <a:buNone/>
+            </a:pPr>
+            <a:r>
+              <a:rPr lang="en-GB" dirty="0"/>
+              <a:t>I can say I chose </a:t>
+            </a:r>
+            <a:r>
+              <a:rPr lang="en-GB" dirty="0" err="1"/>
+              <a:t>ananamys</a:t>
+            </a:r>
+            <a:r>
+              <a:rPr lang="en-GB" dirty="0"/>
+              <a:t> as I just wanted feedback purely for the game</a:t>
+            </a:r>
+          </a:p>
+          <a:p>
+            <a:pPr marL="0" indent="0">
+              <a:buNone/>
+            </a:pPr>
+            <a:r>
+              <a:rPr lang="en-GB" dirty="0"/>
+              <a:t>I asked if they had a gaming background to see if non gamers could easily pick up the game</a:t>
+            </a:r>
+          </a:p>
+          <a:p>
+            <a:pPr marL="0" indent="0">
+              <a:buNone/>
+            </a:pPr>
             <a:endParaRPr lang="en-GB" dirty="0"/>
           </a:p>
           <a:p>
-            <a:endParaRPr lang="en-GB" dirty="0"/>
-          </a:p>
-          <a:p>
-            <a:r>
-              <a:rPr lang="en-GB" dirty="0"/>
-              <a:t>Can always revert back to old as  I saved them as  prefabs and old movement in separate folder </a:t>
-            </a:r>
-          </a:p>
-          <a:p>
-            <a:r>
-              <a:rPr lang="en-GB" dirty="0"/>
-              <a:t>Make sure to change movement in lvl1 </a:t>
+            <a:pPr marL="0" indent="0">
+              <a:buNone/>
+            </a:pPr>
+            <a:r>
+              <a:rPr lang="en-GB" dirty="0"/>
+              <a:t>Include Photos of testing </a:t>
             </a:r>
             <a:r>
               <a:rPr lang="en-GB" dirty="0" err="1"/>
-              <a:t>aswel</a:t>
-            </a:r>
-            <a:endParaRPr lang="en-GB"/>
-          </a:p>
-          <a:p>
-            <a:endParaRPr lang="en-GB"/>
+              <a:t>commensing</a:t>
+            </a:r>
+            <a:r>
+              <a:rPr lang="en-GB" dirty="0"/>
+              <a:t> </a:t>
+            </a:r>
+          </a:p>
+          <a:p>
+            <a:pPr marL="0" indent="0">
+              <a:buNone/>
+            </a:pPr>
+            <a:r>
+              <a:rPr lang="en-GB" dirty="0"/>
+              <a:t>Turn results into graph or </a:t>
+            </a:r>
+            <a:r>
+              <a:rPr lang="en-GB" dirty="0" err="1"/>
+              <a:t>whtever</a:t>
+            </a:r>
+            <a:r>
+              <a:rPr lang="en-GB" dirty="0"/>
+              <a:t> u</a:t>
+            </a:r>
           </a:p>
         </p:txBody>
       </p:sp>
     </p:spTree>
     <p:extLst>
       <p:ext uri="{BB962C8B-B14F-4D97-AF65-F5344CB8AC3E}">
-        <p14:creationId xmlns:p14="http://schemas.microsoft.com/office/powerpoint/2010/main" val="3653716512"/>
+        <p14:creationId xmlns:p14="http://schemas.microsoft.com/office/powerpoint/2010/main" val="983611282"/>
       </p:ext>
     </p:extLst>
   </p:cSld>
@@ -6105,6 +6166,130 @@
           <p:cNvPr id="2" name="Title 1">
             <a:extLst>
               <a:ext uri="{FF2B5EF4-FFF2-40B4-BE49-F238E27FC236}">
+                <a16:creationId xmlns:a16="http://schemas.microsoft.com/office/drawing/2014/main" id="{19B657D5-0D05-CDB3-E622-CC74399D9293}"/>
+              </a:ext>
+            </a:extLst>
+          </p:cNvPr>
+          <p:cNvSpPr>
+            <a:spLocks noGrp="1"/>
+          </p:cNvSpPr>
+          <p:nvPr>
+            <p:ph type="title"/>
+          </p:nvPr>
+        </p:nvSpPr>
+        <p:spPr/>
+        <p:txBody>
+          <a:bodyPr/>
+          <a:lstStyle/>
+          <a:p>
+            <a:r>
+              <a:rPr lang="en-GB" dirty="0"/>
+              <a:t>MOVEMENT 2</a:t>
+            </a:r>
+          </a:p>
+        </p:txBody>
+      </p:sp>
+      <p:sp>
+        <p:nvSpPr>
+          <p:cNvPr id="3" name="Content Placeholder 2">
+            <a:extLst>
+              <a:ext uri="{FF2B5EF4-FFF2-40B4-BE49-F238E27FC236}">
+                <a16:creationId xmlns:a16="http://schemas.microsoft.com/office/drawing/2014/main" id="{6ADAF85F-3274-500B-24F1-77722205A975}"/>
+              </a:ext>
+            </a:extLst>
+          </p:cNvPr>
+          <p:cNvSpPr>
+            <a:spLocks noGrp="1"/>
+          </p:cNvSpPr>
+          <p:nvPr>
+            <p:ph idx="1"/>
+          </p:nvPr>
+        </p:nvSpPr>
+        <p:spPr/>
+        <p:txBody>
+          <a:bodyPr/>
+          <a:lstStyle/>
+          <a:p>
+            <a:r>
+              <a:rPr lang="en-GB" dirty="0"/>
+              <a:t>JUMP ONLY WORKS WHEN HELD</a:t>
+            </a:r>
+          </a:p>
+          <a:p>
+            <a:r>
+              <a:rPr lang="en-GB" dirty="0"/>
+              <a:t>KINDA BUGGY WHEN PLAYER IS BEING PUSHED </a:t>
+            </a:r>
+          </a:p>
+          <a:p>
+            <a:r>
+              <a:rPr lang="en-GB" dirty="0">
+                <a:hlinkClick r:id="rId2"/>
+              </a:rPr>
+              <a:t>https://www.youtube.com/watch?v=_QajrabyTJc&amp;t=848s</a:t>
+            </a:r>
+            <a:endParaRPr lang="en-GB" dirty="0"/>
+          </a:p>
+          <a:p>
+            <a:endParaRPr lang="en-GB" dirty="0"/>
+          </a:p>
+          <a:p>
+            <a:r>
+              <a:rPr lang="en-GB" dirty="0"/>
+              <a:t>Can always revert back to old as  I saved them as  prefabs and old movement in separate folder </a:t>
+            </a:r>
+          </a:p>
+          <a:p>
+            <a:r>
+              <a:rPr lang="en-GB" dirty="0"/>
+              <a:t>Make sure to change movement in lvl1 </a:t>
+            </a:r>
+            <a:r>
+              <a:rPr lang="en-GB" dirty="0" err="1"/>
+              <a:t>aswel</a:t>
+            </a:r>
+            <a:endParaRPr lang="en-GB"/>
+          </a:p>
+          <a:p>
+            <a:endParaRPr lang="en-GB"/>
+          </a:p>
+        </p:txBody>
+      </p:sp>
+    </p:spTree>
+    <p:extLst>
+      <p:ext uri="{BB962C8B-B14F-4D97-AF65-F5344CB8AC3E}">
+        <p14:creationId xmlns:p14="http://schemas.microsoft.com/office/powerpoint/2010/main" val="3653716512"/>
+      </p:ext>
+    </p:extLst>
+  </p:cSld>
+  <p:clrMapOvr>
+    <a:masterClrMapping/>
+  </p:clrMapOvr>
+</p:sld>
+</file>
+
+<file path=ppt/slides/slide23.xml><?xml version="1.0" encoding="utf-8"?>
+<p:sld xmlns:a="http://schemas.openxmlformats.org/drawingml/2006/main" xmlns:r="http://schemas.openxmlformats.org/officeDocument/2006/relationships" xmlns:p="http://schemas.openxmlformats.org/presentationml/2006/main">
+  <p:cSld>
+    <p:spTree>
+      <p:nvGrpSpPr>
+        <p:cNvPr id="1" name=""/>
+        <p:cNvGrpSpPr/>
+        <p:nvPr/>
+      </p:nvGrpSpPr>
+      <p:grpSpPr>
+        <a:xfrm>
+          <a:off x="0" y="0"/>
+          <a:ext cx="0" cy="0"/>
+          <a:chOff x="0" y="0"/>
+          <a:chExt cx="0" cy="0"/>
+        </a:xfrm>
+      </p:grpSpPr>
+      <p:sp>
+        <p:nvSpPr>
+          <p:cNvPr id="2" name="Title 1">
+            <a:extLst>
+              <a:ext uri="{FF2B5EF4-FFF2-40B4-BE49-F238E27FC236}">
                 <a16:creationId xmlns:a16="http://schemas.microsoft.com/office/drawing/2014/main" id="{76F7E7E4-9827-C9EA-41A9-B8C6EF75B3BA}"/>
               </a:ext>
             </a:extLst>
@@ -6594,7 +6779,7 @@
 </p:sld>
 </file>
 
-<file path=ppt/slides/slide23.xml><?xml version="1.0" encoding="utf-8"?>
+<file path=ppt/slides/slide24.xml><?xml version="1.0" encoding="utf-8"?>
 <p:sld xmlns:a="http://schemas.openxmlformats.org/drawingml/2006/main" xmlns:r="http://schemas.openxmlformats.org/officeDocument/2006/relationships" xmlns:p="http://schemas.openxmlformats.org/presentationml/2006/main">
   <p:cSld>
     <p:spTree>
@@ -6736,7 +6921,7 @@
 </p:sld>
 </file>
 
-<file path=ppt/slides/slide24.xml><?xml version="1.0" encoding="utf-8"?>
+<file path=ppt/slides/slide25.xml><?xml version="1.0" encoding="utf-8"?>
 <p:sld xmlns:a="http://schemas.openxmlformats.org/drawingml/2006/main" xmlns:r="http://schemas.openxmlformats.org/officeDocument/2006/relationships" xmlns:p="http://schemas.openxmlformats.org/presentationml/2006/main">
   <p:cSld>
     <p:spTree>
@@ -6895,7 +7080,7 @@
 </p:sld>
 </file>
 
-<file path=ppt/slides/slide25.xml><?xml version="1.0" encoding="utf-8"?>
+<file path=ppt/slides/slide26.xml><?xml version="1.0" encoding="utf-8"?>
 <p:sld xmlns:a="http://schemas.openxmlformats.org/drawingml/2006/main" xmlns:r="http://schemas.openxmlformats.org/officeDocument/2006/relationships" xmlns:p="http://schemas.openxmlformats.org/presentationml/2006/main">
   <p:cSld>
     <p:spTree>
@@ -7017,7 +7202,7 @@
 </p:sld>
 </file>
 
-<file path=ppt/slides/slide26.xml><?xml version="1.0" encoding="utf-8"?>
+<file path=ppt/slides/slide27.xml><?xml version="1.0" encoding="utf-8"?>
 <p:sld xmlns:a="http://schemas.openxmlformats.org/drawingml/2006/main" xmlns:r="http://schemas.openxmlformats.org/officeDocument/2006/relationships" xmlns:p="http://schemas.openxmlformats.org/presentationml/2006/main">
   <p:cSld>
     <p:spTree>

</xml_diff>

<commit_message>
Report Progress all day
</commit_message>
<xml_diff>
--- a/Documentation/Report/Documentationofstuff.pptx
+++ b/Documentation/Report/Documentationofstuff.pptx
@@ -288,7 +288,7 @@
           <a:p>
             <a:fld id="{C272013D-9C3F-40F8-8AC4-43A405D33223}" type="datetimeFigureOut">
               <a:rPr lang="en-GB" smtClean="0"/>
-              <a:t>15/04/2025</a:t>
+              <a:t>16/04/2025</a:t>
             </a:fld>
             <a:endParaRPr lang="en-GB"/>
           </a:p>
@@ -488,7 +488,7 @@
           <a:p>
             <a:fld id="{C272013D-9C3F-40F8-8AC4-43A405D33223}" type="datetimeFigureOut">
               <a:rPr lang="en-GB" smtClean="0"/>
-              <a:t>15/04/2025</a:t>
+              <a:t>16/04/2025</a:t>
             </a:fld>
             <a:endParaRPr lang="en-GB"/>
           </a:p>
@@ -698,7 +698,7 @@
           <a:p>
             <a:fld id="{C272013D-9C3F-40F8-8AC4-43A405D33223}" type="datetimeFigureOut">
               <a:rPr lang="en-GB" smtClean="0"/>
-              <a:t>15/04/2025</a:t>
+              <a:t>16/04/2025</a:t>
             </a:fld>
             <a:endParaRPr lang="en-GB"/>
           </a:p>
@@ -898,7 +898,7 @@
           <a:p>
             <a:fld id="{C272013D-9C3F-40F8-8AC4-43A405D33223}" type="datetimeFigureOut">
               <a:rPr lang="en-GB" smtClean="0"/>
-              <a:t>15/04/2025</a:t>
+              <a:t>16/04/2025</a:t>
             </a:fld>
             <a:endParaRPr lang="en-GB"/>
           </a:p>
@@ -1174,7 +1174,7 @@
           <a:p>
             <a:fld id="{C272013D-9C3F-40F8-8AC4-43A405D33223}" type="datetimeFigureOut">
               <a:rPr lang="en-GB" smtClean="0"/>
-              <a:t>15/04/2025</a:t>
+              <a:t>16/04/2025</a:t>
             </a:fld>
             <a:endParaRPr lang="en-GB"/>
           </a:p>
@@ -1442,7 +1442,7 @@
           <a:p>
             <a:fld id="{C272013D-9C3F-40F8-8AC4-43A405D33223}" type="datetimeFigureOut">
               <a:rPr lang="en-GB" smtClean="0"/>
-              <a:t>15/04/2025</a:t>
+              <a:t>16/04/2025</a:t>
             </a:fld>
             <a:endParaRPr lang="en-GB"/>
           </a:p>
@@ -1857,7 +1857,7 @@
           <a:p>
             <a:fld id="{C272013D-9C3F-40F8-8AC4-43A405D33223}" type="datetimeFigureOut">
               <a:rPr lang="en-GB" smtClean="0"/>
-              <a:t>15/04/2025</a:t>
+              <a:t>16/04/2025</a:t>
             </a:fld>
             <a:endParaRPr lang="en-GB"/>
           </a:p>
@@ -1999,7 +1999,7 @@
           <a:p>
             <a:fld id="{C272013D-9C3F-40F8-8AC4-43A405D33223}" type="datetimeFigureOut">
               <a:rPr lang="en-GB" smtClean="0"/>
-              <a:t>15/04/2025</a:t>
+              <a:t>16/04/2025</a:t>
             </a:fld>
             <a:endParaRPr lang="en-GB"/>
           </a:p>
@@ -2112,7 +2112,7 @@
           <a:p>
             <a:fld id="{C272013D-9C3F-40F8-8AC4-43A405D33223}" type="datetimeFigureOut">
               <a:rPr lang="en-GB" smtClean="0"/>
-              <a:t>15/04/2025</a:t>
+              <a:t>16/04/2025</a:t>
             </a:fld>
             <a:endParaRPr lang="en-GB"/>
           </a:p>
@@ -2425,7 +2425,7 @@
           <a:p>
             <a:fld id="{C272013D-9C3F-40F8-8AC4-43A405D33223}" type="datetimeFigureOut">
               <a:rPr lang="en-GB" smtClean="0"/>
-              <a:t>15/04/2025</a:t>
+              <a:t>16/04/2025</a:t>
             </a:fld>
             <a:endParaRPr lang="en-GB"/>
           </a:p>
@@ -2714,7 +2714,7 @@
           <a:p>
             <a:fld id="{C272013D-9C3F-40F8-8AC4-43A405D33223}" type="datetimeFigureOut">
               <a:rPr lang="en-GB" smtClean="0"/>
-              <a:t>15/04/2025</a:t>
+              <a:t>16/04/2025</a:t>
             </a:fld>
             <a:endParaRPr lang="en-GB"/>
           </a:p>
@@ -2957,7 +2957,7 @@
           <a:p>
             <a:fld id="{C272013D-9C3F-40F8-8AC4-43A405D33223}" type="datetimeFigureOut">
               <a:rPr lang="en-GB" smtClean="0"/>
-              <a:t>15/04/2025</a:t>
+              <a:t>16/04/2025</a:t>
             </a:fld>
             <a:endParaRPr lang="en-GB"/>
           </a:p>
@@ -5297,12 +5297,22 @@
         </p:nvSpPr>
         <p:spPr/>
         <p:txBody>
-          <a:bodyPr/>
-          <a:lstStyle/>
-          <a:p>
-            <a:r>
-              <a:rPr lang="en-GB" dirty="0"/>
-              <a:t>Background , Objectives &amp; Deliverables </a:t>
+          <a:bodyPr>
+            <a:normAutofit/>
+          </a:bodyPr>
+          <a:lstStyle/>
+          <a:p>
+            <a:r>
+              <a:rPr lang="en-GB" dirty="0"/>
+              <a:t>Background , Objectives &amp; Deliverables (</a:t>
+            </a:r>
+            <a:r>
+              <a:rPr lang="en-GB" dirty="0" err="1"/>
+              <a:t>gdd</a:t>
+            </a:r>
+            <a:r>
+              <a:rPr lang="en-GB" dirty="0"/>
+              <a:t>) </a:t>
             </a:r>
           </a:p>
           <a:p>
@@ -5320,14 +5330,26 @@
           <a:p>
             <a:r>
               <a:rPr lang="en-GB" dirty="0"/>
-              <a:t>User Testing </a:t>
-            </a:r>
-          </a:p>
-          <a:p>
-            <a:r>
-              <a:rPr lang="en-GB" dirty="0"/>
               <a:t>Legal social ethical professional</a:t>
             </a:r>
+          </a:p>
+          <a:p>
+            <a:endParaRPr lang="en-GB" dirty="0"/>
+          </a:p>
+          <a:p>
+            <a:r>
+              <a:rPr lang="en-GB" dirty="0"/>
+              <a:t>User Testing  </a:t>
+            </a:r>
+            <a:r>
+              <a:rPr lang="en-GB" dirty="0">
+                <a:highlight>
+                  <a:srgbClr val="00FF00"/>
+                </a:highlight>
+              </a:rPr>
+              <a:t>(change this to here in report )</a:t>
+            </a:r>
+            <a:endParaRPr lang="en-GB" dirty="0"/>
           </a:p>
           <a:p>
             <a:r>
@@ -7404,6 +7426,21 @@
               <a:rPr lang="en-GB" dirty="0"/>
               <a:t>JUST WANT TO POLISH OFF GAME NOW</a:t>
             </a:r>
+          </a:p>
+          <a:p>
+            <a:r>
+              <a:rPr lang="en-GB" dirty="0"/>
+              <a:t>Rent</a:t>
+            </a:r>
+          </a:p>
+          <a:p>
+            <a:r>
+              <a:rPr lang="en-GB" dirty="0"/>
+              <a:t>Bampy card</a:t>
+            </a:r>
+          </a:p>
+          <a:p>
+            <a:endParaRPr lang="en-GB" dirty="0"/>
           </a:p>
         </p:txBody>
       </p:sp>

</xml_diff>